<commit_message>
more plots and corrections
</commit_message>
<xml_diff>
--- a/RapidAdaptation_DataExploration.pptx
+++ b/RapidAdaptation_DataExploration.pptx
@@ -7,8 +7,20 @@
   <p:sldIdLst>
     <p:sldId id="256" r:id="rId2"/>
     <p:sldId id="257" r:id="rId3"/>
-    <p:sldId id="258" r:id="rId4"/>
-    <p:sldId id="259" r:id="rId5"/>
+    <p:sldId id="269" r:id="rId4"/>
+    <p:sldId id="267" r:id="rId5"/>
+    <p:sldId id="270" r:id="rId6"/>
+    <p:sldId id="272" r:id="rId7"/>
+    <p:sldId id="271" r:id="rId8"/>
+    <p:sldId id="268" r:id="rId9"/>
+    <p:sldId id="258" r:id="rId10"/>
+    <p:sldId id="259" r:id="rId11"/>
+    <p:sldId id="262" r:id="rId12"/>
+    <p:sldId id="266" r:id="rId13"/>
+    <p:sldId id="261" r:id="rId14"/>
+    <p:sldId id="263" r:id="rId15"/>
+    <p:sldId id="265" r:id="rId16"/>
+    <p:sldId id="264" r:id="rId17"/>
   </p:sldIdLst>
   <p:sldSz cx="12192000" cy="6858000"/>
   <p:notesSz cx="6858000" cy="9144000"/>
@@ -107,13 +119,18 @@
       </a:defRPr>
     </a:lvl9pPr>
   </p:defaultTextStyle>
+  <p:extLst>
+    <p:ext uri="{EFAFB233-063F-42B5-8137-9DF3F51BA10A}">
+      <p15:sldGuideLst xmlns:p15="http://schemas.microsoft.com/office/powerpoint/2012/main"/>
+    </p:ext>
+  </p:extLst>
 </p:presentation>
 </file>
 
 <file path=ppt/revisionInfo.xml><?xml version="1.0" encoding="utf-8"?>
 <p1510:revInfo xmlns:a="http://schemas.openxmlformats.org/drawingml/2006/main" xmlns:r="http://schemas.openxmlformats.org/officeDocument/2006/relationships" xmlns:p1510="http://schemas.microsoft.com/office/powerpoint/2015/10/main">
   <p1510:revLst>
-    <p1510:client id="{100BBC7B-7ACA-4A4D-BA33-DEF31D162335}" v="3" dt="2025-12-02T15:51:47.306"/>
+    <p1510:client id="{100BBC7B-7ACA-4A4D-BA33-DEF31D162335}" v="36" dt="2025-12-08T15:44:12.728"/>
   </p1510:revLst>
 </p1510:revInfo>
 </file>
@@ -122,8 +139,8 @@
 <pc:chgInfo xmlns:a="http://schemas.openxmlformats.org/drawingml/2006/main" xmlns:r="http://schemas.openxmlformats.org/officeDocument/2006/relationships" xmlns:ac="http://schemas.microsoft.com/office/drawing/2013/main/command" xmlns:pc="http://schemas.microsoft.com/office/powerpoint/2013/main/command">
   <pc:docChgLst>
     <pc:chgData name="Luisa Dickenmann" userId="0c0840b0-1ae7-42c8-98b5-b02d8f71a603" providerId="ADAL" clId="{100BBC7B-7ACA-4A4D-BA33-DEF31D162335}"/>
-    <pc:docChg chg="custSel modSld">
-      <pc:chgData name="Luisa Dickenmann" userId="0c0840b0-1ae7-42c8-98b5-b02d8f71a603" providerId="ADAL" clId="{100BBC7B-7ACA-4A4D-BA33-DEF31D162335}" dt="2025-12-02T15:52:10.502" v="11" actId="1076"/>
+    <pc:docChg chg="undo custSel addSld delSld modSld sldOrd">
+      <pc:chgData name="Luisa Dickenmann" userId="0c0840b0-1ae7-42c8-98b5-b02d8f71a603" providerId="ADAL" clId="{100BBC7B-7ACA-4A4D-BA33-DEF31D162335}" dt="2025-12-08T15:44:55.261" v="896" actId="1036"/>
       <pc:docMkLst>
         <pc:docMk/>
       </pc:docMkLst>
@@ -150,22 +167,38 @@
           </ac:spMkLst>
         </pc:spChg>
       </pc:sldChg>
-      <pc:sldChg chg="modSp mod">
-        <pc:chgData name="Luisa Dickenmann" userId="0c0840b0-1ae7-42c8-98b5-b02d8f71a603" providerId="ADAL" clId="{100BBC7B-7ACA-4A4D-BA33-DEF31D162335}" dt="2025-12-02T15:51:55.999" v="5" actId="1076"/>
+      <pc:sldChg chg="addSp delSp modSp mod ord">
+        <pc:chgData name="Luisa Dickenmann" userId="0c0840b0-1ae7-42c8-98b5-b02d8f71a603" providerId="ADAL" clId="{100BBC7B-7ACA-4A4D-BA33-DEF31D162335}" dt="2025-12-08T15:18:20.700" v="802"/>
         <pc:sldMkLst>
           <pc:docMk/>
           <pc:sldMk cId="1618141787" sldId="257"/>
         </pc:sldMkLst>
         <pc:spChg chg="mod">
-          <ac:chgData name="Luisa Dickenmann" userId="0c0840b0-1ae7-42c8-98b5-b02d8f71a603" providerId="ADAL" clId="{100BBC7B-7ACA-4A4D-BA33-DEF31D162335}" dt="2025-12-02T15:51:55.999" v="5" actId="1076"/>
+          <ac:chgData name="Luisa Dickenmann" userId="0c0840b0-1ae7-42c8-98b5-b02d8f71a603" providerId="ADAL" clId="{100BBC7B-7ACA-4A4D-BA33-DEF31D162335}" dt="2025-12-08T12:15:27.186" v="406" actId="20577"/>
           <ac:spMkLst>
             <pc:docMk/>
             <pc:sldMk cId="1618141787" sldId="257"/>
             <ac:spMk id="2" creationId="{C84B0C2D-403E-AF7F-8AEE-86B35FE4EA5E}"/>
           </ac:spMkLst>
         </pc:spChg>
-        <pc:picChg chg="mod">
-          <ac:chgData name="Luisa Dickenmann" userId="0c0840b0-1ae7-42c8-98b5-b02d8f71a603" providerId="ADAL" clId="{100BBC7B-7ACA-4A4D-BA33-DEF31D162335}" dt="2025-12-02T15:51:51.941" v="4" actId="1076"/>
+        <pc:spChg chg="add del mod">
+          <ac:chgData name="Luisa Dickenmann" userId="0c0840b0-1ae7-42c8-98b5-b02d8f71a603" providerId="ADAL" clId="{100BBC7B-7ACA-4A4D-BA33-DEF31D162335}" dt="2025-12-08T14:24:00.490" v="704" actId="478"/>
+          <ac:spMkLst>
+            <pc:docMk/>
+            <pc:sldMk cId="1618141787" sldId="257"/>
+            <ac:spMk id="3" creationId="{72515921-7BC3-6E66-F544-F04F562E7A71}"/>
+          </ac:spMkLst>
+        </pc:spChg>
+        <pc:spChg chg="add mod">
+          <ac:chgData name="Luisa Dickenmann" userId="0c0840b0-1ae7-42c8-98b5-b02d8f71a603" providerId="ADAL" clId="{100BBC7B-7ACA-4A4D-BA33-DEF31D162335}" dt="2025-12-08T14:23:58.308" v="703" actId="20577"/>
+          <ac:spMkLst>
+            <pc:docMk/>
+            <pc:sldMk cId="1618141787" sldId="257"/>
+            <ac:spMk id="4" creationId="{63AB7877-6A7E-90C1-8A72-F78A798BE679}"/>
+          </ac:spMkLst>
+        </pc:spChg>
+        <pc:picChg chg="mod modCrop">
+          <ac:chgData name="Luisa Dickenmann" userId="0c0840b0-1ae7-42c8-98b5-b02d8f71a603" providerId="ADAL" clId="{100BBC7B-7ACA-4A4D-BA33-DEF31D162335}" dt="2025-12-08T12:15:32.521" v="408" actId="1076"/>
           <ac:picMkLst>
             <pc:docMk/>
             <pc:sldMk cId="1618141787" sldId="257"/>
@@ -173,22 +206,38 @@
           </ac:picMkLst>
         </pc:picChg>
       </pc:sldChg>
-      <pc:sldChg chg="modSp mod">
-        <pc:chgData name="Luisa Dickenmann" userId="0c0840b0-1ae7-42c8-98b5-b02d8f71a603" providerId="ADAL" clId="{100BBC7B-7ACA-4A4D-BA33-DEF31D162335}" dt="2025-12-02T15:52:01.311" v="7" actId="1076"/>
+      <pc:sldChg chg="addSp delSp modSp mod">
+        <pc:chgData name="Luisa Dickenmann" userId="0c0840b0-1ae7-42c8-98b5-b02d8f71a603" providerId="ADAL" clId="{100BBC7B-7ACA-4A4D-BA33-DEF31D162335}" dt="2025-12-08T15:19:19.058" v="813" actId="1076"/>
         <pc:sldMkLst>
           <pc:docMk/>
           <pc:sldMk cId="4154756640" sldId="258"/>
         </pc:sldMkLst>
         <pc:spChg chg="mod">
-          <ac:chgData name="Luisa Dickenmann" userId="0c0840b0-1ae7-42c8-98b5-b02d8f71a603" providerId="ADAL" clId="{100BBC7B-7ACA-4A4D-BA33-DEF31D162335}" dt="2025-12-02T15:52:00.092" v="6" actId="1076"/>
+          <ac:chgData name="Luisa Dickenmann" userId="0c0840b0-1ae7-42c8-98b5-b02d8f71a603" providerId="ADAL" clId="{100BBC7B-7ACA-4A4D-BA33-DEF31D162335}" dt="2025-12-08T15:19:19.058" v="813" actId="1076"/>
           <ac:spMkLst>
             <pc:docMk/>
             <pc:sldMk cId="4154756640" sldId="258"/>
             <ac:spMk id="2" creationId="{DED8D4A8-9316-1F4F-4391-A51F0AE12446}"/>
           </ac:spMkLst>
         </pc:spChg>
-        <pc:picChg chg="mod">
-          <ac:chgData name="Luisa Dickenmann" userId="0c0840b0-1ae7-42c8-98b5-b02d8f71a603" providerId="ADAL" clId="{100BBC7B-7ACA-4A4D-BA33-DEF31D162335}" dt="2025-12-02T15:52:01.311" v="7" actId="1076"/>
+        <pc:spChg chg="add del mod">
+          <ac:chgData name="Luisa Dickenmann" userId="0c0840b0-1ae7-42c8-98b5-b02d8f71a603" providerId="ADAL" clId="{100BBC7B-7ACA-4A4D-BA33-DEF31D162335}" dt="2025-12-08T13:49:42.448" v="441" actId="931"/>
+          <ac:spMkLst>
+            <pc:docMk/>
+            <pc:sldMk cId="4154756640" sldId="258"/>
+            <ac:spMk id="4" creationId="{8623E004-269D-DA9B-FE56-2A75D127167B}"/>
+          </ac:spMkLst>
+        </pc:spChg>
+        <pc:picChg chg="add mod modCrop">
+          <ac:chgData name="Luisa Dickenmann" userId="0c0840b0-1ae7-42c8-98b5-b02d8f71a603" providerId="ADAL" clId="{100BBC7B-7ACA-4A4D-BA33-DEF31D162335}" dt="2025-12-08T13:49:55.296" v="447" actId="1076"/>
+          <ac:picMkLst>
+            <pc:docMk/>
+            <pc:sldMk cId="4154756640" sldId="258"/>
+            <ac:picMk id="6" creationId="{60E642FF-9B67-83CD-BE65-139ECD5DC288}"/>
+          </ac:picMkLst>
+        </pc:picChg>
+        <pc:picChg chg="del mod modCrop">
+          <ac:chgData name="Luisa Dickenmann" userId="0c0840b0-1ae7-42c8-98b5-b02d8f71a603" providerId="ADAL" clId="{100BBC7B-7ACA-4A4D-BA33-DEF31D162335}" dt="2025-12-08T13:49:37.996" v="440" actId="478"/>
           <ac:picMkLst>
             <pc:docMk/>
             <pc:sldMk cId="4154756640" sldId="258"/>
@@ -197,25 +246,564 @@
         </pc:picChg>
       </pc:sldChg>
       <pc:sldChg chg="modSp mod">
-        <pc:chgData name="Luisa Dickenmann" userId="0c0840b0-1ae7-42c8-98b5-b02d8f71a603" providerId="ADAL" clId="{100BBC7B-7ACA-4A4D-BA33-DEF31D162335}" dt="2025-12-02T15:52:10.502" v="11" actId="1076"/>
+        <pc:chgData name="Luisa Dickenmann" userId="0c0840b0-1ae7-42c8-98b5-b02d8f71a603" providerId="ADAL" clId="{100BBC7B-7ACA-4A4D-BA33-DEF31D162335}" dt="2025-12-08T15:19:10.499" v="812" actId="1076"/>
         <pc:sldMkLst>
           <pc:docMk/>
           <pc:sldMk cId="2740833318" sldId="259"/>
         </pc:sldMkLst>
         <pc:spChg chg="mod">
-          <ac:chgData name="Luisa Dickenmann" userId="0c0840b0-1ae7-42c8-98b5-b02d8f71a603" providerId="ADAL" clId="{100BBC7B-7ACA-4A4D-BA33-DEF31D162335}" dt="2025-12-02T15:52:05.021" v="8" actId="1076"/>
+          <ac:chgData name="Luisa Dickenmann" userId="0c0840b0-1ae7-42c8-98b5-b02d8f71a603" providerId="ADAL" clId="{100BBC7B-7ACA-4A4D-BA33-DEF31D162335}" dt="2025-12-08T15:19:10.499" v="812" actId="1076"/>
           <ac:spMkLst>
             <pc:docMk/>
             <pc:sldMk cId="2740833318" sldId="259"/>
             <ac:spMk id="2" creationId="{EC37FC25-0092-D266-9369-B42C8B0A2DCD}"/>
           </ac:spMkLst>
         </pc:spChg>
-        <pc:picChg chg="mod">
-          <ac:chgData name="Luisa Dickenmann" userId="0c0840b0-1ae7-42c8-98b5-b02d8f71a603" providerId="ADAL" clId="{100BBC7B-7ACA-4A4D-BA33-DEF31D162335}" dt="2025-12-02T15:52:10.502" v="11" actId="1076"/>
+        <pc:picChg chg="mod modCrop">
+          <ac:chgData name="Luisa Dickenmann" userId="0c0840b0-1ae7-42c8-98b5-b02d8f71a603" providerId="ADAL" clId="{100BBC7B-7ACA-4A4D-BA33-DEF31D162335}" dt="2025-12-08T12:15:04.974" v="388" actId="1076"/>
           <ac:picMkLst>
             <pc:docMk/>
             <pc:sldMk cId="2740833318" sldId="259"/>
             <ac:picMk id="13" creationId="{DF5F4204-7DFC-D576-7935-B7E0866D43BB}"/>
+          </ac:picMkLst>
+        </pc:picChg>
+      </pc:sldChg>
+      <pc:sldChg chg="addSp delSp modSp new del mod">
+        <pc:chgData name="Luisa Dickenmann" userId="0c0840b0-1ae7-42c8-98b5-b02d8f71a603" providerId="ADAL" clId="{100BBC7B-7ACA-4A4D-BA33-DEF31D162335}" dt="2025-12-08T12:01:51.656" v="165" actId="47"/>
+        <pc:sldMkLst>
+          <pc:docMk/>
+          <pc:sldMk cId="3575966718" sldId="260"/>
+        </pc:sldMkLst>
+      </pc:sldChg>
+      <pc:sldChg chg="addSp delSp modSp new mod">
+        <pc:chgData name="Luisa Dickenmann" userId="0c0840b0-1ae7-42c8-98b5-b02d8f71a603" providerId="ADAL" clId="{100BBC7B-7ACA-4A4D-BA33-DEF31D162335}" dt="2025-12-08T15:19:33.932" v="816" actId="1076"/>
+        <pc:sldMkLst>
+          <pc:docMk/>
+          <pc:sldMk cId="4018528445" sldId="261"/>
+        </pc:sldMkLst>
+        <pc:spChg chg="mod">
+          <ac:chgData name="Luisa Dickenmann" userId="0c0840b0-1ae7-42c8-98b5-b02d8f71a603" providerId="ADAL" clId="{100BBC7B-7ACA-4A4D-BA33-DEF31D162335}" dt="2025-12-08T15:19:29.658" v="815" actId="1076"/>
+          <ac:spMkLst>
+            <pc:docMk/>
+            <pc:sldMk cId="4018528445" sldId="261"/>
+            <ac:spMk id="2" creationId="{32D9D9BF-2B66-09AD-138F-36386DDD5CDD}"/>
+          </ac:spMkLst>
+        </pc:spChg>
+        <pc:spChg chg="add mod">
+          <ac:chgData name="Luisa Dickenmann" userId="0c0840b0-1ae7-42c8-98b5-b02d8f71a603" providerId="ADAL" clId="{100BBC7B-7ACA-4A4D-BA33-DEF31D162335}" dt="2025-12-08T12:03:29.753" v="268" actId="20577"/>
+          <ac:spMkLst>
+            <pc:docMk/>
+            <pc:sldMk cId="4018528445" sldId="261"/>
+            <ac:spMk id="3" creationId="{3FEE3C62-7A17-B683-8845-1CC05C605A19}"/>
+          </ac:spMkLst>
+        </pc:spChg>
+        <pc:spChg chg="add mod">
+          <ac:chgData name="Luisa Dickenmann" userId="0c0840b0-1ae7-42c8-98b5-b02d8f71a603" providerId="ADAL" clId="{100BBC7B-7ACA-4A4D-BA33-DEF31D162335}" dt="2025-12-08T13:51:28.329" v="556" actId="1076"/>
+          <ac:spMkLst>
+            <pc:docMk/>
+            <pc:sldMk cId="4018528445" sldId="261"/>
+            <ac:spMk id="4" creationId="{E5DCEE24-4EB7-F051-422E-FF7AF5E0BE67}"/>
+          </ac:spMkLst>
+        </pc:spChg>
+        <pc:picChg chg="add mod modCrop">
+          <ac:chgData name="Luisa Dickenmann" userId="0c0840b0-1ae7-42c8-98b5-b02d8f71a603" providerId="ADAL" clId="{100BBC7B-7ACA-4A4D-BA33-DEF31D162335}" dt="2025-12-08T15:19:33.932" v="816" actId="1076"/>
+          <ac:picMkLst>
+            <pc:docMk/>
+            <pc:sldMk cId="4018528445" sldId="261"/>
+            <ac:picMk id="5" creationId="{C81AF245-CF10-C522-E0CE-18AABCB35AA8}"/>
+          </ac:picMkLst>
+        </pc:picChg>
+      </pc:sldChg>
+      <pc:sldChg chg="addSp delSp modSp new mod">
+        <pc:chgData name="Luisa Dickenmann" userId="0c0840b0-1ae7-42c8-98b5-b02d8f71a603" providerId="ADAL" clId="{100BBC7B-7ACA-4A4D-BA33-DEF31D162335}" dt="2025-12-08T15:19:07.001" v="811" actId="1076"/>
+        <pc:sldMkLst>
+          <pc:docMk/>
+          <pc:sldMk cId="2468455985" sldId="262"/>
+        </pc:sldMkLst>
+        <pc:spChg chg="mod">
+          <ac:chgData name="Luisa Dickenmann" userId="0c0840b0-1ae7-42c8-98b5-b02d8f71a603" providerId="ADAL" clId="{100BBC7B-7ACA-4A4D-BA33-DEF31D162335}" dt="2025-12-08T15:19:07.001" v="811" actId="1076"/>
+          <ac:spMkLst>
+            <pc:docMk/>
+            <pc:sldMk cId="2468455985" sldId="262"/>
+            <ac:spMk id="2" creationId="{186B59D3-816C-2A57-089A-EA265D288680}"/>
+          </ac:spMkLst>
+        </pc:spChg>
+        <pc:spChg chg="del">
+          <ac:chgData name="Luisa Dickenmann" userId="0c0840b0-1ae7-42c8-98b5-b02d8f71a603" providerId="ADAL" clId="{100BBC7B-7ACA-4A4D-BA33-DEF31D162335}" dt="2025-12-08T12:14:21.839" v="349" actId="931"/>
+          <ac:spMkLst>
+            <pc:docMk/>
+            <pc:sldMk cId="2468455985" sldId="262"/>
+            <ac:spMk id="3" creationId="{5082D910-5641-70E7-318E-1494D91CF015}"/>
+          </ac:spMkLst>
+        </pc:spChg>
+        <pc:spChg chg="add mod">
+          <ac:chgData name="Luisa Dickenmann" userId="0c0840b0-1ae7-42c8-98b5-b02d8f71a603" providerId="ADAL" clId="{100BBC7B-7ACA-4A4D-BA33-DEF31D162335}" dt="2025-12-08T13:50:55.797" v="517" actId="207"/>
+          <ac:spMkLst>
+            <pc:docMk/>
+            <pc:sldMk cId="2468455985" sldId="262"/>
+            <ac:spMk id="6" creationId="{85B2C7B7-4BA9-EB08-7CDD-E8CB7044D6E1}"/>
+          </ac:spMkLst>
+        </pc:spChg>
+        <pc:picChg chg="add mod modCrop">
+          <ac:chgData name="Luisa Dickenmann" userId="0c0840b0-1ae7-42c8-98b5-b02d8f71a603" providerId="ADAL" clId="{100BBC7B-7ACA-4A4D-BA33-DEF31D162335}" dt="2025-12-08T12:14:55.072" v="385" actId="1076"/>
+          <ac:picMkLst>
+            <pc:docMk/>
+            <pc:sldMk cId="2468455985" sldId="262"/>
+            <ac:picMk id="5" creationId="{73E0993F-5E9C-1D30-1C0B-6E7EB90E7028}"/>
+          </ac:picMkLst>
+        </pc:picChg>
+      </pc:sldChg>
+      <pc:sldChg chg="addSp delSp modSp new mod">
+        <pc:chgData name="Luisa Dickenmann" userId="0c0840b0-1ae7-42c8-98b5-b02d8f71a603" providerId="ADAL" clId="{100BBC7B-7ACA-4A4D-BA33-DEF31D162335}" dt="2025-12-08T13:52:07.130" v="566" actId="14100"/>
+        <pc:sldMkLst>
+          <pc:docMk/>
+          <pc:sldMk cId="366536072" sldId="263"/>
+        </pc:sldMkLst>
+        <pc:spChg chg="mod">
+          <ac:chgData name="Luisa Dickenmann" userId="0c0840b0-1ae7-42c8-98b5-b02d8f71a603" providerId="ADAL" clId="{100BBC7B-7ACA-4A4D-BA33-DEF31D162335}" dt="2025-12-08T13:51:56.361" v="563" actId="1076"/>
+          <ac:spMkLst>
+            <pc:docMk/>
+            <pc:sldMk cId="366536072" sldId="263"/>
+            <ac:spMk id="2" creationId="{B4D941A4-7800-BF6D-3047-19A2F1FFE400}"/>
+          </ac:spMkLst>
+        </pc:spChg>
+        <pc:spChg chg="del">
+          <ac:chgData name="Luisa Dickenmann" userId="0c0840b0-1ae7-42c8-98b5-b02d8f71a603" providerId="ADAL" clId="{100BBC7B-7ACA-4A4D-BA33-DEF31D162335}" dt="2025-12-08T11:57:37.698" v="109" actId="931"/>
+          <ac:spMkLst>
+            <pc:docMk/>
+            <pc:sldMk cId="366536072" sldId="263"/>
+            <ac:spMk id="3" creationId="{AC727228-8F6E-4303-82F6-D5F4357795D7}"/>
+          </ac:spMkLst>
+        </pc:spChg>
+        <pc:picChg chg="add mod modCrop">
+          <ac:chgData name="Luisa Dickenmann" userId="0c0840b0-1ae7-42c8-98b5-b02d8f71a603" providerId="ADAL" clId="{100BBC7B-7ACA-4A4D-BA33-DEF31D162335}" dt="2025-12-08T13:52:07.130" v="566" actId="14100"/>
+          <ac:picMkLst>
+            <pc:docMk/>
+            <pc:sldMk cId="366536072" sldId="263"/>
+            <ac:picMk id="5" creationId="{74CD08E0-9A64-49FE-60CB-7BB27C2718EC}"/>
+          </ac:picMkLst>
+        </pc:picChg>
+      </pc:sldChg>
+      <pc:sldChg chg="addSp delSp modSp new mod ord">
+        <pc:chgData name="Luisa Dickenmann" userId="0c0840b0-1ae7-42c8-98b5-b02d8f71a603" providerId="ADAL" clId="{100BBC7B-7ACA-4A4D-BA33-DEF31D162335}" dt="2025-12-08T13:53:27.116" v="594" actId="1076"/>
+        <pc:sldMkLst>
+          <pc:docMk/>
+          <pc:sldMk cId="1505597422" sldId="264"/>
+        </pc:sldMkLst>
+        <pc:spChg chg="mod">
+          <ac:chgData name="Luisa Dickenmann" userId="0c0840b0-1ae7-42c8-98b5-b02d8f71a603" providerId="ADAL" clId="{100BBC7B-7ACA-4A4D-BA33-DEF31D162335}" dt="2025-12-08T13:53:13.258" v="588" actId="1076"/>
+          <ac:spMkLst>
+            <pc:docMk/>
+            <pc:sldMk cId="1505597422" sldId="264"/>
+            <ac:spMk id="2" creationId="{87423E70-6AE2-13AB-B9D6-DFD4DC3807B8}"/>
+          </ac:spMkLst>
+        </pc:spChg>
+        <pc:spChg chg="del">
+          <ac:chgData name="Luisa Dickenmann" userId="0c0840b0-1ae7-42c8-98b5-b02d8f71a603" providerId="ADAL" clId="{100BBC7B-7ACA-4A4D-BA33-DEF31D162335}" dt="2025-12-08T12:02:21.112" v="174" actId="931"/>
+          <ac:spMkLst>
+            <pc:docMk/>
+            <pc:sldMk cId="1505597422" sldId="264"/>
+            <ac:spMk id="3" creationId="{8E71B790-1314-9531-7375-6100B66ED4C6}"/>
+          </ac:spMkLst>
+        </pc:spChg>
+        <pc:picChg chg="add mod modCrop">
+          <ac:chgData name="Luisa Dickenmann" userId="0c0840b0-1ae7-42c8-98b5-b02d8f71a603" providerId="ADAL" clId="{100BBC7B-7ACA-4A4D-BA33-DEF31D162335}" dt="2025-12-08T13:53:27.116" v="594" actId="1076"/>
+          <ac:picMkLst>
+            <pc:docMk/>
+            <pc:sldMk cId="1505597422" sldId="264"/>
+            <ac:picMk id="5" creationId="{16D65E6A-4EF0-6D4D-7682-EC32F509A222}"/>
+          </ac:picMkLst>
+        </pc:picChg>
+      </pc:sldChg>
+      <pc:sldChg chg="addSp delSp modSp new mod">
+        <pc:chgData name="Luisa Dickenmann" userId="0c0840b0-1ae7-42c8-98b5-b02d8f71a603" providerId="ADAL" clId="{100BBC7B-7ACA-4A4D-BA33-DEF31D162335}" dt="2025-12-08T13:53:02.688" v="585" actId="14100"/>
+        <pc:sldMkLst>
+          <pc:docMk/>
+          <pc:sldMk cId="1309389261" sldId="265"/>
+        </pc:sldMkLst>
+        <pc:spChg chg="mod">
+          <ac:chgData name="Luisa Dickenmann" userId="0c0840b0-1ae7-42c8-98b5-b02d8f71a603" providerId="ADAL" clId="{100BBC7B-7ACA-4A4D-BA33-DEF31D162335}" dt="2025-12-08T11:59:32.016" v="159" actId="20577"/>
+          <ac:spMkLst>
+            <pc:docMk/>
+            <pc:sldMk cId="1309389261" sldId="265"/>
+            <ac:spMk id="2" creationId="{E5EB79DC-5387-676F-0683-1D49454F40B3}"/>
+          </ac:spMkLst>
+        </pc:spChg>
+        <pc:spChg chg="del">
+          <ac:chgData name="Luisa Dickenmann" userId="0c0840b0-1ae7-42c8-98b5-b02d8f71a603" providerId="ADAL" clId="{100BBC7B-7ACA-4A4D-BA33-DEF31D162335}" dt="2025-12-08T12:01:07.416" v="160" actId="931"/>
+          <ac:spMkLst>
+            <pc:docMk/>
+            <pc:sldMk cId="1309389261" sldId="265"/>
+            <ac:spMk id="3" creationId="{B7445A8B-7D82-B218-76BE-38031B3A0D80}"/>
+          </ac:spMkLst>
+        </pc:spChg>
+        <pc:spChg chg="add mod">
+          <ac:chgData name="Luisa Dickenmann" userId="0c0840b0-1ae7-42c8-98b5-b02d8f71a603" providerId="ADAL" clId="{100BBC7B-7ACA-4A4D-BA33-DEF31D162335}" dt="2025-12-08T12:04:10.651" v="348" actId="1076"/>
+          <ac:spMkLst>
+            <pc:docMk/>
+            <pc:sldMk cId="1309389261" sldId="265"/>
+            <ac:spMk id="6" creationId="{88649343-2493-E174-DAD2-92A791FD7486}"/>
+          </ac:spMkLst>
+        </pc:spChg>
+        <pc:spChg chg="add mod">
+          <ac:chgData name="Luisa Dickenmann" userId="0c0840b0-1ae7-42c8-98b5-b02d8f71a603" providerId="ADAL" clId="{100BBC7B-7ACA-4A4D-BA33-DEF31D162335}" dt="2025-12-08T13:52:36.650" v="581" actId="14100"/>
+          <ac:spMkLst>
+            <pc:docMk/>
+            <pc:sldMk cId="1309389261" sldId="265"/>
+            <ac:spMk id="7" creationId="{93CF37AE-0442-D191-0D72-30187F796763}"/>
+          </ac:spMkLst>
+        </pc:spChg>
+        <pc:picChg chg="add mod modCrop">
+          <ac:chgData name="Luisa Dickenmann" userId="0c0840b0-1ae7-42c8-98b5-b02d8f71a603" providerId="ADAL" clId="{100BBC7B-7ACA-4A4D-BA33-DEF31D162335}" dt="2025-12-08T13:53:02.688" v="585" actId="14100"/>
+          <ac:picMkLst>
+            <pc:docMk/>
+            <pc:sldMk cId="1309389261" sldId="265"/>
+            <ac:picMk id="5" creationId="{A613A6A1-D807-9828-02A8-F458A86438B3}"/>
+          </ac:picMkLst>
+        </pc:picChg>
+      </pc:sldChg>
+      <pc:sldChg chg="addSp delSp modSp new mod">
+        <pc:chgData name="Luisa Dickenmann" userId="0c0840b0-1ae7-42c8-98b5-b02d8f71a603" providerId="ADAL" clId="{100BBC7B-7ACA-4A4D-BA33-DEF31D162335}" dt="2025-12-08T15:19:02.474" v="810" actId="1076"/>
+        <pc:sldMkLst>
+          <pc:docMk/>
+          <pc:sldMk cId="522262804" sldId="266"/>
+        </pc:sldMkLst>
+        <pc:spChg chg="mod">
+          <ac:chgData name="Luisa Dickenmann" userId="0c0840b0-1ae7-42c8-98b5-b02d8f71a603" providerId="ADAL" clId="{100BBC7B-7ACA-4A4D-BA33-DEF31D162335}" dt="2025-12-08T15:19:02.474" v="810" actId="1076"/>
+          <ac:spMkLst>
+            <pc:docMk/>
+            <pc:sldMk cId="522262804" sldId="266"/>
+            <ac:spMk id="2" creationId="{88E45658-7DE4-99A0-DD6E-14745BC00932}"/>
+          </ac:spMkLst>
+        </pc:spChg>
+        <pc:spChg chg="del">
+          <ac:chgData name="Luisa Dickenmann" userId="0c0840b0-1ae7-42c8-98b5-b02d8f71a603" providerId="ADAL" clId="{100BBC7B-7ACA-4A4D-BA33-DEF31D162335}" dt="2025-12-08T12:17:17.488" v="427" actId="931"/>
+          <ac:spMkLst>
+            <pc:docMk/>
+            <pc:sldMk cId="522262804" sldId="266"/>
+            <ac:spMk id="3" creationId="{A23DF43B-180F-6577-FD50-EEDB2C1CCCB5}"/>
+          </ac:spMkLst>
+        </pc:spChg>
+        <pc:spChg chg="add mod">
+          <ac:chgData name="Luisa Dickenmann" userId="0c0840b0-1ae7-42c8-98b5-b02d8f71a603" providerId="ADAL" clId="{100BBC7B-7ACA-4A4D-BA33-DEF31D162335}" dt="2025-12-08T13:51:08.123" v="525" actId="1076"/>
+          <ac:spMkLst>
+            <pc:docMk/>
+            <pc:sldMk cId="522262804" sldId="266"/>
+            <ac:spMk id="6" creationId="{BC044F4B-72E6-AB1B-4698-07642C2B12A6}"/>
+          </ac:spMkLst>
+        </pc:spChg>
+        <pc:spChg chg="add del mod">
+          <ac:chgData name="Luisa Dickenmann" userId="0c0840b0-1ae7-42c8-98b5-b02d8f71a603" providerId="ADAL" clId="{100BBC7B-7ACA-4A4D-BA33-DEF31D162335}" dt="2025-12-08T14:19:58.755" v="634" actId="931"/>
+          <ac:spMkLst>
+            <pc:docMk/>
+            <pc:sldMk cId="522262804" sldId="266"/>
+            <ac:spMk id="8" creationId="{1E182486-652B-51B1-0DB4-87FCBC4202F4}"/>
+          </ac:spMkLst>
+        </pc:spChg>
+        <pc:picChg chg="add del mod modCrop">
+          <ac:chgData name="Luisa Dickenmann" userId="0c0840b0-1ae7-42c8-98b5-b02d8f71a603" providerId="ADAL" clId="{100BBC7B-7ACA-4A4D-BA33-DEF31D162335}" dt="2025-12-08T14:19:55.360" v="633" actId="478"/>
+          <ac:picMkLst>
+            <pc:docMk/>
+            <pc:sldMk cId="522262804" sldId="266"/>
+            <ac:picMk id="5" creationId="{4B09988F-19A5-4E3F-2A12-E557FFF1503B}"/>
+          </ac:picMkLst>
+        </pc:picChg>
+        <pc:picChg chg="add mod modCrop">
+          <ac:chgData name="Luisa Dickenmann" userId="0c0840b0-1ae7-42c8-98b5-b02d8f71a603" providerId="ADAL" clId="{100BBC7B-7ACA-4A4D-BA33-DEF31D162335}" dt="2025-12-08T14:20:08.302" v="639" actId="14100"/>
+          <ac:picMkLst>
+            <pc:docMk/>
+            <pc:sldMk cId="522262804" sldId="266"/>
+            <ac:picMk id="10" creationId="{8BA279B2-C990-BC1D-5784-CB13A3FEFDBE}"/>
+          </ac:picMkLst>
+        </pc:picChg>
+      </pc:sldChg>
+      <pc:sldChg chg="addSp delSp modSp new mod ord">
+        <pc:chgData name="Luisa Dickenmann" userId="0c0840b0-1ae7-42c8-98b5-b02d8f71a603" providerId="ADAL" clId="{100BBC7B-7ACA-4A4D-BA33-DEF31D162335}" dt="2025-12-08T15:18:31.556" v="806"/>
+        <pc:sldMkLst>
+          <pc:docMk/>
+          <pc:sldMk cId="71374995" sldId="267"/>
+        </pc:sldMkLst>
+        <pc:spChg chg="mod">
+          <ac:chgData name="Luisa Dickenmann" userId="0c0840b0-1ae7-42c8-98b5-b02d8f71a603" providerId="ADAL" clId="{100BBC7B-7ACA-4A4D-BA33-DEF31D162335}" dt="2025-12-08T15:01:08.428" v="754" actId="1076"/>
+          <ac:spMkLst>
+            <pc:docMk/>
+            <pc:sldMk cId="71374995" sldId="267"/>
+            <ac:spMk id="2" creationId="{3924B841-9362-0383-46CC-CFFBEFEFB90A}"/>
+          </ac:spMkLst>
+        </pc:spChg>
+        <pc:spChg chg="del">
+          <ac:chgData name="Luisa Dickenmann" userId="0c0840b0-1ae7-42c8-98b5-b02d8f71a603" providerId="ADAL" clId="{100BBC7B-7ACA-4A4D-BA33-DEF31D162335}" dt="2025-12-08T15:00:56.102" v="749" actId="931"/>
+          <ac:spMkLst>
+            <pc:docMk/>
+            <pc:sldMk cId="71374995" sldId="267"/>
+            <ac:spMk id="3" creationId="{C5D45000-2327-9F64-320C-7F13070C3D6D}"/>
+          </ac:spMkLst>
+        </pc:spChg>
+        <pc:picChg chg="add mod modCrop">
+          <ac:chgData name="Luisa Dickenmann" userId="0c0840b0-1ae7-42c8-98b5-b02d8f71a603" providerId="ADAL" clId="{100BBC7B-7ACA-4A4D-BA33-DEF31D162335}" dt="2025-12-08T15:01:16.791" v="758" actId="1076"/>
+          <ac:picMkLst>
+            <pc:docMk/>
+            <pc:sldMk cId="71374995" sldId="267"/>
+            <ac:picMk id="5" creationId="{A1CE5F60-A8AD-E47F-B1ED-5F1950277951}"/>
+          </ac:picMkLst>
+        </pc:picChg>
+      </pc:sldChg>
+      <pc:sldChg chg="addSp delSp modSp new mod ord">
+        <pc:chgData name="Luisa Dickenmann" userId="0c0840b0-1ae7-42c8-98b5-b02d8f71a603" providerId="ADAL" clId="{100BBC7B-7ACA-4A4D-BA33-DEF31D162335}" dt="2025-12-08T15:18:11.277" v="798"/>
+        <pc:sldMkLst>
+          <pc:docMk/>
+          <pc:sldMk cId="1284769585" sldId="268"/>
+        </pc:sldMkLst>
+        <pc:spChg chg="mod">
+          <ac:chgData name="Luisa Dickenmann" userId="0c0840b0-1ae7-42c8-98b5-b02d8f71a603" providerId="ADAL" clId="{100BBC7B-7ACA-4A4D-BA33-DEF31D162335}" dt="2025-12-08T14:24:36.668" v="735" actId="1076"/>
+          <ac:spMkLst>
+            <pc:docMk/>
+            <pc:sldMk cId="1284769585" sldId="268"/>
+            <ac:spMk id="2" creationId="{26A2107B-1EA8-BA64-B10E-8A0B8E21FB4C}"/>
+          </ac:spMkLst>
+        </pc:spChg>
+        <pc:spChg chg="del">
+          <ac:chgData name="Luisa Dickenmann" userId="0c0840b0-1ae7-42c8-98b5-b02d8f71a603" providerId="ADAL" clId="{100BBC7B-7ACA-4A4D-BA33-DEF31D162335}" dt="2025-12-08T14:20:40.187" v="677" actId="931"/>
+          <ac:spMkLst>
+            <pc:docMk/>
+            <pc:sldMk cId="1284769585" sldId="268"/>
+            <ac:spMk id="3" creationId="{2D475B74-E9C3-E334-CE1D-1F2D91223DCD}"/>
+          </ac:spMkLst>
+        </pc:spChg>
+        <pc:spChg chg="add del mod">
+          <ac:chgData name="Luisa Dickenmann" userId="0c0840b0-1ae7-42c8-98b5-b02d8f71a603" providerId="ADAL" clId="{100BBC7B-7ACA-4A4D-BA33-DEF31D162335}" dt="2025-12-08T14:21:00.340" v="681" actId="931"/>
+          <ac:spMkLst>
+            <pc:docMk/>
+            <pc:sldMk cId="1284769585" sldId="268"/>
+            <ac:spMk id="7" creationId="{B5DE2E83-425E-06E0-4757-0E1D976A3F01}"/>
+          </ac:spMkLst>
+        </pc:spChg>
+        <pc:spChg chg="add del mod">
+          <ac:chgData name="Luisa Dickenmann" userId="0c0840b0-1ae7-42c8-98b5-b02d8f71a603" providerId="ADAL" clId="{100BBC7B-7ACA-4A4D-BA33-DEF31D162335}" dt="2025-12-08T14:21:39.809" v="685" actId="931"/>
+          <ac:spMkLst>
+            <pc:docMk/>
+            <pc:sldMk cId="1284769585" sldId="268"/>
+            <ac:spMk id="11" creationId="{B0ABEDB3-CC77-573F-8715-0AD9B422EB55}"/>
+          </ac:spMkLst>
+        </pc:spChg>
+        <pc:spChg chg="add del mod">
+          <ac:chgData name="Luisa Dickenmann" userId="0c0840b0-1ae7-42c8-98b5-b02d8f71a603" providerId="ADAL" clId="{100BBC7B-7ACA-4A4D-BA33-DEF31D162335}" dt="2025-12-08T14:25:04.840" v="742" actId="478"/>
+          <ac:spMkLst>
+            <pc:docMk/>
+            <pc:sldMk cId="1284769585" sldId="268"/>
+            <ac:spMk id="14" creationId="{335AFEB9-6171-80FA-9AA3-57C19E453BED}"/>
+          </ac:spMkLst>
+        </pc:spChg>
+        <pc:spChg chg="add del mod">
+          <ac:chgData name="Luisa Dickenmann" userId="0c0840b0-1ae7-42c8-98b5-b02d8f71a603" providerId="ADAL" clId="{100BBC7B-7ACA-4A4D-BA33-DEF31D162335}" dt="2025-12-08T14:46:18.764" v="744" actId="931"/>
+          <ac:spMkLst>
+            <pc:docMk/>
+            <pc:sldMk cId="1284769585" sldId="268"/>
+            <ac:spMk id="16" creationId="{8A56E870-4677-2A40-2F05-D20449CF7C8B}"/>
+          </ac:spMkLst>
+        </pc:spChg>
+        <pc:picChg chg="add del mod">
+          <ac:chgData name="Luisa Dickenmann" userId="0c0840b0-1ae7-42c8-98b5-b02d8f71a603" providerId="ADAL" clId="{100BBC7B-7ACA-4A4D-BA33-DEF31D162335}" dt="2025-12-08T14:20:56.823" v="680" actId="478"/>
+          <ac:picMkLst>
+            <pc:docMk/>
+            <pc:sldMk cId="1284769585" sldId="268"/>
+            <ac:picMk id="5" creationId="{65C0BBCC-2E2F-A9EF-5563-686DE2B356BE}"/>
+          </ac:picMkLst>
+        </pc:picChg>
+        <pc:picChg chg="add del mod">
+          <ac:chgData name="Luisa Dickenmann" userId="0c0840b0-1ae7-42c8-98b5-b02d8f71a603" providerId="ADAL" clId="{100BBC7B-7ACA-4A4D-BA33-DEF31D162335}" dt="2025-12-08T14:21:33.116" v="684" actId="478"/>
+          <ac:picMkLst>
+            <pc:docMk/>
+            <pc:sldMk cId="1284769585" sldId="268"/>
+            <ac:picMk id="9" creationId="{B83F64B8-3184-EC00-46E8-5D501A9CF1FC}"/>
+          </ac:picMkLst>
+        </pc:picChg>
+        <pc:picChg chg="add del mod">
+          <ac:chgData name="Luisa Dickenmann" userId="0c0840b0-1ae7-42c8-98b5-b02d8f71a603" providerId="ADAL" clId="{100BBC7B-7ACA-4A4D-BA33-DEF31D162335}" dt="2025-12-08T14:46:11.754" v="743" actId="478"/>
+          <ac:picMkLst>
+            <pc:docMk/>
+            <pc:sldMk cId="1284769585" sldId="268"/>
+            <ac:picMk id="13" creationId="{2371C52C-BD47-B2CB-3B8A-0C572B64175C}"/>
+          </ac:picMkLst>
+        </pc:picChg>
+        <pc:picChg chg="add mod">
+          <ac:chgData name="Luisa Dickenmann" userId="0c0840b0-1ae7-42c8-98b5-b02d8f71a603" providerId="ADAL" clId="{100BBC7B-7ACA-4A4D-BA33-DEF31D162335}" dt="2025-12-08T14:46:25.582" v="748" actId="14100"/>
+          <ac:picMkLst>
+            <pc:docMk/>
+            <pc:sldMk cId="1284769585" sldId="268"/>
+            <ac:picMk id="18" creationId="{46EE900A-3FC4-6135-E0EC-34BB7B492793}"/>
+          </ac:picMkLst>
+        </pc:picChg>
+      </pc:sldChg>
+      <pc:sldChg chg="addSp delSp modSp new mod ord">
+        <pc:chgData name="Luisa Dickenmann" userId="0c0840b0-1ae7-42c8-98b5-b02d8f71a603" providerId="ADAL" clId="{100BBC7B-7ACA-4A4D-BA33-DEF31D162335}" dt="2025-12-08T15:18:28.525" v="804"/>
+        <pc:sldMkLst>
+          <pc:docMk/>
+          <pc:sldMk cId="1264928361" sldId="269"/>
+        </pc:sldMkLst>
+        <pc:spChg chg="del">
+          <ac:chgData name="Luisa Dickenmann" userId="0c0840b0-1ae7-42c8-98b5-b02d8f71a603" providerId="ADAL" clId="{100BBC7B-7ACA-4A4D-BA33-DEF31D162335}" dt="2025-12-08T14:24:18.526" v="706"/>
+          <ac:spMkLst>
+            <pc:docMk/>
+            <pc:sldMk cId="1264928361" sldId="269"/>
+            <ac:spMk id="2" creationId="{DB86227E-8BC9-48C2-4954-7A70664D246C}"/>
+          </ac:spMkLst>
+        </pc:spChg>
+        <pc:spChg chg="del">
+          <ac:chgData name="Luisa Dickenmann" userId="0c0840b0-1ae7-42c8-98b5-b02d8f71a603" providerId="ADAL" clId="{100BBC7B-7ACA-4A4D-BA33-DEF31D162335}" dt="2025-12-08T15:17:36.340" v="789" actId="931"/>
+          <ac:spMkLst>
+            <pc:docMk/>
+            <pc:sldMk cId="1264928361" sldId="269"/>
+            <ac:spMk id="3" creationId="{6ECA84FA-A3F6-E9F8-BAC9-5B792C4C5144}"/>
+          </ac:spMkLst>
+        </pc:spChg>
+        <pc:spChg chg="add mod">
+          <ac:chgData name="Luisa Dickenmann" userId="0c0840b0-1ae7-42c8-98b5-b02d8f71a603" providerId="ADAL" clId="{100BBC7B-7ACA-4A4D-BA33-DEF31D162335}" dt="2025-12-08T15:17:39.682" v="792" actId="1076"/>
+          <ac:spMkLst>
+            <pc:docMk/>
+            <pc:sldMk cId="1264928361" sldId="269"/>
+            <ac:spMk id="4" creationId="{C2C95541-CA90-A88F-7649-31BAE83914A4}"/>
+          </ac:spMkLst>
+        </pc:spChg>
+        <pc:picChg chg="add mod modCrop">
+          <ac:chgData name="Luisa Dickenmann" userId="0c0840b0-1ae7-42c8-98b5-b02d8f71a603" providerId="ADAL" clId="{100BBC7B-7ACA-4A4D-BA33-DEF31D162335}" dt="2025-12-08T15:17:49.873" v="796" actId="1076"/>
+          <ac:picMkLst>
+            <pc:docMk/>
+            <pc:sldMk cId="1264928361" sldId="269"/>
+            <ac:picMk id="6" creationId="{AD890090-EF65-13CD-3F06-580B5D3AF2EB}"/>
+          </ac:picMkLst>
+        </pc:picChg>
+      </pc:sldChg>
+      <pc:sldChg chg="addSp delSp modSp new mod ord">
+        <pc:chgData name="Luisa Dickenmann" userId="0c0840b0-1ae7-42c8-98b5-b02d8f71a603" providerId="ADAL" clId="{100BBC7B-7ACA-4A4D-BA33-DEF31D162335}" dt="2025-12-08T15:44:55.261" v="896" actId="1036"/>
+        <pc:sldMkLst>
+          <pc:docMk/>
+          <pc:sldMk cId="2413059109" sldId="270"/>
+        </pc:sldMkLst>
+        <pc:spChg chg="del">
+          <ac:chgData name="Luisa Dickenmann" userId="0c0840b0-1ae7-42c8-98b5-b02d8f71a603" providerId="ADAL" clId="{100BBC7B-7ACA-4A4D-BA33-DEF31D162335}" dt="2025-12-08T14:24:26.085" v="728"/>
+          <ac:spMkLst>
+            <pc:docMk/>
+            <pc:sldMk cId="2413059109" sldId="270"/>
+            <ac:spMk id="2" creationId="{60427FBF-51B3-79E2-8BBC-2D3361A7FFA4}"/>
+          </ac:spMkLst>
+        </pc:spChg>
+        <pc:spChg chg="del">
+          <ac:chgData name="Luisa Dickenmann" userId="0c0840b0-1ae7-42c8-98b5-b02d8f71a603" providerId="ADAL" clId="{100BBC7B-7ACA-4A4D-BA33-DEF31D162335}" dt="2025-12-08T15:42:35.550" v="851" actId="931"/>
+          <ac:spMkLst>
+            <pc:docMk/>
+            <pc:sldMk cId="2413059109" sldId="270"/>
+            <ac:spMk id="3" creationId="{1C15EAB5-15B8-86BD-3419-353AA073DC02}"/>
+          </ac:spMkLst>
+        </pc:spChg>
+        <pc:spChg chg="add mod">
+          <ac:chgData name="Luisa Dickenmann" userId="0c0840b0-1ae7-42c8-98b5-b02d8f71a603" providerId="ADAL" clId="{100BBC7B-7ACA-4A4D-BA33-DEF31D162335}" dt="2025-12-08T15:42:29.661" v="850" actId="1076"/>
+          <ac:spMkLst>
+            <pc:docMk/>
+            <pc:sldMk cId="2413059109" sldId="270"/>
+            <ac:spMk id="4" creationId="{F351BBFA-4D62-6F56-D9B2-084422C226AB}"/>
+          </ac:spMkLst>
+        </pc:spChg>
+        <pc:spChg chg="add del mod">
+          <ac:chgData name="Luisa Dickenmann" userId="0c0840b0-1ae7-42c8-98b5-b02d8f71a603" providerId="ADAL" clId="{100BBC7B-7ACA-4A4D-BA33-DEF31D162335}" dt="2025-12-08T15:43:10.605" v="855" actId="931"/>
+          <ac:spMkLst>
+            <pc:docMk/>
+            <pc:sldMk cId="2413059109" sldId="270"/>
+            <ac:spMk id="8" creationId="{4F4988D8-FD40-C370-7F4A-A91BFA267D2E}"/>
+          </ac:spMkLst>
+        </pc:spChg>
+        <pc:picChg chg="add del mod">
+          <ac:chgData name="Luisa Dickenmann" userId="0c0840b0-1ae7-42c8-98b5-b02d8f71a603" providerId="ADAL" clId="{100BBC7B-7ACA-4A4D-BA33-DEF31D162335}" dt="2025-12-08T15:43:05.724" v="854" actId="478"/>
+          <ac:picMkLst>
+            <pc:docMk/>
+            <pc:sldMk cId="2413059109" sldId="270"/>
+            <ac:picMk id="6" creationId="{8A8DF9E4-C9E1-F6E5-FFA0-CFA7CDFD4E3A}"/>
+          </ac:picMkLst>
+        </pc:picChg>
+        <pc:picChg chg="add mod">
+          <ac:chgData name="Luisa Dickenmann" userId="0c0840b0-1ae7-42c8-98b5-b02d8f71a603" providerId="ADAL" clId="{100BBC7B-7ACA-4A4D-BA33-DEF31D162335}" dt="2025-12-08T15:44:55.261" v="896" actId="1036"/>
+          <ac:picMkLst>
+            <pc:docMk/>
+            <pc:sldMk cId="2413059109" sldId="270"/>
+            <ac:picMk id="10" creationId="{EA175353-6AD5-76CA-2329-CCA6E2F2F8DA}"/>
+          </ac:picMkLst>
+        </pc:picChg>
+      </pc:sldChg>
+      <pc:sldChg chg="addSp delSp modSp new mod ord">
+        <pc:chgData name="Luisa Dickenmann" userId="0c0840b0-1ae7-42c8-98b5-b02d8f71a603" providerId="ADAL" clId="{100BBC7B-7ACA-4A4D-BA33-DEF31D162335}" dt="2025-12-08T15:18:36.915" v="809" actId="1076"/>
+        <pc:sldMkLst>
+          <pc:docMk/>
+          <pc:sldMk cId="985959284" sldId="271"/>
+        </pc:sldMkLst>
+        <pc:spChg chg="mod">
+          <ac:chgData name="Luisa Dickenmann" userId="0c0840b0-1ae7-42c8-98b5-b02d8f71a603" providerId="ADAL" clId="{100BBC7B-7ACA-4A4D-BA33-DEF31D162335}" dt="2025-12-08T15:11:51.465" v="783" actId="1076"/>
+          <ac:spMkLst>
+            <pc:docMk/>
+            <pc:sldMk cId="985959284" sldId="271"/>
+            <ac:spMk id="2" creationId="{168C75FB-2C6E-BD4A-0495-ABAEC6CE37D7}"/>
+          </ac:spMkLst>
+        </pc:spChg>
+        <pc:spChg chg="del">
+          <ac:chgData name="Luisa Dickenmann" userId="0c0840b0-1ae7-42c8-98b5-b02d8f71a603" providerId="ADAL" clId="{100BBC7B-7ACA-4A4D-BA33-DEF31D162335}" dt="2025-12-08T15:16:07.123" v="784" actId="931"/>
+          <ac:spMkLst>
+            <pc:docMk/>
+            <pc:sldMk cId="985959284" sldId="271"/>
+            <ac:spMk id="3" creationId="{E5D6C9AB-0E03-A8A4-1D6D-D9993A18A725}"/>
+          </ac:spMkLst>
+        </pc:spChg>
+        <pc:picChg chg="add mod">
+          <ac:chgData name="Luisa Dickenmann" userId="0c0840b0-1ae7-42c8-98b5-b02d8f71a603" providerId="ADAL" clId="{100BBC7B-7ACA-4A4D-BA33-DEF31D162335}" dt="2025-12-08T15:18:36.915" v="809" actId="1076"/>
+          <ac:picMkLst>
+            <pc:docMk/>
+            <pc:sldMk cId="985959284" sldId="271"/>
+            <ac:picMk id="5" creationId="{6226C969-854B-D7FD-DFE0-FB7D108928AD}"/>
+          </ac:picMkLst>
+        </pc:picChg>
+      </pc:sldChg>
+      <pc:sldChg chg="addSp delSp modSp new mod">
+        <pc:chgData name="Luisa Dickenmann" userId="0c0840b0-1ae7-42c8-98b5-b02d8f71a603" providerId="ADAL" clId="{100BBC7B-7ACA-4A4D-BA33-DEF31D162335}" dt="2025-12-08T15:44:35.582" v="879" actId="14100"/>
+        <pc:sldMkLst>
+          <pc:docMk/>
+          <pc:sldMk cId="4087577250" sldId="272"/>
+        </pc:sldMkLst>
+        <pc:spChg chg="mod">
+          <ac:chgData name="Luisa Dickenmann" userId="0c0840b0-1ae7-42c8-98b5-b02d8f71a603" providerId="ADAL" clId="{100BBC7B-7ACA-4A4D-BA33-DEF31D162335}" dt="2025-12-08T15:42:24.710" v="849" actId="1076"/>
+          <ac:spMkLst>
+            <pc:docMk/>
+            <pc:sldMk cId="4087577250" sldId="272"/>
+            <ac:spMk id="2" creationId="{DBBAC9F3-8100-D77A-023E-C972C89795AC}"/>
+          </ac:spMkLst>
+        </pc:spChg>
+        <pc:spChg chg="del">
+          <ac:chgData name="Luisa Dickenmann" userId="0c0840b0-1ae7-42c8-98b5-b02d8f71a603" providerId="ADAL" clId="{100BBC7B-7ACA-4A4D-BA33-DEF31D162335}" dt="2025-12-08T15:43:14.965" v="857" actId="931"/>
+          <ac:spMkLst>
+            <pc:docMk/>
+            <pc:sldMk cId="4087577250" sldId="272"/>
+            <ac:spMk id="3" creationId="{C66BD223-4350-C820-7AF7-260F8A9F05F9}"/>
+          </ac:spMkLst>
+        </pc:spChg>
+        <pc:spChg chg="add del mod">
+          <ac:chgData name="Luisa Dickenmann" userId="0c0840b0-1ae7-42c8-98b5-b02d8f71a603" providerId="ADAL" clId="{100BBC7B-7ACA-4A4D-BA33-DEF31D162335}" dt="2025-12-08T15:44:12.727" v="867" actId="931"/>
+          <ac:spMkLst>
+            <pc:docMk/>
+            <pc:sldMk cId="4087577250" sldId="272"/>
+            <ac:spMk id="7" creationId="{8D6C9324-A5FD-0775-4747-C7FE69E1A6DE}"/>
+          </ac:spMkLst>
+        </pc:spChg>
+        <pc:picChg chg="add del mod modCrop">
+          <ac:chgData name="Luisa Dickenmann" userId="0c0840b0-1ae7-42c8-98b5-b02d8f71a603" providerId="ADAL" clId="{100BBC7B-7ACA-4A4D-BA33-DEF31D162335}" dt="2025-12-08T15:44:08.979" v="866" actId="478"/>
+          <ac:picMkLst>
+            <pc:docMk/>
+            <pc:sldMk cId="4087577250" sldId="272"/>
+            <ac:picMk id="5" creationId="{126834C1-AB21-229E-A7E1-0CCF3D851590}"/>
+          </ac:picMkLst>
+        </pc:picChg>
+        <pc:picChg chg="add mod modCrop">
+          <ac:chgData name="Luisa Dickenmann" userId="0c0840b0-1ae7-42c8-98b5-b02d8f71a603" providerId="ADAL" clId="{100BBC7B-7ACA-4A4D-BA33-DEF31D162335}" dt="2025-12-08T15:44:35.582" v="879" actId="14100"/>
+          <ac:picMkLst>
+            <pc:docMk/>
+            <pc:sldMk cId="4087577250" sldId="272"/>
+            <ac:picMk id="9" creationId="{11EA4D3C-9827-BB96-BA2A-29A5ABBE1BA1}"/>
           </ac:picMkLst>
         </pc:picChg>
       </pc:sldChg>
@@ -420,7 +1008,7 @@
           <a:p>
             <a:fld id="{817C20B3-7C49-43C0-BA15-4AF729A94E81}" type="datetimeFigureOut">
               <a:rPr lang="en-GB" smtClean="0"/>
-              <a:t>02/12/2025</a:t>
+              <a:t>08/12/2025</a:t>
             </a:fld>
             <a:endParaRPr lang="en-GB"/>
           </a:p>
@@ -641,7 +1229,7 @@
           <a:p>
             <a:fld id="{817C20B3-7C49-43C0-BA15-4AF729A94E81}" type="datetimeFigureOut">
               <a:rPr lang="en-GB" smtClean="0"/>
-              <a:t>02/12/2025</a:t>
+              <a:t>08/12/2025</a:t>
             </a:fld>
             <a:endParaRPr lang="en-GB"/>
           </a:p>
@@ -821,7 +1409,7 @@
           <a:p>
             <a:fld id="{817C20B3-7C49-43C0-BA15-4AF729A94E81}" type="datetimeFigureOut">
               <a:rPr lang="en-GB" smtClean="0"/>
-              <a:t>02/12/2025</a:t>
+              <a:t>08/12/2025</a:t>
             </a:fld>
             <a:endParaRPr lang="en-GB"/>
           </a:p>
@@ -991,7 +1579,7 @@
           <a:p>
             <a:fld id="{817C20B3-7C49-43C0-BA15-4AF729A94E81}" type="datetimeFigureOut">
               <a:rPr lang="en-GB" smtClean="0"/>
-              <a:t>02/12/2025</a:t>
+              <a:t>08/12/2025</a:t>
             </a:fld>
             <a:endParaRPr lang="en-GB"/>
           </a:p>
@@ -1242,7 +1830,7 @@
           <a:p>
             <a:fld id="{817C20B3-7C49-43C0-BA15-4AF729A94E81}" type="datetimeFigureOut">
               <a:rPr lang="en-GB" smtClean="0"/>
-              <a:t>02/12/2025</a:t>
+              <a:t>08/12/2025</a:t>
             </a:fld>
             <a:endParaRPr lang="en-GB"/>
           </a:p>
@@ -1565,7 +2153,7 @@
           <a:p>
             <a:fld id="{817C20B3-7C49-43C0-BA15-4AF729A94E81}" type="datetimeFigureOut">
               <a:rPr lang="en-GB" smtClean="0"/>
-              <a:t>02/12/2025</a:t>
+              <a:t>08/12/2025</a:t>
             </a:fld>
             <a:endParaRPr lang="en-GB"/>
           </a:p>
@@ -1989,7 +2577,7 @@
           <a:p>
             <a:fld id="{817C20B3-7C49-43C0-BA15-4AF729A94E81}" type="datetimeFigureOut">
               <a:rPr lang="en-GB" smtClean="0"/>
-              <a:t>02/12/2025</a:t>
+              <a:t>08/12/2025</a:t>
             </a:fld>
             <a:endParaRPr lang="en-GB"/>
           </a:p>
@@ -2107,7 +2695,7 @@
           <a:p>
             <a:fld id="{817C20B3-7C49-43C0-BA15-4AF729A94E81}" type="datetimeFigureOut">
               <a:rPr lang="en-GB" smtClean="0"/>
-              <a:t>02/12/2025</a:t>
+              <a:t>08/12/2025</a:t>
             </a:fld>
             <a:endParaRPr lang="en-GB"/>
           </a:p>
@@ -2202,7 +2790,7 @@
           <a:p>
             <a:fld id="{817C20B3-7C49-43C0-BA15-4AF729A94E81}" type="datetimeFigureOut">
               <a:rPr lang="en-GB" smtClean="0"/>
-              <a:t>02/12/2025</a:t>
+              <a:t>08/12/2025</a:t>
             </a:fld>
             <a:endParaRPr lang="en-GB"/>
           </a:p>
@@ -2492,7 +3080,7 @@
           <a:p>
             <a:fld id="{817C20B3-7C49-43C0-BA15-4AF729A94E81}" type="datetimeFigureOut">
               <a:rPr lang="en-GB" smtClean="0"/>
-              <a:t>02/12/2025</a:t>
+              <a:t>08/12/2025</a:t>
             </a:fld>
             <a:endParaRPr lang="en-GB"/>
           </a:p>
@@ -2764,7 +3352,7 @@
           <a:p>
             <a:fld id="{817C20B3-7C49-43C0-BA15-4AF729A94E81}" type="datetimeFigureOut">
               <a:rPr lang="en-GB" smtClean="0"/>
-              <a:t>02/12/2025</a:t>
+              <a:t>08/12/2025</a:t>
             </a:fld>
             <a:endParaRPr lang="en-GB"/>
           </a:p>
@@ -3018,7 +3606,7 @@
           <a:p>
             <a:fld id="{817C20B3-7C49-43C0-BA15-4AF729A94E81}" type="datetimeFigureOut">
               <a:rPr lang="en-GB" smtClean="0"/>
-              <a:t>02/12/2025</a:t>
+              <a:t>08/12/2025</a:t>
             </a:fld>
             <a:endParaRPr lang="en-GB"/>
           </a:p>
@@ -3561,6 +4149,983 @@
 </p:sld>
 </file>
 
+<file path=ppt/slides/slide10.xml><?xml version="1.0" encoding="utf-8"?>
+<p:sld xmlns:a="http://schemas.openxmlformats.org/drawingml/2006/main" xmlns:r="http://schemas.openxmlformats.org/officeDocument/2006/relationships" xmlns:p="http://schemas.openxmlformats.org/presentationml/2006/main">
+  <p:cSld>
+    <p:spTree>
+      <p:nvGrpSpPr>
+        <p:cNvPr id="1" name=""/>
+        <p:cNvGrpSpPr/>
+        <p:nvPr/>
+      </p:nvGrpSpPr>
+      <p:grpSpPr>
+        <a:xfrm>
+          <a:off x="0" y="0"/>
+          <a:ext cx="0" cy="0"/>
+          <a:chOff x="0" y="0"/>
+          <a:chExt cx="0" cy="0"/>
+        </a:xfrm>
+      </p:grpSpPr>
+      <p:sp>
+        <p:nvSpPr>
+          <p:cNvPr id="2" name="Title 1">
+            <a:extLst>
+              <a:ext uri="{FF2B5EF4-FFF2-40B4-BE49-F238E27FC236}">
+                <a16:creationId xmlns:a16="http://schemas.microsoft.com/office/drawing/2014/main" id="{EC37FC25-0092-D266-9369-B42C8B0A2DCD}"/>
+              </a:ext>
+            </a:extLst>
+          </p:cNvPr>
+          <p:cNvSpPr>
+            <a:spLocks noGrp="1"/>
+          </p:cNvSpPr>
+          <p:nvPr>
+            <p:ph type="title"/>
+          </p:nvPr>
+        </p:nvSpPr>
+        <p:spPr>
+          <a:xfrm>
+            <a:off x="238760" y="223520"/>
+            <a:ext cx="9875520" cy="1356360"/>
+          </a:xfrm>
+        </p:spPr>
+        <p:txBody>
+          <a:bodyPr/>
+          <a:lstStyle/>
+          <a:p>
+            <a:r>
+              <a:rPr lang="de-CH" dirty="0"/>
+              <a:t>Height - Distribution</a:t>
+            </a:r>
+            <a:endParaRPr lang="en-GB" dirty="0"/>
+          </a:p>
+        </p:txBody>
+      </p:sp>
+      <p:pic>
+        <p:nvPicPr>
+          <p:cNvPr id="13" name="Content Placeholder 12" descr="A graph of a graph&#10;&#10;AI-generated content may be incorrect.">
+            <a:extLst>
+              <a:ext uri="{FF2B5EF4-FFF2-40B4-BE49-F238E27FC236}">
+                <a16:creationId xmlns:a16="http://schemas.microsoft.com/office/drawing/2014/main" id="{DF5F4204-7DFC-D576-7935-B7E0866D43BB}"/>
+              </a:ext>
+            </a:extLst>
+          </p:cNvPr>
+          <p:cNvPicPr>
+            <a:picLocks noGrp="1" noChangeAspect="1"/>
+          </p:cNvPicPr>
+          <p:nvPr>
+            <p:ph idx="1"/>
+          </p:nvPr>
+        </p:nvPicPr>
+        <p:blipFill>
+          <a:blip r:embed="rId2">
+            <a:extLst>
+              <a:ext uri="{28A0092B-C50C-407E-A947-70E740481C1C}">
+                <a14:useLocalDpi xmlns:a14="http://schemas.microsoft.com/office/drawing/2010/main" val="0"/>
+              </a:ext>
+            </a:extLst>
+          </a:blip>
+          <a:srcRect t="6325"/>
+          <a:stretch/>
+        </p:blipFill>
+        <p:spPr>
+          <a:xfrm>
+            <a:off x="1656079" y="1503680"/>
+            <a:ext cx="9114949" cy="5130800"/>
+          </a:xfrm>
+        </p:spPr>
+      </p:pic>
+    </p:spTree>
+    <p:extLst>
+      <p:ext uri="{BB962C8B-B14F-4D97-AF65-F5344CB8AC3E}">
+        <p14:creationId xmlns:p14="http://schemas.microsoft.com/office/powerpoint/2010/main" val="2740833318"/>
+      </p:ext>
+    </p:extLst>
+  </p:cSld>
+  <p:clrMapOvr>
+    <a:masterClrMapping/>
+  </p:clrMapOvr>
+</p:sld>
+</file>
+
+<file path=ppt/slides/slide11.xml><?xml version="1.0" encoding="utf-8"?>
+<p:sld xmlns:a="http://schemas.openxmlformats.org/drawingml/2006/main" xmlns:r="http://schemas.openxmlformats.org/officeDocument/2006/relationships" xmlns:p="http://schemas.openxmlformats.org/presentationml/2006/main">
+  <p:cSld>
+    <p:spTree>
+      <p:nvGrpSpPr>
+        <p:cNvPr id="1" name=""/>
+        <p:cNvGrpSpPr/>
+        <p:nvPr/>
+      </p:nvGrpSpPr>
+      <p:grpSpPr>
+        <a:xfrm>
+          <a:off x="0" y="0"/>
+          <a:ext cx="0" cy="0"/>
+          <a:chOff x="0" y="0"/>
+          <a:chExt cx="0" cy="0"/>
+        </a:xfrm>
+      </p:grpSpPr>
+      <p:sp>
+        <p:nvSpPr>
+          <p:cNvPr id="2" name="Title 1">
+            <a:extLst>
+              <a:ext uri="{FF2B5EF4-FFF2-40B4-BE49-F238E27FC236}">
+                <a16:creationId xmlns:a16="http://schemas.microsoft.com/office/drawing/2014/main" id="{186B59D3-816C-2A57-089A-EA265D288680}"/>
+              </a:ext>
+            </a:extLst>
+          </p:cNvPr>
+          <p:cNvSpPr>
+            <a:spLocks noGrp="1"/>
+          </p:cNvSpPr>
+          <p:nvPr>
+            <p:ph type="title"/>
+          </p:nvPr>
+        </p:nvSpPr>
+        <p:spPr>
+          <a:xfrm>
+            <a:off x="238760" y="213360"/>
+            <a:ext cx="9875520" cy="1356360"/>
+          </a:xfrm>
+        </p:spPr>
+        <p:txBody>
+          <a:bodyPr/>
+          <a:lstStyle/>
+          <a:p>
+            <a:r>
+              <a:rPr lang="de-CH" dirty="0"/>
+              <a:t>Height – by Provenance</a:t>
+            </a:r>
+            <a:endParaRPr lang="en-GB" dirty="0"/>
+          </a:p>
+        </p:txBody>
+      </p:sp>
+      <p:pic>
+        <p:nvPicPr>
+          <p:cNvPr id="5" name="Content Placeholder 4" descr="A diagram of different colored squares&#10;&#10;AI-generated content may be incorrect.">
+            <a:extLst>
+              <a:ext uri="{FF2B5EF4-FFF2-40B4-BE49-F238E27FC236}">
+                <a16:creationId xmlns:a16="http://schemas.microsoft.com/office/drawing/2014/main" id="{73E0993F-5E9C-1D30-1C0B-6E7EB90E7028}"/>
+              </a:ext>
+            </a:extLst>
+          </p:cNvPr>
+          <p:cNvPicPr>
+            <a:picLocks noGrp="1" noChangeAspect="1"/>
+          </p:cNvPicPr>
+          <p:nvPr>
+            <p:ph idx="1"/>
+          </p:nvPr>
+        </p:nvPicPr>
+        <p:blipFill>
+          <a:blip r:embed="rId2">
+            <a:extLst>
+              <a:ext uri="{28A0092B-C50C-407E-A947-70E740481C1C}">
+                <a14:useLocalDpi xmlns:a14="http://schemas.microsoft.com/office/drawing/2010/main" val="0"/>
+              </a:ext>
+            </a:extLst>
+          </a:blip>
+          <a:srcRect t="6225"/>
+          <a:stretch/>
+        </p:blipFill>
+        <p:spPr>
+          <a:xfrm>
+            <a:off x="1786756" y="1788160"/>
+            <a:ext cx="8618487" cy="4856480"/>
+          </a:xfrm>
+        </p:spPr>
+      </p:pic>
+      <p:sp>
+        <p:nvSpPr>
+          <p:cNvPr id="6" name="TextBox 5">
+            <a:extLst>
+              <a:ext uri="{FF2B5EF4-FFF2-40B4-BE49-F238E27FC236}">
+                <a16:creationId xmlns:a16="http://schemas.microsoft.com/office/drawing/2014/main" id="{85B2C7B7-4BA9-EB08-7CDD-E8CB7044D6E1}"/>
+              </a:ext>
+            </a:extLst>
+          </p:cNvPr>
+          <p:cNvSpPr txBox="1"/>
+          <p:nvPr/>
+        </p:nvSpPr>
+        <p:spPr>
+          <a:xfrm>
+            <a:off x="8270240" y="670560"/>
+            <a:ext cx="2661920" cy="923330"/>
+          </a:xfrm>
+          <a:prstGeom prst="rect">
+            <a:avLst/>
+          </a:prstGeom>
+          <a:noFill/>
+        </p:spPr>
+        <p:txBody>
+          <a:bodyPr wrap="square" rtlCol="0">
+            <a:spAutoFit/>
+          </a:bodyPr>
+          <a:lstStyle/>
+          <a:p>
+            <a:r>
+              <a:rPr lang="de-CH" dirty="0">
+                <a:solidFill>
+                  <a:srgbClr val="FF0000"/>
+                </a:solidFill>
+              </a:rPr>
+              <a:t>How many height values for each provenance?</a:t>
+            </a:r>
+          </a:p>
+          <a:p>
+            <a:r>
+              <a:rPr lang="de-CH" dirty="0">
+                <a:solidFill>
+                  <a:srgbClr val="FF0000"/>
+                </a:solidFill>
+              </a:rPr>
+              <a:t>How many NAs</a:t>
+            </a:r>
+            <a:endParaRPr lang="en-GB" dirty="0">
+              <a:solidFill>
+                <a:srgbClr val="FF0000"/>
+              </a:solidFill>
+            </a:endParaRPr>
+          </a:p>
+        </p:txBody>
+      </p:sp>
+    </p:spTree>
+    <p:extLst>
+      <p:ext uri="{BB962C8B-B14F-4D97-AF65-F5344CB8AC3E}">
+        <p14:creationId xmlns:p14="http://schemas.microsoft.com/office/powerpoint/2010/main" val="2468455985"/>
+      </p:ext>
+    </p:extLst>
+  </p:cSld>
+  <p:clrMapOvr>
+    <a:masterClrMapping/>
+  </p:clrMapOvr>
+</p:sld>
+</file>
+
+<file path=ppt/slides/slide12.xml><?xml version="1.0" encoding="utf-8"?>
+<p:sld xmlns:a="http://schemas.openxmlformats.org/drawingml/2006/main" xmlns:r="http://schemas.openxmlformats.org/officeDocument/2006/relationships" xmlns:p="http://schemas.openxmlformats.org/presentationml/2006/main">
+  <p:cSld>
+    <p:spTree>
+      <p:nvGrpSpPr>
+        <p:cNvPr id="1" name=""/>
+        <p:cNvGrpSpPr/>
+        <p:nvPr/>
+      </p:nvGrpSpPr>
+      <p:grpSpPr>
+        <a:xfrm>
+          <a:off x="0" y="0"/>
+          <a:ext cx="0" cy="0"/>
+          <a:chOff x="0" y="0"/>
+          <a:chExt cx="0" cy="0"/>
+        </a:xfrm>
+      </p:grpSpPr>
+      <p:sp>
+        <p:nvSpPr>
+          <p:cNvPr id="2" name="Title 1">
+            <a:extLst>
+              <a:ext uri="{FF2B5EF4-FFF2-40B4-BE49-F238E27FC236}">
+                <a16:creationId xmlns:a16="http://schemas.microsoft.com/office/drawing/2014/main" id="{88E45658-7DE4-99A0-DD6E-14745BC00932}"/>
+              </a:ext>
+            </a:extLst>
+          </p:cNvPr>
+          <p:cNvSpPr>
+            <a:spLocks noGrp="1"/>
+          </p:cNvSpPr>
+          <p:nvPr>
+            <p:ph type="title"/>
+          </p:nvPr>
+        </p:nvSpPr>
+        <p:spPr>
+          <a:xfrm>
+            <a:off x="238760" y="203200"/>
+            <a:ext cx="9875520" cy="1356360"/>
+          </a:xfrm>
+        </p:spPr>
+        <p:txBody>
+          <a:bodyPr/>
+          <a:lstStyle/>
+          <a:p>
+            <a:r>
+              <a:rPr lang="de-CH" dirty="0"/>
+              <a:t>Height – by Type</a:t>
+            </a:r>
+            <a:endParaRPr lang="en-GB" dirty="0"/>
+          </a:p>
+        </p:txBody>
+      </p:sp>
+      <p:sp>
+        <p:nvSpPr>
+          <p:cNvPr id="6" name="TextBox 5">
+            <a:extLst>
+              <a:ext uri="{FF2B5EF4-FFF2-40B4-BE49-F238E27FC236}">
+                <a16:creationId xmlns:a16="http://schemas.microsoft.com/office/drawing/2014/main" id="{BC044F4B-72E6-AB1B-4698-07642C2B12A6}"/>
+              </a:ext>
+            </a:extLst>
+          </p:cNvPr>
+          <p:cNvSpPr txBox="1"/>
+          <p:nvPr/>
+        </p:nvSpPr>
+        <p:spPr>
+          <a:xfrm>
+            <a:off x="8280400" y="561955"/>
+            <a:ext cx="2661920" cy="923330"/>
+          </a:xfrm>
+          <a:prstGeom prst="rect">
+            <a:avLst/>
+          </a:prstGeom>
+          <a:noFill/>
+        </p:spPr>
+        <p:txBody>
+          <a:bodyPr wrap="square" rtlCol="0">
+            <a:spAutoFit/>
+          </a:bodyPr>
+          <a:lstStyle/>
+          <a:p>
+            <a:r>
+              <a:rPr lang="de-CH" dirty="0">
+                <a:solidFill>
+                  <a:srgbClr val="FF0000"/>
+                </a:solidFill>
+              </a:rPr>
+              <a:t>How many height values for each type?</a:t>
+            </a:r>
+          </a:p>
+          <a:p>
+            <a:r>
+              <a:rPr lang="de-CH" dirty="0">
+                <a:solidFill>
+                  <a:srgbClr val="FF0000"/>
+                </a:solidFill>
+              </a:rPr>
+              <a:t>How many Nas?</a:t>
+            </a:r>
+            <a:endParaRPr lang="en-GB" dirty="0">
+              <a:solidFill>
+                <a:srgbClr val="FF0000"/>
+              </a:solidFill>
+            </a:endParaRPr>
+          </a:p>
+        </p:txBody>
+      </p:sp>
+      <p:pic>
+        <p:nvPicPr>
+          <p:cNvPr id="10" name="Content Placeholder 9" descr="A diagram of different colored rectangles&#10;&#10;AI-generated content may be incorrect.">
+            <a:extLst>
+              <a:ext uri="{FF2B5EF4-FFF2-40B4-BE49-F238E27FC236}">
+                <a16:creationId xmlns:a16="http://schemas.microsoft.com/office/drawing/2014/main" id="{8BA279B2-C990-BC1D-5784-CB13A3FEFDBE}"/>
+              </a:ext>
+            </a:extLst>
+          </p:cNvPr>
+          <p:cNvPicPr>
+            <a:picLocks noGrp="1" noChangeAspect="1"/>
+          </p:cNvPicPr>
+          <p:nvPr>
+            <p:ph idx="1"/>
+          </p:nvPr>
+        </p:nvPicPr>
+        <p:blipFill>
+          <a:blip r:embed="rId2">
+            <a:extLst>
+              <a:ext uri="{28A0092B-C50C-407E-A947-70E740481C1C}">
+                <a14:useLocalDpi xmlns:a14="http://schemas.microsoft.com/office/drawing/2010/main" val="0"/>
+              </a:ext>
+            </a:extLst>
+          </a:blip>
+          <a:srcRect t="5930"/>
+          <a:stretch/>
+        </p:blipFill>
+        <p:spPr>
+          <a:xfrm>
+            <a:off x="1273629" y="1479925"/>
+            <a:ext cx="9002485" cy="5088833"/>
+          </a:xfrm>
+        </p:spPr>
+      </p:pic>
+    </p:spTree>
+    <p:extLst>
+      <p:ext uri="{BB962C8B-B14F-4D97-AF65-F5344CB8AC3E}">
+        <p14:creationId xmlns:p14="http://schemas.microsoft.com/office/powerpoint/2010/main" val="522262804"/>
+      </p:ext>
+    </p:extLst>
+  </p:cSld>
+  <p:clrMapOvr>
+    <a:masterClrMapping/>
+  </p:clrMapOvr>
+</p:sld>
+</file>
+
+<file path=ppt/slides/slide13.xml><?xml version="1.0" encoding="utf-8"?>
+<p:sld xmlns:a="http://schemas.openxmlformats.org/drawingml/2006/main" xmlns:r="http://schemas.openxmlformats.org/officeDocument/2006/relationships" xmlns:p="http://schemas.openxmlformats.org/presentationml/2006/main">
+  <p:cSld>
+    <p:spTree>
+      <p:nvGrpSpPr>
+        <p:cNvPr id="1" name=""/>
+        <p:cNvGrpSpPr/>
+        <p:nvPr/>
+      </p:nvGrpSpPr>
+      <p:grpSpPr>
+        <a:xfrm>
+          <a:off x="0" y="0"/>
+          <a:ext cx="0" cy="0"/>
+          <a:chOff x="0" y="0"/>
+          <a:chExt cx="0" cy="0"/>
+        </a:xfrm>
+      </p:grpSpPr>
+      <p:sp>
+        <p:nvSpPr>
+          <p:cNvPr id="2" name="Title 1">
+            <a:extLst>
+              <a:ext uri="{FF2B5EF4-FFF2-40B4-BE49-F238E27FC236}">
+                <a16:creationId xmlns:a16="http://schemas.microsoft.com/office/drawing/2014/main" id="{32D9D9BF-2B66-09AD-138F-36386DDD5CDD}"/>
+              </a:ext>
+            </a:extLst>
+          </p:cNvPr>
+          <p:cNvSpPr>
+            <a:spLocks noGrp="1"/>
+          </p:cNvSpPr>
+          <p:nvPr>
+            <p:ph type="title"/>
+          </p:nvPr>
+        </p:nvSpPr>
+        <p:spPr>
+          <a:xfrm>
+            <a:off x="189848" y="263545"/>
+            <a:ext cx="9875520" cy="1356360"/>
+          </a:xfrm>
+        </p:spPr>
+        <p:txBody>
+          <a:bodyPr/>
+          <a:lstStyle/>
+          <a:p>
+            <a:r>
+              <a:rPr lang="de-CH" dirty="0"/>
+              <a:t>Budset – by provenance</a:t>
+            </a:r>
+            <a:endParaRPr lang="en-GB" dirty="0"/>
+          </a:p>
+        </p:txBody>
+      </p:sp>
+      <p:pic>
+        <p:nvPicPr>
+          <p:cNvPr id="5" name="Content Placeholder 4">
+            <a:extLst>
+              <a:ext uri="{FF2B5EF4-FFF2-40B4-BE49-F238E27FC236}">
+                <a16:creationId xmlns:a16="http://schemas.microsoft.com/office/drawing/2014/main" id="{C81AF245-CF10-C522-E0CE-18AABCB35AA8}"/>
+              </a:ext>
+            </a:extLst>
+          </p:cNvPr>
+          <p:cNvPicPr>
+            <a:picLocks noGrp="1" noChangeAspect="1"/>
+          </p:cNvPicPr>
+          <p:nvPr>
+            <p:ph idx="1"/>
+          </p:nvPr>
+        </p:nvPicPr>
+        <p:blipFill>
+          <a:blip r:embed="rId2">
+            <a:extLst>
+              <a:ext uri="{28A0092B-C50C-407E-A947-70E740481C1C}">
+                <a14:useLocalDpi xmlns:a14="http://schemas.microsoft.com/office/drawing/2010/main" val="0"/>
+              </a:ext>
+            </a:extLst>
+          </a:blip>
+          <a:srcRect t="7493"/>
+          <a:stretch/>
+        </p:blipFill>
+        <p:spPr>
+          <a:xfrm>
+            <a:off x="739264" y="1597014"/>
+            <a:ext cx="8776687" cy="4878756"/>
+          </a:xfrm>
+        </p:spPr>
+      </p:pic>
+      <p:sp>
+        <p:nvSpPr>
+          <p:cNvPr id="3" name="TextBox 2">
+            <a:extLst>
+              <a:ext uri="{FF2B5EF4-FFF2-40B4-BE49-F238E27FC236}">
+                <a16:creationId xmlns:a16="http://schemas.microsoft.com/office/drawing/2014/main" id="{3FEE3C62-7A17-B683-8845-1CC05C605A19}"/>
+              </a:ext>
+            </a:extLst>
+          </p:cNvPr>
+          <p:cNvSpPr txBox="1"/>
+          <p:nvPr/>
+        </p:nvSpPr>
+        <p:spPr>
+          <a:xfrm>
+            <a:off x="9133188" y="1158240"/>
+            <a:ext cx="1864360" cy="923330"/>
+          </a:xfrm>
+          <a:prstGeom prst="rect">
+            <a:avLst/>
+          </a:prstGeom>
+          <a:noFill/>
+        </p:spPr>
+        <p:txBody>
+          <a:bodyPr wrap="square" rtlCol="0">
+            <a:spAutoFit/>
+          </a:bodyPr>
+          <a:lstStyle/>
+          <a:p>
+            <a:r>
+              <a:rPr lang="de-CH" dirty="0"/>
+              <a:t>Even distribution between provenances</a:t>
+            </a:r>
+            <a:endParaRPr lang="en-GB" dirty="0"/>
+          </a:p>
+        </p:txBody>
+      </p:sp>
+      <p:sp>
+        <p:nvSpPr>
+          <p:cNvPr id="4" name="TextBox 3">
+            <a:extLst>
+              <a:ext uri="{FF2B5EF4-FFF2-40B4-BE49-F238E27FC236}">
+                <a16:creationId xmlns:a16="http://schemas.microsoft.com/office/drawing/2014/main" id="{E5DCEE24-4EB7-F051-422E-FF7AF5E0BE67}"/>
+              </a:ext>
+            </a:extLst>
+          </p:cNvPr>
+          <p:cNvSpPr txBox="1"/>
+          <p:nvPr/>
+        </p:nvSpPr>
+        <p:spPr>
+          <a:xfrm>
+            <a:off x="7303207" y="422255"/>
+            <a:ext cx="2661920" cy="923330"/>
+          </a:xfrm>
+          <a:prstGeom prst="rect">
+            <a:avLst/>
+          </a:prstGeom>
+          <a:noFill/>
+        </p:spPr>
+        <p:txBody>
+          <a:bodyPr wrap="square" rtlCol="0">
+            <a:spAutoFit/>
+          </a:bodyPr>
+          <a:lstStyle/>
+          <a:p>
+            <a:r>
+              <a:rPr lang="de-CH" dirty="0">
+                <a:solidFill>
+                  <a:srgbClr val="FF0000"/>
+                </a:solidFill>
+              </a:rPr>
+              <a:t>How many budset values for each provenance?</a:t>
+            </a:r>
+          </a:p>
+          <a:p>
+            <a:r>
+              <a:rPr lang="de-CH" dirty="0">
+                <a:solidFill>
+                  <a:srgbClr val="FF0000"/>
+                </a:solidFill>
+              </a:rPr>
+              <a:t>How many Nas?</a:t>
+            </a:r>
+            <a:endParaRPr lang="en-GB" dirty="0">
+              <a:solidFill>
+                <a:srgbClr val="FF0000"/>
+              </a:solidFill>
+            </a:endParaRPr>
+          </a:p>
+        </p:txBody>
+      </p:sp>
+    </p:spTree>
+    <p:extLst>
+      <p:ext uri="{BB962C8B-B14F-4D97-AF65-F5344CB8AC3E}">
+        <p14:creationId xmlns:p14="http://schemas.microsoft.com/office/powerpoint/2010/main" val="4018528445"/>
+      </p:ext>
+    </p:extLst>
+  </p:cSld>
+  <p:clrMapOvr>
+    <a:masterClrMapping/>
+  </p:clrMapOvr>
+</p:sld>
+</file>
+
+<file path=ppt/slides/slide14.xml><?xml version="1.0" encoding="utf-8"?>
+<p:sld xmlns:a="http://schemas.openxmlformats.org/drawingml/2006/main" xmlns:r="http://schemas.openxmlformats.org/officeDocument/2006/relationships" xmlns:p="http://schemas.openxmlformats.org/presentationml/2006/main">
+  <p:cSld>
+    <p:spTree>
+      <p:nvGrpSpPr>
+        <p:cNvPr id="1" name=""/>
+        <p:cNvGrpSpPr/>
+        <p:nvPr/>
+      </p:nvGrpSpPr>
+      <p:grpSpPr>
+        <a:xfrm>
+          <a:off x="0" y="0"/>
+          <a:ext cx="0" cy="0"/>
+          <a:chOff x="0" y="0"/>
+          <a:chExt cx="0" cy="0"/>
+        </a:xfrm>
+      </p:grpSpPr>
+      <p:sp>
+        <p:nvSpPr>
+          <p:cNvPr id="2" name="Title 1">
+            <a:extLst>
+              <a:ext uri="{FF2B5EF4-FFF2-40B4-BE49-F238E27FC236}">
+                <a16:creationId xmlns:a16="http://schemas.microsoft.com/office/drawing/2014/main" id="{B4D941A4-7800-BF6D-3047-19A2F1FFE400}"/>
+              </a:ext>
+            </a:extLst>
+          </p:cNvPr>
+          <p:cNvSpPr>
+            <a:spLocks noGrp="1"/>
+          </p:cNvSpPr>
+          <p:nvPr>
+            <p:ph type="title"/>
+          </p:nvPr>
+        </p:nvSpPr>
+        <p:spPr>
+          <a:xfrm>
+            <a:off x="238760" y="178812"/>
+            <a:ext cx="9875520" cy="1356360"/>
+          </a:xfrm>
+        </p:spPr>
+        <p:txBody>
+          <a:bodyPr/>
+          <a:lstStyle/>
+          <a:p>
+            <a:r>
+              <a:rPr lang="de-CH" dirty="0"/>
+              <a:t>Budset by Type</a:t>
+            </a:r>
+            <a:endParaRPr lang="en-GB" dirty="0"/>
+          </a:p>
+        </p:txBody>
+      </p:sp>
+      <p:pic>
+        <p:nvPicPr>
+          <p:cNvPr id="5" name="Content Placeholder 4" descr="A graph of a graph&#10;&#10;AI-generated content may be incorrect.">
+            <a:extLst>
+              <a:ext uri="{FF2B5EF4-FFF2-40B4-BE49-F238E27FC236}">
+                <a16:creationId xmlns:a16="http://schemas.microsoft.com/office/drawing/2014/main" id="{74CD08E0-9A64-49FE-60CB-7BB27C2718EC}"/>
+              </a:ext>
+            </a:extLst>
+          </p:cNvPr>
+          <p:cNvPicPr>
+            <a:picLocks noGrp="1" noChangeAspect="1"/>
+          </p:cNvPicPr>
+          <p:nvPr>
+            <p:ph idx="1"/>
+          </p:nvPr>
+        </p:nvPicPr>
+        <p:blipFill>
+          <a:blip r:embed="rId2">
+            <a:extLst>
+              <a:ext uri="{28A0092B-C50C-407E-A947-70E740481C1C}">
+                <a14:useLocalDpi xmlns:a14="http://schemas.microsoft.com/office/drawing/2010/main" val="0"/>
+              </a:ext>
+            </a:extLst>
+          </a:blip>
+          <a:srcRect t="6163"/>
+          <a:stretch/>
+        </p:blipFill>
+        <p:spPr>
+          <a:xfrm>
+            <a:off x="1334318" y="1320800"/>
+            <a:ext cx="9143182" cy="5155531"/>
+          </a:xfrm>
+        </p:spPr>
+      </p:pic>
+    </p:spTree>
+    <p:extLst>
+      <p:ext uri="{BB962C8B-B14F-4D97-AF65-F5344CB8AC3E}">
+        <p14:creationId xmlns:p14="http://schemas.microsoft.com/office/powerpoint/2010/main" val="366536072"/>
+      </p:ext>
+    </p:extLst>
+  </p:cSld>
+  <p:clrMapOvr>
+    <a:masterClrMapping/>
+  </p:clrMapOvr>
+</p:sld>
+</file>
+
+<file path=ppt/slides/slide15.xml><?xml version="1.0" encoding="utf-8"?>
+<p:sld xmlns:a="http://schemas.openxmlformats.org/drawingml/2006/main" xmlns:r="http://schemas.openxmlformats.org/officeDocument/2006/relationships" xmlns:p="http://schemas.openxmlformats.org/presentationml/2006/main">
+  <p:cSld>
+    <p:spTree>
+      <p:nvGrpSpPr>
+        <p:cNvPr id="1" name=""/>
+        <p:cNvGrpSpPr/>
+        <p:nvPr/>
+      </p:nvGrpSpPr>
+      <p:grpSpPr>
+        <a:xfrm>
+          <a:off x="0" y="0"/>
+          <a:ext cx="0" cy="0"/>
+          <a:chOff x="0" y="0"/>
+          <a:chExt cx="0" cy="0"/>
+        </a:xfrm>
+      </p:grpSpPr>
+      <p:sp>
+        <p:nvSpPr>
+          <p:cNvPr id="2" name="Title 1">
+            <a:extLst>
+              <a:ext uri="{FF2B5EF4-FFF2-40B4-BE49-F238E27FC236}">
+                <a16:creationId xmlns:a16="http://schemas.microsoft.com/office/drawing/2014/main" id="{E5EB79DC-5387-676F-0683-1D49454F40B3}"/>
+              </a:ext>
+            </a:extLst>
+          </p:cNvPr>
+          <p:cNvSpPr>
+            <a:spLocks noGrp="1"/>
+          </p:cNvSpPr>
+          <p:nvPr>
+            <p:ph type="title"/>
+          </p:nvPr>
+        </p:nvSpPr>
+        <p:spPr/>
+        <p:txBody>
+          <a:bodyPr/>
+          <a:lstStyle/>
+          <a:p>
+            <a:r>
+              <a:rPr lang="de-CH" dirty="0"/>
+              <a:t>Budburst – by provenance</a:t>
+            </a:r>
+            <a:endParaRPr lang="en-GB" dirty="0"/>
+          </a:p>
+        </p:txBody>
+      </p:sp>
+      <p:pic>
+        <p:nvPicPr>
+          <p:cNvPr id="5" name="Content Placeholder 4" descr="A graph with blue and black lines&#10;&#10;AI-generated content may be incorrect.">
+            <a:extLst>
+              <a:ext uri="{FF2B5EF4-FFF2-40B4-BE49-F238E27FC236}">
+                <a16:creationId xmlns:a16="http://schemas.microsoft.com/office/drawing/2014/main" id="{A613A6A1-D807-9828-02A8-F458A86438B3}"/>
+              </a:ext>
+            </a:extLst>
+          </p:cNvPr>
+          <p:cNvPicPr>
+            <a:picLocks noGrp="1" noChangeAspect="1"/>
+          </p:cNvPicPr>
+          <p:nvPr>
+            <p:ph idx="1"/>
+          </p:nvPr>
+        </p:nvPicPr>
+        <p:blipFill>
+          <a:blip r:embed="rId2">
+            <a:extLst>
+              <a:ext uri="{28A0092B-C50C-407E-A947-70E740481C1C}">
+                <a14:useLocalDpi xmlns:a14="http://schemas.microsoft.com/office/drawing/2010/main" val="0"/>
+              </a:ext>
+            </a:extLst>
+          </a:blip>
+          <a:srcRect t="6223"/>
+          <a:stretch/>
+        </p:blipFill>
+        <p:spPr>
+          <a:xfrm>
+            <a:off x="721360" y="1584960"/>
+            <a:ext cx="8816633" cy="4968240"/>
+          </a:xfrm>
+        </p:spPr>
+      </p:pic>
+      <p:sp>
+        <p:nvSpPr>
+          <p:cNvPr id="6" name="TextBox 5">
+            <a:extLst>
+              <a:ext uri="{FF2B5EF4-FFF2-40B4-BE49-F238E27FC236}">
+                <a16:creationId xmlns:a16="http://schemas.microsoft.com/office/drawing/2014/main" id="{88649343-2493-E174-DAD2-92A791FD7486}"/>
+              </a:ext>
+            </a:extLst>
+          </p:cNvPr>
+          <p:cNvSpPr txBox="1"/>
+          <p:nvPr/>
+        </p:nvSpPr>
+        <p:spPr>
+          <a:xfrm>
+            <a:off x="9286118" y="950297"/>
+            <a:ext cx="2367932" cy="2031325"/>
+          </a:xfrm>
+          <a:prstGeom prst="rect">
+            <a:avLst/>
+          </a:prstGeom>
+          <a:noFill/>
+        </p:spPr>
+        <p:txBody>
+          <a:bodyPr wrap="square" rtlCol="0">
+            <a:spAutoFit/>
+          </a:bodyPr>
+          <a:lstStyle/>
+          <a:p>
+            <a:r>
+              <a:rPr lang="de-CH" dirty="0"/>
+              <a:t>Slightly less even distribution between provenances, but smaller range than budset</a:t>
+            </a:r>
+          </a:p>
+          <a:p>
+            <a:endParaRPr lang="de-CH" dirty="0"/>
+          </a:p>
+          <a:p>
+            <a:r>
+              <a:rPr lang="en-GB" dirty="0"/>
+              <a:t>More outliers</a:t>
+            </a:r>
+          </a:p>
+        </p:txBody>
+      </p:sp>
+      <p:sp>
+        <p:nvSpPr>
+          <p:cNvPr id="7" name="TextBox 6">
+            <a:extLst>
+              <a:ext uri="{FF2B5EF4-FFF2-40B4-BE49-F238E27FC236}">
+                <a16:creationId xmlns:a16="http://schemas.microsoft.com/office/drawing/2014/main" id="{93CF37AE-0442-D191-0D72-30187F796763}"/>
+              </a:ext>
+            </a:extLst>
+          </p:cNvPr>
+          <p:cNvSpPr txBox="1"/>
+          <p:nvPr/>
+        </p:nvSpPr>
+        <p:spPr>
+          <a:xfrm>
+            <a:off x="9261044" y="4705310"/>
+            <a:ext cx="2707436" cy="1200329"/>
+          </a:xfrm>
+          <a:prstGeom prst="rect">
+            <a:avLst/>
+          </a:prstGeom>
+          <a:noFill/>
+        </p:spPr>
+        <p:txBody>
+          <a:bodyPr wrap="square" rtlCol="0">
+            <a:spAutoFit/>
+          </a:bodyPr>
+          <a:lstStyle/>
+          <a:p>
+            <a:r>
+              <a:rPr lang="de-CH" dirty="0">
+                <a:solidFill>
+                  <a:srgbClr val="FF0000"/>
+                </a:solidFill>
+              </a:rPr>
+              <a:t>How many budburst values for each provenance?</a:t>
+            </a:r>
+          </a:p>
+          <a:p>
+            <a:r>
+              <a:rPr lang="de-CH" dirty="0">
+                <a:solidFill>
+                  <a:srgbClr val="FF0000"/>
+                </a:solidFill>
+              </a:rPr>
+              <a:t>How many Nas?</a:t>
+            </a:r>
+            <a:endParaRPr lang="en-GB" dirty="0">
+              <a:solidFill>
+                <a:srgbClr val="FF0000"/>
+              </a:solidFill>
+            </a:endParaRPr>
+          </a:p>
+        </p:txBody>
+      </p:sp>
+    </p:spTree>
+    <p:extLst>
+      <p:ext uri="{BB962C8B-B14F-4D97-AF65-F5344CB8AC3E}">
+        <p14:creationId xmlns:p14="http://schemas.microsoft.com/office/powerpoint/2010/main" val="1309389261"/>
+      </p:ext>
+    </p:extLst>
+  </p:cSld>
+  <p:clrMapOvr>
+    <a:masterClrMapping/>
+  </p:clrMapOvr>
+</p:sld>
+</file>
+
+<file path=ppt/slides/slide16.xml><?xml version="1.0" encoding="utf-8"?>
+<p:sld xmlns:a="http://schemas.openxmlformats.org/drawingml/2006/main" xmlns:r="http://schemas.openxmlformats.org/officeDocument/2006/relationships" xmlns:p="http://schemas.openxmlformats.org/presentationml/2006/main">
+  <p:cSld>
+    <p:spTree>
+      <p:nvGrpSpPr>
+        <p:cNvPr id="1" name=""/>
+        <p:cNvGrpSpPr/>
+        <p:nvPr/>
+      </p:nvGrpSpPr>
+      <p:grpSpPr>
+        <a:xfrm>
+          <a:off x="0" y="0"/>
+          <a:ext cx="0" cy="0"/>
+          <a:chOff x="0" y="0"/>
+          <a:chExt cx="0" cy="0"/>
+        </a:xfrm>
+      </p:grpSpPr>
+      <p:sp>
+        <p:nvSpPr>
+          <p:cNvPr id="2" name="Title 1">
+            <a:extLst>
+              <a:ext uri="{FF2B5EF4-FFF2-40B4-BE49-F238E27FC236}">
+                <a16:creationId xmlns:a16="http://schemas.microsoft.com/office/drawing/2014/main" id="{87423E70-6AE2-13AB-B9D6-DFD4DC3807B8}"/>
+              </a:ext>
+            </a:extLst>
+          </p:cNvPr>
+          <p:cNvSpPr>
+            <a:spLocks noGrp="1"/>
+          </p:cNvSpPr>
+          <p:nvPr>
+            <p:ph type="title"/>
+          </p:nvPr>
+        </p:nvSpPr>
+        <p:spPr>
+          <a:xfrm>
+            <a:off x="177800" y="196168"/>
+            <a:ext cx="9875520" cy="1356360"/>
+          </a:xfrm>
+        </p:spPr>
+        <p:txBody>
+          <a:bodyPr/>
+          <a:lstStyle/>
+          <a:p>
+            <a:r>
+              <a:rPr lang="de-CH" dirty="0"/>
+              <a:t>Budburst by Type</a:t>
+            </a:r>
+            <a:endParaRPr lang="en-GB" dirty="0"/>
+          </a:p>
+        </p:txBody>
+      </p:sp>
+      <p:pic>
+        <p:nvPicPr>
+          <p:cNvPr id="5" name="Content Placeholder 4" descr="A graph of a graph&#10;&#10;AI-generated content may be incorrect.">
+            <a:extLst>
+              <a:ext uri="{FF2B5EF4-FFF2-40B4-BE49-F238E27FC236}">
+                <a16:creationId xmlns:a16="http://schemas.microsoft.com/office/drawing/2014/main" id="{16D65E6A-4EF0-6D4D-7682-EC32F509A222}"/>
+              </a:ext>
+            </a:extLst>
+          </p:cNvPr>
+          <p:cNvPicPr>
+            <a:picLocks noGrp="1" noChangeAspect="1"/>
+          </p:cNvPicPr>
+          <p:nvPr>
+            <p:ph idx="1"/>
+          </p:nvPr>
+        </p:nvPicPr>
+        <p:blipFill>
+          <a:blip r:embed="rId2">
+            <a:extLst>
+              <a:ext uri="{28A0092B-C50C-407E-A947-70E740481C1C}">
+                <a14:useLocalDpi xmlns:a14="http://schemas.microsoft.com/office/drawing/2010/main" val="0"/>
+              </a:ext>
+            </a:extLst>
+          </a:blip>
+          <a:srcRect t="6302"/>
+          <a:stretch/>
+        </p:blipFill>
+        <p:spPr>
+          <a:xfrm>
+            <a:off x="1296023" y="1124632"/>
+            <a:ext cx="9599953" cy="5405120"/>
+          </a:xfrm>
+        </p:spPr>
+      </p:pic>
+    </p:spTree>
+    <p:extLst>
+      <p:ext uri="{BB962C8B-B14F-4D97-AF65-F5344CB8AC3E}">
+        <p14:creationId xmlns:p14="http://schemas.microsoft.com/office/powerpoint/2010/main" val="1505597422"/>
+      </p:ext>
+    </p:extLst>
+  </p:cSld>
+  <p:clrMapOvr>
+    <a:masterClrMapping/>
+  </p:clrMapOvr>
+</p:sld>
+</file>
+
 <file path=ppt/slides/slide2.xml><?xml version="1.0" encoding="utf-8"?>
 <p:sld xmlns:a="http://schemas.openxmlformats.org/drawingml/2006/main" xmlns:r="http://schemas.openxmlformats.org/officeDocument/2006/relationships" xmlns:p="http://schemas.openxmlformats.org/presentationml/2006/main">
   <p:cSld>
@@ -3606,7 +5171,7 @@
           <a:p>
             <a:r>
               <a:rPr lang="de-CH" dirty="0"/>
-              <a:t>Tree status</a:t>
+              <a:t>Tree status – 2024-2025</a:t>
             </a:r>
             <a:endParaRPr lang="en-GB" dirty="0"/>
           </a:p>
@@ -3636,17 +5201,53 @@
               </a:ext>
             </a:extLst>
           </a:blip>
-          <a:stretch>
-            <a:fillRect/>
-          </a:stretch>
+          <a:srcRect t="5375"/>
+          <a:stretch/>
         </p:blipFill>
         <p:spPr>
           <a:xfrm>
-            <a:off x="1612504" y="1287780"/>
-            <a:ext cx="8728925" cy="5245237"/>
+            <a:off x="1240240" y="1280160"/>
+            <a:ext cx="9273909" cy="5273177"/>
           </a:xfrm>
         </p:spPr>
       </p:pic>
+      <p:sp>
+        <p:nvSpPr>
+          <p:cNvPr id="4" name="TextBox 3">
+            <a:extLst>
+              <a:ext uri="{FF2B5EF4-FFF2-40B4-BE49-F238E27FC236}">
+                <a16:creationId xmlns:a16="http://schemas.microsoft.com/office/drawing/2014/main" id="{63AB7877-6A7E-90C1-8A72-F78A798BE679}"/>
+              </a:ext>
+            </a:extLst>
+          </p:cNvPr>
+          <p:cNvSpPr txBox="1"/>
+          <p:nvPr/>
+        </p:nvSpPr>
+        <p:spPr>
+          <a:xfrm>
+            <a:off x="7132320" y="706874"/>
+            <a:ext cx="1188720" cy="369332"/>
+          </a:xfrm>
+          <a:prstGeom prst="rect">
+            <a:avLst/>
+          </a:prstGeom>
+          <a:noFill/>
+        </p:spPr>
+        <p:txBody>
+          <a:bodyPr wrap="square" rtlCol="0">
+            <a:spAutoFit/>
+          </a:bodyPr>
+          <a:lstStyle/>
+          <a:p>
+            <a:pPr algn="ctr"/>
+            <a:r>
+              <a:rPr lang="de-CH" dirty="0"/>
+              <a:t>n = 780</a:t>
+            </a:r>
+            <a:endParaRPr lang="en-GB" dirty="0"/>
+          </a:p>
+        </p:txBody>
+      </p:sp>
     </p:spTree>
     <p:extLst>
       <p:ext uri="{BB962C8B-B14F-4D97-AF65-F5344CB8AC3E}">
@@ -3677,46 +5278,12 @@
           <a:chExt cx="0" cy="0"/>
         </a:xfrm>
       </p:grpSpPr>
-      <p:sp>
-        <p:nvSpPr>
-          <p:cNvPr id="2" name="Title 1">
+      <p:pic>
+        <p:nvPicPr>
+          <p:cNvPr id="6" name="Content Placeholder 5" descr="A graph of different colored bars&#10;&#10;AI-generated content may be incorrect.">
             <a:extLst>
               <a:ext uri="{FF2B5EF4-FFF2-40B4-BE49-F238E27FC236}">
-                <a16:creationId xmlns:a16="http://schemas.microsoft.com/office/drawing/2014/main" id="{DED8D4A8-9316-1F4F-4391-A51F0AE12446}"/>
-              </a:ext>
-            </a:extLst>
-          </p:cNvPr>
-          <p:cNvSpPr>
-            <a:spLocks noGrp="1"/>
-          </p:cNvSpPr>
-          <p:nvPr>
-            <p:ph type="title"/>
-          </p:nvPr>
-        </p:nvSpPr>
-        <p:spPr>
-          <a:xfrm>
-            <a:off x="309880" y="274320"/>
-            <a:ext cx="9875520" cy="1356360"/>
-          </a:xfrm>
-        </p:spPr>
-        <p:txBody>
-          <a:bodyPr/>
-          <a:lstStyle/>
-          <a:p>
-            <a:r>
-              <a:rPr lang="de-CH" dirty="0"/>
-              <a:t>DBB</a:t>
-            </a:r>
-            <a:endParaRPr lang="en-GB" dirty="0"/>
-          </a:p>
-        </p:txBody>
-      </p:sp>
-      <p:pic>
-        <p:nvPicPr>
-          <p:cNvPr id="13" name="Content Placeholder 12" descr="A graph of a graph&#10;&#10;AI-generated content may be incorrect.">
-            <a:extLst>
-              <a:ext uri="{FF2B5EF4-FFF2-40B4-BE49-F238E27FC236}">
-                <a16:creationId xmlns:a16="http://schemas.microsoft.com/office/drawing/2014/main" id="{20E9ABAA-AE1B-6BCA-1B39-06C6C56C6344}"/>
+                <a16:creationId xmlns:a16="http://schemas.microsoft.com/office/drawing/2014/main" id="{AD890090-EF65-13CD-3F06-580B5D3AF2EB}"/>
               </a:ext>
             </a:extLst>
           </p:cNvPr>
@@ -3735,21 +5302,54 @@
               </a:ext>
             </a:extLst>
           </a:blip>
-          <a:stretch>
-            <a:fillRect/>
-          </a:stretch>
+          <a:srcRect t="5660"/>
+          <a:stretch/>
         </p:blipFill>
         <p:spPr>
           <a:xfrm>
-            <a:off x="1741324" y="1148080"/>
-            <a:ext cx="8927366" cy="5364480"/>
+            <a:off x="1452880" y="1349888"/>
+            <a:ext cx="9286240" cy="5264272"/>
           </a:xfrm>
         </p:spPr>
       </p:pic>
+      <p:sp>
+        <p:nvSpPr>
+          <p:cNvPr id="4" name="Title 1">
+            <a:extLst>
+              <a:ext uri="{FF2B5EF4-FFF2-40B4-BE49-F238E27FC236}">
+                <a16:creationId xmlns:a16="http://schemas.microsoft.com/office/drawing/2014/main" id="{C2C95541-CA90-A88F-7649-31BAE83914A4}"/>
+              </a:ext>
+            </a:extLst>
+          </p:cNvPr>
+          <p:cNvSpPr>
+            <a:spLocks noGrp="1"/>
+          </p:cNvSpPr>
+          <p:nvPr>
+            <p:ph type="title"/>
+          </p:nvPr>
+        </p:nvSpPr>
+        <p:spPr>
+          <a:xfrm>
+            <a:off x="228600" y="243840"/>
+            <a:ext cx="9875838" cy="1355725"/>
+          </a:xfrm>
+        </p:spPr>
+        <p:txBody>
+          <a:bodyPr/>
+          <a:lstStyle/>
+          <a:p>
+            <a:r>
+              <a:rPr lang="de-CH" dirty="0"/>
+              <a:t>Status – by Provenance</a:t>
+            </a:r>
+            <a:endParaRPr lang="en-GB" dirty="0"/>
+          </a:p>
+        </p:txBody>
+      </p:sp>
     </p:spTree>
     <p:extLst>
       <p:ext uri="{BB962C8B-B14F-4D97-AF65-F5344CB8AC3E}">
-        <p14:creationId xmlns:p14="http://schemas.microsoft.com/office/powerpoint/2010/main" val="4154756640"/>
+        <p14:creationId xmlns:p14="http://schemas.microsoft.com/office/powerpoint/2010/main" val="1264928361"/>
       </p:ext>
     </p:extLst>
   </p:cSld>
@@ -3781,7 +5381,7 @@
           <p:cNvPr id="2" name="Title 1">
             <a:extLst>
               <a:ext uri="{FF2B5EF4-FFF2-40B4-BE49-F238E27FC236}">
-                <a16:creationId xmlns:a16="http://schemas.microsoft.com/office/drawing/2014/main" id="{EC37FC25-0092-D266-9369-B42C8B0A2DCD}"/>
+                <a16:creationId xmlns:a16="http://schemas.microsoft.com/office/drawing/2014/main" id="{3924B841-9362-0383-46CC-CFFBEFEFB90A}"/>
               </a:ext>
             </a:extLst>
           </p:cNvPr>
@@ -3794,7 +5394,7 @@
         </p:nvSpPr>
         <p:spPr>
           <a:xfrm>
-            <a:off x="421640" y="386080"/>
+            <a:off x="238760" y="233680"/>
             <a:ext cx="9875520" cy="1356360"/>
           </a:xfrm>
         </p:spPr>
@@ -3804,7 +5404,7 @@
           <a:p>
             <a:r>
               <a:rPr lang="de-CH" dirty="0"/>
-              <a:t>Height</a:t>
+              <a:t>Status – by Type</a:t>
             </a:r>
             <a:endParaRPr lang="en-GB" dirty="0"/>
           </a:p>
@@ -3812,10 +5412,108 @@
       </p:sp>
       <p:pic>
         <p:nvPicPr>
-          <p:cNvPr id="13" name="Content Placeholder 12" descr="A graph of a graph&#10;&#10;AI-generated content may be incorrect.">
+          <p:cNvPr id="5" name="Content Placeholder 4" descr="A graph with different colored bars&#10;&#10;AI-generated content may be incorrect.">
             <a:extLst>
               <a:ext uri="{FF2B5EF4-FFF2-40B4-BE49-F238E27FC236}">
-                <a16:creationId xmlns:a16="http://schemas.microsoft.com/office/drawing/2014/main" id="{DF5F4204-7DFC-D576-7935-B7E0866D43BB}"/>
+                <a16:creationId xmlns:a16="http://schemas.microsoft.com/office/drawing/2014/main" id="{A1CE5F60-A8AD-E47F-B1ED-5F1950277951}"/>
+              </a:ext>
+            </a:extLst>
+          </p:cNvPr>
+          <p:cNvPicPr>
+            <a:picLocks noGrp="1" noChangeAspect="1"/>
+          </p:cNvPicPr>
+          <p:nvPr>
+            <p:ph idx="1"/>
+          </p:nvPr>
+        </p:nvPicPr>
+        <p:blipFill>
+          <a:blip r:embed="rId2">
+            <a:extLst>
+              <a:ext uri="{28A0092B-C50C-407E-A947-70E740481C1C}">
+                <a14:useLocalDpi xmlns:a14="http://schemas.microsoft.com/office/drawing/2010/main" val="0"/>
+              </a:ext>
+            </a:extLst>
+          </a:blip>
+          <a:srcRect t="5930"/>
+          <a:stretch/>
+        </p:blipFill>
+        <p:spPr>
+          <a:xfrm>
+            <a:off x="1413847" y="1229360"/>
+            <a:ext cx="9364306" cy="5293360"/>
+          </a:xfrm>
+        </p:spPr>
+      </p:pic>
+    </p:spTree>
+    <p:extLst>
+      <p:ext uri="{BB962C8B-B14F-4D97-AF65-F5344CB8AC3E}">
+        <p14:creationId xmlns:p14="http://schemas.microsoft.com/office/powerpoint/2010/main" val="71374995"/>
+      </p:ext>
+    </p:extLst>
+  </p:cSld>
+  <p:clrMapOvr>
+    <a:masterClrMapping/>
+  </p:clrMapOvr>
+</p:sld>
+</file>
+
+<file path=ppt/slides/slide5.xml><?xml version="1.0" encoding="utf-8"?>
+<p:sld xmlns:a="http://schemas.openxmlformats.org/drawingml/2006/main" xmlns:r="http://schemas.openxmlformats.org/officeDocument/2006/relationships" xmlns:p="http://schemas.openxmlformats.org/presentationml/2006/main">
+  <p:cSld>
+    <p:spTree>
+      <p:nvGrpSpPr>
+        <p:cNvPr id="1" name=""/>
+        <p:cNvGrpSpPr/>
+        <p:nvPr/>
+      </p:nvGrpSpPr>
+      <p:grpSpPr>
+        <a:xfrm>
+          <a:off x="0" y="0"/>
+          <a:ext cx="0" cy="0"/>
+          <a:chOff x="0" y="0"/>
+          <a:chExt cx="0" cy="0"/>
+        </a:xfrm>
+      </p:grpSpPr>
+      <p:sp>
+        <p:nvSpPr>
+          <p:cNvPr id="4" name="Title 1">
+            <a:extLst>
+              <a:ext uri="{FF2B5EF4-FFF2-40B4-BE49-F238E27FC236}">
+                <a16:creationId xmlns:a16="http://schemas.microsoft.com/office/drawing/2014/main" id="{F351BBFA-4D62-6F56-D9B2-084422C226AB}"/>
+              </a:ext>
+            </a:extLst>
+          </p:cNvPr>
+          <p:cNvSpPr>
+            <a:spLocks noGrp="1"/>
+          </p:cNvSpPr>
+          <p:nvPr>
+            <p:ph type="title"/>
+          </p:nvPr>
+        </p:nvSpPr>
+        <p:spPr>
+          <a:xfrm>
+            <a:off x="248920" y="213360"/>
+            <a:ext cx="9875838" cy="1355725"/>
+          </a:xfrm>
+        </p:spPr>
+        <p:txBody>
+          <a:bodyPr/>
+          <a:lstStyle/>
+          <a:p>
+            <a:r>
+              <a:rPr lang="de-CH" dirty="0"/>
+              <a:t>Status – by Block</a:t>
+            </a:r>
+            <a:endParaRPr lang="en-GB" dirty="0"/>
+          </a:p>
+        </p:txBody>
+      </p:sp>
+      <p:pic>
+        <p:nvPicPr>
+          <p:cNvPr id="10" name="Content Placeholder 9" descr="A graph of blue and red bars&#10;&#10;AI-generated content may be incorrect.">
+            <a:extLst>
+              <a:ext uri="{FF2B5EF4-FFF2-40B4-BE49-F238E27FC236}">
+                <a16:creationId xmlns:a16="http://schemas.microsoft.com/office/drawing/2014/main" id="{EA175353-6AD5-76CA-2329-CCA6E2F2F8DA}"/>
               </a:ext>
             </a:extLst>
           </p:cNvPr>
@@ -3840,15 +5538,409 @@
         </p:blipFill>
         <p:spPr>
           <a:xfrm>
-            <a:off x="1991360" y="1538946"/>
-            <a:ext cx="8429072" cy="5065054"/>
+            <a:off x="1547778" y="1148080"/>
+            <a:ext cx="9096444" cy="5466080"/>
           </a:xfrm>
         </p:spPr>
       </p:pic>
     </p:spTree>
     <p:extLst>
       <p:ext uri="{BB962C8B-B14F-4D97-AF65-F5344CB8AC3E}">
-        <p14:creationId xmlns:p14="http://schemas.microsoft.com/office/powerpoint/2010/main" val="2740833318"/>
+        <p14:creationId xmlns:p14="http://schemas.microsoft.com/office/powerpoint/2010/main" val="2413059109"/>
+      </p:ext>
+    </p:extLst>
+  </p:cSld>
+  <p:clrMapOvr>
+    <a:masterClrMapping/>
+  </p:clrMapOvr>
+</p:sld>
+</file>
+
+<file path=ppt/slides/slide6.xml><?xml version="1.0" encoding="utf-8"?>
+<p:sld xmlns:a="http://schemas.openxmlformats.org/drawingml/2006/main" xmlns:r="http://schemas.openxmlformats.org/officeDocument/2006/relationships" xmlns:p="http://schemas.openxmlformats.org/presentationml/2006/main">
+  <p:cSld>
+    <p:spTree>
+      <p:nvGrpSpPr>
+        <p:cNvPr id="1" name=""/>
+        <p:cNvGrpSpPr/>
+        <p:nvPr/>
+      </p:nvGrpSpPr>
+      <p:grpSpPr>
+        <a:xfrm>
+          <a:off x="0" y="0"/>
+          <a:ext cx="0" cy="0"/>
+          <a:chOff x="0" y="0"/>
+          <a:chExt cx="0" cy="0"/>
+        </a:xfrm>
+      </p:grpSpPr>
+      <p:sp>
+        <p:nvSpPr>
+          <p:cNvPr id="2" name="Title 1">
+            <a:extLst>
+              <a:ext uri="{FF2B5EF4-FFF2-40B4-BE49-F238E27FC236}">
+                <a16:creationId xmlns:a16="http://schemas.microsoft.com/office/drawing/2014/main" id="{DBBAC9F3-8100-D77A-023E-C972C89795AC}"/>
+              </a:ext>
+            </a:extLst>
+          </p:cNvPr>
+          <p:cNvSpPr>
+            <a:spLocks noGrp="1"/>
+          </p:cNvSpPr>
+          <p:nvPr>
+            <p:ph type="title"/>
+          </p:nvPr>
+        </p:nvSpPr>
+        <p:spPr>
+          <a:xfrm>
+            <a:off x="228600" y="223520"/>
+            <a:ext cx="9875520" cy="1356360"/>
+          </a:xfrm>
+        </p:spPr>
+        <p:txBody>
+          <a:bodyPr/>
+          <a:lstStyle/>
+          <a:p>
+            <a:r>
+              <a:rPr lang="de-CH" dirty="0"/>
+              <a:t>Status – by Family</a:t>
+            </a:r>
+            <a:endParaRPr lang="en-GB" dirty="0"/>
+          </a:p>
+        </p:txBody>
+      </p:sp>
+      <p:pic>
+        <p:nvPicPr>
+          <p:cNvPr id="9" name="Content Placeholder 8" descr="A graph of a family&#10;&#10;AI-generated content may be incorrect.">
+            <a:extLst>
+              <a:ext uri="{FF2B5EF4-FFF2-40B4-BE49-F238E27FC236}">
+                <a16:creationId xmlns:a16="http://schemas.microsoft.com/office/drawing/2014/main" id="{11EA4D3C-9827-BB96-BA2A-29A5ABBE1BA1}"/>
+              </a:ext>
+            </a:extLst>
+          </p:cNvPr>
+          <p:cNvPicPr>
+            <a:picLocks noGrp="1" noChangeAspect="1"/>
+          </p:cNvPicPr>
+          <p:nvPr>
+            <p:ph idx="1"/>
+          </p:nvPr>
+        </p:nvPicPr>
+        <p:blipFill>
+          <a:blip r:embed="rId2">
+            <a:extLst>
+              <a:ext uri="{28A0092B-C50C-407E-A947-70E740481C1C}">
+                <a14:useLocalDpi xmlns:a14="http://schemas.microsoft.com/office/drawing/2010/main" val="0"/>
+              </a:ext>
+            </a:extLst>
+          </a:blip>
+          <a:srcRect t="5409"/>
+          <a:stretch/>
+        </p:blipFill>
+        <p:spPr>
+          <a:xfrm>
+            <a:off x="1250101" y="1219200"/>
+            <a:ext cx="9509339" cy="5405120"/>
+          </a:xfrm>
+        </p:spPr>
+      </p:pic>
+    </p:spTree>
+    <p:extLst>
+      <p:ext uri="{BB962C8B-B14F-4D97-AF65-F5344CB8AC3E}">
+        <p14:creationId xmlns:p14="http://schemas.microsoft.com/office/powerpoint/2010/main" val="4087577250"/>
+      </p:ext>
+    </p:extLst>
+  </p:cSld>
+  <p:clrMapOvr>
+    <a:masterClrMapping/>
+  </p:clrMapOvr>
+</p:sld>
+</file>
+
+<file path=ppt/slides/slide7.xml><?xml version="1.0" encoding="utf-8"?>
+<p:sld xmlns:a="http://schemas.openxmlformats.org/drawingml/2006/main" xmlns:r="http://schemas.openxmlformats.org/officeDocument/2006/relationships" xmlns:p="http://schemas.openxmlformats.org/presentationml/2006/main">
+  <p:cSld>
+    <p:spTree>
+      <p:nvGrpSpPr>
+        <p:cNvPr id="1" name=""/>
+        <p:cNvGrpSpPr/>
+        <p:nvPr/>
+      </p:nvGrpSpPr>
+      <p:grpSpPr>
+        <a:xfrm>
+          <a:off x="0" y="0"/>
+          <a:ext cx="0" cy="0"/>
+          <a:chOff x="0" y="0"/>
+          <a:chExt cx="0" cy="0"/>
+        </a:xfrm>
+      </p:grpSpPr>
+      <p:sp>
+        <p:nvSpPr>
+          <p:cNvPr id="2" name="Title 1">
+            <a:extLst>
+              <a:ext uri="{FF2B5EF4-FFF2-40B4-BE49-F238E27FC236}">
+                <a16:creationId xmlns:a16="http://schemas.microsoft.com/office/drawing/2014/main" id="{168C75FB-2C6E-BD4A-0495-ABAEC6CE37D7}"/>
+              </a:ext>
+            </a:extLst>
+          </p:cNvPr>
+          <p:cNvSpPr>
+            <a:spLocks noGrp="1"/>
+          </p:cNvSpPr>
+          <p:nvPr>
+            <p:ph type="title"/>
+          </p:nvPr>
+        </p:nvSpPr>
+        <p:spPr>
+          <a:xfrm>
+            <a:off x="248920" y="233680"/>
+            <a:ext cx="9875520" cy="1356360"/>
+          </a:xfrm>
+        </p:spPr>
+        <p:txBody>
+          <a:bodyPr/>
+          <a:lstStyle/>
+          <a:p>
+            <a:r>
+              <a:rPr lang="de-CH" dirty="0"/>
+              <a:t>Provenance distribution</a:t>
+            </a:r>
+            <a:endParaRPr lang="en-GB" dirty="0"/>
+          </a:p>
+        </p:txBody>
+      </p:sp>
+      <p:pic>
+        <p:nvPicPr>
+          <p:cNvPr id="5" name="Content Placeholder 4" descr="A graph with different colored rectangles&#10;&#10;AI-generated content may be incorrect.">
+            <a:extLst>
+              <a:ext uri="{FF2B5EF4-FFF2-40B4-BE49-F238E27FC236}">
+                <a16:creationId xmlns:a16="http://schemas.microsoft.com/office/drawing/2014/main" id="{6226C969-854B-D7FD-DFE0-FB7D108928AD}"/>
+              </a:ext>
+            </a:extLst>
+          </p:cNvPr>
+          <p:cNvPicPr>
+            <a:picLocks noGrp="1" noChangeAspect="1"/>
+          </p:cNvPicPr>
+          <p:nvPr>
+            <p:ph idx="1"/>
+          </p:nvPr>
+        </p:nvPicPr>
+        <p:blipFill>
+          <a:blip r:embed="rId2">
+            <a:extLst>
+              <a:ext uri="{28A0092B-C50C-407E-A947-70E740481C1C}">
+                <a14:useLocalDpi xmlns:a14="http://schemas.microsoft.com/office/drawing/2010/main" val="0"/>
+              </a:ext>
+            </a:extLst>
+          </a:blip>
+          <a:stretch>
+            <a:fillRect/>
+          </a:stretch>
+        </p:blipFill>
+        <p:spPr>
+          <a:xfrm>
+            <a:off x="1620520" y="1103704"/>
+            <a:ext cx="8950960" cy="5378658"/>
+          </a:xfrm>
+        </p:spPr>
+      </p:pic>
+    </p:spTree>
+    <p:extLst>
+      <p:ext uri="{BB962C8B-B14F-4D97-AF65-F5344CB8AC3E}">
+        <p14:creationId xmlns:p14="http://schemas.microsoft.com/office/powerpoint/2010/main" val="985959284"/>
+      </p:ext>
+    </p:extLst>
+  </p:cSld>
+  <p:clrMapOvr>
+    <a:masterClrMapping/>
+  </p:clrMapOvr>
+</p:sld>
+</file>
+
+<file path=ppt/slides/slide8.xml><?xml version="1.0" encoding="utf-8"?>
+<p:sld xmlns:a="http://schemas.openxmlformats.org/drawingml/2006/main" xmlns:r="http://schemas.openxmlformats.org/officeDocument/2006/relationships" xmlns:p="http://schemas.openxmlformats.org/presentationml/2006/main">
+  <p:cSld>
+    <p:spTree>
+      <p:nvGrpSpPr>
+        <p:cNvPr id="1" name=""/>
+        <p:cNvGrpSpPr/>
+        <p:nvPr/>
+      </p:nvGrpSpPr>
+      <p:grpSpPr>
+        <a:xfrm>
+          <a:off x="0" y="0"/>
+          <a:ext cx="0" cy="0"/>
+          <a:chOff x="0" y="0"/>
+          <a:chExt cx="0" cy="0"/>
+        </a:xfrm>
+      </p:grpSpPr>
+      <p:sp>
+        <p:nvSpPr>
+          <p:cNvPr id="2" name="Title 1">
+            <a:extLst>
+              <a:ext uri="{FF2B5EF4-FFF2-40B4-BE49-F238E27FC236}">
+                <a16:creationId xmlns:a16="http://schemas.microsoft.com/office/drawing/2014/main" id="{26A2107B-1EA8-BA64-B10E-8A0B8E21FB4C}"/>
+              </a:ext>
+            </a:extLst>
+          </p:cNvPr>
+          <p:cNvSpPr>
+            <a:spLocks noGrp="1"/>
+          </p:cNvSpPr>
+          <p:nvPr>
+            <p:ph type="title"/>
+          </p:nvPr>
+        </p:nvSpPr>
+        <p:spPr>
+          <a:xfrm>
+            <a:off x="228600" y="243840"/>
+            <a:ext cx="9875520" cy="1356360"/>
+          </a:xfrm>
+        </p:spPr>
+        <p:txBody>
+          <a:bodyPr/>
+          <a:lstStyle/>
+          <a:p>
+            <a:r>
+              <a:rPr lang="de-CH" dirty="0"/>
+              <a:t>Type distribution</a:t>
+            </a:r>
+            <a:endParaRPr lang="en-GB" dirty="0"/>
+          </a:p>
+        </p:txBody>
+      </p:sp>
+      <p:pic>
+        <p:nvPicPr>
+          <p:cNvPr id="18" name="Content Placeholder 17" descr="A graph with different colored squares&#10;&#10;AI-generated content may be incorrect.">
+            <a:extLst>
+              <a:ext uri="{FF2B5EF4-FFF2-40B4-BE49-F238E27FC236}">
+                <a16:creationId xmlns:a16="http://schemas.microsoft.com/office/drawing/2014/main" id="{46EE900A-3FC4-6135-E0EC-34BB7B492793}"/>
+              </a:ext>
+            </a:extLst>
+          </p:cNvPr>
+          <p:cNvPicPr>
+            <a:picLocks noGrp="1" noChangeAspect="1"/>
+          </p:cNvPicPr>
+          <p:nvPr>
+            <p:ph idx="1"/>
+          </p:nvPr>
+        </p:nvPicPr>
+        <p:blipFill>
+          <a:blip r:embed="rId2">
+            <a:extLst>
+              <a:ext uri="{28A0092B-C50C-407E-A947-70E740481C1C}">
+                <a14:useLocalDpi xmlns:a14="http://schemas.microsoft.com/office/drawing/2010/main" val="0"/>
+              </a:ext>
+            </a:extLst>
+          </a:blip>
+          <a:stretch>
+            <a:fillRect/>
+          </a:stretch>
+        </p:blipFill>
+        <p:spPr>
+          <a:xfrm>
+            <a:off x="1635760" y="1406545"/>
+            <a:ext cx="8666316" cy="5207615"/>
+          </a:xfrm>
+        </p:spPr>
+      </p:pic>
+    </p:spTree>
+    <p:extLst>
+      <p:ext uri="{BB962C8B-B14F-4D97-AF65-F5344CB8AC3E}">
+        <p14:creationId xmlns:p14="http://schemas.microsoft.com/office/powerpoint/2010/main" val="1284769585"/>
+      </p:ext>
+    </p:extLst>
+  </p:cSld>
+  <p:clrMapOvr>
+    <a:masterClrMapping/>
+  </p:clrMapOvr>
+</p:sld>
+</file>
+
+<file path=ppt/slides/slide9.xml><?xml version="1.0" encoding="utf-8"?>
+<p:sld xmlns:a="http://schemas.openxmlformats.org/drawingml/2006/main" xmlns:r="http://schemas.openxmlformats.org/officeDocument/2006/relationships" xmlns:p="http://schemas.openxmlformats.org/presentationml/2006/main">
+  <p:cSld>
+    <p:spTree>
+      <p:nvGrpSpPr>
+        <p:cNvPr id="1" name=""/>
+        <p:cNvGrpSpPr/>
+        <p:nvPr/>
+      </p:nvGrpSpPr>
+      <p:grpSpPr>
+        <a:xfrm>
+          <a:off x="0" y="0"/>
+          <a:ext cx="0" cy="0"/>
+          <a:chOff x="0" y="0"/>
+          <a:chExt cx="0" cy="0"/>
+        </a:xfrm>
+      </p:grpSpPr>
+      <p:sp>
+        <p:nvSpPr>
+          <p:cNvPr id="2" name="Title 1">
+            <a:extLst>
+              <a:ext uri="{FF2B5EF4-FFF2-40B4-BE49-F238E27FC236}">
+                <a16:creationId xmlns:a16="http://schemas.microsoft.com/office/drawing/2014/main" id="{DED8D4A8-9316-1F4F-4391-A51F0AE12446}"/>
+              </a:ext>
+            </a:extLst>
+          </p:cNvPr>
+          <p:cNvSpPr>
+            <a:spLocks noGrp="1"/>
+          </p:cNvSpPr>
+          <p:nvPr>
+            <p:ph type="title"/>
+          </p:nvPr>
+        </p:nvSpPr>
+        <p:spPr>
+          <a:xfrm>
+            <a:off x="238760" y="274320"/>
+            <a:ext cx="9875520" cy="1356360"/>
+          </a:xfrm>
+        </p:spPr>
+        <p:txBody>
+          <a:bodyPr/>
+          <a:lstStyle/>
+          <a:p>
+            <a:r>
+              <a:rPr lang="de-CH" dirty="0"/>
+              <a:t>DBB – 2024-2025</a:t>
+            </a:r>
+            <a:endParaRPr lang="en-GB" dirty="0"/>
+          </a:p>
+        </p:txBody>
+      </p:sp>
+      <p:pic>
+        <p:nvPicPr>
+          <p:cNvPr id="6" name="Content Placeholder 5" descr="A graph with numbers and a red line&#10;&#10;AI-generated content may be incorrect.">
+            <a:extLst>
+              <a:ext uri="{FF2B5EF4-FFF2-40B4-BE49-F238E27FC236}">
+                <a16:creationId xmlns:a16="http://schemas.microsoft.com/office/drawing/2014/main" id="{60E642FF-9B67-83CD-BE65-139ECD5DC288}"/>
+              </a:ext>
+            </a:extLst>
+          </p:cNvPr>
+          <p:cNvPicPr>
+            <a:picLocks noGrp="1" noChangeAspect="1"/>
+          </p:cNvPicPr>
+          <p:nvPr>
+            <p:ph idx="1"/>
+          </p:nvPr>
+        </p:nvPicPr>
+        <p:blipFill>
+          <a:blip r:embed="rId2">
+            <a:extLst>
+              <a:ext uri="{28A0092B-C50C-407E-A947-70E740481C1C}">
+                <a14:useLocalDpi xmlns:a14="http://schemas.microsoft.com/office/drawing/2010/main" val="0"/>
+              </a:ext>
+            </a:extLst>
+          </a:blip>
+          <a:srcRect t="5930"/>
+          <a:stretch/>
+        </p:blipFill>
+        <p:spPr>
+          <a:xfrm>
+            <a:off x="1458686" y="1341013"/>
+            <a:ext cx="9274628" cy="5242667"/>
+          </a:xfrm>
+        </p:spPr>
+      </p:pic>
+    </p:spTree>
+    <p:extLst>
+      <p:ext uri="{BB962C8B-B14F-4D97-AF65-F5344CB8AC3E}">
+        <p14:creationId xmlns:p14="http://schemas.microsoft.com/office/powerpoint/2010/main" val="4154756640"/>
       </p:ext>
     </p:extLst>
   </p:cSld>

</xml_diff>

<commit_message>
trees per family, met WOW data
</commit_message>
<xml_diff>
--- a/RapidAdaptation_DataExploration.pptx
+++ b/RapidAdaptation_DataExploration.pptx
@@ -5,7 +5,7 @@
     <p:sldMasterId id="2147483660" r:id="rId1"/>
   </p:sldMasterIdLst>
   <p:notesMasterIdLst>
-    <p:notesMasterId r:id="rId32"/>
+    <p:notesMasterId r:id="rId33"/>
   </p:notesMasterIdLst>
   <p:sldIdLst>
     <p:sldId id="256" r:id="rId2"/>
@@ -16,28 +16,29 @@
     <p:sldId id="268" r:id="rId7"/>
     <p:sldId id="267" r:id="rId8"/>
     <p:sldId id="270" r:id="rId9"/>
-    <p:sldId id="272" r:id="rId10"/>
-    <p:sldId id="288" r:id="rId11"/>
-    <p:sldId id="258" r:id="rId12"/>
-    <p:sldId id="259" r:id="rId13"/>
-    <p:sldId id="262" r:id="rId14"/>
-    <p:sldId id="266" r:id="rId15"/>
-    <p:sldId id="284" r:id="rId16"/>
-    <p:sldId id="261" r:id="rId17"/>
-    <p:sldId id="275" r:id="rId18"/>
-    <p:sldId id="276" r:id="rId19"/>
-    <p:sldId id="263" r:id="rId20"/>
-    <p:sldId id="265" r:id="rId21"/>
-    <p:sldId id="277" r:id="rId22"/>
-    <p:sldId id="278" r:id="rId23"/>
-    <p:sldId id="264" r:id="rId24"/>
-    <p:sldId id="286" r:id="rId25"/>
-    <p:sldId id="287" r:id="rId26"/>
-    <p:sldId id="282" r:id="rId27"/>
-    <p:sldId id="283" r:id="rId28"/>
-    <p:sldId id="281" r:id="rId29"/>
-    <p:sldId id="280" r:id="rId30"/>
-    <p:sldId id="279" r:id="rId31"/>
+    <p:sldId id="289" r:id="rId10"/>
+    <p:sldId id="272" r:id="rId11"/>
+    <p:sldId id="288" r:id="rId12"/>
+    <p:sldId id="258" r:id="rId13"/>
+    <p:sldId id="259" r:id="rId14"/>
+    <p:sldId id="262" r:id="rId15"/>
+    <p:sldId id="266" r:id="rId16"/>
+    <p:sldId id="284" r:id="rId17"/>
+    <p:sldId id="261" r:id="rId18"/>
+    <p:sldId id="275" r:id="rId19"/>
+    <p:sldId id="276" r:id="rId20"/>
+    <p:sldId id="263" r:id="rId21"/>
+    <p:sldId id="265" r:id="rId22"/>
+    <p:sldId id="277" r:id="rId23"/>
+    <p:sldId id="278" r:id="rId24"/>
+    <p:sldId id="264" r:id="rId25"/>
+    <p:sldId id="286" r:id="rId26"/>
+    <p:sldId id="287" r:id="rId27"/>
+    <p:sldId id="282" r:id="rId28"/>
+    <p:sldId id="283" r:id="rId29"/>
+    <p:sldId id="281" r:id="rId30"/>
+    <p:sldId id="280" r:id="rId31"/>
+    <p:sldId id="279" r:id="rId32"/>
   </p:sldIdLst>
   <p:sldSz cx="12192000" cy="6858000"/>
   <p:notesSz cx="6858000" cy="9144000"/>
@@ -147,7 +148,7 @@
 <file path=ppt/revisionInfo.xml><?xml version="1.0" encoding="utf-8"?>
 <p1510:revInfo xmlns:a="http://schemas.openxmlformats.org/drawingml/2006/main" xmlns:r="http://schemas.openxmlformats.org/officeDocument/2006/relationships" xmlns:p1510="http://schemas.microsoft.com/office/powerpoint/2015/10/main">
   <p1510:revLst>
-    <p1510:client id="{100BBC7B-7ACA-4A4D-BA33-DEF31D162335}" v="132" dt="2025-12-12T09:53:50.214"/>
+    <p1510:client id="{14F8172B-23CC-43AF-8874-FD0289D90325}" v="2" dt="2026-01-19T15:59:21.470"/>
   </p1510:revLst>
 </p1510:revInfo>
 </file>
@@ -797,22 +798,6 @@
           <pc:docMk/>
           <pc:sldMk cId="4222636709" sldId="274"/>
         </pc:sldMkLst>
-        <pc:spChg chg="add mod">
-          <ac:chgData name="Luisa Dickenmann" userId="0c0840b0-1ae7-42c8-98b5-b02d8f71a603" providerId="ADAL" clId="{100BBC7B-7ACA-4A4D-BA33-DEF31D162335}" dt="2025-12-11T16:48:27.512" v="3798" actId="1076"/>
-          <ac:spMkLst>
-            <pc:docMk/>
-            <pc:sldMk cId="4222636709" sldId="274"/>
-            <ac:spMk id="12" creationId="{31B25E77-5BAC-84FD-D736-D673EFA1488B}"/>
-          </ac:spMkLst>
-        </pc:spChg>
-        <pc:graphicFrameChg chg="add mod ord modGraphic">
-          <ac:chgData name="Luisa Dickenmann" userId="0c0840b0-1ae7-42c8-98b5-b02d8f71a603" providerId="ADAL" clId="{100BBC7B-7ACA-4A4D-BA33-DEF31D162335}" dt="2025-12-11T16:47:51.968" v="3767" actId="12385"/>
-          <ac:graphicFrameMkLst>
-            <pc:docMk/>
-            <pc:sldMk cId="4222636709" sldId="274"/>
-            <ac:graphicFrameMk id="9" creationId="{0AADB95F-2104-542D-E0E1-ABEDEF08E276}"/>
-          </ac:graphicFrameMkLst>
-        </pc:graphicFrameChg>
       </pc:sldChg>
       <pc:sldChg chg="addSp delSp modSp new mod">
         <pc:chgData name="Luisa Dickenmann" userId="0c0840b0-1ae7-42c8-98b5-b02d8f71a603" providerId="ADAL" clId="{100BBC7B-7ACA-4A4D-BA33-DEF31D162335}" dt="2025-12-09T11:50:47.749" v="2144" actId="692"/>
@@ -1014,22 +999,6 @@
             <ac:spMk id="2" creationId="{D4D7EE4B-07AE-A580-2F47-92BB4583481C}"/>
           </ac:spMkLst>
         </pc:spChg>
-        <pc:spChg chg="del">
-          <ac:chgData name="Luisa Dickenmann" userId="0c0840b0-1ae7-42c8-98b5-b02d8f71a603" providerId="ADAL" clId="{100BBC7B-7ACA-4A4D-BA33-DEF31D162335}" dt="2025-12-11T14:13:02.146" v="2847" actId="931"/>
-          <ac:spMkLst>
-            <pc:docMk/>
-            <pc:sldMk cId="1520243702" sldId="281"/>
-            <ac:spMk id="3" creationId="{D235ACE3-C471-9EA2-9FEA-B60230495951}"/>
-          </ac:spMkLst>
-        </pc:spChg>
-        <pc:spChg chg="add del">
-          <ac:chgData name="Luisa Dickenmann" userId="0c0840b0-1ae7-42c8-98b5-b02d8f71a603" providerId="ADAL" clId="{100BBC7B-7ACA-4A4D-BA33-DEF31D162335}" dt="2025-12-11T14:13:23.573" v="2855" actId="478"/>
-          <ac:spMkLst>
-            <pc:docMk/>
-            <pc:sldMk cId="1520243702" sldId="281"/>
-            <ac:spMk id="6" creationId="{44EAE06B-E9D0-68B9-786E-DB17081801E5}"/>
-          </ac:spMkLst>
-        </pc:spChg>
         <pc:spChg chg="add mod">
           <ac:chgData name="Luisa Dickenmann" userId="0c0840b0-1ae7-42c8-98b5-b02d8f71a603" providerId="ADAL" clId="{100BBC7B-7ACA-4A4D-BA33-DEF31D162335}" dt="2025-12-11T16:50:14.011" v="3816" actId="1076"/>
           <ac:spMkLst>
@@ -1100,30 +1069,6 @@
             <pc:docMk/>
             <pc:sldMk cId="1520243702" sldId="281"/>
             <ac:cxnSpMk id="10" creationId="{F08A697B-293A-3B9A-EA5D-A7F12FE9C9F9}"/>
-          </ac:cxnSpMkLst>
-        </pc:cxnChg>
-        <pc:cxnChg chg="add del mod">
-          <ac:chgData name="Luisa Dickenmann" userId="0c0840b0-1ae7-42c8-98b5-b02d8f71a603" providerId="ADAL" clId="{100BBC7B-7ACA-4A4D-BA33-DEF31D162335}" dt="2025-12-11T14:16:29.423" v="2948" actId="478"/>
-          <ac:cxnSpMkLst>
-            <pc:docMk/>
-            <pc:sldMk cId="1520243702" sldId="281"/>
-            <ac:cxnSpMk id="24" creationId="{0EA599C2-9A0C-5CAF-9A2E-CE2D7FE0FBB9}"/>
-          </ac:cxnSpMkLst>
-        </pc:cxnChg>
-        <pc:cxnChg chg="add del mod">
-          <ac:chgData name="Luisa Dickenmann" userId="0c0840b0-1ae7-42c8-98b5-b02d8f71a603" providerId="ADAL" clId="{100BBC7B-7ACA-4A4D-BA33-DEF31D162335}" dt="2025-12-11T14:16:34.898" v="2950" actId="478"/>
-          <ac:cxnSpMkLst>
-            <pc:docMk/>
-            <pc:sldMk cId="1520243702" sldId="281"/>
-            <ac:cxnSpMk id="25" creationId="{368BF930-2682-A33A-B16C-A7D3F39F6E29}"/>
-          </ac:cxnSpMkLst>
-        </pc:cxnChg>
-        <pc:cxnChg chg="add del mod">
-          <ac:chgData name="Luisa Dickenmann" userId="0c0840b0-1ae7-42c8-98b5-b02d8f71a603" providerId="ADAL" clId="{100BBC7B-7ACA-4A4D-BA33-DEF31D162335}" dt="2025-12-11T14:16:36.719" v="2951" actId="478"/>
-          <ac:cxnSpMkLst>
-            <pc:docMk/>
-            <pc:sldMk cId="1520243702" sldId="281"/>
-            <ac:cxnSpMk id="31" creationId="{F62BFAD7-BDA4-F817-042E-505E9A0348D1}"/>
           </ac:cxnSpMkLst>
         </pc:cxnChg>
         <pc:cxnChg chg="add mod">
@@ -1165,14 +1110,6 @@
             <ac:spMk id="2" creationId="{EF986BC2-00B2-FE0A-3FD2-8B3983EDDD41}"/>
           </ac:spMkLst>
         </pc:spChg>
-        <pc:spChg chg="del">
-          <ac:chgData name="Luisa Dickenmann" userId="0c0840b0-1ae7-42c8-98b5-b02d8f71a603" providerId="ADAL" clId="{100BBC7B-7ACA-4A4D-BA33-DEF31D162335}" dt="2025-12-11T16:26:52.774" v="3124" actId="931"/>
-          <ac:spMkLst>
-            <pc:docMk/>
-            <pc:sldMk cId="232684958" sldId="282"/>
-            <ac:spMk id="3" creationId="{1E74B375-2D84-6AA4-C745-A460D96B38EF}"/>
-          </ac:spMkLst>
-        </pc:spChg>
         <pc:spChg chg="add mod">
           <ac:chgData name="Luisa Dickenmann" userId="0c0840b0-1ae7-42c8-98b5-b02d8f71a603" providerId="ADAL" clId="{100BBC7B-7ACA-4A4D-BA33-DEF31D162335}" dt="2025-12-11T16:29:07.112" v="3175" actId="1076"/>
           <ac:spMkLst>
@@ -1228,22 +1165,6 @@
           <pc:docMk/>
           <pc:sldMk cId="4142346926" sldId="283"/>
         </pc:sldMkLst>
-        <pc:spChg chg="del">
-          <ac:chgData name="Luisa Dickenmann" userId="0c0840b0-1ae7-42c8-98b5-b02d8f71a603" providerId="ADAL" clId="{100BBC7B-7ACA-4A4D-BA33-DEF31D162335}" dt="2025-12-11T16:31:15.715" v="3268"/>
-          <ac:spMkLst>
-            <pc:docMk/>
-            <pc:sldMk cId="4142346926" sldId="283"/>
-            <ac:spMk id="2" creationId="{37CA41E9-BA21-60D0-1B73-6E1D1D96C837}"/>
-          </ac:spMkLst>
-        </pc:spChg>
-        <pc:spChg chg="del">
-          <ac:chgData name="Luisa Dickenmann" userId="0c0840b0-1ae7-42c8-98b5-b02d8f71a603" providerId="ADAL" clId="{100BBC7B-7ACA-4A4D-BA33-DEF31D162335}" dt="2025-12-11T16:32:57.685" v="3274" actId="931"/>
-          <ac:spMkLst>
-            <pc:docMk/>
-            <pc:sldMk cId="4142346926" sldId="283"/>
-            <ac:spMk id="3" creationId="{C8177E0E-9758-087A-7554-9EF915C2D2BE}"/>
-          </ac:spMkLst>
-        </pc:spChg>
         <pc:spChg chg="add mod">
           <ac:chgData name="Luisa Dickenmann" userId="0c0840b0-1ae7-42c8-98b5-b02d8f71a603" providerId="ADAL" clId="{100BBC7B-7ACA-4A4D-BA33-DEF31D162335}" dt="2025-12-11T16:31:21.028" v="3273" actId="20577"/>
           <ac:spMkLst>
@@ -1351,6 +1272,62 @@
             <ac:spMk id="3" creationId="{F28F0F0A-631B-70F5-5626-2DE0EA30D885}"/>
           </ac:spMkLst>
         </pc:spChg>
+      </pc:sldChg>
+    </pc:docChg>
+  </pc:docChgLst>
+  <pc:docChgLst>
+    <pc:chgData name="Luisa Dickenmann" userId="0c0840b0-1ae7-42c8-98b5-b02d8f71a603" providerId="ADAL" clId="{14F8172B-23CC-43AF-8874-FD0289D90325}"/>
+    <pc:docChg chg="custSel addSld modSld">
+      <pc:chgData name="Luisa Dickenmann" userId="0c0840b0-1ae7-42c8-98b5-b02d8f71a603" providerId="ADAL" clId="{14F8172B-23CC-43AF-8874-FD0289D90325}" dt="2026-01-19T15:59:48.578" v="36" actId="14100"/>
+      <pc:docMkLst>
+        <pc:docMk/>
+      </pc:docMkLst>
+      <pc:sldChg chg="addSp delSp modSp new mod">
+        <pc:chgData name="Luisa Dickenmann" userId="0c0840b0-1ae7-42c8-98b5-b02d8f71a603" providerId="ADAL" clId="{14F8172B-23CC-43AF-8874-FD0289D90325}" dt="2026-01-19T15:59:48.578" v="36" actId="14100"/>
+        <pc:sldMkLst>
+          <pc:docMk/>
+          <pc:sldMk cId="3085592028" sldId="289"/>
+        </pc:sldMkLst>
+        <pc:spChg chg="mod">
+          <ac:chgData name="Luisa Dickenmann" userId="0c0840b0-1ae7-42c8-98b5-b02d8f71a603" providerId="ADAL" clId="{14F8172B-23CC-43AF-8874-FD0289D90325}" dt="2026-01-19T15:59:42.221" v="32" actId="1076"/>
+          <ac:spMkLst>
+            <pc:docMk/>
+            <pc:sldMk cId="3085592028" sldId="289"/>
+            <ac:spMk id="2" creationId="{33D63F40-F221-2E7F-F83E-35F6231E0E7B}"/>
+          </ac:spMkLst>
+        </pc:spChg>
+        <pc:spChg chg="del">
+          <ac:chgData name="Luisa Dickenmann" userId="0c0840b0-1ae7-42c8-98b5-b02d8f71a603" providerId="ADAL" clId="{14F8172B-23CC-43AF-8874-FD0289D90325}" dt="2026-01-19T15:58:12.368" v="22"/>
+          <ac:spMkLst>
+            <pc:docMk/>
+            <pc:sldMk cId="3085592028" sldId="289"/>
+            <ac:spMk id="3" creationId="{8CBA336C-3D2E-6712-47DF-E333BE84B5F6}"/>
+          </ac:spMkLst>
+        </pc:spChg>
+        <pc:spChg chg="add del mod">
+          <ac:chgData name="Luisa Dickenmann" userId="0c0840b0-1ae7-42c8-98b5-b02d8f71a603" providerId="ADAL" clId="{14F8172B-23CC-43AF-8874-FD0289D90325}" dt="2026-01-19T15:59:21.470" v="26" actId="931"/>
+          <ac:spMkLst>
+            <pc:docMk/>
+            <pc:sldMk cId="3085592028" sldId="289"/>
+            <ac:spMk id="7" creationId="{62224BF0-B41A-33F7-E65B-99D3DE15C9C3}"/>
+          </ac:spMkLst>
+        </pc:spChg>
+        <pc:picChg chg="add del mod">
+          <ac:chgData name="Luisa Dickenmann" userId="0c0840b0-1ae7-42c8-98b5-b02d8f71a603" providerId="ADAL" clId="{14F8172B-23CC-43AF-8874-FD0289D90325}" dt="2026-01-19T15:58:20.124" v="25" actId="478"/>
+          <ac:picMkLst>
+            <pc:docMk/>
+            <pc:sldMk cId="3085592028" sldId="289"/>
+            <ac:picMk id="5" creationId="{A3D13E38-845D-F651-5895-22646D7E4292}"/>
+          </ac:picMkLst>
+        </pc:picChg>
+        <pc:picChg chg="add mod modCrop">
+          <ac:chgData name="Luisa Dickenmann" userId="0c0840b0-1ae7-42c8-98b5-b02d8f71a603" providerId="ADAL" clId="{14F8172B-23CC-43AF-8874-FD0289D90325}" dt="2026-01-19T15:59:48.578" v="36" actId="14100"/>
+          <ac:picMkLst>
+            <pc:docMk/>
+            <pc:sldMk cId="3085592028" sldId="289"/>
+            <ac:picMk id="9" creationId="{9DC3274B-287F-4CA0-BAE5-BEC9FBDB4565}"/>
+          </ac:picMkLst>
+        </pc:picChg>
       </pc:sldChg>
     </pc:docChg>
   </pc:docChgLst>
@@ -1439,7 +1416,7 @@
           <a:p>
             <a:fld id="{205757B0-FBC9-4508-996A-3E224EB738F1}" type="datetimeFigureOut">
               <a:rPr lang="en-GB" smtClean="0"/>
-              <a:t>12/12/2025</a:t>
+              <a:t>19/01/2026</a:t>
             </a:fld>
             <a:endParaRPr lang="en-GB"/>
           </a:p>
@@ -1750,10 +1727,7 @@
           <a:bodyPr/>
           <a:lstStyle/>
           <a:p>
-            <a:r>
-              <a:rPr lang="en-GB" dirty="0"/>
-              <a:t>North coast n=50</a:t>
-            </a:r>
+            <a:endParaRPr lang="en-GB" dirty="0"/>
           </a:p>
         </p:txBody>
       </p:sp>
@@ -1774,7 +1748,7 @@
           <a:p>
             <a:fld id="{00BEF3A4-E543-4418-A8C6-AC4DBC501A73}" type="slidenum">
               <a:rPr lang="en-GB" smtClean="0"/>
-              <a:t>16</a:t>
+              <a:t>1</a:t>
             </a:fld>
             <a:endParaRPr lang="en-GB"/>
           </a:p>
@@ -1783,7 +1757,7 @@
     </p:spTree>
     <p:extLst>
       <p:ext uri="{BB962C8B-B14F-4D97-AF65-F5344CB8AC3E}">
-        <p14:creationId xmlns:p14="http://schemas.microsoft.com/office/powerpoint/2010/main" val="494490276"/>
+        <p14:creationId xmlns:p14="http://schemas.microsoft.com/office/powerpoint/2010/main" val="548995778"/>
       </p:ext>
     </p:extLst>
   </p:cSld>
@@ -1837,7 +1811,10 @@
           <a:bodyPr/>
           <a:lstStyle/>
           <a:p>
-            <a:endParaRPr lang="en-GB" dirty="0"/>
+            <a:r>
+              <a:rPr lang="en-GB" dirty="0"/>
+              <a:t>North coast n=50</a:t>
+            </a:r>
           </a:p>
         </p:txBody>
       </p:sp>
@@ -1858,7 +1835,7 @@
           <a:p>
             <a:fld id="{00BEF3A4-E543-4418-A8C6-AC4DBC501A73}" type="slidenum">
               <a:rPr lang="en-GB" smtClean="0"/>
-              <a:t>26</a:t>
+              <a:t>17</a:t>
             </a:fld>
             <a:endParaRPr lang="en-GB"/>
           </a:p>
@@ -1867,7 +1844,7 @@
     </p:spTree>
     <p:extLst>
       <p:ext uri="{BB962C8B-B14F-4D97-AF65-F5344CB8AC3E}">
-        <p14:creationId xmlns:p14="http://schemas.microsoft.com/office/powerpoint/2010/main" val="1916923163"/>
+        <p14:creationId xmlns:p14="http://schemas.microsoft.com/office/powerpoint/2010/main" val="494490276"/>
       </p:ext>
     </p:extLst>
   </p:cSld>
@@ -1921,6 +1898,90 @@
           <a:bodyPr/>
           <a:lstStyle/>
           <a:p>
+            <a:endParaRPr lang="en-GB" dirty="0"/>
+          </a:p>
+        </p:txBody>
+      </p:sp>
+      <p:sp>
+        <p:nvSpPr>
+          <p:cNvPr id="4" name="Slide Number Placeholder 3"/>
+          <p:cNvSpPr>
+            <a:spLocks noGrp="1"/>
+          </p:cNvSpPr>
+          <p:nvPr>
+            <p:ph type="sldNum" sz="quarter" idx="5"/>
+          </p:nvPr>
+        </p:nvSpPr>
+        <p:spPr/>
+        <p:txBody>
+          <a:bodyPr/>
+          <a:lstStyle/>
+          <a:p>
+            <a:fld id="{00BEF3A4-E543-4418-A8C6-AC4DBC501A73}" type="slidenum">
+              <a:rPr lang="en-GB" smtClean="0"/>
+              <a:t>27</a:t>
+            </a:fld>
+            <a:endParaRPr lang="en-GB"/>
+          </a:p>
+        </p:txBody>
+      </p:sp>
+    </p:spTree>
+    <p:extLst>
+      <p:ext uri="{BB962C8B-B14F-4D97-AF65-F5344CB8AC3E}">
+        <p14:creationId xmlns:p14="http://schemas.microsoft.com/office/powerpoint/2010/main" val="1916923163"/>
+      </p:ext>
+    </p:extLst>
+  </p:cSld>
+  <p:clrMapOvr>
+    <a:masterClrMapping/>
+  </p:clrMapOvr>
+</p:notes>
+</file>
+
+<file path=ppt/notesSlides/notesSlide4.xml><?xml version="1.0" encoding="utf-8"?>
+<p:notes xmlns:a="http://schemas.openxmlformats.org/drawingml/2006/main" xmlns:r="http://schemas.openxmlformats.org/officeDocument/2006/relationships" xmlns:p="http://schemas.openxmlformats.org/presentationml/2006/main">
+  <p:cSld>
+    <p:spTree>
+      <p:nvGrpSpPr>
+        <p:cNvPr id="1" name=""/>
+        <p:cNvGrpSpPr/>
+        <p:nvPr/>
+      </p:nvGrpSpPr>
+      <p:grpSpPr>
+        <a:xfrm>
+          <a:off x="0" y="0"/>
+          <a:ext cx="0" cy="0"/>
+          <a:chOff x="0" y="0"/>
+          <a:chExt cx="0" cy="0"/>
+        </a:xfrm>
+      </p:grpSpPr>
+      <p:sp>
+        <p:nvSpPr>
+          <p:cNvPr id="2" name="Slide Image Placeholder 1"/>
+          <p:cNvSpPr>
+            <a:spLocks noGrp="1" noRot="1" noChangeAspect="1"/>
+          </p:cNvSpPr>
+          <p:nvPr>
+            <p:ph type="sldImg"/>
+          </p:nvPr>
+        </p:nvSpPr>
+        <p:spPr/>
+      </p:sp>
+      <p:sp>
+        <p:nvSpPr>
+          <p:cNvPr id="3" name="Notes Placeholder 2"/>
+          <p:cNvSpPr>
+            <a:spLocks noGrp="1"/>
+          </p:cNvSpPr>
+          <p:nvPr>
+            <p:ph type="body" idx="1"/>
+          </p:nvPr>
+        </p:nvSpPr>
+        <p:spPr/>
+        <p:txBody>
+          <a:bodyPr/>
+          <a:lstStyle/>
+          <a:p>
             <a:r>
               <a:rPr lang="de-CH" dirty="0"/>
               <a:t>Plot met office daylength or temperature data </a:t>
@@ -1946,7 +2007,7 @@
           <a:p>
             <a:fld id="{00BEF3A4-E543-4418-A8C6-AC4DBC501A73}" type="slidenum">
               <a:rPr lang="en-GB" smtClean="0"/>
-              <a:t>28</a:t>
+              <a:t>29</a:t>
             </a:fld>
             <a:endParaRPr lang="en-GB"/>
           </a:p>
@@ -2161,7 +2222,7 @@
           <a:p>
             <a:fld id="{817C20B3-7C49-43C0-BA15-4AF729A94E81}" type="datetimeFigureOut">
               <a:rPr lang="en-GB" smtClean="0"/>
-              <a:t>12/12/2025</a:t>
+              <a:t>19/01/2026</a:t>
             </a:fld>
             <a:endParaRPr lang="en-GB"/>
           </a:p>
@@ -2382,7 +2443,7 @@
           <a:p>
             <a:fld id="{817C20B3-7C49-43C0-BA15-4AF729A94E81}" type="datetimeFigureOut">
               <a:rPr lang="en-GB" smtClean="0"/>
-              <a:t>12/12/2025</a:t>
+              <a:t>19/01/2026</a:t>
             </a:fld>
             <a:endParaRPr lang="en-GB"/>
           </a:p>
@@ -2562,7 +2623,7 @@
           <a:p>
             <a:fld id="{817C20B3-7C49-43C0-BA15-4AF729A94E81}" type="datetimeFigureOut">
               <a:rPr lang="en-GB" smtClean="0"/>
-              <a:t>12/12/2025</a:t>
+              <a:t>19/01/2026</a:t>
             </a:fld>
             <a:endParaRPr lang="en-GB"/>
           </a:p>
@@ -2732,7 +2793,7 @@
           <a:p>
             <a:fld id="{817C20B3-7C49-43C0-BA15-4AF729A94E81}" type="datetimeFigureOut">
               <a:rPr lang="en-GB" smtClean="0"/>
-              <a:t>12/12/2025</a:t>
+              <a:t>19/01/2026</a:t>
             </a:fld>
             <a:endParaRPr lang="en-GB"/>
           </a:p>
@@ -2983,7 +3044,7 @@
           <a:p>
             <a:fld id="{817C20B3-7C49-43C0-BA15-4AF729A94E81}" type="datetimeFigureOut">
               <a:rPr lang="en-GB" smtClean="0"/>
-              <a:t>12/12/2025</a:t>
+              <a:t>19/01/2026</a:t>
             </a:fld>
             <a:endParaRPr lang="en-GB"/>
           </a:p>
@@ -3306,7 +3367,7 @@
           <a:p>
             <a:fld id="{817C20B3-7C49-43C0-BA15-4AF729A94E81}" type="datetimeFigureOut">
               <a:rPr lang="en-GB" smtClean="0"/>
-              <a:t>12/12/2025</a:t>
+              <a:t>19/01/2026</a:t>
             </a:fld>
             <a:endParaRPr lang="en-GB"/>
           </a:p>
@@ -3730,7 +3791,7 @@
           <a:p>
             <a:fld id="{817C20B3-7C49-43C0-BA15-4AF729A94E81}" type="datetimeFigureOut">
               <a:rPr lang="en-GB" smtClean="0"/>
-              <a:t>12/12/2025</a:t>
+              <a:t>19/01/2026</a:t>
             </a:fld>
             <a:endParaRPr lang="en-GB"/>
           </a:p>
@@ -3848,7 +3909,7 @@
           <a:p>
             <a:fld id="{817C20B3-7C49-43C0-BA15-4AF729A94E81}" type="datetimeFigureOut">
               <a:rPr lang="en-GB" smtClean="0"/>
-              <a:t>12/12/2025</a:t>
+              <a:t>19/01/2026</a:t>
             </a:fld>
             <a:endParaRPr lang="en-GB"/>
           </a:p>
@@ -3943,7 +4004,7 @@
           <a:p>
             <a:fld id="{817C20B3-7C49-43C0-BA15-4AF729A94E81}" type="datetimeFigureOut">
               <a:rPr lang="en-GB" smtClean="0"/>
-              <a:t>12/12/2025</a:t>
+              <a:t>19/01/2026</a:t>
             </a:fld>
             <a:endParaRPr lang="en-GB"/>
           </a:p>
@@ -4233,7 +4294,7 @@
           <a:p>
             <a:fld id="{817C20B3-7C49-43C0-BA15-4AF729A94E81}" type="datetimeFigureOut">
               <a:rPr lang="en-GB" smtClean="0"/>
-              <a:t>12/12/2025</a:t>
+              <a:t>19/01/2026</a:t>
             </a:fld>
             <a:endParaRPr lang="en-GB"/>
           </a:p>
@@ -4505,7 +4566,7 @@
           <a:p>
             <a:fld id="{817C20B3-7C49-43C0-BA15-4AF729A94E81}" type="datetimeFigureOut">
               <a:rPr lang="en-GB" smtClean="0"/>
-              <a:t>12/12/2025</a:t>
+              <a:t>19/01/2026</a:t>
             </a:fld>
             <a:endParaRPr lang="en-GB"/>
           </a:p>
@@ -4759,7 +4820,7 @@
           <a:p>
             <a:fld id="{817C20B3-7C49-43C0-BA15-4AF729A94E81}" type="datetimeFigureOut">
               <a:rPr lang="en-GB" smtClean="0"/>
-              <a:t>12/12/2025</a:t>
+              <a:t>19/01/2026</a:t>
             </a:fld>
             <a:endParaRPr lang="en-GB"/>
           </a:p>
@@ -5324,7 +5385,7 @@
           <p:cNvPr id="2" name="Title 1">
             <a:extLst>
               <a:ext uri="{FF2B5EF4-FFF2-40B4-BE49-F238E27FC236}">
-                <a16:creationId xmlns:a16="http://schemas.microsoft.com/office/drawing/2014/main" id="{BA21E4DD-A0E9-85A5-076F-15D48EB17A60}"/>
+                <a16:creationId xmlns:a16="http://schemas.microsoft.com/office/drawing/2014/main" id="{DBBAC9F3-8100-D77A-023E-C972C89795AC}"/>
               </a:ext>
             </a:extLst>
           </p:cNvPr>
@@ -5335,52 +5396,186 @@
             <p:ph type="title"/>
           </p:nvPr>
         </p:nvSpPr>
-        <p:spPr/>
+        <p:spPr>
+          <a:xfrm>
+            <a:off x="228600" y="223520"/>
+            <a:ext cx="9875520" cy="995680"/>
+          </a:xfrm>
+        </p:spPr>
         <p:txBody>
           <a:bodyPr/>
           <a:lstStyle/>
           <a:p>
             <a:r>
               <a:rPr lang="de-CH" dirty="0"/>
-              <a:t>Interaction</a:t>
+              <a:t>Status – by Family</a:t>
             </a:r>
             <a:endParaRPr lang="en-GB" dirty="0"/>
           </a:p>
         </p:txBody>
       </p:sp>
-      <p:sp>
-        <p:nvSpPr>
-          <p:cNvPr id="3" name="Content Placeholder 2">
+      <p:pic>
+        <p:nvPicPr>
+          <p:cNvPr id="5" name="Content Placeholder 4">
             <a:extLst>
               <a:ext uri="{FF2B5EF4-FFF2-40B4-BE49-F238E27FC236}">
-                <a16:creationId xmlns:a16="http://schemas.microsoft.com/office/drawing/2014/main" id="{F28F0F0A-631B-70F5-5626-2DE0EA30D885}"/>
+                <a16:creationId xmlns:a16="http://schemas.microsoft.com/office/drawing/2014/main" id="{88AB1702-AC8E-BCAE-24FC-C14A03615DD3}"/>
               </a:ext>
             </a:extLst>
           </p:cNvPr>
-          <p:cNvSpPr>
-            <a:spLocks noGrp="1"/>
-          </p:cNvSpPr>
+          <p:cNvPicPr>
+            <a:picLocks noGrp="1" noChangeAspect="1"/>
+          </p:cNvPicPr>
           <p:nvPr>
             <p:ph idx="1"/>
           </p:nvPr>
-        </p:nvSpPr>
-        <p:spPr/>
-        <p:txBody>
-          <a:bodyPr/>
+        </p:nvPicPr>
+        <p:blipFill>
+          <a:blip r:embed="rId2">
+            <a:extLst>
+              <a:ext uri="{28A0092B-C50C-407E-A947-70E740481C1C}">
+                <a14:useLocalDpi xmlns:a14="http://schemas.microsoft.com/office/drawing/2010/main" val="0"/>
+              </a:ext>
+            </a:extLst>
+          </a:blip>
+          <a:srcRect t="6549"/>
+          <a:stretch/>
+        </p:blipFill>
+        <p:spPr>
+          <a:xfrm>
+            <a:off x="1226129" y="1095555"/>
+            <a:ext cx="9739742" cy="5518605"/>
+          </a:xfrm>
+        </p:spPr>
+      </p:pic>
+      <p:sp>
+        <p:nvSpPr>
+          <p:cNvPr id="6" name="TextBox 5">
+            <a:extLst>
+              <a:ext uri="{FF2B5EF4-FFF2-40B4-BE49-F238E27FC236}">
+                <a16:creationId xmlns:a16="http://schemas.microsoft.com/office/drawing/2014/main" id="{C5012472-E3FE-9887-B742-0271FEB26237}"/>
+              </a:ext>
+            </a:extLst>
+          </p:cNvPr>
+          <p:cNvSpPr txBox="1"/>
+          <p:nvPr/>
+        </p:nvSpPr>
+        <p:spPr>
+          <a:xfrm>
+            <a:off x="5382883" y="586596"/>
+            <a:ext cx="3045125" cy="369332"/>
+          </a:xfrm>
+          <a:prstGeom prst="rect">
+            <a:avLst/>
+          </a:prstGeom>
+          <a:noFill/>
+        </p:spPr>
+        <p:txBody>
+          <a:bodyPr wrap="square" rtlCol="0">
+            <a:spAutoFit/>
+          </a:bodyPr>
           <a:lstStyle/>
           <a:p>
             <a:r>
               <a:rPr lang="de-CH" dirty="0"/>
-              <a:t>Mortality based on type AND provenance</a:t>
+              <a:t>Top and bottom 10 Families</a:t>
             </a:r>
             <a:endParaRPr lang="en-GB" dirty="0"/>
+          </a:p>
+        </p:txBody>
+      </p:sp>
+      <p:sp>
+        <p:nvSpPr>
+          <p:cNvPr id="3" name="TextBox 2">
+            <a:extLst>
+              <a:ext uri="{FF2B5EF4-FFF2-40B4-BE49-F238E27FC236}">
+                <a16:creationId xmlns:a16="http://schemas.microsoft.com/office/drawing/2014/main" id="{C4409357-62AB-C53D-577F-0FF4CFF2F18D}"/>
+              </a:ext>
+            </a:extLst>
+          </p:cNvPr>
+          <p:cNvSpPr txBox="1"/>
+          <p:nvPr/>
+        </p:nvSpPr>
+        <p:spPr>
+          <a:xfrm>
+            <a:off x="7626539" y="3956766"/>
+            <a:ext cx="2353734" cy="646331"/>
+          </a:xfrm>
+          <a:prstGeom prst="rect">
+            <a:avLst/>
+          </a:prstGeom>
+          <a:noFill/>
+        </p:spPr>
+        <p:txBody>
+          <a:bodyPr wrap="square" rtlCol="0">
+            <a:spAutoFit/>
+          </a:bodyPr>
+          <a:lstStyle/>
+          <a:p>
+            <a:r>
+              <a:rPr lang="de-CH" dirty="0"/>
+              <a:t>Why so many with exactly 50%??</a:t>
+            </a:r>
+            <a:endParaRPr lang="en-GB" dirty="0"/>
+          </a:p>
+        </p:txBody>
+      </p:sp>
+      <p:sp>
+        <p:nvSpPr>
+          <p:cNvPr id="4" name="Rectangle: Rounded Corners 3">
+            <a:extLst>
+              <a:ext uri="{FF2B5EF4-FFF2-40B4-BE49-F238E27FC236}">
+                <a16:creationId xmlns:a16="http://schemas.microsoft.com/office/drawing/2014/main" id="{79AA551E-FA63-960E-F087-D4304A8C24A0}"/>
+              </a:ext>
+            </a:extLst>
+          </p:cNvPr>
+          <p:cNvSpPr/>
+          <p:nvPr/>
+        </p:nvSpPr>
+        <p:spPr>
+          <a:xfrm>
+            <a:off x="6096000" y="3429000"/>
+            <a:ext cx="1507067" cy="1905000"/>
+          </a:xfrm>
+          <a:prstGeom prst="roundRect">
+            <a:avLst/>
+          </a:prstGeom>
+          <a:noFill/>
+          <a:ln w="38100">
+            <a:solidFill>
+              <a:srgbClr val="FF0000"/>
+            </a:solidFill>
+          </a:ln>
+        </p:spPr>
+        <p:style>
+          <a:lnRef idx="2">
+            <a:schemeClr val="accent1">
+              <a:shade val="15000"/>
+            </a:schemeClr>
+          </a:lnRef>
+          <a:fillRef idx="1">
+            <a:schemeClr val="accent1"/>
+          </a:fillRef>
+          <a:effectRef idx="0">
+            <a:schemeClr val="accent1"/>
+          </a:effectRef>
+          <a:fontRef idx="minor">
+            <a:schemeClr val="lt1"/>
+          </a:fontRef>
+        </p:style>
+        <p:txBody>
+          <a:bodyPr rtlCol="0" anchor="ctr"/>
+          <a:lstStyle/>
+          <a:p>
+            <a:pPr algn="ctr"/>
+            <a:endParaRPr lang="en-GB"/>
           </a:p>
         </p:txBody>
       </p:sp>
     </p:spTree>
     <p:extLst>
       <p:ext uri="{BB962C8B-B14F-4D97-AF65-F5344CB8AC3E}">
-        <p14:creationId xmlns:p14="http://schemas.microsoft.com/office/powerpoint/2010/main" val="3026645936"/>
+        <p14:creationId xmlns:p14="http://schemas.microsoft.com/office/powerpoint/2010/main" val="4087577250"/>
       </p:ext>
     </p:extLst>
   </p:cSld>
@@ -5407,126 +5602,68 @@
           <a:chExt cx="0" cy="0"/>
         </a:xfrm>
       </p:grpSpPr>
-      <p:pic>
-        <p:nvPicPr>
-          <p:cNvPr id="12" name="Content Placeholder 11" descr="A graph with red lines and numbers&#10;&#10;AI-generated content may be incorrect.">
+      <p:sp>
+        <p:nvSpPr>
+          <p:cNvPr id="2" name="Title 1">
             <a:extLst>
               <a:ext uri="{FF2B5EF4-FFF2-40B4-BE49-F238E27FC236}">
-                <a16:creationId xmlns:a16="http://schemas.microsoft.com/office/drawing/2014/main" id="{BD49C6AC-C674-843D-C8F1-02241A71B122}"/>
+                <a16:creationId xmlns:a16="http://schemas.microsoft.com/office/drawing/2014/main" id="{BA21E4DD-A0E9-85A5-076F-15D48EB17A60}"/>
               </a:ext>
             </a:extLst>
           </p:cNvPr>
-          <p:cNvPicPr>
-            <a:picLocks noGrp="1" noChangeAspect="1"/>
-          </p:cNvPicPr>
+          <p:cNvSpPr>
+            <a:spLocks noGrp="1"/>
+          </p:cNvSpPr>
+          <p:nvPr>
+            <p:ph type="title"/>
+          </p:nvPr>
+        </p:nvSpPr>
+        <p:spPr/>
+        <p:txBody>
+          <a:bodyPr/>
+          <a:lstStyle/>
+          <a:p>
+            <a:r>
+              <a:rPr lang="de-CH" dirty="0"/>
+              <a:t>Interaction</a:t>
+            </a:r>
+            <a:endParaRPr lang="en-GB" dirty="0"/>
+          </a:p>
+        </p:txBody>
+      </p:sp>
+      <p:sp>
+        <p:nvSpPr>
+          <p:cNvPr id="3" name="Content Placeholder 2">
+            <a:extLst>
+              <a:ext uri="{FF2B5EF4-FFF2-40B4-BE49-F238E27FC236}">
+                <a16:creationId xmlns:a16="http://schemas.microsoft.com/office/drawing/2014/main" id="{F28F0F0A-631B-70F5-5626-2DE0EA30D885}"/>
+              </a:ext>
+            </a:extLst>
+          </p:cNvPr>
+          <p:cNvSpPr>
+            <a:spLocks noGrp="1"/>
+          </p:cNvSpPr>
           <p:nvPr>
             <p:ph idx="1"/>
           </p:nvPr>
-        </p:nvPicPr>
-        <p:blipFill>
-          <a:blip r:embed="rId2">
-            <a:extLst>
-              <a:ext uri="{28A0092B-C50C-407E-A947-70E740481C1C}">
-                <a14:useLocalDpi xmlns:a14="http://schemas.microsoft.com/office/drawing/2010/main" val="0"/>
-              </a:ext>
-            </a:extLst>
-          </a:blip>
-          <a:srcRect t="6070"/>
-          <a:stretch/>
-        </p:blipFill>
-        <p:spPr>
-          <a:xfrm>
-            <a:off x="544941" y="1310640"/>
-            <a:ext cx="11102118" cy="5273040"/>
-          </a:xfrm>
-        </p:spPr>
-      </p:pic>
-      <p:sp>
-        <p:nvSpPr>
-          <p:cNvPr id="2" name="Title 1">
-            <a:extLst>
-              <a:ext uri="{FF2B5EF4-FFF2-40B4-BE49-F238E27FC236}">
-                <a16:creationId xmlns:a16="http://schemas.microsoft.com/office/drawing/2014/main" id="{DED8D4A8-9316-1F4F-4391-A51F0AE12446}"/>
-              </a:ext>
-            </a:extLst>
-          </p:cNvPr>
-          <p:cNvSpPr>
-            <a:spLocks noGrp="1"/>
-          </p:cNvSpPr>
-          <p:nvPr>
-            <p:ph type="title"/>
-          </p:nvPr>
-        </p:nvSpPr>
-        <p:spPr>
-          <a:xfrm>
-            <a:off x="238760" y="274320"/>
-            <a:ext cx="9875520" cy="1356360"/>
-          </a:xfrm>
-        </p:spPr>
+        </p:nvSpPr>
+        <p:spPr/>
         <p:txBody>
           <a:bodyPr/>
           <a:lstStyle/>
           <a:p>
             <a:r>
               <a:rPr lang="de-CH" dirty="0"/>
-              <a:t>DBB</a:t>
+              <a:t>Mortality based on type AND provenance</a:t>
             </a:r>
             <a:endParaRPr lang="en-GB" dirty="0"/>
-          </a:p>
-        </p:txBody>
-      </p:sp>
-      <p:sp>
-        <p:nvSpPr>
-          <p:cNvPr id="3" name="TextBox 2">
-            <a:extLst>
-              <a:ext uri="{FF2B5EF4-FFF2-40B4-BE49-F238E27FC236}">
-                <a16:creationId xmlns:a16="http://schemas.microsoft.com/office/drawing/2014/main" id="{7FC9CC8D-5E27-7D11-D30C-DB30F7B517A9}"/>
-              </a:ext>
-            </a:extLst>
-          </p:cNvPr>
-          <p:cNvSpPr txBox="1"/>
-          <p:nvPr/>
-        </p:nvSpPr>
-        <p:spPr>
-          <a:xfrm>
-            <a:off x="9193074" y="552390"/>
-            <a:ext cx="2675531" cy="400110"/>
-          </a:xfrm>
-          <a:prstGeom prst="rect">
-            <a:avLst/>
-          </a:prstGeom>
-          <a:noFill/>
-        </p:spPr>
-        <p:txBody>
-          <a:bodyPr wrap="square" rtlCol="0">
-            <a:spAutoFit/>
-          </a:bodyPr>
-          <a:lstStyle/>
-          <a:p>
-            <a:r>
-              <a:rPr lang="de-CH" sz="1000" dirty="0">
-                <a:solidFill>
-                  <a:schemeClr val="accent6">
-                    <a:lumMod val="75000"/>
-                  </a:schemeClr>
-                </a:solidFill>
-              </a:rPr>
-              <a:t>506 trees that are alive at both timepoints have DBB measurements</a:t>
-            </a:r>
-            <a:endParaRPr lang="en-GB" sz="1000" dirty="0">
-              <a:solidFill>
-                <a:schemeClr val="accent6">
-                  <a:lumMod val="75000"/>
-                </a:schemeClr>
-              </a:solidFill>
-            </a:endParaRPr>
           </a:p>
         </p:txBody>
       </p:sp>
     </p:spTree>
     <p:extLst>
       <p:ext uri="{BB962C8B-B14F-4D97-AF65-F5344CB8AC3E}">
-        <p14:creationId xmlns:p14="http://schemas.microsoft.com/office/powerpoint/2010/main" val="4154756640"/>
+        <p14:creationId xmlns:p14="http://schemas.microsoft.com/office/powerpoint/2010/main" val="3026645936"/>
       </p:ext>
     </p:extLst>
   </p:cSld>
@@ -5555,10 +5692,10 @@
       </p:grpSpPr>
       <p:pic>
         <p:nvPicPr>
-          <p:cNvPr id="11" name="Content Placeholder 10">
+          <p:cNvPr id="12" name="Content Placeholder 11" descr="A graph with red lines and numbers&#10;&#10;AI-generated content may be incorrect.">
             <a:extLst>
               <a:ext uri="{FF2B5EF4-FFF2-40B4-BE49-F238E27FC236}">
-                <a16:creationId xmlns:a16="http://schemas.microsoft.com/office/drawing/2014/main" id="{C5869241-031B-EBB0-A018-4867A27D2D22}"/>
+                <a16:creationId xmlns:a16="http://schemas.microsoft.com/office/drawing/2014/main" id="{BD49C6AC-C674-843D-C8F1-02241A71B122}"/>
               </a:ext>
             </a:extLst>
           </p:cNvPr>
@@ -5577,14 +5714,13 @@
               </a:ext>
             </a:extLst>
           </a:blip>
-          <a:stretch>
-            <a:fillRect/>
-          </a:stretch>
+          <a:srcRect t="6070"/>
+          <a:stretch/>
         </p:blipFill>
         <p:spPr>
           <a:xfrm>
-            <a:off x="833120" y="1423966"/>
-            <a:ext cx="10304635" cy="5210514"/>
+            <a:off x="544941" y="1310640"/>
+            <a:ext cx="11102118" cy="5273040"/>
           </a:xfrm>
         </p:spPr>
       </p:pic>
@@ -5593,7 +5729,7 @@
           <p:cNvPr id="2" name="Title 1">
             <a:extLst>
               <a:ext uri="{FF2B5EF4-FFF2-40B4-BE49-F238E27FC236}">
-                <a16:creationId xmlns:a16="http://schemas.microsoft.com/office/drawing/2014/main" id="{EC37FC25-0092-D266-9369-B42C8B0A2DCD}"/>
+                <a16:creationId xmlns:a16="http://schemas.microsoft.com/office/drawing/2014/main" id="{DED8D4A8-9316-1F4F-4391-A51F0AE12446}"/>
               </a:ext>
             </a:extLst>
           </p:cNvPr>
@@ -5606,7 +5742,7 @@
         </p:nvSpPr>
         <p:spPr>
           <a:xfrm>
-            <a:off x="238760" y="223520"/>
+            <a:off x="238760" y="274320"/>
             <a:ext cx="9875520" cy="1356360"/>
           </a:xfrm>
         </p:spPr>
@@ -5616,7 +5752,7 @@
           <a:p>
             <a:r>
               <a:rPr lang="de-CH" dirty="0"/>
-              <a:t>Height</a:t>
+              <a:t>DBB</a:t>
             </a:r>
             <a:endParaRPr lang="en-GB" dirty="0"/>
           </a:p>
@@ -5624,10 +5760,10 @@
       </p:sp>
       <p:sp>
         <p:nvSpPr>
-          <p:cNvPr id="7" name="TextBox 6">
+          <p:cNvPr id="3" name="TextBox 2">
             <a:extLst>
               <a:ext uri="{FF2B5EF4-FFF2-40B4-BE49-F238E27FC236}">
-                <a16:creationId xmlns:a16="http://schemas.microsoft.com/office/drawing/2014/main" id="{48543C4B-69A1-290C-CEFB-6E8DFA1E1BD1}"/>
+                <a16:creationId xmlns:a16="http://schemas.microsoft.com/office/drawing/2014/main" id="{7FC9CC8D-5E27-7D11-D30C-DB30F7B517A9}"/>
               </a:ext>
             </a:extLst>
           </p:cNvPr>
@@ -5636,7 +5772,7 @@
         </p:nvSpPr>
         <p:spPr>
           <a:xfrm>
-            <a:off x="8776513" y="537367"/>
+            <a:off x="9193074" y="552390"/>
             <a:ext cx="2675531" cy="400110"/>
           </a:xfrm>
           <a:prstGeom prst="rect">
@@ -5658,7 +5794,7 @@
                   </a:schemeClr>
                 </a:solidFill>
               </a:rPr>
-              <a:t>506 trees that are alive at both timepoints have height measurements</a:t>
+              <a:t>506 trees that are alive at both timepoints have DBB measurements</a:t>
             </a:r>
             <a:endParaRPr lang="en-GB" sz="1000" dirty="0">
               <a:solidFill>
@@ -5670,58 +5806,10 @@
           </a:p>
         </p:txBody>
       </p:sp>
-      <p:sp>
-        <p:nvSpPr>
-          <p:cNvPr id="12" name="TextBox 11">
-            <a:extLst>
-              <a:ext uri="{FF2B5EF4-FFF2-40B4-BE49-F238E27FC236}">
-                <a16:creationId xmlns:a16="http://schemas.microsoft.com/office/drawing/2014/main" id="{86B23E41-3A5D-BCAF-834C-2A32E08422A5}"/>
-              </a:ext>
-            </a:extLst>
-          </p:cNvPr>
-          <p:cNvSpPr txBox="1"/>
-          <p:nvPr/>
-        </p:nvSpPr>
-        <p:spPr>
-          <a:xfrm>
-            <a:off x="8776514" y="1017566"/>
-            <a:ext cx="2675531" cy="400110"/>
-          </a:xfrm>
-          <a:prstGeom prst="rect">
-            <a:avLst/>
-          </a:prstGeom>
-          <a:noFill/>
-        </p:spPr>
-        <p:txBody>
-          <a:bodyPr wrap="square" rtlCol="0">
-            <a:spAutoFit/>
-          </a:bodyPr>
-          <a:lstStyle/>
-          <a:p>
-            <a:r>
-              <a:rPr lang="de-CH" sz="1000" dirty="0">
-                <a:solidFill>
-                  <a:schemeClr val="accent6">
-                    <a:lumMod val="75000"/>
-                  </a:schemeClr>
-                </a:solidFill>
-              </a:rPr>
-              <a:t>1 tree is alive at both and has DBB but not height</a:t>
-            </a:r>
-            <a:endParaRPr lang="en-GB" sz="1000" dirty="0">
-              <a:solidFill>
-                <a:schemeClr val="accent6">
-                  <a:lumMod val="75000"/>
-                </a:schemeClr>
-              </a:solidFill>
-            </a:endParaRPr>
-          </a:p>
-        </p:txBody>
-      </p:sp>
     </p:spTree>
     <p:extLst>
       <p:ext uri="{BB962C8B-B14F-4D97-AF65-F5344CB8AC3E}">
-        <p14:creationId xmlns:p14="http://schemas.microsoft.com/office/powerpoint/2010/main" val="2740833318"/>
+        <p14:creationId xmlns:p14="http://schemas.microsoft.com/office/powerpoint/2010/main" val="4154756640"/>
       </p:ext>
     </p:extLst>
   </p:cSld>
@@ -5750,10 +5838,10 @@
       </p:grpSpPr>
       <p:pic>
         <p:nvPicPr>
-          <p:cNvPr id="5" name="Content Placeholder 4" descr="A diagram of different colored squares&#10;&#10;AI-generated content may be incorrect.">
+          <p:cNvPr id="11" name="Content Placeholder 10">
             <a:extLst>
               <a:ext uri="{FF2B5EF4-FFF2-40B4-BE49-F238E27FC236}">
-                <a16:creationId xmlns:a16="http://schemas.microsoft.com/office/drawing/2014/main" id="{73E0993F-5E9C-1D30-1C0B-6E7EB90E7028}"/>
+                <a16:creationId xmlns:a16="http://schemas.microsoft.com/office/drawing/2014/main" id="{C5869241-031B-EBB0-A018-4867A27D2D22}"/>
               </a:ext>
             </a:extLst>
           </p:cNvPr>
@@ -5772,13 +5860,14 @@
               </a:ext>
             </a:extLst>
           </a:blip>
-          <a:srcRect t="6225"/>
-          <a:stretch/>
+          <a:stretch>
+            <a:fillRect/>
+          </a:stretch>
         </p:blipFill>
         <p:spPr>
           <a:xfrm>
-            <a:off x="1786756" y="1766126"/>
-            <a:ext cx="8618487" cy="4856480"/>
+            <a:off x="833120" y="1423966"/>
+            <a:ext cx="10304635" cy="5210514"/>
           </a:xfrm>
         </p:spPr>
       </p:pic>
@@ -5787,7 +5876,7 @@
           <p:cNvPr id="2" name="Title 1">
             <a:extLst>
               <a:ext uri="{FF2B5EF4-FFF2-40B4-BE49-F238E27FC236}">
-                <a16:creationId xmlns:a16="http://schemas.microsoft.com/office/drawing/2014/main" id="{186B59D3-816C-2A57-089A-EA265D288680}"/>
+                <a16:creationId xmlns:a16="http://schemas.microsoft.com/office/drawing/2014/main" id="{EC37FC25-0092-D266-9369-B42C8B0A2DCD}"/>
               </a:ext>
             </a:extLst>
           </p:cNvPr>
@@ -5800,7 +5889,7 @@
         </p:nvSpPr>
         <p:spPr>
           <a:xfrm>
-            <a:off x="238760" y="213360"/>
+            <a:off x="238760" y="223520"/>
             <a:ext cx="9875520" cy="1356360"/>
           </a:xfrm>
         </p:spPr>
@@ -5810,7 +5899,7 @@
           <a:p>
             <a:r>
               <a:rPr lang="de-CH" dirty="0"/>
-              <a:t>Height – by Provenance</a:t>
+              <a:t>Height</a:t>
             </a:r>
             <a:endParaRPr lang="en-GB" dirty="0"/>
           </a:p>
@@ -5818,10 +5907,10 @@
       </p:sp>
       <p:sp>
         <p:nvSpPr>
-          <p:cNvPr id="6" name="TextBox 5">
+          <p:cNvPr id="7" name="TextBox 6">
             <a:extLst>
               <a:ext uri="{FF2B5EF4-FFF2-40B4-BE49-F238E27FC236}">
-                <a16:creationId xmlns:a16="http://schemas.microsoft.com/office/drawing/2014/main" id="{85B2C7B7-4BA9-EB08-7CDD-E8CB7044D6E1}"/>
+                <a16:creationId xmlns:a16="http://schemas.microsoft.com/office/drawing/2014/main" id="{48543C4B-69A1-290C-CEFB-6E8DFA1E1BD1}"/>
               </a:ext>
             </a:extLst>
           </p:cNvPr>
@@ -5830,8 +5919,8 @@
         </p:nvSpPr>
         <p:spPr>
           <a:xfrm>
-            <a:off x="8270240" y="670560"/>
-            <a:ext cx="2661920" cy="923330"/>
+            <a:off x="8776513" y="537367"/>
+            <a:ext cx="2675531" cy="400110"/>
           </a:xfrm>
           <a:prstGeom prst="rect">
             <a:avLst/>
@@ -5845,174 +5934,31 @@
           <a:lstStyle/>
           <a:p>
             <a:r>
-              <a:rPr lang="de-CH" dirty="0">
-                <a:solidFill>
-                  <a:srgbClr val="FF0000"/>
-                </a:solidFill>
-              </a:rPr>
-              <a:t>How many height values for each provenance?</a:t>
-            </a:r>
-          </a:p>
-          <a:p>
-            <a:r>
-              <a:rPr lang="de-CH" dirty="0">
-                <a:solidFill>
-                  <a:srgbClr val="FF0000"/>
-                </a:solidFill>
-              </a:rPr>
-              <a:t>How many NAs</a:t>
-            </a:r>
-            <a:endParaRPr lang="en-GB" dirty="0">
-              <a:solidFill>
-                <a:srgbClr val="FF0000"/>
-              </a:solidFill>
-            </a:endParaRPr>
-          </a:p>
-        </p:txBody>
-      </p:sp>
-      <p:cxnSp>
-        <p:nvCxnSpPr>
-          <p:cNvPr id="7" name="Straight Connector 6">
-            <a:extLst>
-              <a:ext uri="{FF2B5EF4-FFF2-40B4-BE49-F238E27FC236}">
-                <a16:creationId xmlns:a16="http://schemas.microsoft.com/office/drawing/2014/main" id="{19059EA4-2DBF-0663-3CBB-735422399593}"/>
-              </a:ext>
-            </a:extLst>
-          </p:cNvPr>
-          <p:cNvCxnSpPr>
-            <a:cxnSpLocks/>
-          </p:cNvCxnSpPr>
-          <p:nvPr/>
-        </p:nvCxnSpPr>
-        <p:spPr>
-          <a:xfrm flipV="1">
-            <a:off x="6745584" y="2254710"/>
-            <a:ext cx="2088872" cy="2986"/>
-          </a:xfrm>
-          <a:prstGeom prst="line">
-            <a:avLst/>
-          </a:prstGeom>
-          <a:ln>
-            <a:solidFill>
-              <a:schemeClr val="accent6">
-                <a:lumMod val="75000"/>
-              </a:schemeClr>
-            </a:solidFill>
-          </a:ln>
-        </p:spPr>
-        <p:style>
-          <a:lnRef idx="2">
-            <a:schemeClr val="accent1"/>
-          </a:lnRef>
-          <a:fillRef idx="0">
-            <a:schemeClr val="accent1"/>
-          </a:fillRef>
-          <a:effectRef idx="1">
-            <a:schemeClr val="accent1"/>
-          </a:effectRef>
-          <a:fontRef idx="minor">
-            <a:schemeClr val="tx1"/>
-          </a:fontRef>
-        </p:style>
-      </p:cxnSp>
-      <p:sp>
-        <p:nvSpPr>
-          <p:cNvPr id="8" name="TextBox 7">
-            <a:extLst>
-              <a:ext uri="{FF2B5EF4-FFF2-40B4-BE49-F238E27FC236}">
-                <a16:creationId xmlns:a16="http://schemas.microsoft.com/office/drawing/2014/main" id="{B4B09F37-05AB-B6E9-E388-410DADB688E9}"/>
-              </a:ext>
-            </a:extLst>
-          </p:cNvPr>
-          <p:cNvSpPr txBox="1"/>
-          <p:nvPr/>
-        </p:nvSpPr>
-        <p:spPr>
-          <a:xfrm>
-            <a:off x="7450347" y="1996473"/>
-            <a:ext cx="679347" cy="364074"/>
-          </a:xfrm>
-          <a:prstGeom prst="rect">
-            <a:avLst/>
-          </a:prstGeom>
-          <a:noFill/>
-          <a:ln>
-            <a:noFill/>
-          </a:ln>
-        </p:spPr>
-        <p:txBody>
-          <a:bodyPr wrap="square" rtlCol="0">
-            <a:spAutoFit/>
-          </a:bodyPr>
-          <a:lstStyle/>
-          <a:p>
-            <a:pPr algn="ctr"/>
-            <a:r>
-              <a:rPr lang="en-GB" sz="1766" b="1" dirty="0">
+              <a:rPr lang="de-CH" sz="1000" dirty="0">
                 <a:solidFill>
                   <a:schemeClr val="accent6">
                     <a:lumMod val="75000"/>
                   </a:schemeClr>
                 </a:solidFill>
-                <a:latin typeface="Helvetica" panose="020B0604020202020204"/>
-                <a:cs typeface="Helvetica" panose="020B0604020202020204"/>
               </a:rPr>
-              <a:t>*</a:t>
-            </a:r>
-          </a:p>
-        </p:txBody>
-      </p:sp>
-      <p:cxnSp>
-        <p:nvCxnSpPr>
-          <p:cNvPr id="12" name="Straight Connector 11">
+              <a:t>506 trees that are alive at both timepoints have height measurements</a:t>
+            </a:r>
+            <a:endParaRPr lang="en-GB" sz="1000" dirty="0">
+              <a:solidFill>
+                <a:schemeClr val="accent6">
+                  <a:lumMod val="75000"/>
+                </a:schemeClr>
+              </a:solidFill>
+            </a:endParaRPr>
+          </a:p>
+        </p:txBody>
+      </p:sp>
+      <p:sp>
+        <p:nvSpPr>
+          <p:cNvPr id="12" name="TextBox 11">
             <a:extLst>
               <a:ext uri="{FF2B5EF4-FFF2-40B4-BE49-F238E27FC236}">
-                <a16:creationId xmlns:a16="http://schemas.microsoft.com/office/drawing/2014/main" id="{FCE061F1-94C7-639C-91D4-CFA492EA4128}"/>
-              </a:ext>
-            </a:extLst>
-          </p:cNvPr>
-          <p:cNvCxnSpPr>
-            <a:cxnSpLocks/>
-          </p:cNvCxnSpPr>
-          <p:nvPr/>
-        </p:nvCxnSpPr>
-        <p:spPr>
-          <a:xfrm flipV="1">
-            <a:off x="3790687" y="2254710"/>
-            <a:ext cx="2088872" cy="2986"/>
-          </a:xfrm>
-          <a:prstGeom prst="line">
-            <a:avLst/>
-          </a:prstGeom>
-          <a:ln>
-            <a:solidFill>
-              <a:schemeClr val="accent6">
-                <a:lumMod val="75000"/>
-              </a:schemeClr>
-            </a:solidFill>
-          </a:ln>
-        </p:spPr>
-        <p:style>
-          <a:lnRef idx="2">
-            <a:schemeClr val="accent1"/>
-          </a:lnRef>
-          <a:fillRef idx="0">
-            <a:schemeClr val="accent1"/>
-          </a:fillRef>
-          <a:effectRef idx="1">
-            <a:schemeClr val="accent1"/>
-          </a:effectRef>
-          <a:fontRef idx="minor">
-            <a:schemeClr val="tx1"/>
-          </a:fontRef>
-        </p:style>
-      </p:cxnSp>
-      <p:sp>
-        <p:nvSpPr>
-          <p:cNvPr id="13" name="TextBox 12">
-            <a:extLst>
-              <a:ext uri="{FF2B5EF4-FFF2-40B4-BE49-F238E27FC236}">
-                <a16:creationId xmlns:a16="http://schemas.microsoft.com/office/drawing/2014/main" id="{2544A9C5-D7E0-7596-44AC-D0B1CF22A9BF}"/>
+                <a16:creationId xmlns:a16="http://schemas.microsoft.com/office/drawing/2014/main" id="{86B23E41-3A5D-BCAF-834C-2A32E08422A5}"/>
               </a:ext>
             </a:extLst>
           </p:cNvPr>
@@ -6021,16 +5967,13 @@
         </p:nvSpPr>
         <p:spPr>
           <a:xfrm>
-            <a:off x="4495450" y="1996473"/>
-            <a:ext cx="679347" cy="364074"/>
+            <a:off x="8776514" y="1017566"/>
+            <a:ext cx="2675531" cy="400110"/>
           </a:xfrm>
           <a:prstGeom prst="rect">
             <a:avLst/>
           </a:prstGeom>
           <a:noFill/>
-          <a:ln>
-            <a:noFill/>
-          </a:ln>
         </p:spPr>
         <p:txBody>
           <a:bodyPr wrap="square" rtlCol="0">
@@ -6038,26 +5981,30 @@
           </a:bodyPr>
           <a:lstStyle/>
           <a:p>
-            <a:pPr algn="ctr"/>
-            <a:r>
-              <a:rPr lang="en-GB" sz="1766" b="1" dirty="0">
+            <a:r>
+              <a:rPr lang="de-CH" sz="1000" dirty="0">
                 <a:solidFill>
                   <a:schemeClr val="accent6">
                     <a:lumMod val="75000"/>
                   </a:schemeClr>
                 </a:solidFill>
-                <a:latin typeface="Helvetica" panose="020B0604020202020204"/>
-                <a:cs typeface="Helvetica" panose="020B0604020202020204"/>
               </a:rPr>
-              <a:t>*</a:t>
-            </a:r>
+              <a:t>1 tree is alive at both and has DBB but not height</a:t>
+            </a:r>
+            <a:endParaRPr lang="en-GB" sz="1000" dirty="0">
+              <a:solidFill>
+                <a:schemeClr val="accent6">
+                  <a:lumMod val="75000"/>
+                </a:schemeClr>
+              </a:solidFill>
+            </a:endParaRPr>
           </a:p>
         </p:txBody>
       </p:sp>
     </p:spTree>
     <p:extLst>
       <p:ext uri="{BB962C8B-B14F-4D97-AF65-F5344CB8AC3E}">
-        <p14:creationId xmlns:p14="http://schemas.microsoft.com/office/powerpoint/2010/main" val="2468455985"/>
+        <p14:creationId xmlns:p14="http://schemas.microsoft.com/office/powerpoint/2010/main" val="2740833318"/>
       </p:ext>
     </p:extLst>
   </p:cSld>
@@ -6084,12 +6031,46 @@
           <a:chExt cx="0" cy="0"/>
         </a:xfrm>
       </p:grpSpPr>
+      <p:pic>
+        <p:nvPicPr>
+          <p:cNvPr id="5" name="Content Placeholder 4" descr="A diagram of different colored squares&#10;&#10;AI-generated content may be incorrect.">
+            <a:extLst>
+              <a:ext uri="{FF2B5EF4-FFF2-40B4-BE49-F238E27FC236}">
+                <a16:creationId xmlns:a16="http://schemas.microsoft.com/office/drawing/2014/main" id="{73E0993F-5E9C-1D30-1C0B-6E7EB90E7028}"/>
+              </a:ext>
+            </a:extLst>
+          </p:cNvPr>
+          <p:cNvPicPr>
+            <a:picLocks noGrp="1" noChangeAspect="1"/>
+          </p:cNvPicPr>
+          <p:nvPr>
+            <p:ph idx="1"/>
+          </p:nvPr>
+        </p:nvPicPr>
+        <p:blipFill>
+          <a:blip r:embed="rId2">
+            <a:extLst>
+              <a:ext uri="{28A0092B-C50C-407E-A947-70E740481C1C}">
+                <a14:useLocalDpi xmlns:a14="http://schemas.microsoft.com/office/drawing/2010/main" val="0"/>
+              </a:ext>
+            </a:extLst>
+          </a:blip>
+          <a:srcRect t="6225"/>
+          <a:stretch/>
+        </p:blipFill>
+        <p:spPr>
+          <a:xfrm>
+            <a:off x="1786756" y="1766126"/>
+            <a:ext cx="8618487" cy="4856480"/>
+          </a:xfrm>
+        </p:spPr>
+      </p:pic>
       <p:sp>
         <p:nvSpPr>
           <p:cNvPr id="2" name="Title 1">
             <a:extLst>
               <a:ext uri="{FF2B5EF4-FFF2-40B4-BE49-F238E27FC236}">
-                <a16:creationId xmlns:a16="http://schemas.microsoft.com/office/drawing/2014/main" id="{88E45658-7DE4-99A0-DD6E-14745BC00932}"/>
+                <a16:creationId xmlns:a16="http://schemas.microsoft.com/office/drawing/2014/main" id="{186B59D3-816C-2A57-089A-EA265D288680}"/>
               </a:ext>
             </a:extLst>
           </p:cNvPr>
@@ -6102,7 +6083,7 @@
         </p:nvSpPr>
         <p:spPr>
           <a:xfrm>
-            <a:off x="238760" y="203200"/>
+            <a:off x="238760" y="213360"/>
             <a:ext cx="9875520" cy="1356360"/>
           </a:xfrm>
         </p:spPr>
@@ -6112,7 +6093,7 @@
           <a:p>
             <a:r>
               <a:rPr lang="de-CH" dirty="0"/>
-              <a:t>Height – by Type</a:t>
+              <a:t>Height – by Provenance</a:t>
             </a:r>
             <a:endParaRPr lang="en-GB" dirty="0"/>
           </a:p>
@@ -6123,7 +6104,7 @@
           <p:cNvPr id="6" name="TextBox 5">
             <a:extLst>
               <a:ext uri="{FF2B5EF4-FFF2-40B4-BE49-F238E27FC236}">
-                <a16:creationId xmlns:a16="http://schemas.microsoft.com/office/drawing/2014/main" id="{BC044F4B-72E6-AB1B-4698-07642C2B12A6}"/>
+                <a16:creationId xmlns:a16="http://schemas.microsoft.com/office/drawing/2014/main" id="{85B2C7B7-4BA9-EB08-7CDD-E8CB7044D6E1}"/>
               </a:ext>
             </a:extLst>
           </p:cNvPr>
@@ -6132,7 +6113,7 @@
         </p:nvSpPr>
         <p:spPr>
           <a:xfrm>
-            <a:off x="8280400" y="561955"/>
+            <a:off x="8270240" y="670560"/>
             <a:ext cx="2661920" cy="923330"/>
           </a:xfrm>
           <a:prstGeom prst="rect">
@@ -6152,7 +6133,7 @@
                   <a:srgbClr val="FF0000"/>
                 </a:solidFill>
               </a:rPr>
-              <a:t>How many height values for each type?</a:t>
+              <a:t>How many height values for each provenance?</a:t>
             </a:r>
           </a:p>
           <a:p>
@@ -6162,7 +6143,7 @@
                   <a:srgbClr val="FF0000"/>
                 </a:solidFill>
               </a:rPr>
-              <a:t>How many Nas?</a:t>
+              <a:t>How many NAs</a:t>
             </a:r>
             <a:endParaRPr lang="en-GB" dirty="0">
               <a:solidFill>
@@ -6172,46 +6153,12 @@
           </a:p>
         </p:txBody>
       </p:sp>
-      <p:pic>
-        <p:nvPicPr>
-          <p:cNvPr id="10" name="Content Placeholder 9" descr="A diagram of different colored rectangles&#10;&#10;AI-generated content may be incorrect.">
-            <a:extLst>
-              <a:ext uri="{FF2B5EF4-FFF2-40B4-BE49-F238E27FC236}">
-                <a16:creationId xmlns:a16="http://schemas.microsoft.com/office/drawing/2014/main" id="{8BA279B2-C990-BC1D-5784-CB13A3FEFDBE}"/>
-              </a:ext>
-            </a:extLst>
-          </p:cNvPr>
-          <p:cNvPicPr>
-            <a:picLocks noGrp="1" noChangeAspect="1"/>
-          </p:cNvPicPr>
-          <p:nvPr>
-            <p:ph idx="1"/>
-          </p:nvPr>
-        </p:nvPicPr>
-        <p:blipFill>
-          <a:blip r:embed="rId2">
-            <a:extLst>
-              <a:ext uri="{28A0092B-C50C-407E-A947-70E740481C1C}">
-                <a14:useLocalDpi xmlns:a14="http://schemas.microsoft.com/office/drawing/2010/main" val="0"/>
-              </a:ext>
-            </a:extLst>
-          </a:blip>
-          <a:srcRect t="5930"/>
-          <a:stretch/>
-        </p:blipFill>
-        <p:spPr>
-          <a:xfrm>
-            <a:off x="1273629" y="1479925"/>
-            <a:ext cx="9002485" cy="5088833"/>
-          </a:xfrm>
-        </p:spPr>
-      </p:pic>
       <p:cxnSp>
         <p:nvCxnSpPr>
-          <p:cNvPr id="4" name="Straight Connector 3">
+          <p:cNvPr id="7" name="Straight Connector 6">
             <a:extLst>
               <a:ext uri="{FF2B5EF4-FFF2-40B4-BE49-F238E27FC236}">
-                <a16:creationId xmlns:a16="http://schemas.microsoft.com/office/drawing/2014/main" id="{799FF156-1706-02AD-E8DE-8029EE35527A}"/>
+                <a16:creationId xmlns:a16="http://schemas.microsoft.com/office/drawing/2014/main" id="{19059EA4-2DBF-0663-3CBB-735422399593}"/>
               </a:ext>
             </a:extLst>
           </p:cNvPr>
@@ -6222,7 +6169,7 @@
         </p:nvCxnSpPr>
         <p:spPr>
           <a:xfrm flipV="1">
-            <a:off x="3434552" y="2697258"/>
+            <a:off x="6745584" y="2254710"/>
             <a:ext cx="2088872" cy="2986"/>
           </a:xfrm>
           <a:prstGeom prst="line">
@@ -6253,10 +6200,10 @@
       </p:cxnSp>
       <p:sp>
         <p:nvSpPr>
-          <p:cNvPr id="5" name="TextBox 4">
+          <p:cNvPr id="8" name="TextBox 7">
             <a:extLst>
               <a:ext uri="{FF2B5EF4-FFF2-40B4-BE49-F238E27FC236}">
-                <a16:creationId xmlns:a16="http://schemas.microsoft.com/office/drawing/2014/main" id="{0B94D3B1-D2D1-C219-BFFD-F4DB6DC8B9BB}"/>
+                <a16:creationId xmlns:a16="http://schemas.microsoft.com/office/drawing/2014/main" id="{B4B09F37-05AB-B6E9-E388-410DADB688E9}"/>
               </a:ext>
             </a:extLst>
           </p:cNvPr>
@@ -6265,7 +6212,7 @@
         </p:nvSpPr>
         <p:spPr>
           <a:xfrm>
-            <a:off x="4139315" y="2439021"/>
+            <a:off x="7450347" y="1996473"/>
             <a:ext cx="679347" cy="364074"/>
           </a:xfrm>
           <a:prstGeom prst="rect">
@@ -6300,10 +6247,10 @@
       </p:sp>
       <p:cxnSp>
         <p:nvCxnSpPr>
-          <p:cNvPr id="7" name="Straight Connector 6">
+          <p:cNvPr id="12" name="Straight Connector 11">
             <a:extLst>
               <a:ext uri="{FF2B5EF4-FFF2-40B4-BE49-F238E27FC236}">
-                <a16:creationId xmlns:a16="http://schemas.microsoft.com/office/drawing/2014/main" id="{EF7AD5F4-45BE-97EA-56EB-EB3658392A22}"/>
+                <a16:creationId xmlns:a16="http://schemas.microsoft.com/office/drawing/2014/main" id="{FCE061F1-94C7-639C-91D4-CFA492EA4128}"/>
               </a:ext>
             </a:extLst>
           </p:cNvPr>
@@ -6314,7 +6261,7 @@
         </p:nvCxnSpPr>
         <p:spPr>
           <a:xfrm flipV="1">
-            <a:off x="6328904" y="2400269"/>
+            <a:off x="3790687" y="2254710"/>
             <a:ext cx="2088872" cy="2986"/>
           </a:xfrm>
           <a:prstGeom prst="line">
@@ -6345,10 +6292,10 @@
       </p:cxnSp>
       <p:sp>
         <p:nvSpPr>
-          <p:cNvPr id="8" name="TextBox 7">
+          <p:cNvPr id="13" name="TextBox 12">
             <a:extLst>
               <a:ext uri="{FF2B5EF4-FFF2-40B4-BE49-F238E27FC236}">
-                <a16:creationId xmlns:a16="http://schemas.microsoft.com/office/drawing/2014/main" id="{47F509E7-DF81-6201-EAEF-76C19805D2B3}"/>
+                <a16:creationId xmlns:a16="http://schemas.microsoft.com/office/drawing/2014/main" id="{2544A9C5-D7E0-7596-44AC-D0B1CF22A9BF}"/>
               </a:ext>
             </a:extLst>
           </p:cNvPr>
@@ -6357,7 +6304,7 @@
         </p:nvSpPr>
         <p:spPr>
           <a:xfrm>
-            <a:off x="7033667" y="2142032"/>
+            <a:off x="4495450" y="1996473"/>
             <a:ext cx="679347" cy="364074"/>
           </a:xfrm>
           <a:prstGeom prst="rect">
@@ -6390,102 +6337,10 @@
           </a:p>
         </p:txBody>
       </p:sp>
-      <p:cxnSp>
-        <p:nvCxnSpPr>
-          <p:cNvPr id="9" name="Straight Connector 8">
-            <a:extLst>
-              <a:ext uri="{FF2B5EF4-FFF2-40B4-BE49-F238E27FC236}">
-                <a16:creationId xmlns:a16="http://schemas.microsoft.com/office/drawing/2014/main" id="{9856D891-6E77-53B9-A5ED-9F3C0CB4763A}"/>
-              </a:ext>
-            </a:extLst>
-          </p:cNvPr>
-          <p:cNvCxnSpPr>
-            <a:cxnSpLocks/>
-          </p:cNvCxnSpPr>
-          <p:nvPr/>
-        </p:nvCxnSpPr>
-        <p:spPr>
-          <a:xfrm>
-            <a:off x="3434552" y="1722714"/>
-            <a:ext cx="4983224" cy="0"/>
-          </a:xfrm>
-          <a:prstGeom prst="line">
-            <a:avLst/>
-          </a:prstGeom>
-          <a:ln>
-            <a:solidFill>
-              <a:schemeClr val="accent6">
-                <a:lumMod val="75000"/>
-              </a:schemeClr>
-            </a:solidFill>
-          </a:ln>
-        </p:spPr>
-        <p:style>
-          <a:lnRef idx="2">
-            <a:schemeClr val="accent1"/>
-          </a:lnRef>
-          <a:fillRef idx="0">
-            <a:schemeClr val="accent1"/>
-          </a:fillRef>
-          <a:effectRef idx="1">
-            <a:schemeClr val="accent1"/>
-          </a:effectRef>
-          <a:fontRef idx="minor">
-            <a:schemeClr val="tx1"/>
-          </a:fontRef>
-        </p:style>
-      </p:cxnSp>
-      <p:sp>
-        <p:nvSpPr>
-          <p:cNvPr id="11" name="TextBox 10">
-            <a:extLst>
-              <a:ext uri="{FF2B5EF4-FFF2-40B4-BE49-F238E27FC236}">
-                <a16:creationId xmlns:a16="http://schemas.microsoft.com/office/drawing/2014/main" id="{925679F4-CF01-D594-4512-3725711039C9}"/>
-              </a:ext>
-            </a:extLst>
-          </p:cNvPr>
-          <p:cNvSpPr txBox="1"/>
-          <p:nvPr/>
-        </p:nvSpPr>
-        <p:spPr>
-          <a:xfrm>
-            <a:off x="5649557" y="1406376"/>
-            <a:ext cx="679347" cy="364074"/>
-          </a:xfrm>
-          <a:prstGeom prst="rect">
-            <a:avLst/>
-          </a:prstGeom>
-          <a:noFill/>
-          <a:ln>
-            <a:noFill/>
-          </a:ln>
-        </p:spPr>
-        <p:txBody>
-          <a:bodyPr wrap="square" rtlCol="0">
-            <a:spAutoFit/>
-          </a:bodyPr>
-          <a:lstStyle/>
-          <a:p>
-            <a:pPr algn="ctr"/>
-            <a:r>
-              <a:rPr lang="en-GB" sz="1766" b="1" dirty="0">
-                <a:solidFill>
-                  <a:schemeClr val="accent6">
-                    <a:lumMod val="75000"/>
-                  </a:schemeClr>
-                </a:solidFill>
-                <a:latin typeface="Helvetica" panose="020B0604020202020204"/>
-                <a:cs typeface="Helvetica" panose="020B0604020202020204"/>
-              </a:rPr>
-              <a:t>*</a:t>
-            </a:r>
-          </a:p>
-        </p:txBody>
-      </p:sp>
     </p:spTree>
     <p:extLst>
       <p:ext uri="{BB962C8B-B14F-4D97-AF65-F5344CB8AC3E}">
-        <p14:creationId xmlns:p14="http://schemas.microsoft.com/office/powerpoint/2010/main" val="522262804"/>
+        <p14:creationId xmlns:p14="http://schemas.microsoft.com/office/powerpoint/2010/main" val="2468455985"/>
       </p:ext>
     </p:extLst>
   </p:cSld>
@@ -6517,7 +6372,7 @@
           <p:cNvPr id="2" name="Title 1">
             <a:extLst>
               <a:ext uri="{FF2B5EF4-FFF2-40B4-BE49-F238E27FC236}">
-                <a16:creationId xmlns:a16="http://schemas.microsoft.com/office/drawing/2014/main" id="{453C67C6-7C6F-9EC2-BC2C-F591BF4901DA}"/>
+                <a16:creationId xmlns:a16="http://schemas.microsoft.com/office/drawing/2014/main" id="{88E45658-7DE4-99A0-DD6E-14745BC00932}"/>
               </a:ext>
             </a:extLst>
           </p:cNvPr>
@@ -6530,7 +6385,7 @@
         </p:nvSpPr>
         <p:spPr>
           <a:xfrm>
-            <a:off x="239618" y="212992"/>
+            <a:off x="238760" y="203200"/>
             <a:ext cx="9875520" cy="1356360"/>
           </a:xfrm>
         </p:spPr>
@@ -6540,7 +6395,7 @@
           <a:p>
             <a:r>
               <a:rPr lang="de-CH" dirty="0"/>
-              <a:t>Budset &amp; Budburst</a:t>
+              <a:t>Height – by Type</a:t>
             </a:r>
             <a:endParaRPr lang="en-GB" dirty="0"/>
           </a:p>
@@ -6548,99 +6403,372 @@
       </p:sp>
       <p:sp>
         <p:nvSpPr>
-          <p:cNvPr id="3" name="Content Placeholder 2">
+          <p:cNvPr id="6" name="TextBox 5">
             <a:extLst>
               <a:ext uri="{FF2B5EF4-FFF2-40B4-BE49-F238E27FC236}">
-                <a16:creationId xmlns:a16="http://schemas.microsoft.com/office/drawing/2014/main" id="{4667D288-CBE2-F195-7FFC-C90ACACBE117}"/>
+                <a16:creationId xmlns:a16="http://schemas.microsoft.com/office/drawing/2014/main" id="{BC044F4B-72E6-AB1B-4698-07642C2B12A6}"/>
               </a:ext>
             </a:extLst>
           </p:cNvPr>
-          <p:cNvSpPr>
-            <a:spLocks noGrp="1"/>
-          </p:cNvSpPr>
+          <p:cNvSpPr txBox="1"/>
+          <p:nvPr/>
+        </p:nvSpPr>
+        <p:spPr>
+          <a:xfrm>
+            <a:off x="8280400" y="561955"/>
+            <a:ext cx="2661920" cy="923330"/>
+          </a:xfrm>
+          <a:prstGeom prst="rect">
+            <a:avLst/>
+          </a:prstGeom>
+          <a:noFill/>
+        </p:spPr>
+        <p:txBody>
+          <a:bodyPr wrap="square" rtlCol="0">
+            <a:spAutoFit/>
+          </a:bodyPr>
+          <a:lstStyle/>
+          <a:p>
+            <a:r>
+              <a:rPr lang="de-CH" dirty="0">
+                <a:solidFill>
+                  <a:srgbClr val="FF0000"/>
+                </a:solidFill>
+              </a:rPr>
+              <a:t>How many height values for each type?</a:t>
+            </a:r>
+          </a:p>
+          <a:p>
+            <a:r>
+              <a:rPr lang="de-CH" dirty="0">
+                <a:solidFill>
+                  <a:srgbClr val="FF0000"/>
+                </a:solidFill>
+              </a:rPr>
+              <a:t>How many Nas?</a:t>
+            </a:r>
+            <a:endParaRPr lang="en-GB" dirty="0">
+              <a:solidFill>
+                <a:srgbClr val="FF0000"/>
+              </a:solidFill>
+            </a:endParaRPr>
+          </a:p>
+        </p:txBody>
+      </p:sp>
+      <p:pic>
+        <p:nvPicPr>
+          <p:cNvPr id="10" name="Content Placeholder 9" descr="A diagram of different colored rectangles&#10;&#10;AI-generated content may be incorrect.">
+            <a:extLst>
+              <a:ext uri="{FF2B5EF4-FFF2-40B4-BE49-F238E27FC236}">
+                <a16:creationId xmlns:a16="http://schemas.microsoft.com/office/drawing/2014/main" id="{8BA279B2-C990-BC1D-5784-CB13A3FEFDBE}"/>
+              </a:ext>
+            </a:extLst>
+          </p:cNvPr>
+          <p:cNvPicPr>
+            <a:picLocks noGrp="1" noChangeAspect="1"/>
+          </p:cNvPicPr>
           <p:nvPr>
             <p:ph idx="1"/>
           </p:nvPr>
-        </p:nvSpPr>
-        <p:spPr>
-          <a:xfrm>
-            <a:off x="933680" y="1569352"/>
-            <a:ext cx="9872871" cy="4038600"/>
-          </a:xfrm>
-        </p:spPr>
-        <p:txBody>
-          <a:bodyPr/>
-          <a:lstStyle/>
-          <a:p>
-            <a:r>
-              <a:rPr lang="de-CH" dirty="0"/>
-              <a:t>Date of planting: 20-23/6/2023</a:t>
-            </a:r>
-          </a:p>
-          <a:p>
-            <a:r>
-              <a:rPr lang="de-CH" dirty="0"/>
-              <a:t>Budset period: 11/9/2023 – 17/5/2024</a:t>
-            </a:r>
-          </a:p>
-          <a:p>
-            <a:r>
-              <a:rPr lang="de-CH" dirty="0"/>
-              <a:t>Budburst period: 2/2/2024 – 22/5/2024</a:t>
-            </a:r>
-          </a:p>
-          <a:p>
-            <a:endParaRPr lang="de-CH" dirty="0"/>
-          </a:p>
-          <a:p>
-            <a:r>
-              <a:rPr lang="de-CH" u="sng" dirty="0"/>
-              <a:t>Sample sizes:</a:t>
-            </a:r>
-          </a:p>
-          <a:p>
-            <a:pPr lvl="1"/>
-            <a:r>
-              <a:rPr lang="de-CH" sz="2200" dirty="0"/>
-              <a:t>Budset: 549 trees</a:t>
-            </a:r>
-          </a:p>
-          <a:p>
-            <a:pPr lvl="1"/>
-            <a:r>
-              <a:rPr lang="de-CH" sz="2200" dirty="0"/>
-              <a:t>Budburst: 575 trees</a:t>
-            </a:r>
-          </a:p>
-          <a:p>
-            <a:pPr lvl="2"/>
-            <a:r>
-              <a:rPr lang="de-CH" sz="2000" dirty="0"/>
-              <a:t>(Maybe 26 didn’t have noticeable buds?)</a:t>
-            </a:r>
-          </a:p>
-          <a:p>
-            <a:pPr lvl="1"/>
-            <a:r>
-              <a:rPr lang="de-CH" sz="2200" dirty="0"/>
-              <a:t>Budset &amp; Budburst: 529 trees have data (~85%)</a:t>
-            </a:r>
-          </a:p>
-          <a:p>
-            <a:endParaRPr lang="de-CH" dirty="0"/>
-          </a:p>
-          <a:p>
-            <a:endParaRPr lang="de-CH" dirty="0"/>
-          </a:p>
-          <a:p>
-            <a:endParaRPr lang="en-GB" dirty="0"/>
+        </p:nvPicPr>
+        <p:blipFill>
+          <a:blip r:embed="rId2">
+            <a:extLst>
+              <a:ext uri="{28A0092B-C50C-407E-A947-70E740481C1C}">
+                <a14:useLocalDpi xmlns:a14="http://schemas.microsoft.com/office/drawing/2010/main" val="0"/>
+              </a:ext>
+            </a:extLst>
+          </a:blip>
+          <a:srcRect t="5930"/>
+          <a:stretch/>
+        </p:blipFill>
+        <p:spPr>
+          <a:xfrm>
+            <a:off x="1273629" y="1479925"/>
+            <a:ext cx="9002485" cy="5088833"/>
+          </a:xfrm>
+        </p:spPr>
+      </p:pic>
+      <p:cxnSp>
+        <p:nvCxnSpPr>
+          <p:cNvPr id="4" name="Straight Connector 3">
+            <a:extLst>
+              <a:ext uri="{FF2B5EF4-FFF2-40B4-BE49-F238E27FC236}">
+                <a16:creationId xmlns:a16="http://schemas.microsoft.com/office/drawing/2014/main" id="{799FF156-1706-02AD-E8DE-8029EE35527A}"/>
+              </a:ext>
+            </a:extLst>
+          </p:cNvPr>
+          <p:cNvCxnSpPr>
+            <a:cxnSpLocks/>
+          </p:cNvCxnSpPr>
+          <p:nvPr/>
+        </p:nvCxnSpPr>
+        <p:spPr>
+          <a:xfrm flipV="1">
+            <a:off x="3434552" y="2697258"/>
+            <a:ext cx="2088872" cy="2986"/>
+          </a:xfrm>
+          <a:prstGeom prst="line">
+            <a:avLst/>
+          </a:prstGeom>
+          <a:ln>
+            <a:solidFill>
+              <a:schemeClr val="accent6">
+                <a:lumMod val="75000"/>
+              </a:schemeClr>
+            </a:solidFill>
+          </a:ln>
+        </p:spPr>
+        <p:style>
+          <a:lnRef idx="2">
+            <a:schemeClr val="accent1"/>
+          </a:lnRef>
+          <a:fillRef idx="0">
+            <a:schemeClr val="accent1"/>
+          </a:fillRef>
+          <a:effectRef idx="1">
+            <a:schemeClr val="accent1"/>
+          </a:effectRef>
+          <a:fontRef idx="minor">
+            <a:schemeClr val="tx1"/>
+          </a:fontRef>
+        </p:style>
+      </p:cxnSp>
+      <p:sp>
+        <p:nvSpPr>
+          <p:cNvPr id="5" name="TextBox 4">
+            <a:extLst>
+              <a:ext uri="{FF2B5EF4-FFF2-40B4-BE49-F238E27FC236}">
+                <a16:creationId xmlns:a16="http://schemas.microsoft.com/office/drawing/2014/main" id="{0B94D3B1-D2D1-C219-BFFD-F4DB6DC8B9BB}"/>
+              </a:ext>
+            </a:extLst>
+          </p:cNvPr>
+          <p:cNvSpPr txBox="1"/>
+          <p:nvPr/>
+        </p:nvSpPr>
+        <p:spPr>
+          <a:xfrm>
+            <a:off x="4139315" y="2439021"/>
+            <a:ext cx="679347" cy="364074"/>
+          </a:xfrm>
+          <a:prstGeom prst="rect">
+            <a:avLst/>
+          </a:prstGeom>
+          <a:noFill/>
+          <a:ln>
+            <a:noFill/>
+          </a:ln>
+        </p:spPr>
+        <p:txBody>
+          <a:bodyPr wrap="square" rtlCol="0">
+            <a:spAutoFit/>
+          </a:bodyPr>
+          <a:lstStyle/>
+          <a:p>
+            <a:pPr algn="ctr"/>
+            <a:r>
+              <a:rPr lang="en-GB" sz="1766" b="1" dirty="0">
+                <a:solidFill>
+                  <a:schemeClr val="accent6">
+                    <a:lumMod val="75000"/>
+                  </a:schemeClr>
+                </a:solidFill>
+                <a:latin typeface="Helvetica" panose="020B0604020202020204"/>
+                <a:cs typeface="Helvetica" panose="020B0604020202020204"/>
+              </a:rPr>
+              <a:t>*</a:t>
+            </a:r>
+          </a:p>
+        </p:txBody>
+      </p:sp>
+      <p:cxnSp>
+        <p:nvCxnSpPr>
+          <p:cNvPr id="7" name="Straight Connector 6">
+            <a:extLst>
+              <a:ext uri="{FF2B5EF4-FFF2-40B4-BE49-F238E27FC236}">
+                <a16:creationId xmlns:a16="http://schemas.microsoft.com/office/drawing/2014/main" id="{EF7AD5F4-45BE-97EA-56EB-EB3658392A22}"/>
+              </a:ext>
+            </a:extLst>
+          </p:cNvPr>
+          <p:cNvCxnSpPr>
+            <a:cxnSpLocks/>
+          </p:cNvCxnSpPr>
+          <p:nvPr/>
+        </p:nvCxnSpPr>
+        <p:spPr>
+          <a:xfrm flipV="1">
+            <a:off x="6328904" y="2400269"/>
+            <a:ext cx="2088872" cy="2986"/>
+          </a:xfrm>
+          <a:prstGeom prst="line">
+            <a:avLst/>
+          </a:prstGeom>
+          <a:ln>
+            <a:solidFill>
+              <a:schemeClr val="accent6">
+                <a:lumMod val="75000"/>
+              </a:schemeClr>
+            </a:solidFill>
+          </a:ln>
+        </p:spPr>
+        <p:style>
+          <a:lnRef idx="2">
+            <a:schemeClr val="accent1"/>
+          </a:lnRef>
+          <a:fillRef idx="0">
+            <a:schemeClr val="accent1"/>
+          </a:fillRef>
+          <a:effectRef idx="1">
+            <a:schemeClr val="accent1"/>
+          </a:effectRef>
+          <a:fontRef idx="minor">
+            <a:schemeClr val="tx1"/>
+          </a:fontRef>
+        </p:style>
+      </p:cxnSp>
+      <p:sp>
+        <p:nvSpPr>
+          <p:cNvPr id="8" name="TextBox 7">
+            <a:extLst>
+              <a:ext uri="{FF2B5EF4-FFF2-40B4-BE49-F238E27FC236}">
+                <a16:creationId xmlns:a16="http://schemas.microsoft.com/office/drawing/2014/main" id="{47F509E7-DF81-6201-EAEF-76C19805D2B3}"/>
+              </a:ext>
+            </a:extLst>
+          </p:cNvPr>
+          <p:cNvSpPr txBox="1"/>
+          <p:nvPr/>
+        </p:nvSpPr>
+        <p:spPr>
+          <a:xfrm>
+            <a:off x="7033667" y="2142032"/>
+            <a:ext cx="679347" cy="364074"/>
+          </a:xfrm>
+          <a:prstGeom prst="rect">
+            <a:avLst/>
+          </a:prstGeom>
+          <a:noFill/>
+          <a:ln>
+            <a:noFill/>
+          </a:ln>
+        </p:spPr>
+        <p:txBody>
+          <a:bodyPr wrap="square" rtlCol="0">
+            <a:spAutoFit/>
+          </a:bodyPr>
+          <a:lstStyle/>
+          <a:p>
+            <a:pPr algn="ctr"/>
+            <a:r>
+              <a:rPr lang="en-GB" sz="1766" b="1" dirty="0">
+                <a:solidFill>
+                  <a:schemeClr val="accent6">
+                    <a:lumMod val="75000"/>
+                  </a:schemeClr>
+                </a:solidFill>
+                <a:latin typeface="Helvetica" panose="020B0604020202020204"/>
+                <a:cs typeface="Helvetica" panose="020B0604020202020204"/>
+              </a:rPr>
+              <a:t>*</a:t>
+            </a:r>
+          </a:p>
+        </p:txBody>
+      </p:sp>
+      <p:cxnSp>
+        <p:nvCxnSpPr>
+          <p:cNvPr id="9" name="Straight Connector 8">
+            <a:extLst>
+              <a:ext uri="{FF2B5EF4-FFF2-40B4-BE49-F238E27FC236}">
+                <a16:creationId xmlns:a16="http://schemas.microsoft.com/office/drawing/2014/main" id="{9856D891-6E77-53B9-A5ED-9F3C0CB4763A}"/>
+              </a:ext>
+            </a:extLst>
+          </p:cNvPr>
+          <p:cNvCxnSpPr>
+            <a:cxnSpLocks/>
+          </p:cNvCxnSpPr>
+          <p:nvPr/>
+        </p:nvCxnSpPr>
+        <p:spPr>
+          <a:xfrm>
+            <a:off x="3434552" y="1722714"/>
+            <a:ext cx="4983224" cy="0"/>
+          </a:xfrm>
+          <a:prstGeom prst="line">
+            <a:avLst/>
+          </a:prstGeom>
+          <a:ln>
+            <a:solidFill>
+              <a:schemeClr val="accent6">
+                <a:lumMod val="75000"/>
+              </a:schemeClr>
+            </a:solidFill>
+          </a:ln>
+        </p:spPr>
+        <p:style>
+          <a:lnRef idx="2">
+            <a:schemeClr val="accent1"/>
+          </a:lnRef>
+          <a:fillRef idx="0">
+            <a:schemeClr val="accent1"/>
+          </a:fillRef>
+          <a:effectRef idx="1">
+            <a:schemeClr val="accent1"/>
+          </a:effectRef>
+          <a:fontRef idx="minor">
+            <a:schemeClr val="tx1"/>
+          </a:fontRef>
+        </p:style>
+      </p:cxnSp>
+      <p:sp>
+        <p:nvSpPr>
+          <p:cNvPr id="11" name="TextBox 10">
+            <a:extLst>
+              <a:ext uri="{FF2B5EF4-FFF2-40B4-BE49-F238E27FC236}">
+                <a16:creationId xmlns:a16="http://schemas.microsoft.com/office/drawing/2014/main" id="{925679F4-CF01-D594-4512-3725711039C9}"/>
+              </a:ext>
+            </a:extLst>
+          </p:cNvPr>
+          <p:cNvSpPr txBox="1"/>
+          <p:nvPr/>
+        </p:nvSpPr>
+        <p:spPr>
+          <a:xfrm>
+            <a:off x="5649557" y="1406376"/>
+            <a:ext cx="679347" cy="364074"/>
+          </a:xfrm>
+          <a:prstGeom prst="rect">
+            <a:avLst/>
+          </a:prstGeom>
+          <a:noFill/>
+          <a:ln>
+            <a:noFill/>
+          </a:ln>
+        </p:spPr>
+        <p:txBody>
+          <a:bodyPr wrap="square" rtlCol="0">
+            <a:spAutoFit/>
+          </a:bodyPr>
+          <a:lstStyle/>
+          <a:p>
+            <a:pPr algn="ctr"/>
+            <a:r>
+              <a:rPr lang="en-GB" sz="1766" b="1" dirty="0">
+                <a:solidFill>
+                  <a:schemeClr val="accent6">
+                    <a:lumMod val="75000"/>
+                  </a:schemeClr>
+                </a:solidFill>
+                <a:latin typeface="Helvetica" panose="020B0604020202020204"/>
+                <a:cs typeface="Helvetica" panose="020B0604020202020204"/>
+              </a:rPr>
+              <a:t>*</a:t>
+            </a:r>
           </a:p>
         </p:txBody>
       </p:sp>
     </p:spTree>
     <p:extLst>
       <p:ext uri="{BB962C8B-B14F-4D97-AF65-F5344CB8AC3E}">
-        <p14:creationId xmlns:p14="http://schemas.microsoft.com/office/powerpoint/2010/main" val="536145808"/>
+        <p14:creationId xmlns:p14="http://schemas.microsoft.com/office/powerpoint/2010/main" val="522262804"/>
       </p:ext>
     </p:extLst>
   </p:cSld>
@@ -6672,6 +6800,161 @@
           <p:cNvPr id="2" name="Title 1">
             <a:extLst>
               <a:ext uri="{FF2B5EF4-FFF2-40B4-BE49-F238E27FC236}">
+                <a16:creationId xmlns:a16="http://schemas.microsoft.com/office/drawing/2014/main" id="{453C67C6-7C6F-9EC2-BC2C-F591BF4901DA}"/>
+              </a:ext>
+            </a:extLst>
+          </p:cNvPr>
+          <p:cNvSpPr>
+            <a:spLocks noGrp="1"/>
+          </p:cNvSpPr>
+          <p:nvPr>
+            <p:ph type="title"/>
+          </p:nvPr>
+        </p:nvSpPr>
+        <p:spPr>
+          <a:xfrm>
+            <a:off x="239618" y="212992"/>
+            <a:ext cx="9875520" cy="1356360"/>
+          </a:xfrm>
+        </p:spPr>
+        <p:txBody>
+          <a:bodyPr/>
+          <a:lstStyle/>
+          <a:p>
+            <a:r>
+              <a:rPr lang="de-CH" dirty="0"/>
+              <a:t>Budset &amp; Budburst</a:t>
+            </a:r>
+            <a:endParaRPr lang="en-GB" dirty="0"/>
+          </a:p>
+        </p:txBody>
+      </p:sp>
+      <p:sp>
+        <p:nvSpPr>
+          <p:cNvPr id="3" name="Content Placeholder 2">
+            <a:extLst>
+              <a:ext uri="{FF2B5EF4-FFF2-40B4-BE49-F238E27FC236}">
+                <a16:creationId xmlns:a16="http://schemas.microsoft.com/office/drawing/2014/main" id="{4667D288-CBE2-F195-7FFC-C90ACACBE117}"/>
+              </a:ext>
+            </a:extLst>
+          </p:cNvPr>
+          <p:cNvSpPr>
+            <a:spLocks noGrp="1"/>
+          </p:cNvSpPr>
+          <p:nvPr>
+            <p:ph idx="1"/>
+          </p:nvPr>
+        </p:nvSpPr>
+        <p:spPr>
+          <a:xfrm>
+            <a:off x="933680" y="1569352"/>
+            <a:ext cx="9872871" cy="4038600"/>
+          </a:xfrm>
+        </p:spPr>
+        <p:txBody>
+          <a:bodyPr/>
+          <a:lstStyle/>
+          <a:p>
+            <a:r>
+              <a:rPr lang="de-CH" dirty="0"/>
+              <a:t>Date of planting: 20-23/6/2023</a:t>
+            </a:r>
+          </a:p>
+          <a:p>
+            <a:r>
+              <a:rPr lang="de-CH" dirty="0"/>
+              <a:t>Budset period: 11/9/2023 – 17/5/2024</a:t>
+            </a:r>
+          </a:p>
+          <a:p>
+            <a:r>
+              <a:rPr lang="de-CH" dirty="0"/>
+              <a:t>Budburst period: 2/2/2024 – 22/5/2024</a:t>
+            </a:r>
+          </a:p>
+          <a:p>
+            <a:endParaRPr lang="de-CH" dirty="0"/>
+          </a:p>
+          <a:p>
+            <a:r>
+              <a:rPr lang="de-CH" u="sng" dirty="0"/>
+              <a:t>Sample sizes:</a:t>
+            </a:r>
+          </a:p>
+          <a:p>
+            <a:pPr lvl="1"/>
+            <a:r>
+              <a:rPr lang="de-CH" sz="2200" dirty="0"/>
+              <a:t>Budset: 549 trees</a:t>
+            </a:r>
+          </a:p>
+          <a:p>
+            <a:pPr lvl="1"/>
+            <a:r>
+              <a:rPr lang="de-CH" sz="2200" dirty="0"/>
+              <a:t>Budburst: 575 trees</a:t>
+            </a:r>
+          </a:p>
+          <a:p>
+            <a:pPr lvl="2"/>
+            <a:r>
+              <a:rPr lang="de-CH" sz="2000" dirty="0"/>
+              <a:t>(Maybe 26 didn’t have noticeable buds?)</a:t>
+            </a:r>
+          </a:p>
+          <a:p>
+            <a:pPr lvl="1"/>
+            <a:r>
+              <a:rPr lang="de-CH" sz="2200" dirty="0"/>
+              <a:t>Budset &amp; Budburst: 529 trees have data (~85%)</a:t>
+            </a:r>
+          </a:p>
+          <a:p>
+            <a:endParaRPr lang="de-CH" dirty="0"/>
+          </a:p>
+          <a:p>
+            <a:endParaRPr lang="de-CH" dirty="0"/>
+          </a:p>
+          <a:p>
+            <a:endParaRPr lang="en-GB" dirty="0"/>
+          </a:p>
+        </p:txBody>
+      </p:sp>
+    </p:spTree>
+    <p:extLst>
+      <p:ext uri="{BB962C8B-B14F-4D97-AF65-F5344CB8AC3E}">
+        <p14:creationId xmlns:p14="http://schemas.microsoft.com/office/powerpoint/2010/main" val="536145808"/>
+      </p:ext>
+    </p:extLst>
+  </p:cSld>
+  <p:clrMapOvr>
+    <a:masterClrMapping/>
+  </p:clrMapOvr>
+</p:sld>
+</file>
+
+<file path=ppt/slides/slide17.xml><?xml version="1.0" encoding="utf-8"?>
+<p:sld xmlns:a="http://schemas.openxmlformats.org/drawingml/2006/main" xmlns:r="http://schemas.openxmlformats.org/officeDocument/2006/relationships" xmlns:p="http://schemas.openxmlformats.org/presentationml/2006/main">
+  <p:cSld>
+    <p:spTree>
+      <p:nvGrpSpPr>
+        <p:cNvPr id="1" name=""/>
+        <p:cNvGrpSpPr/>
+        <p:nvPr/>
+      </p:nvGrpSpPr>
+      <p:grpSpPr>
+        <a:xfrm>
+          <a:off x="0" y="0"/>
+          <a:ext cx="0" cy="0"/>
+          <a:chOff x="0" y="0"/>
+          <a:chExt cx="0" cy="0"/>
+        </a:xfrm>
+      </p:grpSpPr>
+      <p:sp>
+        <p:nvSpPr>
+          <p:cNvPr id="2" name="Title 1">
+            <a:extLst>
+              <a:ext uri="{FF2B5EF4-FFF2-40B4-BE49-F238E27FC236}">
                 <a16:creationId xmlns:a16="http://schemas.microsoft.com/office/drawing/2014/main" id="{32D9D9BF-2B66-09AD-138F-36386DDD5CDD}"/>
               </a:ext>
             </a:extLst>
@@ -6924,7 +7207,7 @@
 </p:sld>
 </file>
 
-<file path=ppt/slides/slide17.xml><?xml version="1.0" encoding="utf-8"?>
+<file path=ppt/slides/slide18.xml><?xml version="1.0" encoding="utf-8"?>
 <p:sld xmlns:a="http://schemas.openxmlformats.org/drawingml/2006/main" xmlns:r="http://schemas.openxmlformats.org/officeDocument/2006/relationships" xmlns:p="http://schemas.openxmlformats.org/presentationml/2006/main">
   <p:cSld>
     <p:spTree>
@@ -7067,289 +7350,6 @@
 </p:sld>
 </file>
 
-<file path=ppt/slides/slide18.xml><?xml version="1.0" encoding="utf-8"?>
-<p:sld xmlns:a="http://schemas.openxmlformats.org/drawingml/2006/main" xmlns:r="http://schemas.openxmlformats.org/officeDocument/2006/relationships" xmlns:p="http://schemas.openxmlformats.org/presentationml/2006/main">
-  <p:cSld>
-    <p:spTree>
-      <p:nvGrpSpPr>
-        <p:cNvPr id="1" name=""/>
-        <p:cNvGrpSpPr/>
-        <p:nvPr/>
-      </p:nvGrpSpPr>
-      <p:grpSpPr>
-        <a:xfrm>
-          <a:off x="0" y="0"/>
-          <a:ext cx="0" cy="0"/>
-          <a:chOff x="0" y="0"/>
-          <a:chExt cx="0" cy="0"/>
-        </a:xfrm>
-      </p:grpSpPr>
-      <p:sp>
-        <p:nvSpPr>
-          <p:cNvPr id="2" name="Title 1">
-            <a:extLst>
-              <a:ext uri="{FF2B5EF4-FFF2-40B4-BE49-F238E27FC236}">
-                <a16:creationId xmlns:a16="http://schemas.microsoft.com/office/drawing/2014/main" id="{331E21EA-EC58-E43B-46B6-72D5584F9856}"/>
-              </a:ext>
-            </a:extLst>
-          </p:cNvPr>
-          <p:cNvSpPr>
-            <a:spLocks noGrp="1"/>
-          </p:cNvSpPr>
-          <p:nvPr>
-            <p:ph type="title"/>
-          </p:nvPr>
-        </p:nvSpPr>
-        <p:spPr>
-          <a:xfrm>
-            <a:off x="238225" y="243840"/>
-            <a:ext cx="9875520" cy="1356360"/>
-          </a:xfrm>
-        </p:spPr>
-        <p:txBody>
-          <a:bodyPr/>
-          <a:lstStyle/>
-          <a:p>
-            <a:r>
-              <a:rPr lang="de-CH" dirty="0"/>
-              <a:t>Budset – by Type</a:t>
-            </a:r>
-            <a:endParaRPr lang="en-GB" dirty="0"/>
-          </a:p>
-        </p:txBody>
-      </p:sp>
-      <p:pic>
-        <p:nvPicPr>
-          <p:cNvPr id="9" name="Content Placeholder 8">
-            <a:extLst>
-              <a:ext uri="{FF2B5EF4-FFF2-40B4-BE49-F238E27FC236}">
-                <a16:creationId xmlns:a16="http://schemas.microsoft.com/office/drawing/2014/main" id="{FA0D3437-97B6-1053-8FD3-9E66A7F8235A}"/>
-              </a:ext>
-            </a:extLst>
-          </p:cNvPr>
-          <p:cNvPicPr>
-            <a:picLocks noGrp="1" noChangeAspect="1"/>
-          </p:cNvPicPr>
-          <p:nvPr>
-            <p:ph idx="1"/>
-          </p:nvPr>
-        </p:nvPicPr>
-        <p:blipFill>
-          <a:blip r:embed="rId2">
-            <a:extLst>
-              <a:ext uri="{28A0092B-C50C-407E-A947-70E740481C1C}">
-                <a14:useLocalDpi xmlns:a14="http://schemas.microsoft.com/office/drawing/2010/main" val="0"/>
-              </a:ext>
-            </a:extLst>
-          </a:blip>
-          <a:stretch>
-            <a:fillRect/>
-          </a:stretch>
-        </p:blipFill>
-        <p:spPr>
-          <a:xfrm>
-            <a:off x="835942" y="1294689"/>
-            <a:ext cx="10520115" cy="5319471"/>
-          </a:xfrm>
-        </p:spPr>
-      </p:pic>
-      <p:cxnSp>
-        <p:nvCxnSpPr>
-          <p:cNvPr id="10" name="Straight Connector 9">
-            <a:extLst>
-              <a:ext uri="{FF2B5EF4-FFF2-40B4-BE49-F238E27FC236}">
-                <a16:creationId xmlns:a16="http://schemas.microsoft.com/office/drawing/2014/main" id="{21E77FB2-79EE-9075-C06A-8515F77F5B87}"/>
-              </a:ext>
-            </a:extLst>
-          </p:cNvPr>
-          <p:cNvCxnSpPr>
-            <a:cxnSpLocks/>
-          </p:cNvCxnSpPr>
-          <p:nvPr/>
-        </p:nvCxnSpPr>
-        <p:spPr>
-          <a:xfrm flipV="1">
-            <a:off x="3254326" y="1708729"/>
-            <a:ext cx="3062500" cy="2986"/>
-          </a:xfrm>
-          <a:prstGeom prst="line">
-            <a:avLst/>
-          </a:prstGeom>
-          <a:ln>
-            <a:solidFill>
-              <a:schemeClr val="accent6">
-                <a:lumMod val="75000"/>
-              </a:schemeClr>
-            </a:solidFill>
-          </a:ln>
-        </p:spPr>
-        <p:style>
-          <a:lnRef idx="2">
-            <a:schemeClr val="accent1"/>
-          </a:lnRef>
-          <a:fillRef idx="0">
-            <a:schemeClr val="accent1"/>
-          </a:fillRef>
-          <a:effectRef idx="1">
-            <a:schemeClr val="accent1"/>
-          </a:effectRef>
-          <a:fontRef idx="minor">
-            <a:schemeClr val="tx1"/>
-          </a:fontRef>
-        </p:style>
-      </p:cxnSp>
-      <p:sp>
-        <p:nvSpPr>
-          <p:cNvPr id="11" name="TextBox 10">
-            <a:extLst>
-              <a:ext uri="{FF2B5EF4-FFF2-40B4-BE49-F238E27FC236}">
-                <a16:creationId xmlns:a16="http://schemas.microsoft.com/office/drawing/2014/main" id="{3E6EA98B-C626-6AC0-4F03-A613577D5935}"/>
-              </a:ext>
-            </a:extLst>
-          </p:cNvPr>
-          <p:cNvSpPr txBox="1"/>
-          <p:nvPr/>
-        </p:nvSpPr>
-        <p:spPr>
-          <a:xfrm>
-            <a:off x="4470416" y="1403218"/>
-            <a:ext cx="679347" cy="364074"/>
-          </a:xfrm>
-          <a:prstGeom prst="rect">
-            <a:avLst/>
-          </a:prstGeom>
-          <a:noFill/>
-          <a:ln>
-            <a:noFill/>
-          </a:ln>
-        </p:spPr>
-        <p:txBody>
-          <a:bodyPr wrap="square" rtlCol="0">
-            <a:spAutoFit/>
-          </a:bodyPr>
-          <a:lstStyle/>
-          <a:p>
-            <a:pPr algn="ctr"/>
-            <a:r>
-              <a:rPr lang="en-GB" sz="1766" b="1" dirty="0">
-                <a:solidFill>
-                  <a:schemeClr val="accent6">
-                    <a:lumMod val="75000"/>
-                  </a:schemeClr>
-                </a:solidFill>
-                <a:latin typeface="Helvetica" panose="020B0604020202020204"/>
-                <a:cs typeface="Helvetica" panose="020B0604020202020204"/>
-              </a:rPr>
-              <a:t>*</a:t>
-            </a:r>
-          </a:p>
-        </p:txBody>
-      </p:sp>
-      <p:cxnSp>
-        <p:nvCxnSpPr>
-          <p:cNvPr id="13" name="Straight Connector 12">
-            <a:extLst>
-              <a:ext uri="{FF2B5EF4-FFF2-40B4-BE49-F238E27FC236}">
-                <a16:creationId xmlns:a16="http://schemas.microsoft.com/office/drawing/2014/main" id="{87C6D792-97FC-FD07-3960-989C62EBBECF}"/>
-              </a:ext>
-            </a:extLst>
-          </p:cNvPr>
-          <p:cNvCxnSpPr>
-            <a:cxnSpLocks/>
-          </p:cNvCxnSpPr>
-          <p:nvPr/>
-        </p:nvCxnSpPr>
-        <p:spPr>
-          <a:xfrm>
-            <a:off x="3254326" y="1390375"/>
-            <a:ext cx="6027081" cy="0"/>
-          </a:xfrm>
-          <a:prstGeom prst="line">
-            <a:avLst/>
-          </a:prstGeom>
-          <a:ln>
-            <a:solidFill>
-              <a:schemeClr val="accent6">
-                <a:lumMod val="75000"/>
-              </a:schemeClr>
-            </a:solidFill>
-          </a:ln>
-        </p:spPr>
-        <p:style>
-          <a:lnRef idx="2">
-            <a:schemeClr val="accent1"/>
-          </a:lnRef>
-          <a:fillRef idx="0">
-            <a:schemeClr val="accent1"/>
-          </a:fillRef>
-          <a:effectRef idx="1">
-            <a:schemeClr val="accent1"/>
-          </a:effectRef>
-          <a:fontRef idx="minor">
-            <a:schemeClr val="tx1"/>
-          </a:fontRef>
-        </p:style>
-      </p:cxnSp>
-      <p:sp>
-        <p:nvSpPr>
-          <p:cNvPr id="14" name="TextBox 13">
-            <a:extLst>
-              <a:ext uri="{FF2B5EF4-FFF2-40B4-BE49-F238E27FC236}">
-                <a16:creationId xmlns:a16="http://schemas.microsoft.com/office/drawing/2014/main" id="{392A4E8F-20B8-D1CF-298E-3001E437C6C5}"/>
-              </a:ext>
-            </a:extLst>
-          </p:cNvPr>
-          <p:cNvSpPr txBox="1"/>
-          <p:nvPr/>
-        </p:nvSpPr>
-        <p:spPr>
-          <a:xfrm>
-            <a:off x="5977152" y="1081878"/>
-            <a:ext cx="679347" cy="364074"/>
-          </a:xfrm>
-          <a:prstGeom prst="rect">
-            <a:avLst/>
-          </a:prstGeom>
-          <a:noFill/>
-          <a:ln>
-            <a:noFill/>
-          </a:ln>
-        </p:spPr>
-        <p:txBody>
-          <a:bodyPr wrap="square" rtlCol="0">
-            <a:spAutoFit/>
-          </a:bodyPr>
-          <a:lstStyle/>
-          <a:p>
-            <a:pPr algn="ctr"/>
-            <a:r>
-              <a:rPr lang="en-GB" sz="1766" b="1" dirty="0">
-                <a:solidFill>
-                  <a:schemeClr val="accent6">
-                    <a:lumMod val="75000"/>
-                  </a:schemeClr>
-                </a:solidFill>
-                <a:latin typeface="Helvetica" panose="020B0604020202020204"/>
-                <a:cs typeface="Helvetica" panose="020B0604020202020204"/>
-              </a:rPr>
-              <a:t>*</a:t>
-            </a:r>
-          </a:p>
-        </p:txBody>
-      </p:sp>
-    </p:spTree>
-    <p:extLst>
-      <p:ext uri="{BB962C8B-B14F-4D97-AF65-F5344CB8AC3E}">
-        <p14:creationId xmlns:p14="http://schemas.microsoft.com/office/powerpoint/2010/main" val="4221340399"/>
-      </p:ext>
-    </p:extLst>
-  </p:cSld>
-  <p:clrMapOvr>
-    <a:masterClrMapping/>
-  </p:clrMapOvr>
-</p:sld>
-</file>
-
 <file path=ppt/slides/slide19.xml><?xml version="1.0" encoding="utf-8"?>
 <p:sld xmlns:a="http://schemas.openxmlformats.org/drawingml/2006/main" xmlns:r="http://schemas.openxmlformats.org/officeDocument/2006/relationships" xmlns:p="http://schemas.openxmlformats.org/presentationml/2006/main">
   <p:cSld>
@@ -7372,7 +7372,7 @@
           <p:cNvPr id="2" name="Title 1">
             <a:extLst>
               <a:ext uri="{FF2B5EF4-FFF2-40B4-BE49-F238E27FC236}">
-                <a16:creationId xmlns:a16="http://schemas.microsoft.com/office/drawing/2014/main" id="{B4D941A4-7800-BF6D-3047-19A2F1FFE400}"/>
+                <a16:creationId xmlns:a16="http://schemas.microsoft.com/office/drawing/2014/main" id="{331E21EA-EC58-E43B-46B6-72D5584F9856}"/>
               </a:ext>
             </a:extLst>
           </p:cNvPr>
@@ -7385,7 +7385,7 @@
         </p:nvSpPr>
         <p:spPr>
           <a:xfrm>
-            <a:off x="238760" y="178812"/>
+            <a:off x="238225" y="243840"/>
             <a:ext cx="9875520" cy="1356360"/>
           </a:xfrm>
         </p:spPr>
@@ -7395,7 +7395,7 @@
           <a:p>
             <a:r>
               <a:rPr lang="de-CH" dirty="0"/>
-              <a:t>Budset by Type</a:t>
+              <a:t>Budset – by Type</a:t>
             </a:r>
             <a:endParaRPr lang="en-GB" dirty="0"/>
           </a:p>
@@ -7406,7 +7406,7 @@
           <p:cNvPr id="9" name="Content Placeholder 8">
             <a:extLst>
               <a:ext uri="{FF2B5EF4-FFF2-40B4-BE49-F238E27FC236}">
-                <a16:creationId xmlns:a16="http://schemas.microsoft.com/office/drawing/2014/main" id="{270947E2-94D3-B544-4587-E9882F4D2BAA}"/>
+                <a16:creationId xmlns:a16="http://schemas.microsoft.com/office/drawing/2014/main" id="{FA0D3437-97B6-1053-8FD3-9E66A7F8235A}"/>
               </a:ext>
             </a:extLst>
           </p:cNvPr>
@@ -7431,48 +7431,49 @@
         </p:blipFill>
         <p:spPr>
           <a:xfrm>
-            <a:off x="1053049" y="1535171"/>
-            <a:ext cx="9958252" cy="5035367"/>
+            <a:off x="835942" y="1294689"/>
+            <a:ext cx="10520115" cy="5319471"/>
           </a:xfrm>
         </p:spPr>
       </p:pic>
       <p:cxnSp>
         <p:nvCxnSpPr>
-          <p:cNvPr id="4" name="Straight Arrow Connector 3">
+          <p:cNvPr id="10" name="Straight Connector 9">
             <a:extLst>
               <a:ext uri="{FF2B5EF4-FFF2-40B4-BE49-F238E27FC236}">
-                <a16:creationId xmlns:a16="http://schemas.microsoft.com/office/drawing/2014/main" id="{8E594E9A-0DC9-656A-15F4-E36D519C6094}"/>
+                <a16:creationId xmlns:a16="http://schemas.microsoft.com/office/drawing/2014/main" id="{21E77FB2-79EE-9075-C06A-8515F77F5B87}"/>
               </a:ext>
             </a:extLst>
           </p:cNvPr>
-          <p:cNvCxnSpPr/>
+          <p:cNvCxnSpPr>
+            <a:cxnSpLocks/>
+          </p:cNvCxnSpPr>
           <p:nvPr/>
         </p:nvCxnSpPr>
         <p:spPr>
-          <a:xfrm>
-            <a:off x="7007192" y="2675823"/>
-            <a:ext cx="0" cy="1232034"/>
-          </a:xfrm>
-          <a:prstGeom prst="straightConnector1">
+          <a:xfrm flipV="1">
+            <a:off x="3254326" y="1708729"/>
+            <a:ext cx="3062500" cy="2986"/>
+          </a:xfrm>
+          <a:prstGeom prst="line">
             <a:avLst/>
           </a:prstGeom>
-          <a:ln w="19050">
+          <a:ln>
             <a:solidFill>
-              <a:schemeClr val="bg2">
-                <a:lumMod val="25000"/>
+              <a:schemeClr val="accent6">
+                <a:lumMod val="75000"/>
               </a:schemeClr>
             </a:solidFill>
-            <a:tailEnd type="triangle" w="lg" len="med"/>
           </a:ln>
         </p:spPr>
         <p:style>
-          <a:lnRef idx="1">
+          <a:lnRef idx="2">
             <a:schemeClr val="accent1"/>
           </a:lnRef>
           <a:fillRef idx="0">
             <a:schemeClr val="accent1"/>
           </a:fillRef>
-          <a:effectRef idx="0">
+          <a:effectRef idx="1">
             <a:schemeClr val="accent1"/>
           </a:effectRef>
           <a:fontRef idx="minor">
@@ -7480,10 +7481,149 @@
           </a:fontRef>
         </p:style>
       </p:cxnSp>
+      <p:sp>
+        <p:nvSpPr>
+          <p:cNvPr id="11" name="TextBox 10">
+            <a:extLst>
+              <a:ext uri="{FF2B5EF4-FFF2-40B4-BE49-F238E27FC236}">
+                <a16:creationId xmlns:a16="http://schemas.microsoft.com/office/drawing/2014/main" id="{3E6EA98B-C626-6AC0-4F03-A613577D5935}"/>
+              </a:ext>
+            </a:extLst>
+          </p:cNvPr>
+          <p:cNvSpPr txBox="1"/>
+          <p:nvPr/>
+        </p:nvSpPr>
+        <p:spPr>
+          <a:xfrm>
+            <a:off x="4470416" y="1403218"/>
+            <a:ext cx="679347" cy="364074"/>
+          </a:xfrm>
+          <a:prstGeom prst="rect">
+            <a:avLst/>
+          </a:prstGeom>
+          <a:noFill/>
+          <a:ln>
+            <a:noFill/>
+          </a:ln>
+        </p:spPr>
+        <p:txBody>
+          <a:bodyPr wrap="square" rtlCol="0">
+            <a:spAutoFit/>
+          </a:bodyPr>
+          <a:lstStyle/>
+          <a:p>
+            <a:pPr algn="ctr"/>
+            <a:r>
+              <a:rPr lang="en-GB" sz="1766" b="1" dirty="0">
+                <a:solidFill>
+                  <a:schemeClr val="accent6">
+                    <a:lumMod val="75000"/>
+                  </a:schemeClr>
+                </a:solidFill>
+                <a:latin typeface="Helvetica" panose="020B0604020202020204"/>
+                <a:cs typeface="Helvetica" panose="020B0604020202020204"/>
+              </a:rPr>
+              <a:t>*</a:t>
+            </a:r>
+          </a:p>
+        </p:txBody>
+      </p:sp>
+      <p:cxnSp>
+        <p:nvCxnSpPr>
+          <p:cNvPr id="13" name="Straight Connector 12">
+            <a:extLst>
+              <a:ext uri="{FF2B5EF4-FFF2-40B4-BE49-F238E27FC236}">
+                <a16:creationId xmlns:a16="http://schemas.microsoft.com/office/drawing/2014/main" id="{87C6D792-97FC-FD07-3960-989C62EBBECF}"/>
+              </a:ext>
+            </a:extLst>
+          </p:cNvPr>
+          <p:cNvCxnSpPr>
+            <a:cxnSpLocks/>
+          </p:cNvCxnSpPr>
+          <p:nvPr/>
+        </p:nvCxnSpPr>
+        <p:spPr>
+          <a:xfrm>
+            <a:off x="3254326" y="1390375"/>
+            <a:ext cx="6027081" cy="0"/>
+          </a:xfrm>
+          <a:prstGeom prst="line">
+            <a:avLst/>
+          </a:prstGeom>
+          <a:ln>
+            <a:solidFill>
+              <a:schemeClr val="accent6">
+                <a:lumMod val="75000"/>
+              </a:schemeClr>
+            </a:solidFill>
+          </a:ln>
+        </p:spPr>
+        <p:style>
+          <a:lnRef idx="2">
+            <a:schemeClr val="accent1"/>
+          </a:lnRef>
+          <a:fillRef idx="0">
+            <a:schemeClr val="accent1"/>
+          </a:fillRef>
+          <a:effectRef idx="1">
+            <a:schemeClr val="accent1"/>
+          </a:effectRef>
+          <a:fontRef idx="minor">
+            <a:schemeClr val="tx1"/>
+          </a:fontRef>
+        </p:style>
+      </p:cxnSp>
+      <p:sp>
+        <p:nvSpPr>
+          <p:cNvPr id="14" name="TextBox 13">
+            <a:extLst>
+              <a:ext uri="{FF2B5EF4-FFF2-40B4-BE49-F238E27FC236}">
+                <a16:creationId xmlns:a16="http://schemas.microsoft.com/office/drawing/2014/main" id="{392A4E8F-20B8-D1CF-298E-3001E437C6C5}"/>
+              </a:ext>
+            </a:extLst>
+          </p:cNvPr>
+          <p:cNvSpPr txBox="1"/>
+          <p:nvPr/>
+        </p:nvSpPr>
+        <p:spPr>
+          <a:xfrm>
+            <a:off x="5977152" y="1081878"/>
+            <a:ext cx="679347" cy="364074"/>
+          </a:xfrm>
+          <a:prstGeom prst="rect">
+            <a:avLst/>
+          </a:prstGeom>
+          <a:noFill/>
+          <a:ln>
+            <a:noFill/>
+          </a:ln>
+        </p:spPr>
+        <p:txBody>
+          <a:bodyPr wrap="square" rtlCol="0">
+            <a:spAutoFit/>
+          </a:bodyPr>
+          <a:lstStyle/>
+          <a:p>
+            <a:pPr algn="ctr"/>
+            <a:r>
+              <a:rPr lang="en-GB" sz="1766" b="1" dirty="0">
+                <a:solidFill>
+                  <a:schemeClr val="accent6">
+                    <a:lumMod val="75000"/>
+                  </a:schemeClr>
+                </a:solidFill>
+                <a:latin typeface="Helvetica" panose="020B0604020202020204"/>
+                <a:cs typeface="Helvetica" panose="020B0604020202020204"/>
+              </a:rPr>
+              <a:t>*</a:t>
+            </a:r>
+          </a:p>
+        </p:txBody>
+      </p:sp>
     </p:spTree>
     <p:extLst>
       <p:ext uri="{BB962C8B-B14F-4D97-AF65-F5344CB8AC3E}">
-        <p14:creationId xmlns:p14="http://schemas.microsoft.com/office/powerpoint/2010/main" val="366536072"/>
+        <p14:creationId xmlns:p14="http://schemas.microsoft.com/office/powerpoint/2010/main" val="4221340399"/>
       </p:ext>
     </p:extLst>
   </p:cSld>
@@ -7728,7 +7868,7 @@
           <p:cNvPr id="2" name="Title 1">
             <a:extLst>
               <a:ext uri="{FF2B5EF4-FFF2-40B4-BE49-F238E27FC236}">
-                <a16:creationId xmlns:a16="http://schemas.microsoft.com/office/drawing/2014/main" id="{E5EB79DC-5387-676F-0683-1D49454F40B3}"/>
+                <a16:creationId xmlns:a16="http://schemas.microsoft.com/office/drawing/2014/main" id="{B4D941A4-7800-BF6D-3047-19A2F1FFE400}"/>
               </a:ext>
             </a:extLst>
           </p:cNvPr>
@@ -7741,7 +7881,7 @@
         </p:nvSpPr>
         <p:spPr>
           <a:xfrm>
-            <a:off x="218974" y="176490"/>
+            <a:off x="238760" y="178812"/>
             <a:ext cx="9875520" cy="1356360"/>
           </a:xfrm>
         </p:spPr>
@@ -7751,54 +7891,18 @@
           <a:p>
             <a:r>
               <a:rPr lang="de-CH" dirty="0"/>
-              <a:t>Budburst – by Provenance</a:t>
+              <a:t>Budset by Type</a:t>
             </a:r>
             <a:endParaRPr lang="en-GB" dirty="0"/>
-          </a:p>
-        </p:txBody>
-      </p:sp>
-      <p:sp>
-        <p:nvSpPr>
-          <p:cNvPr id="4" name="TextBox 3">
-            <a:extLst>
-              <a:ext uri="{FF2B5EF4-FFF2-40B4-BE49-F238E27FC236}">
-                <a16:creationId xmlns:a16="http://schemas.microsoft.com/office/drawing/2014/main" id="{1F23F0DC-52E1-09BD-080C-AFC35699FB60}"/>
-              </a:ext>
-            </a:extLst>
-          </p:cNvPr>
-          <p:cNvSpPr txBox="1"/>
-          <p:nvPr/>
-        </p:nvSpPr>
-        <p:spPr>
-          <a:xfrm>
-            <a:off x="9630612" y="670004"/>
-            <a:ext cx="2131350" cy="369332"/>
-          </a:xfrm>
-          <a:prstGeom prst="rect">
-            <a:avLst/>
-          </a:prstGeom>
-          <a:noFill/>
-        </p:spPr>
-        <p:txBody>
-          <a:bodyPr wrap="square">
-            <a:spAutoFit/>
-          </a:bodyPr>
-          <a:lstStyle/>
-          <a:p>
-            <a:pPr algn="ctr"/>
-            <a:r>
-              <a:rPr lang="en-GB" dirty="0"/>
-              <a:t>Day 0 = 01/02/2024</a:t>
-            </a:r>
           </a:p>
         </p:txBody>
       </p:sp>
       <p:pic>
         <p:nvPicPr>
-          <p:cNvPr id="11" name="Content Placeholder 10" descr="A graph of a diagram&#10;&#10;AI-generated content may be incorrect.">
+          <p:cNvPr id="9" name="Content Placeholder 8">
             <a:extLst>
               <a:ext uri="{FF2B5EF4-FFF2-40B4-BE49-F238E27FC236}">
-                <a16:creationId xmlns:a16="http://schemas.microsoft.com/office/drawing/2014/main" id="{44A0C449-8F18-850D-9203-E214A67FEAD7}"/>
+                <a16:creationId xmlns:a16="http://schemas.microsoft.com/office/drawing/2014/main" id="{270947E2-94D3-B544-4587-E9882F4D2BAA}"/>
               </a:ext>
             </a:extLst>
           </p:cNvPr>
@@ -7823,49 +7927,48 @@
         </p:blipFill>
         <p:spPr>
           <a:xfrm>
-            <a:off x="348758" y="1685992"/>
-            <a:ext cx="9517795" cy="4812650"/>
+            <a:off x="1053049" y="1535171"/>
+            <a:ext cx="9958252" cy="5035367"/>
           </a:xfrm>
         </p:spPr>
       </p:pic>
       <p:cxnSp>
         <p:nvCxnSpPr>
-          <p:cNvPr id="12" name="Straight Connector 11">
+          <p:cNvPr id="4" name="Straight Arrow Connector 3">
             <a:extLst>
               <a:ext uri="{FF2B5EF4-FFF2-40B4-BE49-F238E27FC236}">
-                <a16:creationId xmlns:a16="http://schemas.microsoft.com/office/drawing/2014/main" id="{5982C0FB-D28F-93CA-4DE9-0A62C347B1DA}"/>
+                <a16:creationId xmlns:a16="http://schemas.microsoft.com/office/drawing/2014/main" id="{8E594E9A-0DC9-656A-15F4-E36D519C6094}"/>
               </a:ext>
             </a:extLst>
           </p:cNvPr>
-          <p:cNvCxnSpPr>
-            <a:cxnSpLocks/>
-          </p:cNvCxnSpPr>
+          <p:cNvCxnSpPr/>
           <p:nvPr/>
         </p:nvCxnSpPr>
         <p:spPr>
-          <a:xfrm flipV="1">
-            <a:off x="2325447" y="1732324"/>
-            <a:ext cx="3062500" cy="2986"/>
-          </a:xfrm>
-          <a:prstGeom prst="line">
+          <a:xfrm>
+            <a:off x="7007192" y="2675823"/>
+            <a:ext cx="0" cy="1232034"/>
+          </a:xfrm>
+          <a:prstGeom prst="straightConnector1">
             <a:avLst/>
           </a:prstGeom>
-          <a:ln>
+          <a:ln w="19050">
             <a:solidFill>
-              <a:schemeClr val="accent6">
-                <a:lumMod val="75000"/>
+              <a:schemeClr val="bg2">
+                <a:lumMod val="25000"/>
               </a:schemeClr>
             </a:solidFill>
+            <a:tailEnd type="triangle" w="lg" len="med"/>
           </a:ln>
         </p:spPr>
         <p:style>
-          <a:lnRef idx="2">
+          <a:lnRef idx="1">
             <a:schemeClr val="accent1"/>
           </a:lnRef>
           <a:fillRef idx="0">
             <a:schemeClr val="accent1"/>
           </a:fillRef>
-          <a:effectRef idx="1">
+          <a:effectRef idx="0">
             <a:schemeClr val="accent1"/>
           </a:effectRef>
           <a:fontRef idx="minor">
@@ -7873,149 +7976,10 @@
           </a:fontRef>
         </p:style>
       </p:cxnSp>
-      <p:sp>
-        <p:nvSpPr>
-          <p:cNvPr id="13" name="TextBox 12">
-            <a:extLst>
-              <a:ext uri="{FF2B5EF4-FFF2-40B4-BE49-F238E27FC236}">
-                <a16:creationId xmlns:a16="http://schemas.microsoft.com/office/drawing/2014/main" id="{57228138-E4A7-851D-FC56-2306BC16034C}"/>
-              </a:ext>
-            </a:extLst>
-          </p:cNvPr>
-          <p:cNvSpPr txBox="1"/>
-          <p:nvPr/>
-        </p:nvSpPr>
-        <p:spPr>
-          <a:xfrm>
-            <a:off x="3587257" y="1486311"/>
-            <a:ext cx="679347" cy="246221"/>
-          </a:xfrm>
-          <a:prstGeom prst="rect">
-            <a:avLst/>
-          </a:prstGeom>
-          <a:noFill/>
-          <a:ln>
-            <a:noFill/>
-          </a:ln>
-        </p:spPr>
-        <p:txBody>
-          <a:bodyPr wrap="square" rtlCol="0">
-            <a:spAutoFit/>
-          </a:bodyPr>
-          <a:lstStyle/>
-          <a:p>
-            <a:pPr algn="ctr"/>
-            <a:r>
-              <a:rPr lang="en-GB" sz="1000" dirty="0">
-                <a:solidFill>
-                  <a:schemeClr val="accent6">
-                    <a:lumMod val="75000"/>
-                  </a:schemeClr>
-                </a:solidFill>
-                <a:latin typeface="Helvetica" panose="020B0604020202020204"/>
-                <a:cs typeface="Helvetica" panose="020B0604020202020204"/>
-              </a:rPr>
-              <a:t>0.013</a:t>
-            </a:r>
-          </a:p>
-        </p:txBody>
-      </p:sp>
-      <p:cxnSp>
-        <p:nvCxnSpPr>
-          <p:cNvPr id="14" name="Straight Connector 13">
-            <a:extLst>
-              <a:ext uri="{FF2B5EF4-FFF2-40B4-BE49-F238E27FC236}">
-                <a16:creationId xmlns:a16="http://schemas.microsoft.com/office/drawing/2014/main" id="{10EC720A-2AF0-9C6D-6E05-3934CC044EA9}"/>
-              </a:ext>
-            </a:extLst>
-          </p:cNvPr>
-          <p:cNvCxnSpPr>
-            <a:cxnSpLocks/>
-          </p:cNvCxnSpPr>
-          <p:nvPr/>
-        </p:nvCxnSpPr>
-        <p:spPr>
-          <a:xfrm flipV="1">
-            <a:off x="5528414" y="1729338"/>
-            <a:ext cx="3062500" cy="2986"/>
-          </a:xfrm>
-          <a:prstGeom prst="line">
-            <a:avLst/>
-          </a:prstGeom>
-          <a:ln>
-            <a:solidFill>
-              <a:schemeClr val="accent6">
-                <a:lumMod val="75000"/>
-              </a:schemeClr>
-            </a:solidFill>
-          </a:ln>
-        </p:spPr>
-        <p:style>
-          <a:lnRef idx="2">
-            <a:schemeClr val="accent1"/>
-          </a:lnRef>
-          <a:fillRef idx="0">
-            <a:schemeClr val="accent1"/>
-          </a:fillRef>
-          <a:effectRef idx="1">
-            <a:schemeClr val="accent1"/>
-          </a:effectRef>
-          <a:fontRef idx="minor">
-            <a:schemeClr val="tx1"/>
-          </a:fontRef>
-        </p:style>
-      </p:cxnSp>
-      <p:sp>
-        <p:nvSpPr>
-          <p:cNvPr id="15" name="TextBox 14">
-            <a:extLst>
-              <a:ext uri="{FF2B5EF4-FFF2-40B4-BE49-F238E27FC236}">
-                <a16:creationId xmlns:a16="http://schemas.microsoft.com/office/drawing/2014/main" id="{0923EC24-A6E5-C849-B975-9601C8597CF3}"/>
-              </a:ext>
-            </a:extLst>
-          </p:cNvPr>
-          <p:cNvSpPr txBox="1"/>
-          <p:nvPr/>
-        </p:nvSpPr>
-        <p:spPr>
-          <a:xfrm>
-            <a:off x="6790224" y="1483325"/>
-            <a:ext cx="679347" cy="246221"/>
-          </a:xfrm>
-          <a:prstGeom prst="rect">
-            <a:avLst/>
-          </a:prstGeom>
-          <a:noFill/>
-          <a:ln>
-            <a:noFill/>
-          </a:ln>
-        </p:spPr>
-        <p:txBody>
-          <a:bodyPr wrap="square" rtlCol="0">
-            <a:spAutoFit/>
-          </a:bodyPr>
-          <a:lstStyle/>
-          <a:p>
-            <a:pPr algn="ctr"/>
-            <a:r>
-              <a:rPr lang="en-GB" sz="1000" dirty="0">
-                <a:solidFill>
-                  <a:schemeClr val="accent6">
-                    <a:lumMod val="75000"/>
-                  </a:schemeClr>
-                </a:solidFill>
-                <a:latin typeface="Helvetica" panose="020B0604020202020204"/>
-                <a:cs typeface="Helvetica" panose="020B0604020202020204"/>
-              </a:rPr>
-              <a:t>0.01</a:t>
-            </a:r>
-          </a:p>
-        </p:txBody>
-      </p:sp>
     </p:spTree>
     <p:extLst>
       <p:ext uri="{BB962C8B-B14F-4D97-AF65-F5344CB8AC3E}">
-        <p14:creationId xmlns:p14="http://schemas.microsoft.com/office/powerpoint/2010/main" val="1309389261"/>
+        <p14:creationId xmlns:p14="http://schemas.microsoft.com/office/powerpoint/2010/main" val="366536072"/>
       </p:ext>
     </p:extLst>
   </p:cSld>
@@ -8047,7 +8011,7 @@
           <p:cNvPr id="2" name="Title 1">
             <a:extLst>
               <a:ext uri="{FF2B5EF4-FFF2-40B4-BE49-F238E27FC236}">
-                <a16:creationId xmlns:a16="http://schemas.microsoft.com/office/drawing/2014/main" id="{971A7E35-F3A7-7E5B-ED8A-FA3BA661E53E}"/>
+                <a16:creationId xmlns:a16="http://schemas.microsoft.com/office/drawing/2014/main" id="{E5EB79DC-5387-676F-0683-1D49454F40B3}"/>
               </a:ext>
             </a:extLst>
           </p:cNvPr>
@@ -8060,7 +8024,7 @@
         </p:nvSpPr>
         <p:spPr>
           <a:xfrm>
-            <a:off x="238225" y="224589"/>
+            <a:off x="218974" y="176490"/>
             <a:ext cx="9875520" cy="1356360"/>
           </a:xfrm>
         </p:spPr>
@@ -8070,18 +8034,54 @@
           <a:p>
             <a:r>
               <a:rPr lang="de-CH" dirty="0"/>
-              <a:t>Burburst - by Provenance</a:t>
+              <a:t>Budburst – by Provenance</a:t>
             </a:r>
             <a:endParaRPr lang="en-GB" dirty="0"/>
+          </a:p>
+        </p:txBody>
+      </p:sp>
+      <p:sp>
+        <p:nvSpPr>
+          <p:cNvPr id="4" name="TextBox 3">
+            <a:extLst>
+              <a:ext uri="{FF2B5EF4-FFF2-40B4-BE49-F238E27FC236}">
+                <a16:creationId xmlns:a16="http://schemas.microsoft.com/office/drawing/2014/main" id="{1F23F0DC-52E1-09BD-080C-AFC35699FB60}"/>
+              </a:ext>
+            </a:extLst>
+          </p:cNvPr>
+          <p:cNvSpPr txBox="1"/>
+          <p:nvPr/>
+        </p:nvSpPr>
+        <p:spPr>
+          <a:xfrm>
+            <a:off x="9630612" y="670004"/>
+            <a:ext cx="2131350" cy="369332"/>
+          </a:xfrm>
+          <a:prstGeom prst="rect">
+            <a:avLst/>
+          </a:prstGeom>
+          <a:noFill/>
+        </p:spPr>
+        <p:txBody>
+          <a:bodyPr wrap="square">
+            <a:spAutoFit/>
+          </a:bodyPr>
+          <a:lstStyle/>
+          <a:p>
+            <a:pPr algn="ctr"/>
+            <a:r>
+              <a:rPr lang="en-GB" dirty="0"/>
+              <a:t>Day 0 = 01/02/2024</a:t>
+            </a:r>
           </a:p>
         </p:txBody>
       </p:sp>
       <p:pic>
         <p:nvPicPr>
-          <p:cNvPr id="5" name="Content Placeholder 4" descr="A graph of a graph&#10;&#10;AI-generated content may be incorrect.">
+          <p:cNvPr id="11" name="Content Placeholder 10" descr="A graph of a diagram&#10;&#10;AI-generated content may be incorrect.">
             <a:extLst>
               <a:ext uri="{FF2B5EF4-FFF2-40B4-BE49-F238E27FC236}">
-                <a16:creationId xmlns:a16="http://schemas.microsoft.com/office/drawing/2014/main" id="{2D2CC6DF-5B3C-EB76-C731-64BD8A77302C}"/>
+                <a16:creationId xmlns:a16="http://schemas.microsoft.com/office/drawing/2014/main" id="{44A0C449-8F18-850D-9203-E214A67FEAD7}"/>
               </a:ext>
             </a:extLst>
           </p:cNvPr>
@@ -8106,15 +8106,199 @@
         </p:blipFill>
         <p:spPr>
           <a:xfrm>
-            <a:off x="861762" y="1259840"/>
-            <a:ext cx="10468476" cy="5293360"/>
+            <a:off x="348758" y="1685992"/>
+            <a:ext cx="9517795" cy="4812650"/>
           </a:xfrm>
         </p:spPr>
       </p:pic>
+      <p:cxnSp>
+        <p:nvCxnSpPr>
+          <p:cNvPr id="12" name="Straight Connector 11">
+            <a:extLst>
+              <a:ext uri="{FF2B5EF4-FFF2-40B4-BE49-F238E27FC236}">
+                <a16:creationId xmlns:a16="http://schemas.microsoft.com/office/drawing/2014/main" id="{5982C0FB-D28F-93CA-4DE9-0A62C347B1DA}"/>
+              </a:ext>
+            </a:extLst>
+          </p:cNvPr>
+          <p:cNvCxnSpPr>
+            <a:cxnSpLocks/>
+          </p:cNvCxnSpPr>
+          <p:nvPr/>
+        </p:nvCxnSpPr>
+        <p:spPr>
+          <a:xfrm flipV="1">
+            <a:off x="2325447" y="1732324"/>
+            <a:ext cx="3062500" cy="2986"/>
+          </a:xfrm>
+          <a:prstGeom prst="line">
+            <a:avLst/>
+          </a:prstGeom>
+          <a:ln>
+            <a:solidFill>
+              <a:schemeClr val="accent6">
+                <a:lumMod val="75000"/>
+              </a:schemeClr>
+            </a:solidFill>
+          </a:ln>
+        </p:spPr>
+        <p:style>
+          <a:lnRef idx="2">
+            <a:schemeClr val="accent1"/>
+          </a:lnRef>
+          <a:fillRef idx="0">
+            <a:schemeClr val="accent1"/>
+          </a:fillRef>
+          <a:effectRef idx="1">
+            <a:schemeClr val="accent1"/>
+          </a:effectRef>
+          <a:fontRef idx="minor">
+            <a:schemeClr val="tx1"/>
+          </a:fontRef>
+        </p:style>
+      </p:cxnSp>
+      <p:sp>
+        <p:nvSpPr>
+          <p:cNvPr id="13" name="TextBox 12">
+            <a:extLst>
+              <a:ext uri="{FF2B5EF4-FFF2-40B4-BE49-F238E27FC236}">
+                <a16:creationId xmlns:a16="http://schemas.microsoft.com/office/drawing/2014/main" id="{57228138-E4A7-851D-FC56-2306BC16034C}"/>
+              </a:ext>
+            </a:extLst>
+          </p:cNvPr>
+          <p:cNvSpPr txBox="1"/>
+          <p:nvPr/>
+        </p:nvSpPr>
+        <p:spPr>
+          <a:xfrm>
+            <a:off x="3587257" y="1486311"/>
+            <a:ext cx="679347" cy="246221"/>
+          </a:xfrm>
+          <a:prstGeom prst="rect">
+            <a:avLst/>
+          </a:prstGeom>
+          <a:noFill/>
+          <a:ln>
+            <a:noFill/>
+          </a:ln>
+        </p:spPr>
+        <p:txBody>
+          <a:bodyPr wrap="square" rtlCol="0">
+            <a:spAutoFit/>
+          </a:bodyPr>
+          <a:lstStyle/>
+          <a:p>
+            <a:pPr algn="ctr"/>
+            <a:r>
+              <a:rPr lang="en-GB" sz="1000" dirty="0">
+                <a:solidFill>
+                  <a:schemeClr val="accent6">
+                    <a:lumMod val="75000"/>
+                  </a:schemeClr>
+                </a:solidFill>
+                <a:latin typeface="Helvetica" panose="020B0604020202020204"/>
+                <a:cs typeface="Helvetica" panose="020B0604020202020204"/>
+              </a:rPr>
+              <a:t>0.013</a:t>
+            </a:r>
+          </a:p>
+        </p:txBody>
+      </p:sp>
+      <p:cxnSp>
+        <p:nvCxnSpPr>
+          <p:cNvPr id="14" name="Straight Connector 13">
+            <a:extLst>
+              <a:ext uri="{FF2B5EF4-FFF2-40B4-BE49-F238E27FC236}">
+                <a16:creationId xmlns:a16="http://schemas.microsoft.com/office/drawing/2014/main" id="{10EC720A-2AF0-9C6D-6E05-3934CC044EA9}"/>
+              </a:ext>
+            </a:extLst>
+          </p:cNvPr>
+          <p:cNvCxnSpPr>
+            <a:cxnSpLocks/>
+          </p:cNvCxnSpPr>
+          <p:nvPr/>
+        </p:nvCxnSpPr>
+        <p:spPr>
+          <a:xfrm flipV="1">
+            <a:off x="5528414" y="1729338"/>
+            <a:ext cx="3062500" cy="2986"/>
+          </a:xfrm>
+          <a:prstGeom prst="line">
+            <a:avLst/>
+          </a:prstGeom>
+          <a:ln>
+            <a:solidFill>
+              <a:schemeClr val="accent6">
+                <a:lumMod val="75000"/>
+              </a:schemeClr>
+            </a:solidFill>
+          </a:ln>
+        </p:spPr>
+        <p:style>
+          <a:lnRef idx="2">
+            <a:schemeClr val="accent1"/>
+          </a:lnRef>
+          <a:fillRef idx="0">
+            <a:schemeClr val="accent1"/>
+          </a:fillRef>
+          <a:effectRef idx="1">
+            <a:schemeClr val="accent1"/>
+          </a:effectRef>
+          <a:fontRef idx="minor">
+            <a:schemeClr val="tx1"/>
+          </a:fontRef>
+        </p:style>
+      </p:cxnSp>
+      <p:sp>
+        <p:nvSpPr>
+          <p:cNvPr id="15" name="TextBox 14">
+            <a:extLst>
+              <a:ext uri="{FF2B5EF4-FFF2-40B4-BE49-F238E27FC236}">
+                <a16:creationId xmlns:a16="http://schemas.microsoft.com/office/drawing/2014/main" id="{0923EC24-A6E5-C849-B975-9601C8597CF3}"/>
+              </a:ext>
+            </a:extLst>
+          </p:cNvPr>
+          <p:cNvSpPr txBox="1"/>
+          <p:nvPr/>
+        </p:nvSpPr>
+        <p:spPr>
+          <a:xfrm>
+            <a:off x="6790224" y="1483325"/>
+            <a:ext cx="679347" cy="246221"/>
+          </a:xfrm>
+          <a:prstGeom prst="rect">
+            <a:avLst/>
+          </a:prstGeom>
+          <a:noFill/>
+          <a:ln>
+            <a:noFill/>
+          </a:ln>
+        </p:spPr>
+        <p:txBody>
+          <a:bodyPr wrap="square" rtlCol="0">
+            <a:spAutoFit/>
+          </a:bodyPr>
+          <a:lstStyle/>
+          <a:p>
+            <a:pPr algn="ctr"/>
+            <a:r>
+              <a:rPr lang="en-GB" sz="1000" dirty="0">
+                <a:solidFill>
+                  <a:schemeClr val="accent6">
+                    <a:lumMod val="75000"/>
+                  </a:schemeClr>
+                </a:solidFill>
+                <a:latin typeface="Helvetica" panose="020B0604020202020204"/>
+                <a:cs typeface="Helvetica" panose="020B0604020202020204"/>
+              </a:rPr>
+              <a:t>0.01</a:t>
+            </a:r>
+          </a:p>
+        </p:txBody>
+      </p:sp>
     </p:spTree>
     <p:extLst>
       <p:ext uri="{BB962C8B-B14F-4D97-AF65-F5344CB8AC3E}">
-        <p14:creationId xmlns:p14="http://schemas.microsoft.com/office/powerpoint/2010/main" val="2763315938"/>
+        <p14:creationId xmlns:p14="http://schemas.microsoft.com/office/powerpoint/2010/main" val="1309389261"/>
       </p:ext>
     </p:extLst>
   </p:cSld>
@@ -8146,7 +8330,7 @@
           <p:cNvPr id="2" name="Title 1">
             <a:extLst>
               <a:ext uri="{FF2B5EF4-FFF2-40B4-BE49-F238E27FC236}">
-                <a16:creationId xmlns:a16="http://schemas.microsoft.com/office/drawing/2014/main" id="{54C10286-6041-399A-065F-9CA72ED989EA}"/>
+                <a16:creationId xmlns:a16="http://schemas.microsoft.com/office/drawing/2014/main" id="{971A7E35-F3A7-7E5B-ED8A-FA3BA661E53E}"/>
               </a:ext>
             </a:extLst>
           </p:cNvPr>
@@ -8159,7 +8343,7 @@
         </p:nvSpPr>
         <p:spPr>
           <a:xfrm>
-            <a:off x="187960" y="223520"/>
+            <a:off x="238225" y="224589"/>
             <a:ext cx="9875520" cy="1356360"/>
           </a:xfrm>
         </p:spPr>
@@ -8169,7 +8353,7 @@
           <a:p>
             <a:r>
               <a:rPr lang="de-CH" dirty="0"/>
-              <a:t>Budburst – by Type</a:t>
+              <a:t>Burburst - by Provenance</a:t>
             </a:r>
             <a:endParaRPr lang="en-GB" dirty="0"/>
           </a:p>
@@ -8177,10 +8361,10 @@
       </p:sp>
       <p:pic>
         <p:nvPicPr>
-          <p:cNvPr id="9" name="Content Placeholder 8" descr="A graph of a diagram&#10;&#10;AI-generated content may be incorrect.">
+          <p:cNvPr id="5" name="Content Placeholder 4" descr="A graph of a graph&#10;&#10;AI-generated content may be incorrect.">
             <a:extLst>
               <a:ext uri="{FF2B5EF4-FFF2-40B4-BE49-F238E27FC236}">
-                <a16:creationId xmlns:a16="http://schemas.microsoft.com/office/drawing/2014/main" id="{463E4468-FDCA-104C-62BA-3B778918FA92}"/>
+                <a16:creationId xmlns:a16="http://schemas.microsoft.com/office/drawing/2014/main" id="{2D2CC6DF-5B3C-EB76-C731-64BD8A77302C}"/>
               </a:ext>
             </a:extLst>
           </p:cNvPr>
@@ -8205,15 +8389,15 @@
         </p:blipFill>
         <p:spPr>
           <a:xfrm>
-            <a:off x="576234" y="1198881"/>
-            <a:ext cx="10659360" cy="5389880"/>
+            <a:off x="861762" y="1259840"/>
+            <a:ext cx="10468476" cy="5293360"/>
           </a:xfrm>
         </p:spPr>
       </p:pic>
     </p:spTree>
     <p:extLst>
       <p:ext uri="{BB962C8B-B14F-4D97-AF65-F5344CB8AC3E}">
-        <p14:creationId xmlns:p14="http://schemas.microsoft.com/office/powerpoint/2010/main" val="1459603130"/>
+        <p14:creationId xmlns:p14="http://schemas.microsoft.com/office/powerpoint/2010/main" val="2763315938"/>
       </p:ext>
     </p:extLst>
   </p:cSld>
@@ -8245,7 +8429,7 @@
           <p:cNvPr id="2" name="Title 1">
             <a:extLst>
               <a:ext uri="{FF2B5EF4-FFF2-40B4-BE49-F238E27FC236}">
-                <a16:creationId xmlns:a16="http://schemas.microsoft.com/office/drawing/2014/main" id="{87423E70-6AE2-13AB-B9D6-DFD4DC3807B8}"/>
+                <a16:creationId xmlns:a16="http://schemas.microsoft.com/office/drawing/2014/main" id="{54C10286-6041-399A-065F-9CA72ED989EA}"/>
               </a:ext>
             </a:extLst>
           </p:cNvPr>
@@ -8258,7 +8442,7 @@
         </p:nvSpPr>
         <p:spPr>
           <a:xfrm>
-            <a:off x="177800" y="196168"/>
+            <a:off x="187960" y="223520"/>
             <a:ext cx="9875520" cy="1356360"/>
           </a:xfrm>
         </p:spPr>
@@ -8268,7 +8452,7 @@
           <a:p>
             <a:r>
               <a:rPr lang="de-CH" dirty="0"/>
-              <a:t>Budburst by Type</a:t>
+              <a:t>Budburst – by Type</a:t>
             </a:r>
             <a:endParaRPr lang="en-GB" dirty="0"/>
           </a:p>
@@ -8276,10 +8460,10 @@
       </p:sp>
       <p:pic>
         <p:nvPicPr>
-          <p:cNvPr id="8" name="Content Placeholder 7" descr="A graph of a graph&#10;&#10;AI-generated content may be incorrect.">
+          <p:cNvPr id="9" name="Content Placeholder 8" descr="A graph of a diagram&#10;&#10;AI-generated content may be incorrect.">
             <a:extLst>
               <a:ext uri="{FF2B5EF4-FFF2-40B4-BE49-F238E27FC236}">
-                <a16:creationId xmlns:a16="http://schemas.microsoft.com/office/drawing/2014/main" id="{4EC47E45-9E07-5478-4A1D-D66819A23913}"/>
+                <a16:creationId xmlns:a16="http://schemas.microsoft.com/office/drawing/2014/main" id="{463E4468-FDCA-104C-62BA-3B778918FA92}"/>
               </a:ext>
             </a:extLst>
           </p:cNvPr>
@@ -8304,15 +8488,15 @@
         </p:blipFill>
         <p:spPr>
           <a:xfrm>
-            <a:off x="608204" y="1209040"/>
-            <a:ext cx="10602941" cy="5361352"/>
+            <a:off x="576234" y="1198881"/>
+            <a:ext cx="10659360" cy="5389880"/>
           </a:xfrm>
         </p:spPr>
       </p:pic>
     </p:spTree>
     <p:extLst>
       <p:ext uri="{BB962C8B-B14F-4D97-AF65-F5344CB8AC3E}">
-        <p14:creationId xmlns:p14="http://schemas.microsoft.com/office/powerpoint/2010/main" val="1505597422"/>
+        <p14:creationId xmlns:p14="http://schemas.microsoft.com/office/powerpoint/2010/main" val="1459603130"/>
       </p:ext>
     </p:extLst>
   </p:cSld>
@@ -8344,7 +8528,7 @@
           <p:cNvPr id="2" name="Title 1">
             <a:extLst>
               <a:ext uri="{FF2B5EF4-FFF2-40B4-BE49-F238E27FC236}">
-                <a16:creationId xmlns:a16="http://schemas.microsoft.com/office/drawing/2014/main" id="{7C06FE14-95D7-2C34-3B1C-7E62C27D5BD5}"/>
+                <a16:creationId xmlns:a16="http://schemas.microsoft.com/office/drawing/2014/main" id="{87423E70-6AE2-13AB-B9D6-DFD4DC3807B8}"/>
               </a:ext>
             </a:extLst>
           </p:cNvPr>
@@ -8355,48 +8539,63 @@
             <p:ph type="title"/>
           </p:nvPr>
         </p:nvSpPr>
-        <p:spPr/>
+        <p:spPr>
+          <a:xfrm>
+            <a:off x="177800" y="196168"/>
+            <a:ext cx="9875520" cy="1356360"/>
+          </a:xfrm>
+        </p:spPr>
         <p:txBody>
           <a:bodyPr/>
           <a:lstStyle/>
           <a:p>
             <a:r>
               <a:rPr lang="de-CH" dirty="0"/>
-              <a:t>Overlay BS &amp; BB data with temperature</a:t>
+              <a:t>Budburst by Type</a:t>
             </a:r>
             <a:endParaRPr lang="en-GB" dirty="0"/>
           </a:p>
         </p:txBody>
       </p:sp>
-      <p:sp>
-        <p:nvSpPr>
-          <p:cNvPr id="3" name="Content Placeholder 2">
+      <p:pic>
+        <p:nvPicPr>
+          <p:cNvPr id="8" name="Content Placeholder 7" descr="A graph of a graph&#10;&#10;AI-generated content may be incorrect.">
             <a:extLst>
               <a:ext uri="{FF2B5EF4-FFF2-40B4-BE49-F238E27FC236}">
-                <a16:creationId xmlns:a16="http://schemas.microsoft.com/office/drawing/2014/main" id="{F6DB63F4-FC30-DECB-6678-B7E5BBA0AA7F}"/>
+                <a16:creationId xmlns:a16="http://schemas.microsoft.com/office/drawing/2014/main" id="{4EC47E45-9E07-5478-4A1D-D66819A23913}"/>
               </a:ext>
             </a:extLst>
           </p:cNvPr>
-          <p:cNvSpPr>
-            <a:spLocks noGrp="1"/>
-          </p:cNvSpPr>
+          <p:cNvPicPr>
+            <a:picLocks noGrp="1" noChangeAspect="1"/>
+          </p:cNvPicPr>
           <p:nvPr>
             <p:ph idx="1"/>
           </p:nvPr>
-        </p:nvSpPr>
-        <p:spPr/>
-        <p:txBody>
-          <a:bodyPr/>
-          <a:lstStyle/>
-          <a:p>
-            <a:endParaRPr lang="en-GB"/>
-          </a:p>
-        </p:txBody>
-      </p:sp>
+        </p:nvPicPr>
+        <p:blipFill>
+          <a:blip r:embed="rId2">
+            <a:extLst>
+              <a:ext uri="{28A0092B-C50C-407E-A947-70E740481C1C}">
+                <a14:useLocalDpi xmlns:a14="http://schemas.microsoft.com/office/drawing/2010/main" val="0"/>
+              </a:ext>
+            </a:extLst>
+          </a:blip>
+          <a:stretch>
+            <a:fillRect/>
+          </a:stretch>
+        </p:blipFill>
+        <p:spPr>
+          <a:xfrm>
+            <a:off x="608204" y="1209040"/>
+            <a:ext cx="10602941" cy="5361352"/>
+          </a:xfrm>
+        </p:spPr>
+      </p:pic>
     </p:spTree>
     <p:extLst>
       <p:ext uri="{BB962C8B-B14F-4D97-AF65-F5344CB8AC3E}">
-        <p14:creationId xmlns:p14="http://schemas.microsoft.com/office/powerpoint/2010/main" val="3635244816"/>
+        <p14:creationId xmlns:p14="http://schemas.microsoft.com/office/powerpoint/2010/main" val="1505597422"/>
       </p:ext>
     </p:extLst>
   </p:cSld>
@@ -8428,7 +8627,7 @@
           <p:cNvPr id="2" name="Title 1">
             <a:extLst>
               <a:ext uri="{FF2B5EF4-FFF2-40B4-BE49-F238E27FC236}">
-                <a16:creationId xmlns:a16="http://schemas.microsoft.com/office/drawing/2014/main" id="{8FEE9FEA-9B3E-6A9F-C090-44E2DA4F43D8}"/>
+                <a16:creationId xmlns:a16="http://schemas.microsoft.com/office/drawing/2014/main" id="{7C06FE14-95D7-2C34-3B1C-7E62C27D5BD5}"/>
               </a:ext>
             </a:extLst>
           </p:cNvPr>
@@ -8446,7 +8645,7 @@
           <a:p>
             <a:r>
               <a:rPr lang="de-CH" dirty="0"/>
-              <a:t>Cumulative BS/BB curve (per provenance/type)</a:t>
+              <a:t>Overlay BS &amp; BB data with temperature</a:t>
             </a:r>
             <a:endParaRPr lang="en-GB" dirty="0"/>
           </a:p>
@@ -8457,7 +8656,7 @@
           <p:cNvPr id="3" name="Content Placeholder 2">
             <a:extLst>
               <a:ext uri="{FF2B5EF4-FFF2-40B4-BE49-F238E27FC236}">
-                <a16:creationId xmlns:a16="http://schemas.microsoft.com/office/drawing/2014/main" id="{3877EDF9-8919-0183-EBBC-47FDE664CADB}"/>
+                <a16:creationId xmlns:a16="http://schemas.microsoft.com/office/drawing/2014/main" id="{F6DB63F4-FC30-DECB-6678-B7E5BBA0AA7F}"/>
               </a:ext>
             </a:extLst>
           </p:cNvPr>
@@ -8480,7 +8679,7 @@
     </p:spTree>
     <p:extLst>
       <p:ext uri="{BB962C8B-B14F-4D97-AF65-F5344CB8AC3E}">
-        <p14:creationId xmlns:p14="http://schemas.microsoft.com/office/powerpoint/2010/main" val="4162262758"/>
+        <p14:creationId xmlns:p14="http://schemas.microsoft.com/office/powerpoint/2010/main" val="3635244816"/>
       </p:ext>
     </p:extLst>
   </p:cSld>
@@ -8512,7 +8711,7 @@
           <p:cNvPr id="2" name="Title 1">
             <a:extLst>
               <a:ext uri="{FF2B5EF4-FFF2-40B4-BE49-F238E27FC236}">
-                <a16:creationId xmlns:a16="http://schemas.microsoft.com/office/drawing/2014/main" id="{EF986BC2-00B2-FE0A-3FD2-8B3983EDDD41}"/>
+                <a16:creationId xmlns:a16="http://schemas.microsoft.com/office/drawing/2014/main" id="{8FEE9FEA-9B3E-6A9F-C090-44E2DA4F43D8}"/>
               </a:ext>
             </a:extLst>
           </p:cNvPr>
@@ -8523,254 +8722,48 @@
             <p:ph type="title"/>
           </p:nvPr>
         </p:nvSpPr>
-        <p:spPr>
-          <a:xfrm>
-            <a:off x="215900" y="215900"/>
-            <a:ext cx="9875520" cy="1356360"/>
-          </a:xfrm>
-        </p:spPr>
+        <p:spPr/>
         <p:txBody>
           <a:bodyPr/>
           <a:lstStyle/>
           <a:p>
             <a:r>
               <a:rPr lang="de-CH" dirty="0"/>
-              <a:t>Budset &amp; Budburst - Provenance</a:t>
+              <a:t>Cumulative BS/BB curve (per provenance/type)</a:t>
             </a:r>
             <a:endParaRPr lang="en-GB" dirty="0"/>
           </a:p>
         </p:txBody>
       </p:sp>
-      <p:pic>
-        <p:nvPicPr>
-          <p:cNvPr id="5" name="Content Placeholder 4" descr="A graph of a graph&#10;&#10;AI-generated content may be incorrect.">
+      <p:sp>
+        <p:nvSpPr>
+          <p:cNvPr id="3" name="Content Placeholder 2">
             <a:extLst>
               <a:ext uri="{FF2B5EF4-FFF2-40B4-BE49-F238E27FC236}">
-                <a16:creationId xmlns:a16="http://schemas.microsoft.com/office/drawing/2014/main" id="{9E7923FB-1127-0B4E-8720-F56777E2285D}"/>
+                <a16:creationId xmlns:a16="http://schemas.microsoft.com/office/drawing/2014/main" id="{3877EDF9-8919-0183-EBBC-47FDE664CADB}"/>
               </a:ext>
             </a:extLst>
           </p:cNvPr>
-          <p:cNvPicPr>
-            <a:picLocks noGrp="1" noChangeAspect="1"/>
-          </p:cNvPicPr>
+          <p:cNvSpPr>
+            <a:spLocks noGrp="1"/>
+          </p:cNvSpPr>
           <p:nvPr>
             <p:ph idx="1"/>
           </p:nvPr>
-        </p:nvPicPr>
-        <p:blipFill>
-          <a:blip r:embed="rId3">
-            <a:extLst>
-              <a:ext uri="{28A0092B-C50C-407E-A947-70E740481C1C}">
-                <a14:useLocalDpi xmlns:a14="http://schemas.microsoft.com/office/drawing/2010/main" val="0"/>
-              </a:ext>
-            </a:extLst>
-          </a:blip>
-          <a:stretch>
-            <a:fillRect/>
-          </a:stretch>
-        </p:blipFill>
-        <p:spPr>
-          <a:xfrm>
-            <a:off x="1818655" y="1294466"/>
-            <a:ext cx="8554689" cy="5309534"/>
-          </a:xfrm>
-        </p:spPr>
-      </p:pic>
-      <p:cxnSp>
-        <p:nvCxnSpPr>
-          <p:cNvPr id="7" name="Straight Arrow Connector 6">
-            <a:extLst>
-              <a:ext uri="{FF2B5EF4-FFF2-40B4-BE49-F238E27FC236}">
-                <a16:creationId xmlns:a16="http://schemas.microsoft.com/office/drawing/2014/main" id="{25D74AA0-35DD-764B-F3C0-5ECE2236E1C8}"/>
-              </a:ext>
-            </a:extLst>
-          </p:cNvPr>
-          <p:cNvCxnSpPr>
-            <a:cxnSpLocks/>
-          </p:cNvCxnSpPr>
-          <p:nvPr/>
-        </p:nvCxnSpPr>
-        <p:spPr>
-          <a:xfrm flipH="1">
-            <a:off x="8775700" y="3111500"/>
-            <a:ext cx="1701800" cy="244733"/>
-          </a:xfrm>
-          <a:prstGeom prst="straightConnector1">
-            <a:avLst/>
-          </a:prstGeom>
-          <a:ln>
-            <a:tailEnd type="triangle"/>
-          </a:ln>
-        </p:spPr>
-        <p:style>
-          <a:lnRef idx="1">
-            <a:schemeClr val="accent1"/>
-          </a:lnRef>
-          <a:fillRef idx="0">
-            <a:schemeClr val="accent1"/>
-          </a:fillRef>
-          <a:effectRef idx="0">
-            <a:schemeClr val="accent1"/>
-          </a:effectRef>
-          <a:fontRef idx="minor">
-            <a:schemeClr val="tx1"/>
-          </a:fontRef>
-        </p:style>
-      </p:cxnSp>
-      <p:sp>
-        <p:nvSpPr>
-          <p:cNvPr id="10" name="TextBox 9">
-            <a:extLst>
-              <a:ext uri="{FF2B5EF4-FFF2-40B4-BE49-F238E27FC236}">
-                <a16:creationId xmlns:a16="http://schemas.microsoft.com/office/drawing/2014/main" id="{AFE8A3AE-E1B6-A94E-7C86-528849D7B52B}"/>
-              </a:ext>
-            </a:extLst>
-          </p:cNvPr>
-          <p:cNvSpPr txBox="1"/>
-          <p:nvPr/>
-        </p:nvSpPr>
-        <p:spPr>
-          <a:xfrm>
-            <a:off x="10477500" y="2833132"/>
-            <a:ext cx="1130299" cy="369332"/>
-          </a:xfrm>
-          <a:prstGeom prst="rect">
-            <a:avLst/>
-          </a:prstGeom>
-          <a:noFill/>
-        </p:spPr>
-        <p:txBody>
-          <a:bodyPr wrap="square" rtlCol="0">
-            <a:spAutoFit/>
-          </a:bodyPr>
-          <a:lstStyle/>
-          <a:p>
-            <a:r>
-              <a:rPr lang="de-CH" dirty="0"/>
-              <a:t>Budburst</a:t>
-            </a:r>
-            <a:endParaRPr lang="en-GB" dirty="0"/>
-          </a:p>
-        </p:txBody>
-      </p:sp>
-      <p:cxnSp>
-        <p:nvCxnSpPr>
-          <p:cNvPr id="11" name="Straight Arrow Connector 10">
-            <a:extLst>
-              <a:ext uri="{FF2B5EF4-FFF2-40B4-BE49-F238E27FC236}">
-                <a16:creationId xmlns:a16="http://schemas.microsoft.com/office/drawing/2014/main" id="{F9E2F8F7-A542-4D12-3444-9EE948B6280A}"/>
-              </a:ext>
-            </a:extLst>
-          </p:cNvPr>
-          <p:cNvCxnSpPr>
-            <a:cxnSpLocks/>
-            <a:stCxn id="12" idx="1"/>
-          </p:cNvCxnSpPr>
-          <p:nvPr/>
-        </p:nvCxnSpPr>
-        <p:spPr>
-          <a:xfrm flipH="1">
-            <a:off x="7124700" y="4980116"/>
-            <a:ext cx="3352800" cy="620584"/>
-          </a:xfrm>
-          <a:prstGeom prst="straightConnector1">
-            <a:avLst/>
-          </a:prstGeom>
-          <a:ln>
-            <a:tailEnd type="triangle"/>
-          </a:ln>
-        </p:spPr>
-        <p:style>
-          <a:lnRef idx="1">
-            <a:schemeClr val="accent1"/>
-          </a:lnRef>
-          <a:fillRef idx="0">
-            <a:schemeClr val="accent1"/>
-          </a:fillRef>
-          <a:effectRef idx="0">
-            <a:schemeClr val="accent1"/>
-          </a:effectRef>
-          <a:fontRef idx="minor">
-            <a:schemeClr val="tx1"/>
-          </a:fontRef>
-        </p:style>
-      </p:cxnSp>
-      <p:sp>
-        <p:nvSpPr>
-          <p:cNvPr id="12" name="TextBox 11">
-            <a:extLst>
-              <a:ext uri="{FF2B5EF4-FFF2-40B4-BE49-F238E27FC236}">
-                <a16:creationId xmlns:a16="http://schemas.microsoft.com/office/drawing/2014/main" id="{A9FC8493-0AD6-BDCD-FA4F-8FDE947FB7F5}"/>
-              </a:ext>
-            </a:extLst>
-          </p:cNvPr>
-          <p:cNvSpPr txBox="1"/>
-          <p:nvPr/>
-        </p:nvSpPr>
-        <p:spPr>
-          <a:xfrm>
-            <a:off x="10477500" y="4795450"/>
-            <a:ext cx="1130299" cy="369332"/>
-          </a:xfrm>
-          <a:prstGeom prst="rect">
-            <a:avLst/>
-          </a:prstGeom>
-          <a:noFill/>
-        </p:spPr>
-        <p:txBody>
-          <a:bodyPr wrap="square" rtlCol="0">
-            <a:spAutoFit/>
-          </a:bodyPr>
-          <a:lstStyle/>
-          <a:p>
-            <a:r>
-              <a:rPr lang="de-CH" dirty="0"/>
-              <a:t>Budset</a:t>
-            </a:r>
-            <a:endParaRPr lang="en-GB" dirty="0"/>
-          </a:p>
-        </p:txBody>
-      </p:sp>
-      <p:sp>
-        <p:nvSpPr>
-          <p:cNvPr id="17" name="TextBox 16">
-            <a:extLst>
-              <a:ext uri="{FF2B5EF4-FFF2-40B4-BE49-F238E27FC236}">
-                <a16:creationId xmlns:a16="http://schemas.microsoft.com/office/drawing/2014/main" id="{CEF2B93A-CB40-DAF3-E74D-8368928952C9}"/>
-              </a:ext>
-            </a:extLst>
-          </p:cNvPr>
-          <p:cNvSpPr txBox="1"/>
-          <p:nvPr/>
-        </p:nvSpPr>
-        <p:spPr>
-          <a:xfrm>
-            <a:off x="9626600" y="432018"/>
-            <a:ext cx="2247900" cy="646331"/>
-          </a:xfrm>
-          <a:prstGeom prst="rect">
-            <a:avLst/>
-          </a:prstGeom>
-          <a:noFill/>
-        </p:spPr>
-        <p:txBody>
-          <a:bodyPr wrap="square" rtlCol="0">
-            <a:spAutoFit/>
-          </a:bodyPr>
-          <a:lstStyle/>
-          <a:p>
-            <a:r>
-              <a:rPr lang="de-CH" dirty="0"/>
-              <a:t>Origin date (planting date) = 20/06/2023</a:t>
-            </a:r>
-            <a:endParaRPr lang="en-GB" dirty="0"/>
+        </p:nvSpPr>
+        <p:spPr/>
+        <p:txBody>
+          <a:bodyPr/>
+          <a:lstStyle/>
+          <a:p>
+            <a:endParaRPr lang="en-GB"/>
           </a:p>
         </p:txBody>
       </p:sp>
     </p:spTree>
     <p:extLst>
       <p:ext uri="{BB962C8B-B14F-4D97-AF65-F5344CB8AC3E}">
-        <p14:creationId xmlns:p14="http://schemas.microsoft.com/office/powerpoint/2010/main" val="232684958"/>
+        <p14:creationId xmlns:p14="http://schemas.microsoft.com/office/powerpoint/2010/main" val="4162262758"/>
       </p:ext>
     </p:extLst>
   </p:cSld>
@@ -8797,6 +8790,296 @@
           <a:chExt cx="0" cy="0"/>
         </a:xfrm>
       </p:grpSpPr>
+      <p:sp>
+        <p:nvSpPr>
+          <p:cNvPr id="2" name="Title 1">
+            <a:extLst>
+              <a:ext uri="{FF2B5EF4-FFF2-40B4-BE49-F238E27FC236}">
+                <a16:creationId xmlns:a16="http://schemas.microsoft.com/office/drawing/2014/main" id="{EF986BC2-00B2-FE0A-3FD2-8B3983EDDD41}"/>
+              </a:ext>
+            </a:extLst>
+          </p:cNvPr>
+          <p:cNvSpPr>
+            <a:spLocks noGrp="1"/>
+          </p:cNvSpPr>
+          <p:nvPr>
+            <p:ph type="title"/>
+          </p:nvPr>
+        </p:nvSpPr>
+        <p:spPr>
+          <a:xfrm>
+            <a:off x="215900" y="215900"/>
+            <a:ext cx="9875520" cy="1356360"/>
+          </a:xfrm>
+        </p:spPr>
+        <p:txBody>
+          <a:bodyPr/>
+          <a:lstStyle/>
+          <a:p>
+            <a:r>
+              <a:rPr lang="de-CH" dirty="0"/>
+              <a:t>Budset &amp; Budburst - Provenance</a:t>
+            </a:r>
+            <a:endParaRPr lang="en-GB" dirty="0"/>
+          </a:p>
+        </p:txBody>
+      </p:sp>
+      <p:pic>
+        <p:nvPicPr>
+          <p:cNvPr id="5" name="Content Placeholder 4" descr="A graph of a graph&#10;&#10;AI-generated content may be incorrect.">
+            <a:extLst>
+              <a:ext uri="{FF2B5EF4-FFF2-40B4-BE49-F238E27FC236}">
+                <a16:creationId xmlns:a16="http://schemas.microsoft.com/office/drawing/2014/main" id="{9E7923FB-1127-0B4E-8720-F56777E2285D}"/>
+              </a:ext>
+            </a:extLst>
+          </p:cNvPr>
+          <p:cNvPicPr>
+            <a:picLocks noGrp="1" noChangeAspect="1"/>
+          </p:cNvPicPr>
+          <p:nvPr>
+            <p:ph idx="1"/>
+          </p:nvPr>
+        </p:nvPicPr>
+        <p:blipFill>
+          <a:blip r:embed="rId3">
+            <a:extLst>
+              <a:ext uri="{28A0092B-C50C-407E-A947-70E740481C1C}">
+                <a14:useLocalDpi xmlns:a14="http://schemas.microsoft.com/office/drawing/2010/main" val="0"/>
+              </a:ext>
+            </a:extLst>
+          </a:blip>
+          <a:stretch>
+            <a:fillRect/>
+          </a:stretch>
+        </p:blipFill>
+        <p:spPr>
+          <a:xfrm>
+            <a:off x="1818655" y="1294466"/>
+            <a:ext cx="8554689" cy="5309534"/>
+          </a:xfrm>
+        </p:spPr>
+      </p:pic>
+      <p:cxnSp>
+        <p:nvCxnSpPr>
+          <p:cNvPr id="7" name="Straight Arrow Connector 6">
+            <a:extLst>
+              <a:ext uri="{FF2B5EF4-FFF2-40B4-BE49-F238E27FC236}">
+                <a16:creationId xmlns:a16="http://schemas.microsoft.com/office/drawing/2014/main" id="{25D74AA0-35DD-764B-F3C0-5ECE2236E1C8}"/>
+              </a:ext>
+            </a:extLst>
+          </p:cNvPr>
+          <p:cNvCxnSpPr>
+            <a:cxnSpLocks/>
+          </p:cNvCxnSpPr>
+          <p:nvPr/>
+        </p:nvCxnSpPr>
+        <p:spPr>
+          <a:xfrm flipH="1">
+            <a:off x="8775700" y="3111500"/>
+            <a:ext cx="1701800" cy="244733"/>
+          </a:xfrm>
+          <a:prstGeom prst="straightConnector1">
+            <a:avLst/>
+          </a:prstGeom>
+          <a:ln>
+            <a:tailEnd type="triangle"/>
+          </a:ln>
+        </p:spPr>
+        <p:style>
+          <a:lnRef idx="1">
+            <a:schemeClr val="accent1"/>
+          </a:lnRef>
+          <a:fillRef idx="0">
+            <a:schemeClr val="accent1"/>
+          </a:fillRef>
+          <a:effectRef idx="0">
+            <a:schemeClr val="accent1"/>
+          </a:effectRef>
+          <a:fontRef idx="minor">
+            <a:schemeClr val="tx1"/>
+          </a:fontRef>
+        </p:style>
+      </p:cxnSp>
+      <p:sp>
+        <p:nvSpPr>
+          <p:cNvPr id="10" name="TextBox 9">
+            <a:extLst>
+              <a:ext uri="{FF2B5EF4-FFF2-40B4-BE49-F238E27FC236}">
+                <a16:creationId xmlns:a16="http://schemas.microsoft.com/office/drawing/2014/main" id="{AFE8A3AE-E1B6-A94E-7C86-528849D7B52B}"/>
+              </a:ext>
+            </a:extLst>
+          </p:cNvPr>
+          <p:cNvSpPr txBox="1"/>
+          <p:nvPr/>
+        </p:nvSpPr>
+        <p:spPr>
+          <a:xfrm>
+            <a:off x="10477500" y="2833132"/>
+            <a:ext cx="1130299" cy="369332"/>
+          </a:xfrm>
+          <a:prstGeom prst="rect">
+            <a:avLst/>
+          </a:prstGeom>
+          <a:noFill/>
+        </p:spPr>
+        <p:txBody>
+          <a:bodyPr wrap="square" rtlCol="0">
+            <a:spAutoFit/>
+          </a:bodyPr>
+          <a:lstStyle/>
+          <a:p>
+            <a:r>
+              <a:rPr lang="de-CH" dirty="0"/>
+              <a:t>Budburst</a:t>
+            </a:r>
+            <a:endParaRPr lang="en-GB" dirty="0"/>
+          </a:p>
+        </p:txBody>
+      </p:sp>
+      <p:cxnSp>
+        <p:nvCxnSpPr>
+          <p:cNvPr id="11" name="Straight Arrow Connector 10">
+            <a:extLst>
+              <a:ext uri="{FF2B5EF4-FFF2-40B4-BE49-F238E27FC236}">
+                <a16:creationId xmlns:a16="http://schemas.microsoft.com/office/drawing/2014/main" id="{F9E2F8F7-A542-4D12-3444-9EE948B6280A}"/>
+              </a:ext>
+            </a:extLst>
+          </p:cNvPr>
+          <p:cNvCxnSpPr>
+            <a:cxnSpLocks/>
+            <a:stCxn id="12" idx="1"/>
+          </p:cNvCxnSpPr>
+          <p:nvPr/>
+        </p:nvCxnSpPr>
+        <p:spPr>
+          <a:xfrm flipH="1">
+            <a:off x="7124700" y="4980116"/>
+            <a:ext cx="3352800" cy="620584"/>
+          </a:xfrm>
+          <a:prstGeom prst="straightConnector1">
+            <a:avLst/>
+          </a:prstGeom>
+          <a:ln>
+            <a:tailEnd type="triangle"/>
+          </a:ln>
+        </p:spPr>
+        <p:style>
+          <a:lnRef idx="1">
+            <a:schemeClr val="accent1"/>
+          </a:lnRef>
+          <a:fillRef idx="0">
+            <a:schemeClr val="accent1"/>
+          </a:fillRef>
+          <a:effectRef idx="0">
+            <a:schemeClr val="accent1"/>
+          </a:effectRef>
+          <a:fontRef idx="minor">
+            <a:schemeClr val="tx1"/>
+          </a:fontRef>
+        </p:style>
+      </p:cxnSp>
+      <p:sp>
+        <p:nvSpPr>
+          <p:cNvPr id="12" name="TextBox 11">
+            <a:extLst>
+              <a:ext uri="{FF2B5EF4-FFF2-40B4-BE49-F238E27FC236}">
+                <a16:creationId xmlns:a16="http://schemas.microsoft.com/office/drawing/2014/main" id="{A9FC8493-0AD6-BDCD-FA4F-8FDE947FB7F5}"/>
+              </a:ext>
+            </a:extLst>
+          </p:cNvPr>
+          <p:cNvSpPr txBox="1"/>
+          <p:nvPr/>
+        </p:nvSpPr>
+        <p:spPr>
+          <a:xfrm>
+            <a:off x="10477500" y="4795450"/>
+            <a:ext cx="1130299" cy="369332"/>
+          </a:xfrm>
+          <a:prstGeom prst="rect">
+            <a:avLst/>
+          </a:prstGeom>
+          <a:noFill/>
+        </p:spPr>
+        <p:txBody>
+          <a:bodyPr wrap="square" rtlCol="0">
+            <a:spAutoFit/>
+          </a:bodyPr>
+          <a:lstStyle/>
+          <a:p>
+            <a:r>
+              <a:rPr lang="de-CH" dirty="0"/>
+              <a:t>Budset</a:t>
+            </a:r>
+            <a:endParaRPr lang="en-GB" dirty="0"/>
+          </a:p>
+        </p:txBody>
+      </p:sp>
+      <p:sp>
+        <p:nvSpPr>
+          <p:cNvPr id="17" name="TextBox 16">
+            <a:extLst>
+              <a:ext uri="{FF2B5EF4-FFF2-40B4-BE49-F238E27FC236}">
+                <a16:creationId xmlns:a16="http://schemas.microsoft.com/office/drawing/2014/main" id="{CEF2B93A-CB40-DAF3-E74D-8368928952C9}"/>
+              </a:ext>
+            </a:extLst>
+          </p:cNvPr>
+          <p:cNvSpPr txBox="1"/>
+          <p:nvPr/>
+        </p:nvSpPr>
+        <p:spPr>
+          <a:xfrm>
+            <a:off x="9626600" y="432018"/>
+            <a:ext cx="2247900" cy="646331"/>
+          </a:xfrm>
+          <a:prstGeom prst="rect">
+            <a:avLst/>
+          </a:prstGeom>
+          <a:noFill/>
+        </p:spPr>
+        <p:txBody>
+          <a:bodyPr wrap="square" rtlCol="0">
+            <a:spAutoFit/>
+          </a:bodyPr>
+          <a:lstStyle/>
+          <a:p>
+            <a:r>
+              <a:rPr lang="de-CH" dirty="0"/>
+              <a:t>Origin date (planting date) = 20/06/2023</a:t>
+            </a:r>
+            <a:endParaRPr lang="en-GB" dirty="0"/>
+          </a:p>
+        </p:txBody>
+      </p:sp>
+    </p:spTree>
+    <p:extLst>
+      <p:ext uri="{BB962C8B-B14F-4D97-AF65-F5344CB8AC3E}">
+        <p14:creationId xmlns:p14="http://schemas.microsoft.com/office/powerpoint/2010/main" val="232684958"/>
+      </p:ext>
+    </p:extLst>
+  </p:cSld>
+  <p:clrMapOvr>
+    <a:masterClrMapping/>
+  </p:clrMapOvr>
+</p:sld>
+</file>
+
+<file path=ppt/slides/slide28.xml><?xml version="1.0" encoding="utf-8"?>
+<p:sld xmlns:a="http://schemas.openxmlformats.org/drawingml/2006/main" xmlns:r="http://schemas.openxmlformats.org/officeDocument/2006/relationships" xmlns:p="http://schemas.openxmlformats.org/presentationml/2006/main">
+  <p:cSld>
+    <p:spTree>
+      <p:nvGrpSpPr>
+        <p:cNvPr id="1" name=""/>
+        <p:cNvGrpSpPr/>
+        <p:nvPr/>
+      </p:nvGrpSpPr>
+      <p:grpSpPr>
+        <a:xfrm>
+          <a:off x="0" y="0"/>
+          <a:ext cx="0" cy="0"/>
+          <a:chOff x="0" y="0"/>
+          <a:chExt cx="0" cy="0"/>
+        </a:xfrm>
+      </p:grpSpPr>
       <p:pic>
         <p:nvPicPr>
           <p:cNvPr id="6" name="Content Placeholder 5" descr="A graph with lines and numbers&#10;&#10;AI-generated content may be incorrect.">
@@ -8879,7 +9162,7 @@
 </p:sld>
 </file>
 
-<file path=ppt/slides/slide28.xml><?xml version="1.0" encoding="utf-8"?>
+<file path=ppt/slides/slide29.xml><?xml version="1.0" encoding="utf-8"?>
 <p:sld xmlns:a="http://schemas.openxmlformats.org/drawingml/2006/main" xmlns:r="http://schemas.openxmlformats.org/officeDocument/2006/relationships" xmlns:p="http://schemas.openxmlformats.org/presentationml/2006/main">
   <p:cSld>
     <p:spTree>
@@ -9437,128 +9720,6 @@
 </p:sld>
 </file>
 
-<file path=ppt/slides/slide29.xml><?xml version="1.0" encoding="utf-8"?>
-<p:sld xmlns:a="http://schemas.openxmlformats.org/drawingml/2006/main" xmlns:r="http://schemas.openxmlformats.org/officeDocument/2006/relationships" xmlns:p="http://schemas.openxmlformats.org/presentationml/2006/main">
-  <p:cSld>
-    <p:spTree>
-      <p:nvGrpSpPr>
-        <p:cNvPr id="1" name=""/>
-        <p:cNvGrpSpPr/>
-        <p:nvPr/>
-      </p:nvGrpSpPr>
-      <p:grpSpPr>
-        <a:xfrm>
-          <a:off x="0" y="0"/>
-          <a:ext cx="0" cy="0"/>
-          <a:chOff x="0" y="0"/>
-          <a:chExt cx="0" cy="0"/>
-        </a:xfrm>
-      </p:grpSpPr>
-      <p:sp>
-        <p:nvSpPr>
-          <p:cNvPr id="2" name="Title 1">
-            <a:extLst>
-              <a:ext uri="{FF2B5EF4-FFF2-40B4-BE49-F238E27FC236}">
-                <a16:creationId xmlns:a16="http://schemas.microsoft.com/office/drawing/2014/main" id="{7B8526B4-C28B-9F40-11FC-0C82F8F92148}"/>
-              </a:ext>
-            </a:extLst>
-          </p:cNvPr>
-          <p:cNvSpPr>
-            <a:spLocks noGrp="1"/>
-          </p:cNvSpPr>
-          <p:nvPr>
-            <p:ph type="title"/>
-          </p:nvPr>
-        </p:nvSpPr>
-        <p:spPr/>
-        <p:txBody>
-          <a:bodyPr/>
-          <a:lstStyle/>
-          <a:p>
-            <a:r>
-              <a:rPr lang="en-GB" dirty="0"/>
-              <a:t>Missing  trait comparisons</a:t>
-            </a:r>
-          </a:p>
-        </p:txBody>
-      </p:sp>
-      <p:sp>
-        <p:nvSpPr>
-          <p:cNvPr id="3" name="Content Placeholder 2">
-            <a:extLst>
-              <a:ext uri="{FF2B5EF4-FFF2-40B4-BE49-F238E27FC236}">
-                <a16:creationId xmlns:a16="http://schemas.microsoft.com/office/drawing/2014/main" id="{F604B187-7D1D-6C91-8666-FC9DB4E0FC90}"/>
-              </a:ext>
-            </a:extLst>
-          </p:cNvPr>
-          <p:cNvSpPr>
-            <a:spLocks noGrp="1"/>
-          </p:cNvSpPr>
-          <p:nvPr>
-            <p:ph idx="1"/>
-          </p:nvPr>
-        </p:nvSpPr>
-        <p:spPr/>
-        <p:txBody>
-          <a:bodyPr/>
-          <a:lstStyle/>
-          <a:p>
-            <a:r>
-              <a:rPr lang="en-GB" dirty="0"/>
-              <a:t>Mortality based on Provenance AND Type</a:t>
-            </a:r>
-          </a:p>
-          <a:p>
-            <a:endParaRPr lang="en-GB" dirty="0"/>
-          </a:p>
-          <a:p>
-            <a:endParaRPr lang="en-GB" dirty="0"/>
-          </a:p>
-        </p:txBody>
-      </p:sp>
-      <p:pic>
-        <p:nvPicPr>
-          <p:cNvPr id="5" name="Picture 4">
-            <a:extLst>
-              <a:ext uri="{FF2B5EF4-FFF2-40B4-BE49-F238E27FC236}">
-                <a16:creationId xmlns:a16="http://schemas.microsoft.com/office/drawing/2014/main" id="{A3C27B33-D24F-727E-2389-C5F17212B789}"/>
-              </a:ext>
-            </a:extLst>
-          </p:cNvPr>
-          <p:cNvPicPr>
-            <a:picLocks noChangeAspect="1"/>
-          </p:cNvPicPr>
-          <p:nvPr/>
-        </p:nvPicPr>
-        <p:blipFill>
-          <a:blip r:embed="rId2"/>
-          <a:stretch>
-            <a:fillRect/>
-          </a:stretch>
-        </p:blipFill>
-        <p:spPr>
-          <a:xfrm>
-            <a:off x="7653229" y="1745491"/>
-            <a:ext cx="3473629" cy="4248368"/>
-          </a:xfrm>
-          <a:prstGeom prst="rect">
-            <a:avLst/>
-          </a:prstGeom>
-        </p:spPr>
-      </p:pic>
-    </p:spTree>
-    <p:extLst>
-      <p:ext uri="{BB962C8B-B14F-4D97-AF65-F5344CB8AC3E}">
-        <p14:creationId xmlns:p14="http://schemas.microsoft.com/office/powerpoint/2010/main" val="2235722807"/>
-      </p:ext>
-    </p:extLst>
-  </p:cSld>
-  <p:clrMapOvr>
-    <a:masterClrMapping/>
-  </p:clrMapOvr>
-</p:sld>
-</file>
-
 <file path=ppt/slides/slide3.xml><?xml version="1.0" encoding="utf-8"?>
 <p:sld xmlns:a="http://schemas.openxmlformats.org/drawingml/2006/main" xmlns:r="http://schemas.openxmlformats.org/officeDocument/2006/relationships" xmlns:p="http://schemas.openxmlformats.org/presentationml/2006/main">
   <p:cSld>
@@ -9644,6 +9805,128 @@
 </file>
 
 <file path=ppt/slides/slide30.xml><?xml version="1.0" encoding="utf-8"?>
+<p:sld xmlns:a="http://schemas.openxmlformats.org/drawingml/2006/main" xmlns:r="http://schemas.openxmlformats.org/officeDocument/2006/relationships" xmlns:p="http://schemas.openxmlformats.org/presentationml/2006/main">
+  <p:cSld>
+    <p:spTree>
+      <p:nvGrpSpPr>
+        <p:cNvPr id="1" name=""/>
+        <p:cNvGrpSpPr/>
+        <p:nvPr/>
+      </p:nvGrpSpPr>
+      <p:grpSpPr>
+        <a:xfrm>
+          <a:off x="0" y="0"/>
+          <a:ext cx="0" cy="0"/>
+          <a:chOff x="0" y="0"/>
+          <a:chExt cx="0" cy="0"/>
+        </a:xfrm>
+      </p:grpSpPr>
+      <p:sp>
+        <p:nvSpPr>
+          <p:cNvPr id="2" name="Title 1">
+            <a:extLst>
+              <a:ext uri="{FF2B5EF4-FFF2-40B4-BE49-F238E27FC236}">
+                <a16:creationId xmlns:a16="http://schemas.microsoft.com/office/drawing/2014/main" id="{7B8526B4-C28B-9F40-11FC-0C82F8F92148}"/>
+              </a:ext>
+            </a:extLst>
+          </p:cNvPr>
+          <p:cNvSpPr>
+            <a:spLocks noGrp="1"/>
+          </p:cNvSpPr>
+          <p:nvPr>
+            <p:ph type="title"/>
+          </p:nvPr>
+        </p:nvSpPr>
+        <p:spPr/>
+        <p:txBody>
+          <a:bodyPr/>
+          <a:lstStyle/>
+          <a:p>
+            <a:r>
+              <a:rPr lang="en-GB" dirty="0"/>
+              <a:t>Missing  trait comparisons</a:t>
+            </a:r>
+          </a:p>
+        </p:txBody>
+      </p:sp>
+      <p:sp>
+        <p:nvSpPr>
+          <p:cNvPr id="3" name="Content Placeholder 2">
+            <a:extLst>
+              <a:ext uri="{FF2B5EF4-FFF2-40B4-BE49-F238E27FC236}">
+                <a16:creationId xmlns:a16="http://schemas.microsoft.com/office/drawing/2014/main" id="{F604B187-7D1D-6C91-8666-FC9DB4E0FC90}"/>
+              </a:ext>
+            </a:extLst>
+          </p:cNvPr>
+          <p:cNvSpPr>
+            <a:spLocks noGrp="1"/>
+          </p:cNvSpPr>
+          <p:nvPr>
+            <p:ph idx="1"/>
+          </p:nvPr>
+        </p:nvSpPr>
+        <p:spPr/>
+        <p:txBody>
+          <a:bodyPr/>
+          <a:lstStyle/>
+          <a:p>
+            <a:r>
+              <a:rPr lang="en-GB" dirty="0"/>
+              <a:t>Mortality based on Provenance AND Type</a:t>
+            </a:r>
+          </a:p>
+          <a:p>
+            <a:endParaRPr lang="en-GB" dirty="0"/>
+          </a:p>
+          <a:p>
+            <a:endParaRPr lang="en-GB" dirty="0"/>
+          </a:p>
+        </p:txBody>
+      </p:sp>
+      <p:pic>
+        <p:nvPicPr>
+          <p:cNvPr id="5" name="Picture 4">
+            <a:extLst>
+              <a:ext uri="{FF2B5EF4-FFF2-40B4-BE49-F238E27FC236}">
+                <a16:creationId xmlns:a16="http://schemas.microsoft.com/office/drawing/2014/main" id="{A3C27B33-D24F-727E-2389-C5F17212B789}"/>
+              </a:ext>
+            </a:extLst>
+          </p:cNvPr>
+          <p:cNvPicPr>
+            <a:picLocks noChangeAspect="1"/>
+          </p:cNvPicPr>
+          <p:nvPr/>
+        </p:nvPicPr>
+        <p:blipFill>
+          <a:blip r:embed="rId2"/>
+          <a:stretch>
+            <a:fillRect/>
+          </a:stretch>
+        </p:blipFill>
+        <p:spPr>
+          <a:xfrm>
+            <a:off x="7653229" y="1745491"/>
+            <a:ext cx="3473629" cy="4248368"/>
+          </a:xfrm>
+          <a:prstGeom prst="rect">
+            <a:avLst/>
+          </a:prstGeom>
+        </p:spPr>
+      </p:pic>
+    </p:spTree>
+    <p:extLst>
+      <p:ext uri="{BB962C8B-B14F-4D97-AF65-F5344CB8AC3E}">
+        <p14:creationId xmlns:p14="http://schemas.microsoft.com/office/powerpoint/2010/main" val="2235722807"/>
+      </p:ext>
+    </p:extLst>
+  </p:cSld>
+  <p:clrMapOvr>
+    <a:masterClrMapping/>
+  </p:clrMapOvr>
+</p:sld>
+</file>
+
+<file path=ppt/slides/slide31.xml><?xml version="1.0" encoding="utf-8"?>
 <p:sld xmlns:a="http://schemas.openxmlformats.org/drawingml/2006/main" xmlns:r="http://schemas.openxmlformats.org/officeDocument/2006/relationships" xmlns:p="http://schemas.openxmlformats.org/presentationml/2006/main">
   <p:cSld>
     <p:spTree>
@@ -10256,7 +10539,7 @@
           <p:cNvPr id="2" name="Title 1">
             <a:extLst>
               <a:ext uri="{FF2B5EF4-FFF2-40B4-BE49-F238E27FC236}">
-                <a16:creationId xmlns:a16="http://schemas.microsoft.com/office/drawing/2014/main" id="{DBBAC9F3-8100-D77A-023E-C972C89795AC}"/>
+                <a16:creationId xmlns:a16="http://schemas.microsoft.com/office/drawing/2014/main" id="{33D63F40-F221-2E7F-F83E-35F6231E0E7B}"/>
               </a:ext>
             </a:extLst>
           </p:cNvPr>
@@ -10269,8 +10552,8 @@
         </p:nvSpPr>
         <p:spPr>
           <a:xfrm>
-            <a:off x="228600" y="223520"/>
-            <a:ext cx="9875520" cy="995680"/>
+            <a:off x="228600" y="243661"/>
+            <a:ext cx="9875520" cy="1356360"/>
           </a:xfrm>
         </p:spPr>
         <p:txBody>
@@ -10279,7 +10562,7 @@
           <a:p>
             <a:r>
               <a:rPr lang="de-CH" dirty="0"/>
-              <a:t>Status – by Family</a:t>
+              <a:t>Family distribution</a:t>
             </a:r>
             <a:endParaRPr lang="en-GB" dirty="0"/>
           </a:p>
@@ -10287,10 +10570,10 @@
       </p:sp>
       <p:pic>
         <p:nvPicPr>
-          <p:cNvPr id="5" name="Content Placeholder 4">
+          <p:cNvPr id="9" name="Content Placeholder 8" descr="A graph with blue squares&#10;&#10;AI-generated content may be incorrect.">
             <a:extLst>
               <a:ext uri="{FF2B5EF4-FFF2-40B4-BE49-F238E27FC236}">
-                <a16:creationId xmlns:a16="http://schemas.microsoft.com/office/drawing/2014/main" id="{88AB1702-AC8E-BCAE-24FC-C14A03615DD3}"/>
+                <a16:creationId xmlns:a16="http://schemas.microsoft.com/office/drawing/2014/main" id="{9DC3274B-287F-4CA0-BAE5-BEC9FBDB4565}"/>
               </a:ext>
             </a:extLst>
           </p:cNvPr>
@@ -10309,144 +10592,20 @@
               </a:ext>
             </a:extLst>
           </a:blip>
-          <a:srcRect t="6549"/>
+          <a:srcRect r="6448"/>
           <a:stretch/>
         </p:blipFill>
         <p:spPr>
           <a:xfrm>
-            <a:off x="1226129" y="1095555"/>
-            <a:ext cx="9739742" cy="5518605"/>
+            <a:off x="1741713" y="1162427"/>
+            <a:ext cx="8798253" cy="5451912"/>
           </a:xfrm>
         </p:spPr>
       </p:pic>
-      <p:sp>
-        <p:nvSpPr>
-          <p:cNvPr id="6" name="TextBox 5">
-            <a:extLst>
-              <a:ext uri="{FF2B5EF4-FFF2-40B4-BE49-F238E27FC236}">
-                <a16:creationId xmlns:a16="http://schemas.microsoft.com/office/drawing/2014/main" id="{C5012472-E3FE-9887-B742-0271FEB26237}"/>
-              </a:ext>
-            </a:extLst>
-          </p:cNvPr>
-          <p:cNvSpPr txBox="1"/>
-          <p:nvPr/>
-        </p:nvSpPr>
-        <p:spPr>
-          <a:xfrm>
-            <a:off x="5382883" y="586596"/>
-            <a:ext cx="3045125" cy="369332"/>
-          </a:xfrm>
-          <a:prstGeom prst="rect">
-            <a:avLst/>
-          </a:prstGeom>
-          <a:noFill/>
-        </p:spPr>
-        <p:txBody>
-          <a:bodyPr wrap="square" rtlCol="0">
-            <a:spAutoFit/>
-          </a:bodyPr>
-          <a:lstStyle/>
-          <a:p>
-            <a:r>
-              <a:rPr lang="de-CH" dirty="0"/>
-              <a:t>Top and bottom 10 Families</a:t>
-            </a:r>
-            <a:endParaRPr lang="en-GB" dirty="0"/>
-          </a:p>
-        </p:txBody>
-      </p:sp>
-      <p:sp>
-        <p:nvSpPr>
-          <p:cNvPr id="3" name="TextBox 2">
-            <a:extLst>
-              <a:ext uri="{FF2B5EF4-FFF2-40B4-BE49-F238E27FC236}">
-                <a16:creationId xmlns:a16="http://schemas.microsoft.com/office/drawing/2014/main" id="{C4409357-62AB-C53D-577F-0FF4CFF2F18D}"/>
-              </a:ext>
-            </a:extLst>
-          </p:cNvPr>
-          <p:cNvSpPr txBox="1"/>
-          <p:nvPr/>
-        </p:nvSpPr>
-        <p:spPr>
-          <a:xfrm>
-            <a:off x="7626539" y="3956766"/>
-            <a:ext cx="2353734" cy="646331"/>
-          </a:xfrm>
-          <a:prstGeom prst="rect">
-            <a:avLst/>
-          </a:prstGeom>
-          <a:noFill/>
-        </p:spPr>
-        <p:txBody>
-          <a:bodyPr wrap="square" rtlCol="0">
-            <a:spAutoFit/>
-          </a:bodyPr>
-          <a:lstStyle/>
-          <a:p>
-            <a:r>
-              <a:rPr lang="de-CH" dirty="0"/>
-              <a:t>Why so many with exactly 50%??</a:t>
-            </a:r>
-            <a:endParaRPr lang="en-GB" dirty="0"/>
-          </a:p>
-        </p:txBody>
-      </p:sp>
-      <p:sp>
-        <p:nvSpPr>
-          <p:cNvPr id="4" name="Rectangle: Rounded Corners 3">
-            <a:extLst>
-              <a:ext uri="{FF2B5EF4-FFF2-40B4-BE49-F238E27FC236}">
-                <a16:creationId xmlns:a16="http://schemas.microsoft.com/office/drawing/2014/main" id="{79AA551E-FA63-960E-F087-D4304A8C24A0}"/>
-              </a:ext>
-            </a:extLst>
-          </p:cNvPr>
-          <p:cNvSpPr/>
-          <p:nvPr/>
-        </p:nvSpPr>
-        <p:spPr>
-          <a:xfrm>
-            <a:off x="6096000" y="3429000"/>
-            <a:ext cx="1507067" cy="1905000"/>
-          </a:xfrm>
-          <a:prstGeom prst="roundRect">
-            <a:avLst/>
-          </a:prstGeom>
-          <a:noFill/>
-          <a:ln w="38100">
-            <a:solidFill>
-              <a:srgbClr val="FF0000"/>
-            </a:solidFill>
-          </a:ln>
-        </p:spPr>
-        <p:style>
-          <a:lnRef idx="2">
-            <a:schemeClr val="accent1">
-              <a:shade val="15000"/>
-            </a:schemeClr>
-          </a:lnRef>
-          <a:fillRef idx="1">
-            <a:schemeClr val="accent1"/>
-          </a:fillRef>
-          <a:effectRef idx="0">
-            <a:schemeClr val="accent1"/>
-          </a:effectRef>
-          <a:fontRef idx="minor">
-            <a:schemeClr val="lt1"/>
-          </a:fontRef>
-        </p:style>
-        <p:txBody>
-          <a:bodyPr rtlCol="0" anchor="ctr"/>
-          <a:lstStyle/>
-          <a:p>
-            <a:pPr algn="ctr"/>
-            <a:endParaRPr lang="en-GB"/>
-          </a:p>
-        </p:txBody>
-      </p:sp>
     </p:spTree>
     <p:extLst>
       <p:ext uri="{BB962C8B-B14F-4D97-AF65-F5344CB8AC3E}">
-        <p14:creationId xmlns:p14="http://schemas.microsoft.com/office/powerpoint/2010/main" val="4087577250"/>
+        <p14:creationId xmlns:p14="http://schemas.microsoft.com/office/powerpoint/2010/main" val="3085592028"/>
       </p:ext>
     </p:extLst>
   </p:cSld>

</xml_diff>

<commit_message>
added interaction model, started MetData
</commit_message>
<xml_diff>
--- a/RapidAdaptation_DataExploration.pptx
+++ b/RapidAdaptation_DataExploration.pptx
@@ -5,7 +5,7 @@
     <p:sldMasterId id="2147483660" r:id="rId1"/>
   </p:sldMasterIdLst>
   <p:notesMasterIdLst>
-    <p:notesMasterId r:id="rId33"/>
+    <p:notesMasterId r:id="rId34"/>
   </p:notesMasterIdLst>
   <p:sldIdLst>
     <p:sldId id="256" r:id="rId2"/>
@@ -32,13 +32,14 @@
     <p:sldId id="277" r:id="rId23"/>
     <p:sldId id="278" r:id="rId24"/>
     <p:sldId id="264" r:id="rId25"/>
-    <p:sldId id="286" r:id="rId26"/>
-    <p:sldId id="287" r:id="rId27"/>
-    <p:sldId id="282" r:id="rId28"/>
-    <p:sldId id="283" r:id="rId29"/>
-    <p:sldId id="281" r:id="rId30"/>
-    <p:sldId id="280" r:id="rId31"/>
-    <p:sldId id="279" r:id="rId32"/>
+    <p:sldId id="290" r:id="rId26"/>
+    <p:sldId id="286" r:id="rId27"/>
+    <p:sldId id="287" r:id="rId28"/>
+    <p:sldId id="282" r:id="rId29"/>
+    <p:sldId id="283" r:id="rId30"/>
+    <p:sldId id="281" r:id="rId31"/>
+    <p:sldId id="280" r:id="rId32"/>
+    <p:sldId id="279" r:id="rId33"/>
   </p:sldIdLst>
   <p:sldSz cx="12192000" cy="6858000"/>
   <p:notesSz cx="6858000" cy="9144000"/>
@@ -148,7 +149,7 @@
 <file path=ppt/revisionInfo.xml><?xml version="1.0" encoding="utf-8"?>
 <p1510:revInfo xmlns:a="http://schemas.openxmlformats.org/drawingml/2006/main" xmlns:r="http://schemas.openxmlformats.org/officeDocument/2006/relationships" xmlns:p1510="http://schemas.microsoft.com/office/powerpoint/2015/10/main">
   <p1510:revLst>
-    <p1510:client id="{14F8172B-23CC-43AF-8874-FD0289D90325}" v="2" dt="2026-01-19T15:59:21.470"/>
+    <p1510:client id="{14F8172B-23CC-43AF-8874-FD0289D90325}" v="11" dt="2026-01-20T10:03:07.877"/>
   </p1510:revLst>
 </p1510:revInfo>
 </file>
@@ -378,14 +379,6 @@
             <ac:spMk id="2" creationId="{186B59D3-816C-2A57-089A-EA265D288680}"/>
           </ac:spMkLst>
         </pc:spChg>
-        <pc:spChg chg="add mod">
-          <ac:chgData name="Luisa Dickenmann" userId="0c0840b0-1ae7-42c8-98b5-b02d8f71a603" providerId="ADAL" clId="{100BBC7B-7ACA-4A4D-BA33-DEF31D162335}" dt="2025-12-08T13:50:55.797" v="517" actId="207"/>
-          <ac:spMkLst>
-            <pc:docMk/>
-            <pc:sldMk cId="2468455985" sldId="262"/>
-            <ac:spMk id="6" creationId="{85B2C7B7-4BA9-EB08-7CDD-E8CB7044D6E1}"/>
-          </ac:spMkLst>
-        </pc:spChg>
         <pc:spChg chg="add mod topLvl">
           <ac:chgData name="Luisa Dickenmann" userId="0c0840b0-1ae7-42c8-98b5-b02d8f71a603" providerId="ADAL" clId="{100BBC7B-7ACA-4A4D-BA33-DEF31D162335}" dt="2025-12-09T11:30:36.654" v="2000" actId="165"/>
           <ac:spMkLst>
@@ -752,38 +745,6 @@
             <ac:spMk id="2" creationId="{DBBAC9F3-8100-D77A-023E-C972C89795AC}"/>
           </ac:spMkLst>
         </pc:spChg>
-        <pc:spChg chg="add mod">
-          <ac:chgData name="Luisa Dickenmann" userId="0c0840b0-1ae7-42c8-98b5-b02d8f71a603" providerId="ADAL" clId="{100BBC7B-7ACA-4A4D-BA33-DEF31D162335}" dt="2025-12-12T09:54:14.818" v="4039" actId="1076"/>
-          <ac:spMkLst>
-            <pc:docMk/>
-            <pc:sldMk cId="4087577250" sldId="272"/>
-            <ac:spMk id="3" creationId="{C4409357-62AB-C53D-577F-0FF4CFF2F18D}"/>
-          </ac:spMkLst>
-        </pc:spChg>
-        <pc:spChg chg="add mod">
-          <ac:chgData name="Luisa Dickenmann" userId="0c0840b0-1ae7-42c8-98b5-b02d8f71a603" providerId="ADAL" clId="{100BBC7B-7ACA-4A4D-BA33-DEF31D162335}" dt="2025-12-12T09:54:11.814" v="4038" actId="1582"/>
-          <ac:spMkLst>
-            <pc:docMk/>
-            <pc:sldMk cId="4087577250" sldId="272"/>
-            <ac:spMk id="4" creationId="{79AA551E-FA63-960E-F087-D4304A8C24A0}"/>
-          </ac:spMkLst>
-        </pc:spChg>
-        <pc:spChg chg="add mod">
-          <ac:chgData name="Luisa Dickenmann" userId="0c0840b0-1ae7-42c8-98b5-b02d8f71a603" providerId="ADAL" clId="{100BBC7B-7ACA-4A4D-BA33-DEF31D162335}" dt="2025-12-09T10:11:04.800" v="1487" actId="20577"/>
-          <ac:spMkLst>
-            <pc:docMk/>
-            <pc:sldMk cId="4087577250" sldId="272"/>
-            <ac:spMk id="6" creationId="{C5012472-E3FE-9887-B742-0271FEB26237}"/>
-          </ac:spMkLst>
-        </pc:spChg>
-        <pc:picChg chg="add mod modCrop">
-          <ac:chgData name="Luisa Dickenmann" userId="0c0840b0-1ae7-42c8-98b5-b02d8f71a603" providerId="ADAL" clId="{100BBC7B-7ACA-4A4D-BA33-DEF31D162335}" dt="2025-12-09T10:11:14.408" v="1488" actId="732"/>
-          <ac:picMkLst>
-            <pc:docMk/>
-            <pc:sldMk cId="4087577250" sldId="272"/>
-            <ac:picMk id="5" creationId="{88AB1702-AC8E-BCAE-24FC-C14A03615DD3}"/>
-          </ac:picMkLst>
-        </pc:picChg>
       </pc:sldChg>
       <pc:sldChg chg="addSp delSp modSp new del mod">
         <pc:chgData name="Luisa Dickenmann" userId="0c0840b0-1ae7-42c8-98b5-b02d8f71a603" providerId="ADAL" clId="{100BBC7B-7ACA-4A4D-BA33-DEF31D162335}" dt="2025-12-11T16:47:40.889" v="3766" actId="47"/>
@@ -1264,24 +1225,157 @@
             <ac:spMk id="2" creationId="{BA21E4DD-A0E9-85A5-076F-15D48EB17A60}"/>
           </ac:spMkLst>
         </pc:spChg>
-        <pc:spChg chg="mod">
-          <ac:chgData name="Luisa Dickenmann" userId="0c0840b0-1ae7-42c8-98b5-b02d8f71a603" providerId="ADAL" clId="{100BBC7B-7ACA-4A4D-BA33-DEF31D162335}" dt="2025-12-12T09:54:28.617" v="4098" actId="20577"/>
-          <ac:spMkLst>
-            <pc:docMk/>
-            <pc:sldMk cId="3026645936" sldId="288"/>
-            <ac:spMk id="3" creationId="{F28F0F0A-631B-70F5-5626-2DE0EA30D885}"/>
-          </ac:spMkLst>
-        </pc:spChg>
       </pc:sldChg>
     </pc:docChg>
   </pc:docChgLst>
   <pc:docChgLst>
     <pc:chgData name="Luisa Dickenmann" userId="0c0840b0-1ae7-42c8-98b5-b02d8f71a603" providerId="ADAL" clId="{14F8172B-23CC-43AF-8874-FD0289D90325}"/>
-    <pc:docChg chg="custSel addSld modSld">
-      <pc:chgData name="Luisa Dickenmann" userId="0c0840b0-1ae7-42c8-98b5-b02d8f71a603" providerId="ADAL" clId="{14F8172B-23CC-43AF-8874-FD0289D90325}" dt="2026-01-19T15:59:48.578" v="36" actId="14100"/>
+    <pc:docChg chg="undo custSel addSld modSld">
+      <pc:chgData name="Luisa Dickenmann" userId="0c0840b0-1ae7-42c8-98b5-b02d8f71a603" providerId="ADAL" clId="{14F8172B-23CC-43AF-8874-FD0289D90325}" dt="2026-01-20T10:03:38.989" v="497" actId="14100"/>
       <pc:docMkLst>
         <pc:docMk/>
       </pc:docMkLst>
+      <pc:sldChg chg="delSp mod">
+        <pc:chgData name="Luisa Dickenmann" userId="0c0840b0-1ae7-42c8-98b5-b02d8f71a603" providerId="ADAL" clId="{14F8172B-23CC-43AF-8874-FD0289D90325}" dt="2026-01-20T09:59:25.610" v="395" actId="478"/>
+        <pc:sldMkLst>
+          <pc:docMk/>
+          <pc:sldMk cId="2468455985" sldId="262"/>
+        </pc:sldMkLst>
+        <pc:spChg chg="del">
+          <ac:chgData name="Luisa Dickenmann" userId="0c0840b0-1ae7-42c8-98b5-b02d8f71a603" providerId="ADAL" clId="{14F8172B-23CC-43AF-8874-FD0289D90325}" dt="2026-01-20T09:59:25.610" v="395" actId="478"/>
+          <ac:spMkLst>
+            <pc:docMk/>
+            <pc:sldMk cId="2468455985" sldId="262"/>
+            <ac:spMk id="6" creationId="{85B2C7B7-4BA9-EB08-7CDD-E8CB7044D6E1}"/>
+          </ac:spMkLst>
+        </pc:spChg>
+      </pc:sldChg>
+      <pc:sldChg chg="addSp delSp modSp mod">
+        <pc:chgData name="Luisa Dickenmann" userId="0c0840b0-1ae7-42c8-98b5-b02d8f71a603" providerId="ADAL" clId="{14F8172B-23CC-43AF-8874-FD0289D90325}" dt="2026-01-20T09:07:22.255" v="178" actId="1076"/>
+        <pc:sldMkLst>
+          <pc:docMk/>
+          <pc:sldMk cId="4087577250" sldId="272"/>
+        </pc:sldMkLst>
+        <pc:spChg chg="del mod">
+          <ac:chgData name="Luisa Dickenmann" userId="0c0840b0-1ae7-42c8-98b5-b02d8f71a603" providerId="ADAL" clId="{14F8172B-23CC-43AF-8874-FD0289D90325}" dt="2026-01-20T09:03:48.257" v="41" actId="478"/>
+          <ac:spMkLst>
+            <pc:docMk/>
+            <pc:sldMk cId="4087577250" sldId="272"/>
+            <ac:spMk id="3" creationId="{C4409357-62AB-C53D-577F-0FF4CFF2F18D}"/>
+          </ac:spMkLst>
+        </pc:spChg>
+        <pc:spChg chg="del">
+          <ac:chgData name="Luisa Dickenmann" userId="0c0840b0-1ae7-42c8-98b5-b02d8f71a603" providerId="ADAL" clId="{14F8172B-23CC-43AF-8874-FD0289D90325}" dt="2026-01-20T09:03:48.257" v="41" actId="478"/>
+          <ac:spMkLst>
+            <pc:docMk/>
+            <pc:sldMk cId="4087577250" sldId="272"/>
+            <ac:spMk id="4" creationId="{79AA551E-FA63-960E-F087-D4304A8C24A0}"/>
+          </ac:spMkLst>
+        </pc:spChg>
+        <pc:spChg chg="del">
+          <ac:chgData name="Luisa Dickenmann" userId="0c0840b0-1ae7-42c8-98b5-b02d8f71a603" providerId="ADAL" clId="{14F8172B-23CC-43AF-8874-FD0289D90325}" dt="2026-01-20T09:03:52.692" v="42" actId="478"/>
+          <ac:spMkLst>
+            <pc:docMk/>
+            <pc:sldMk cId="4087577250" sldId="272"/>
+            <ac:spMk id="6" creationId="{C5012472-E3FE-9887-B742-0271FEB26237}"/>
+          </ac:spMkLst>
+        </pc:spChg>
+        <pc:spChg chg="add del mod">
+          <ac:chgData name="Luisa Dickenmann" userId="0c0840b0-1ae7-42c8-98b5-b02d8f71a603" providerId="ADAL" clId="{14F8172B-23CC-43AF-8874-FD0289D90325}" dt="2026-01-20T09:05:46.036" v="44" actId="931"/>
+          <ac:spMkLst>
+            <pc:docMk/>
+            <pc:sldMk cId="4087577250" sldId="272"/>
+            <ac:spMk id="8" creationId="{4636A8C1-901A-F852-882B-F93096F3CBC4}"/>
+          </ac:spMkLst>
+        </pc:spChg>
+        <pc:spChg chg="add del mod">
+          <ac:chgData name="Luisa Dickenmann" userId="0c0840b0-1ae7-42c8-98b5-b02d8f71a603" providerId="ADAL" clId="{14F8172B-23CC-43AF-8874-FD0289D90325}" dt="2026-01-20T09:06:33.305" v="57" actId="931"/>
+          <ac:spMkLst>
+            <pc:docMk/>
+            <pc:sldMk cId="4087577250" sldId="272"/>
+            <ac:spMk id="12" creationId="{F6C0E19E-2012-166C-E9C8-C8900361B22C}"/>
+          </ac:spMkLst>
+        </pc:spChg>
+        <pc:spChg chg="add mod">
+          <ac:chgData name="Luisa Dickenmann" userId="0c0840b0-1ae7-42c8-98b5-b02d8f71a603" providerId="ADAL" clId="{14F8172B-23CC-43AF-8874-FD0289D90325}" dt="2026-01-20T09:07:22.255" v="178" actId="1076"/>
+          <ac:spMkLst>
+            <pc:docMk/>
+            <pc:sldMk cId="4087577250" sldId="272"/>
+            <ac:spMk id="15" creationId="{0410B80A-483E-9758-D0BC-2A3FAA118722}"/>
+          </ac:spMkLst>
+        </pc:spChg>
+        <pc:picChg chg="del">
+          <ac:chgData name="Luisa Dickenmann" userId="0c0840b0-1ae7-42c8-98b5-b02d8f71a603" providerId="ADAL" clId="{14F8172B-23CC-43AF-8874-FD0289D90325}" dt="2026-01-20T09:03:36.939" v="37" actId="478"/>
+          <ac:picMkLst>
+            <pc:docMk/>
+            <pc:sldMk cId="4087577250" sldId="272"/>
+            <ac:picMk id="5" creationId="{88AB1702-AC8E-BCAE-24FC-C14A03615DD3}"/>
+          </ac:picMkLst>
+        </pc:picChg>
+        <pc:picChg chg="add del mod">
+          <ac:chgData name="Luisa Dickenmann" userId="0c0840b0-1ae7-42c8-98b5-b02d8f71a603" providerId="ADAL" clId="{14F8172B-23CC-43AF-8874-FD0289D90325}" dt="2026-01-20T09:06:25.707" v="56" actId="478"/>
+          <ac:picMkLst>
+            <pc:docMk/>
+            <pc:sldMk cId="4087577250" sldId="272"/>
+            <ac:picMk id="10" creationId="{C1EF36F1-1A5B-5DDD-9916-942170ECF7F9}"/>
+          </ac:picMkLst>
+        </pc:picChg>
+        <pc:picChg chg="add mod">
+          <ac:chgData name="Luisa Dickenmann" userId="0c0840b0-1ae7-42c8-98b5-b02d8f71a603" providerId="ADAL" clId="{14F8172B-23CC-43AF-8874-FD0289D90325}" dt="2026-01-20T09:06:40.201" v="62" actId="1076"/>
+          <ac:picMkLst>
+            <pc:docMk/>
+            <pc:sldMk cId="4087577250" sldId="272"/>
+            <ac:picMk id="14" creationId="{E7EA355A-0AE0-3FC7-425D-CC8AF30BA613}"/>
+          </ac:picMkLst>
+        </pc:picChg>
+      </pc:sldChg>
+      <pc:sldChg chg="addSp delSp modSp mod">
+        <pc:chgData name="Luisa Dickenmann" userId="0c0840b0-1ae7-42c8-98b5-b02d8f71a603" providerId="ADAL" clId="{14F8172B-23CC-43AF-8874-FD0289D90325}" dt="2026-01-20T09:59:00.407" v="394" actId="20577"/>
+        <pc:sldMkLst>
+          <pc:docMk/>
+          <pc:sldMk cId="3026645936" sldId="288"/>
+        </pc:sldMkLst>
+        <pc:spChg chg="mod">
+          <ac:chgData name="Luisa Dickenmann" userId="0c0840b0-1ae7-42c8-98b5-b02d8f71a603" providerId="ADAL" clId="{14F8172B-23CC-43AF-8874-FD0289D90325}" dt="2026-01-20T09:56:51.324" v="208" actId="20577"/>
+          <ac:spMkLst>
+            <pc:docMk/>
+            <pc:sldMk cId="3026645936" sldId="288"/>
+            <ac:spMk id="2" creationId="{BA21E4DD-A0E9-85A5-076F-15D48EB17A60}"/>
+          </ac:spMkLst>
+        </pc:spChg>
+        <pc:spChg chg="del">
+          <ac:chgData name="Luisa Dickenmann" userId="0c0840b0-1ae7-42c8-98b5-b02d8f71a603" providerId="ADAL" clId="{14F8172B-23CC-43AF-8874-FD0289D90325}" dt="2026-01-20T09:56:33.732" v="179" actId="478"/>
+          <ac:spMkLst>
+            <pc:docMk/>
+            <pc:sldMk cId="3026645936" sldId="288"/>
+            <ac:spMk id="3" creationId="{F28F0F0A-631B-70F5-5626-2DE0EA30D885}"/>
+          </ac:spMkLst>
+        </pc:spChg>
+        <pc:spChg chg="add del mod">
+          <ac:chgData name="Luisa Dickenmann" userId="0c0840b0-1ae7-42c8-98b5-b02d8f71a603" providerId="ADAL" clId="{14F8172B-23CC-43AF-8874-FD0289D90325}" dt="2026-01-20T09:56:34.065" v="180"/>
+          <ac:spMkLst>
+            <pc:docMk/>
+            <pc:sldMk cId="3026645936" sldId="288"/>
+            <ac:spMk id="5" creationId="{7CB32EC1-53CF-C457-B86C-49BEC52998EE}"/>
+          </ac:spMkLst>
+        </pc:spChg>
+        <pc:spChg chg="add mod">
+          <ac:chgData name="Luisa Dickenmann" userId="0c0840b0-1ae7-42c8-98b5-b02d8f71a603" providerId="ADAL" clId="{14F8172B-23CC-43AF-8874-FD0289D90325}" dt="2026-01-20T09:59:00.407" v="394" actId="20577"/>
+          <ac:spMkLst>
+            <pc:docMk/>
+            <pc:sldMk cId="3026645936" sldId="288"/>
+            <ac:spMk id="8" creationId="{D6308013-9F3B-21BE-2B18-6CC0F86E6950}"/>
+          </ac:spMkLst>
+        </pc:spChg>
+        <pc:picChg chg="add mod">
+          <ac:chgData name="Luisa Dickenmann" userId="0c0840b0-1ae7-42c8-98b5-b02d8f71a603" providerId="ADAL" clId="{14F8172B-23CC-43AF-8874-FD0289D90325}" dt="2026-01-20T09:58:42.954" v="361" actId="1076"/>
+          <ac:picMkLst>
+            <pc:docMk/>
+            <pc:sldMk cId="3026645936" sldId="288"/>
+            <ac:picMk id="7" creationId="{83FE4AC2-629B-89C2-2501-78DB7F033960}"/>
+          </ac:picMkLst>
+        </pc:picChg>
+      </pc:sldChg>
       <pc:sldChg chg="addSp delSp modSp new mod">
         <pc:chgData name="Luisa Dickenmann" userId="0c0840b0-1ae7-42c8-98b5-b02d8f71a603" providerId="ADAL" clId="{14F8172B-23CC-43AF-8874-FD0289D90325}" dt="2026-01-19T15:59:48.578" v="36" actId="14100"/>
         <pc:sldMkLst>
@@ -1328,6 +1422,77 @@
             <ac:picMk id="9" creationId="{9DC3274B-287F-4CA0-BAE5-BEC9FBDB4565}"/>
           </ac:picMkLst>
         </pc:picChg>
+      </pc:sldChg>
+      <pc:sldChg chg="addSp delSp modSp new mod">
+        <pc:chgData name="Luisa Dickenmann" userId="0c0840b0-1ae7-42c8-98b5-b02d8f71a603" providerId="ADAL" clId="{14F8172B-23CC-43AF-8874-FD0289D90325}" dt="2026-01-20T10:03:38.989" v="497" actId="14100"/>
+        <pc:sldMkLst>
+          <pc:docMk/>
+          <pc:sldMk cId="2484633194" sldId="290"/>
+        </pc:sldMkLst>
+        <pc:spChg chg="mod">
+          <ac:chgData name="Luisa Dickenmann" userId="0c0840b0-1ae7-42c8-98b5-b02d8f71a603" providerId="ADAL" clId="{14F8172B-23CC-43AF-8874-FD0289D90325}" dt="2026-01-20T10:00:29.260" v="438" actId="20577"/>
+          <ac:spMkLst>
+            <pc:docMk/>
+            <pc:sldMk cId="2484633194" sldId="290"/>
+            <ac:spMk id="2" creationId="{CB90705A-AF72-94CA-8FF3-82B6CCE4E03D}"/>
+          </ac:spMkLst>
+        </pc:spChg>
+        <pc:spChg chg="del">
+          <ac:chgData name="Luisa Dickenmann" userId="0c0840b0-1ae7-42c8-98b5-b02d8f71a603" providerId="ADAL" clId="{14F8172B-23CC-43AF-8874-FD0289D90325}" dt="2026-01-20T10:00:12.082" v="397"/>
+          <ac:spMkLst>
+            <pc:docMk/>
+            <pc:sldMk cId="2484633194" sldId="290"/>
+            <ac:spMk id="3" creationId="{C6C396B1-6998-2EC3-FF49-EF2F3FF2F579}"/>
+          </ac:spMkLst>
+        </pc:spChg>
+        <pc:spChg chg="add del mod">
+          <ac:chgData name="Luisa Dickenmann" userId="0c0840b0-1ae7-42c8-98b5-b02d8f71a603" providerId="ADAL" clId="{14F8172B-23CC-43AF-8874-FD0289D90325}" dt="2026-01-20T10:02:05.225" v="443" actId="931"/>
+          <ac:spMkLst>
+            <pc:docMk/>
+            <pc:sldMk cId="2484633194" sldId="290"/>
+            <ac:spMk id="7" creationId="{5A1DF8DB-D287-6ABE-2C69-9B80533D40D2}"/>
+          </ac:spMkLst>
+        </pc:spChg>
+        <pc:spChg chg="add mod">
+          <ac:chgData name="Luisa Dickenmann" userId="0c0840b0-1ae7-42c8-98b5-b02d8f71a603" providerId="ADAL" clId="{14F8172B-23CC-43AF-8874-FD0289D90325}" dt="2026-01-20T10:03:38.989" v="497" actId="14100"/>
+          <ac:spMkLst>
+            <pc:docMk/>
+            <pc:sldMk cId="2484633194" sldId="290"/>
+            <ac:spMk id="10" creationId="{AC543367-7004-4E5C-8853-F801A6043E31}"/>
+          </ac:spMkLst>
+        </pc:spChg>
+        <pc:spChg chg="add mod">
+          <ac:chgData name="Luisa Dickenmann" userId="0c0840b0-1ae7-42c8-98b5-b02d8f71a603" providerId="ADAL" clId="{14F8172B-23CC-43AF-8874-FD0289D90325}" dt="2026-01-20T10:03:14.533" v="495" actId="14100"/>
+          <ac:spMkLst>
+            <pc:docMk/>
+            <pc:sldMk cId="2484633194" sldId="290"/>
+            <ac:spMk id="11" creationId="{A161E2C1-F3E8-9639-C02A-FCF99FAC3040}"/>
+          </ac:spMkLst>
+        </pc:spChg>
+        <pc:picChg chg="add del mod">
+          <ac:chgData name="Luisa Dickenmann" userId="0c0840b0-1ae7-42c8-98b5-b02d8f71a603" providerId="ADAL" clId="{14F8172B-23CC-43AF-8874-FD0289D90325}" dt="2026-01-20T10:00:35.315" v="442" actId="478"/>
+          <ac:picMkLst>
+            <pc:docMk/>
+            <pc:sldMk cId="2484633194" sldId="290"/>
+            <ac:picMk id="5" creationId="{8ACD93FA-2918-AB4A-3BE9-0E3A2F8ABBE3}"/>
+          </ac:picMkLst>
+        </pc:picChg>
+        <pc:picChg chg="add mod">
+          <ac:chgData name="Luisa Dickenmann" userId="0c0840b0-1ae7-42c8-98b5-b02d8f71a603" providerId="ADAL" clId="{14F8172B-23CC-43AF-8874-FD0289D90325}" dt="2026-01-20T10:02:12.437" v="448" actId="1076"/>
+          <ac:picMkLst>
+            <pc:docMk/>
+            <pc:sldMk cId="2484633194" sldId="290"/>
+            <ac:picMk id="9" creationId="{869DD54A-0F8A-92EF-88E7-A64854B7A78A}"/>
+          </ac:picMkLst>
+        </pc:picChg>
+        <pc:cxnChg chg="add mod">
+          <ac:chgData name="Luisa Dickenmann" userId="0c0840b0-1ae7-42c8-98b5-b02d8f71a603" providerId="ADAL" clId="{14F8172B-23CC-43AF-8874-FD0289D90325}" dt="2026-01-20T10:03:38.989" v="497" actId="14100"/>
+          <ac:cxnSpMkLst>
+            <pc:docMk/>
+            <pc:sldMk cId="2484633194" sldId="290"/>
+            <ac:cxnSpMk id="13" creationId="{41B53F7D-F308-D58D-B94B-6E007EBD816E}"/>
+          </ac:cxnSpMkLst>
+        </pc:cxnChg>
       </pc:sldChg>
     </pc:docChg>
   </pc:docChgLst>
@@ -1919,7 +2084,7 @@
           <a:p>
             <a:fld id="{00BEF3A4-E543-4418-A8C6-AC4DBC501A73}" type="slidenum">
               <a:rPr lang="en-GB" smtClean="0"/>
-              <a:t>27</a:t>
+              <a:t>28</a:t>
             </a:fld>
             <a:endParaRPr lang="en-GB"/>
           </a:p>
@@ -2007,7 +2172,7 @@
           <a:p>
             <a:fld id="{00BEF3A4-E543-4418-A8C6-AC4DBC501A73}" type="slidenum">
               <a:rPr lang="en-GB" smtClean="0"/>
-              <a:t>29</a:t>
+              <a:t>30</a:t>
             </a:fld>
             <a:endParaRPr lang="en-GB"/>
           </a:p>
@@ -5416,10 +5581,10 @@
       </p:sp>
       <p:pic>
         <p:nvPicPr>
-          <p:cNvPr id="5" name="Content Placeholder 4">
+          <p:cNvPr id="14" name="Content Placeholder 13" descr="A blue and white graph&#10;&#10;AI-generated content may be incorrect.">
             <a:extLst>
               <a:ext uri="{FF2B5EF4-FFF2-40B4-BE49-F238E27FC236}">
-                <a16:creationId xmlns:a16="http://schemas.microsoft.com/office/drawing/2014/main" id="{88AB1702-AC8E-BCAE-24FC-C14A03615DD3}"/>
+                <a16:creationId xmlns:a16="http://schemas.microsoft.com/office/drawing/2014/main" id="{E7EA355A-0AE0-3FC7-425D-CC8AF30BA613}"/>
               </a:ext>
             </a:extLst>
           </p:cNvPr>
@@ -5438,22 +5603,23 @@
               </a:ext>
             </a:extLst>
           </a:blip>
-          <a:srcRect t="6549"/>
-          <a:stretch/>
+          <a:stretch>
+            <a:fillRect/>
+          </a:stretch>
         </p:blipFill>
         <p:spPr>
           <a:xfrm>
-            <a:off x="1226129" y="1095555"/>
-            <a:ext cx="9739742" cy="5518605"/>
+            <a:off x="974253" y="1029151"/>
+            <a:ext cx="9875520" cy="5605329"/>
           </a:xfrm>
         </p:spPr>
       </p:pic>
       <p:sp>
         <p:nvSpPr>
-          <p:cNvPr id="6" name="TextBox 5">
+          <p:cNvPr id="15" name="TextBox 14">
             <a:extLst>
               <a:ext uri="{FF2B5EF4-FFF2-40B4-BE49-F238E27FC236}">
-                <a16:creationId xmlns:a16="http://schemas.microsoft.com/office/drawing/2014/main" id="{C5012472-E3FE-9887-B742-0271FEB26237}"/>
+                <a16:creationId xmlns:a16="http://schemas.microsoft.com/office/drawing/2014/main" id="{0410B80A-483E-9758-D0BC-2A3FAA118722}"/>
               </a:ext>
             </a:extLst>
           </p:cNvPr>
@@ -5462,8 +5628,8 @@
         </p:nvSpPr>
         <p:spPr>
           <a:xfrm>
-            <a:off x="5382883" y="586596"/>
-            <a:ext cx="3045125" cy="369332"/>
+            <a:off x="6172200" y="382820"/>
+            <a:ext cx="5660571" cy="646331"/>
           </a:xfrm>
           <a:prstGeom prst="rect">
             <a:avLst/>
@@ -5478,97 +5644,9 @@
           <a:p>
             <a:r>
               <a:rPr lang="de-CH" dirty="0"/>
-              <a:t>Top and bottom 10 Families</a:t>
+              <a:t>Arranged by percent alive -&gt; families have different numbers of initial trees but same percentage alive</a:t>
             </a:r>
             <a:endParaRPr lang="en-GB" dirty="0"/>
-          </a:p>
-        </p:txBody>
-      </p:sp>
-      <p:sp>
-        <p:nvSpPr>
-          <p:cNvPr id="3" name="TextBox 2">
-            <a:extLst>
-              <a:ext uri="{FF2B5EF4-FFF2-40B4-BE49-F238E27FC236}">
-                <a16:creationId xmlns:a16="http://schemas.microsoft.com/office/drawing/2014/main" id="{C4409357-62AB-C53D-577F-0FF4CFF2F18D}"/>
-              </a:ext>
-            </a:extLst>
-          </p:cNvPr>
-          <p:cNvSpPr txBox="1"/>
-          <p:nvPr/>
-        </p:nvSpPr>
-        <p:spPr>
-          <a:xfrm>
-            <a:off x="7626539" y="3956766"/>
-            <a:ext cx="2353734" cy="646331"/>
-          </a:xfrm>
-          <a:prstGeom prst="rect">
-            <a:avLst/>
-          </a:prstGeom>
-          <a:noFill/>
-        </p:spPr>
-        <p:txBody>
-          <a:bodyPr wrap="square" rtlCol="0">
-            <a:spAutoFit/>
-          </a:bodyPr>
-          <a:lstStyle/>
-          <a:p>
-            <a:r>
-              <a:rPr lang="de-CH" dirty="0"/>
-              <a:t>Why so many with exactly 50%??</a:t>
-            </a:r>
-            <a:endParaRPr lang="en-GB" dirty="0"/>
-          </a:p>
-        </p:txBody>
-      </p:sp>
-      <p:sp>
-        <p:nvSpPr>
-          <p:cNvPr id="4" name="Rectangle: Rounded Corners 3">
-            <a:extLst>
-              <a:ext uri="{FF2B5EF4-FFF2-40B4-BE49-F238E27FC236}">
-                <a16:creationId xmlns:a16="http://schemas.microsoft.com/office/drawing/2014/main" id="{79AA551E-FA63-960E-F087-D4304A8C24A0}"/>
-              </a:ext>
-            </a:extLst>
-          </p:cNvPr>
-          <p:cNvSpPr/>
-          <p:nvPr/>
-        </p:nvSpPr>
-        <p:spPr>
-          <a:xfrm>
-            <a:off x="6096000" y="3429000"/>
-            <a:ext cx="1507067" cy="1905000"/>
-          </a:xfrm>
-          <a:prstGeom prst="roundRect">
-            <a:avLst/>
-          </a:prstGeom>
-          <a:noFill/>
-          <a:ln w="38100">
-            <a:solidFill>
-              <a:srgbClr val="FF0000"/>
-            </a:solidFill>
-          </a:ln>
-        </p:spPr>
-        <p:style>
-          <a:lnRef idx="2">
-            <a:schemeClr val="accent1">
-              <a:shade val="15000"/>
-            </a:schemeClr>
-          </a:lnRef>
-          <a:fillRef idx="1">
-            <a:schemeClr val="accent1"/>
-          </a:fillRef>
-          <a:effectRef idx="0">
-            <a:schemeClr val="accent1"/>
-          </a:effectRef>
-          <a:fontRef idx="minor">
-            <a:schemeClr val="lt1"/>
-          </a:fontRef>
-        </p:style>
-        <p:txBody>
-          <a:bodyPr rtlCol="0" anchor="ctr"/>
-          <a:lstStyle/>
-          <a:p>
-            <a:pPr algn="ctr"/>
-            <a:endParaRPr lang="en-GB"/>
           </a:p>
         </p:txBody>
       </p:sp>
@@ -5618,43 +5696,96 @@
             <p:ph type="title"/>
           </p:nvPr>
         </p:nvSpPr>
-        <p:spPr/>
+        <p:spPr>
+          <a:xfrm>
+            <a:off x="195943" y="174172"/>
+            <a:ext cx="9875520" cy="1356360"/>
+          </a:xfrm>
+        </p:spPr>
         <p:txBody>
           <a:bodyPr/>
           <a:lstStyle/>
           <a:p>
             <a:r>
               <a:rPr lang="de-CH" dirty="0"/>
-              <a:t>Interaction</a:t>
+              <a:t>Interaction – Provenance and Cohort</a:t>
             </a:r>
             <a:endParaRPr lang="en-GB" dirty="0"/>
           </a:p>
         </p:txBody>
       </p:sp>
-      <p:sp>
-        <p:nvSpPr>
-          <p:cNvPr id="3" name="Content Placeholder 2">
+      <p:pic>
+        <p:nvPicPr>
+          <p:cNvPr id="7" name="Content Placeholder 6" descr="A graph of different colored bars&#10;&#10;AI-generated content may be incorrect.">
             <a:extLst>
               <a:ext uri="{FF2B5EF4-FFF2-40B4-BE49-F238E27FC236}">
-                <a16:creationId xmlns:a16="http://schemas.microsoft.com/office/drawing/2014/main" id="{F28F0F0A-631B-70F5-5626-2DE0EA30D885}"/>
+                <a16:creationId xmlns:a16="http://schemas.microsoft.com/office/drawing/2014/main" id="{83FE4AC2-629B-89C2-2501-78DB7F033960}"/>
               </a:ext>
             </a:extLst>
           </p:cNvPr>
-          <p:cNvSpPr>
-            <a:spLocks noGrp="1"/>
-          </p:cNvSpPr>
+          <p:cNvPicPr>
+            <a:picLocks noGrp="1" noChangeAspect="1"/>
+          </p:cNvPicPr>
           <p:nvPr>
             <p:ph idx="1"/>
           </p:nvPr>
-        </p:nvSpPr>
-        <p:spPr/>
-        <p:txBody>
-          <a:bodyPr/>
+        </p:nvPicPr>
+        <p:blipFill>
+          <a:blip r:embed="rId2">
+            <a:extLst>
+              <a:ext uri="{28A0092B-C50C-407E-A947-70E740481C1C}">
+                <a14:useLocalDpi xmlns:a14="http://schemas.microsoft.com/office/drawing/2010/main" val="0"/>
+              </a:ext>
+            </a:extLst>
+          </a:blip>
+          <a:stretch>
+            <a:fillRect/>
+          </a:stretch>
+        </p:blipFill>
+        <p:spPr>
+          <a:xfrm>
+            <a:off x="462040" y="1211688"/>
+            <a:ext cx="8785975" cy="5291387"/>
+          </a:xfrm>
+        </p:spPr>
+      </p:pic>
+      <p:sp>
+        <p:nvSpPr>
+          <p:cNvPr id="8" name="TextBox 7">
+            <a:extLst>
+              <a:ext uri="{FF2B5EF4-FFF2-40B4-BE49-F238E27FC236}">
+                <a16:creationId xmlns:a16="http://schemas.microsoft.com/office/drawing/2014/main" id="{D6308013-9F3B-21BE-2B18-6CC0F86E6950}"/>
+              </a:ext>
+            </a:extLst>
+          </p:cNvPr>
+          <p:cNvSpPr txBox="1"/>
+          <p:nvPr/>
+        </p:nvSpPr>
+        <p:spPr>
+          <a:xfrm>
+            <a:off x="9238706" y="473024"/>
+            <a:ext cx="2757351" cy="1754326"/>
+          </a:xfrm>
+          <a:prstGeom prst="rect">
+            <a:avLst/>
+          </a:prstGeom>
+          <a:noFill/>
+        </p:spPr>
+        <p:txBody>
+          <a:bodyPr wrap="square" rtlCol="0">
+            <a:spAutoFit/>
+          </a:bodyPr>
           <a:lstStyle/>
           <a:p>
             <a:r>
               <a:rPr lang="de-CH" dirty="0"/>
-              <a:t>Mortality based on type AND provenance</a:t>
+              <a:t>GLMM model says Provenance has strongest effect (14% of variation) and Type (cohort) also strong effect (11%) </a:t>
+            </a:r>
+          </a:p>
+          <a:p>
+            <a:r>
+              <a:rPr lang="de-CH" dirty="0"/>
+              <a:t>Family = random effect</a:t>
             </a:r>
             <a:endParaRPr lang="en-GB" dirty="0"/>
           </a:p>
@@ -6096,60 +6227,6 @@
               <a:t>Height – by Provenance</a:t>
             </a:r>
             <a:endParaRPr lang="en-GB" dirty="0"/>
-          </a:p>
-        </p:txBody>
-      </p:sp>
-      <p:sp>
-        <p:nvSpPr>
-          <p:cNvPr id="6" name="TextBox 5">
-            <a:extLst>
-              <a:ext uri="{FF2B5EF4-FFF2-40B4-BE49-F238E27FC236}">
-                <a16:creationId xmlns:a16="http://schemas.microsoft.com/office/drawing/2014/main" id="{85B2C7B7-4BA9-EB08-7CDD-E8CB7044D6E1}"/>
-              </a:ext>
-            </a:extLst>
-          </p:cNvPr>
-          <p:cNvSpPr txBox="1"/>
-          <p:nvPr/>
-        </p:nvSpPr>
-        <p:spPr>
-          <a:xfrm>
-            <a:off x="8270240" y="670560"/>
-            <a:ext cx="2661920" cy="923330"/>
-          </a:xfrm>
-          <a:prstGeom prst="rect">
-            <a:avLst/>
-          </a:prstGeom>
-          <a:noFill/>
-        </p:spPr>
-        <p:txBody>
-          <a:bodyPr wrap="square" rtlCol="0">
-            <a:spAutoFit/>
-          </a:bodyPr>
-          <a:lstStyle/>
-          <a:p>
-            <a:r>
-              <a:rPr lang="de-CH" dirty="0">
-                <a:solidFill>
-                  <a:srgbClr val="FF0000"/>
-                </a:solidFill>
-              </a:rPr>
-              <a:t>How many height values for each provenance?</a:t>
-            </a:r>
-          </a:p>
-          <a:p>
-            <a:r>
-              <a:rPr lang="de-CH" dirty="0">
-                <a:solidFill>
-                  <a:srgbClr val="FF0000"/>
-                </a:solidFill>
-              </a:rPr>
-              <a:t>How many NAs</a:t>
-            </a:r>
-            <a:endParaRPr lang="en-GB" dirty="0">
-              <a:solidFill>
-                <a:srgbClr val="FF0000"/>
-              </a:solidFill>
-            </a:endParaRPr>
           </a:p>
         </p:txBody>
       </p:sp>
@@ -8627,7 +8704,7 @@
           <p:cNvPr id="2" name="Title 1">
             <a:extLst>
               <a:ext uri="{FF2B5EF4-FFF2-40B4-BE49-F238E27FC236}">
-                <a16:creationId xmlns:a16="http://schemas.microsoft.com/office/drawing/2014/main" id="{7C06FE14-95D7-2C34-3B1C-7E62C27D5BD5}"/>
+                <a16:creationId xmlns:a16="http://schemas.microsoft.com/office/drawing/2014/main" id="{CB90705A-AF72-94CA-8FF3-82B6CCE4E03D}"/>
               </a:ext>
             </a:extLst>
           </p:cNvPr>
@@ -8638,48 +8715,234 @@
             <p:ph type="title"/>
           </p:nvPr>
         </p:nvSpPr>
-        <p:spPr/>
+        <p:spPr>
+          <a:xfrm>
+            <a:off x="228600" y="250371"/>
+            <a:ext cx="9875520" cy="1356360"/>
+          </a:xfrm>
+        </p:spPr>
         <p:txBody>
           <a:bodyPr/>
           <a:lstStyle/>
           <a:p>
             <a:r>
               <a:rPr lang="de-CH" dirty="0"/>
-              <a:t>Overlay BS &amp; BB data with temperature</a:t>
+              <a:t>BS &amp; BB offset</a:t>
             </a:r>
             <a:endParaRPr lang="en-GB" dirty="0"/>
           </a:p>
         </p:txBody>
       </p:sp>
-      <p:sp>
-        <p:nvSpPr>
-          <p:cNvPr id="3" name="Content Placeholder 2">
+      <p:pic>
+        <p:nvPicPr>
+          <p:cNvPr id="9" name="Content Placeholder 8" descr="A graph of a graph&#10;&#10;AI-generated content may be incorrect.">
             <a:extLst>
               <a:ext uri="{FF2B5EF4-FFF2-40B4-BE49-F238E27FC236}">
-                <a16:creationId xmlns:a16="http://schemas.microsoft.com/office/drawing/2014/main" id="{F6DB63F4-FC30-DECB-6678-B7E5BBA0AA7F}"/>
+                <a16:creationId xmlns:a16="http://schemas.microsoft.com/office/drawing/2014/main" id="{869DD54A-0F8A-92EF-88E7-A64854B7A78A}"/>
               </a:ext>
             </a:extLst>
           </p:cNvPr>
-          <p:cNvSpPr>
-            <a:spLocks noGrp="1"/>
-          </p:cNvSpPr>
+          <p:cNvPicPr>
+            <a:picLocks noGrp="1" noChangeAspect="1"/>
+          </p:cNvPicPr>
           <p:nvPr>
             <p:ph idx="1"/>
           </p:nvPr>
-        </p:nvSpPr>
-        <p:spPr/>
-        <p:txBody>
-          <a:bodyPr/>
-          <a:lstStyle/>
-          <a:p>
+        </p:nvPicPr>
+        <p:blipFill>
+          <a:blip r:embed="rId2">
+            <a:extLst>
+              <a:ext uri="{28A0092B-C50C-407E-A947-70E740481C1C}">
+                <a14:useLocalDpi xmlns:a14="http://schemas.microsoft.com/office/drawing/2010/main" val="0"/>
+              </a:ext>
+            </a:extLst>
+          </a:blip>
+          <a:stretch>
+            <a:fillRect/>
+          </a:stretch>
+        </p:blipFill>
+        <p:spPr>
+          <a:xfrm>
+            <a:off x="2786744" y="1396773"/>
+            <a:ext cx="9013371" cy="5210856"/>
+          </a:xfrm>
+        </p:spPr>
+      </p:pic>
+      <p:sp>
+        <p:nvSpPr>
+          <p:cNvPr id="10" name="Rectangle: Rounded Corners 9">
+            <a:extLst>
+              <a:ext uri="{FF2B5EF4-FFF2-40B4-BE49-F238E27FC236}">
+                <a16:creationId xmlns:a16="http://schemas.microsoft.com/office/drawing/2014/main" id="{AC543367-7004-4E5C-8853-F801A6043E31}"/>
+              </a:ext>
+            </a:extLst>
+          </p:cNvPr>
+          <p:cNvSpPr/>
+          <p:nvPr/>
+        </p:nvSpPr>
+        <p:spPr>
+          <a:xfrm>
+            <a:off x="3494314" y="5323114"/>
+            <a:ext cx="1676400" cy="805543"/>
+          </a:xfrm>
+          <a:prstGeom prst="roundRect">
+            <a:avLst/>
+          </a:prstGeom>
+          <a:noFill/>
+          <a:ln>
+            <a:solidFill>
+              <a:srgbClr val="FF0000"/>
+            </a:solidFill>
+          </a:ln>
+        </p:spPr>
+        <p:style>
+          <a:lnRef idx="2">
+            <a:schemeClr val="accent1">
+              <a:shade val="15000"/>
+            </a:schemeClr>
+          </a:lnRef>
+          <a:fillRef idx="1">
+            <a:schemeClr val="accent1"/>
+          </a:fillRef>
+          <a:effectRef idx="0">
+            <a:schemeClr val="accent1"/>
+          </a:effectRef>
+          <a:fontRef idx="minor">
+            <a:schemeClr val="lt1"/>
+          </a:fontRef>
+        </p:style>
+        <p:txBody>
+          <a:bodyPr rtlCol="0" anchor="ctr"/>
+          <a:lstStyle/>
+          <a:p>
+            <a:pPr algn="ctr"/>
             <a:endParaRPr lang="en-GB"/>
           </a:p>
         </p:txBody>
       </p:sp>
+      <p:sp>
+        <p:nvSpPr>
+          <p:cNvPr id="11" name="TextBox 10">
+            <a:extLst>
+              <a:ext uri="{FF2B5EF4-FFF2-40B4-BE49-F238E27FC236}">
+                <a16:creationId xmlns:a16="http://schemas.microsoft.com/office/drawing/2014/main" id="{A161E2C1-F3E8-9639-C02A-FCF99FAC3040}"/>
+              </a:ext>
+            </a:extLst>
+          </p:cNvPr>
+          <p:cNvSpPr txBox="1"/>
+          <p:nvPr/>
+        </p:nvSpPr>
+        <p:spPr>
+          <a:xfrm>
+            <a:off x="228600" y="4584063"/>
+            <a:ext cx="2852057" cy="2023565"/>
+          </a:xfrm>
+          <a:prstGeom prst="rect">
+            <a:avLst/>
+          </a:prstGeom>
+          <a:noFill/>
+        </p:spPr>
+        <p:txBody>
+          <a:bodyPr wrap="square" rtlCol="0">
+            <a:spAutoFit/>
+          </a:bodyPr>
+          <a:lstStyle/>
+          <a:p>
+            <a:r>
+              <a:rPr lang="de-CH" dirty="0"/>
+              <a:t>6 trees with budset </a:t>
+            </a:r>
+            <a:r>
+              <a:rPr lang="de-CH" b="1" dirty="0"/>
+              <a:t>after</a:t>
+            </a:r>
+            <a:r>
+              <a:rPr lang="de-CH" dirty="0"/>
+              <a:t> budburst</a:t>
+            </a:r>
+          </a:p>
+          <a:p>
+            <a:r>
+              <a:rPr lang="de-CH" dirty="0"/>
+              <a:t>(</a:t>
+            </a:r>
+            <a:r>
+              <a:rPr lang="en-GB" dirty="0"/>
+              <a:t>no </a:t>
+            </a:r>
+            <a:r>
+              <a:rPr lang="en-GB" dirty="0" err="1"/>
+              <a:t>budset</a:t>
+            </a:r>
+            <a:r>
+              <a:rPr lang="en-GB" dirty="0"/>
+              <a:t> recorded, then </a:t>
+            </a:r>
+            <a:r>
+              <a:rPr lang="en-GB" dirty="0" err="1"/>
+              <a:t>budset</a:t>
+            </a:r>
+            <a:r>
+              <a:rPr lang="en-GB" dirty="0"/>
+              <a:t> &amp; budburst simultaneously, then "second" </a:t>
+            </a:r>
+            <a:r>
+              <a:rPr lang="en-GB" dirty="0" err="1"/>
+              <a:t>budset</a:t>
+            </a:r>
+            <a:r>
+              <a:rPr lang="en-GB" dirty="0"/>
+              <a:t> afterwards??)</a:t>
+            </a:r>
+          </a:p>
+        </p:txBody>
+      </p:sp>
+      <p:cxnSp>
+        <p:nvCxnSpPr>
+          <p:cNvPr id="13" name="Straight Arrow Connector 12">
+            <a:extLst>
+              <a:ext uri="{FF2B5EF4-FFF2-40B4-BE49-F238E27FC236}">
+                <a16:creationId xmlns:a16="http://schemas.microsoft.com/office/drawing/2014/main" id="{41B53F7D-F308-D58D-B94B-6E007EBD816E}"/>
+              </a:ext>
+            </a:extLst>
+          </p:cNvPr>
+          <p:cNvCxnSpPr>
+            <a:cxnSpLocks/>
+            <a:stCxn id="10" idx="1"/>
+          </p:cNvCxnSpPr>
+          <p:nvPr/>
+        </p:nvCxnSpPr>
+        <p:spPr>
+          <a:xfrm flipH="1">
+            <a:off x="2710543" y="5725886"/>
+            <a:ext cx="783771" cy="10885"/>
+          </a:xfrm>
+          <a:prstGeom prst="straightConnector1">
+            <a:avLst/>
+          </a:prstGeom>
+          <a:ln>
+            <a:tailEnd type="triangle"/>
+          </a:ln>
+        </p:spPr>
+        <p:style>
+          <a:lnRef idx="1">
+            <a:schemeClr val="accent1"/>
+          </a:lnRef>
+          <a:fillRef idx="0">
+            <a:schemeClr val="accent1"/>
+          </a:fillRef>
+          <a:effectRef idx="0">
+            <a:schemeClr val="accent1"/>
+          </a:effectRef>
+          <a:fontRef idx="minor">
+            <a:schemeClr val="tx1"/>
+          </a:fontRef>
+        </p:style>
+      </p:cxnSp>
     </p:spTree>
     <p:extLst>
       <p:ext uri="{BB962C8B-B14F-4D97-AF65-F5344CB8AC3E}">
-        <p14:creationId xmlns:p14="http://schemas.microsoft.com/office/powerpoint/2010/main" val="3635244816"/>
+        <p14:creationId xmlns:p14="http://schemas.microsoft.com/office/powerpoint/2010/main" val="2484633194"/>
       </p:ext>
     </p:extLst>
   </p:cSld>
@@ -8711,7 +8974,7 @@
           <p:cNvPr id="2" name="Title 1">
             <a:extLst>
               <a:ext uri="{FF2B5EF4-FFF2-40B4-BE49-F238E27FC236}">
-                <a16:creationId xmlns:a16="http://schemas.microsoft.com/office/drawing/2014/main" id="{8FEE9FEA-9B3E-6A9F-C090-44E2DA4F43D8}"/>
+                <a16:creationId xmlns:a16="http://schemas.microsoft.com/office/drawing/2014/main" id="{7C06FE14-95D7-2C34-3B1C-7E62C27D5BD5}"/>
               </a:ext>
             </a:extLst>
           </p:cNvPr>
@@ -8729,7 +8992,7 @@
           <a:p>
             <a:r>
               <a:rPr lang="de-CH" dirty="0"/>
-              <a:t>Cumulative BS/BB curve (per provenance/type)</a:t>
+              <a:t>Overlay BS &amp; BB data with temperature</a:t>
             </a:r>
             <a:endParaRPr lang="en-GB" dirty="0"/>
           </a:p>
@@ -8740,7 +9003,7 @@
           <p:cNvPr id="3" name="Content Placeholder 2">
             <a:extLst>
               <a:ext uri="{FF2B5EF4-FFF2-40B4-BE49-F238E27FC236}">
-                <a16:creationId xmlns:a16="http://schemas.microsoft.com/office/drawing/2014/main" id="{3877EDF9-8919-0183-EBBC-47FDE664CADB}"/>
+                <a16:creationId xmlns:a16="http://schemas.microsoft.com/office/drawing/2014/main" id="{F6DB63F4-FC30-DECB-6678-B7E5BBA0AA7F}"/>
               </a:ext>
             </a:extLst>
           </p:cNvPr>
@@ -8763,7 +9026,7 @@
     </p:spTree>
     <p:extLst>
       <p:ext uri="{BB962C8B-B14F-4D97-AF65-F5344CB8AC3E}">
-        <p14:creationId xmlns:p14="http://schemas.microsoft.com/office/powerpoint/2010/main" val="4162262758"/>
+        <p14:creationId xmlns:p14="http://schemas.microsoft.com/office/powerpoint/2010/main" val="3635244816"/>
       </p:ext>
     </p:extLst>
   </p:cSld>
@@ -8795,7 +9058,7 @@
           <p:cNvPr id="2" name="Title 1">
             <a:extLst>
               <a:ext uri="{FF2B5EF4-FFF2-40B4-BE49-F238E27FC236}">
-                <a16:creationId xmlns:a16="http://schemas.microsoft.com/office/drawing/2014/main" id="{EF986BC2-00B2-FE0A-3FD2-8B3983EDDD41}"/>
+                <a16:creationId xmlns:a16="http://schemas.microsoft.com/office/drawing/2014/main" id="{8FEE9FEA-9B3E-6A9F-C090-44E2DA4F43D8}"/>
               </a:ext>
             </a:extLst>
           </p:cNvPr>
@@ -8806,254 +9069,48 @@
             <p:ph type="title"/>
           </p:nvPr>
         </p:nvSpPr>
-        <p:spPr>
-          <a:xfrm>
-            <a:off x="215900" y="215900"/>
-            <a:ext cx="9875520" cy="1356360"/>
-          </a:xfrm>
-        </p:spPr>
+        <p:spPr/>
         <p:txBody>
           <a:bodyPr/>
           <a:lstStyle/>
           <a:p>
             <a:r>
               <a:rPr lang="de-CH" dirty="0"/>
-              <a:t>Budset &amp; Budburst - Provenance</a:t>
+              <a:t>Cumulative BS/BB curve (per provenance/type)</a:t>
             </a:r>
             <a:endParaRPr lang="en-GB" dirty="0"/>
           </a:p>
         </p:txBody>
       </p:sp>
-      <p:pic>
-        <p:nvPicPr>
-          <p:cNvPr id="5" name="Content Placeholder 4" descr="A graph of a graph&#10;&#10;AI-generated content may be incorrect.">
+      <p:sp>
+        <p:nvSpPr>
+          <p:cNvPr id="3" name="Content Placeholder 2">
             <a:extLst>
               <a:ext uri="{FF2B5EF4-FFF2-40B4-BE49-F238E27FC236}">
-                <a16:creationId xmlns:a16="http://schemas.microsoft.com/office/drawing/2014/main" id="{9E7923FB-1127-0B4E-8720-F56777E2285D}"/>
+                <a16:creationId xmlns:a16="http://schemas.microsoft.com/office/drawing/2014/main" id="{3877EDF9-8919-0183-EBBC-47FDE664CADB}"/>
               </a:ext>
             </a:extLst>
           </p:cNvPr>
-          <p:cNvPicPr>
-            <a:picLocks noGrp="1" noChangeAspect="1"/>
-          </p:cNvPicPr>
+          <p:cNvSpPr>
+            <a:spLocks noGrp="1"/>
+          </p:cNvSpPr>
           <p:nvPr>
             <p:ph idx="1"/>
           </p:nvPr>
-        </p:nvPicPr>
-        <p:blipFill>
-          <a:blip r:embed="rId3">
-            <a:extLst>
-              <a:ext uri="{28A0092B-C50C-407E-A947-70E740481C1C}">
-                <a14:useLocalDpi xmlns:a14="http://schemas.microsoft.com/office/drawing/2010/main" val="0"/>
-              </a:ext>
-            </a:extLst>
-          </a:blip>
-          <a:stretch>
-            <a:fillRect/>
-          </a:stretch>
-        </p:blipFill>
-        <p:spPr>
-          <a:xfrm>
-            <a:off x="1818655" y="1294466"/>
-            <a:ext cx="8554689" cy="5309534"/>
-          </a:xfrm>
-        </p:spPr>
-      </p:pic>
-      <p:cxnSp>
-        <p:nvCxnSpPr>
-          <p:cNvPr id="7" name="Straight Arrow Connector 6">
-            <a:extLst>
-              <a:ext uri="{FF2B5EF4-FFF2-40B4-BE49-F238E27FC236}">
-                <a16:creationId xmlns:a16="http://schemas.microsoft.com/office/drawing/2014/main" id="{25D74AA0-35DD-764B-F3C0-5ECE2236E1C8}"/>
-              </a:ext>
-            </a:extLst>
-          </p:cNvPr>
-          <p:cNvCxnSpPr>
-            <a:cxnSpLocks/>
-          </p:cNvCxnSpPr>
-          <p:nvPr/>
-        </p:nvCxnSpPr>
-        <p:spPr>
-          <a:xfrm flipH="1">
-            <a:off x="8775700" y="3111500"/>
-            <a:ext cx="1701800" cy="244733"/>
-          </a:xfrm>
-          <a:prstGeom prst="straightConnector1">
-            <a:avLst/>
-          </a:prstGeom>
-          <a:ln>
-            <a:tailEnd type="triangle"/>
-          </a:ln>
-        </p:spPr>
-        <p:style>
-          <a:lnRef idx="1">
-            <a:schemeClr val="accent1"/>
-          </a:lnRef>
-          <a:fillRef idx="0">
-            <a:schemeClr val="accent1"/>
-          </a:fillRef>
-          <a:effectRef idx="0">
-            <a:schemeClr val="accent1"/>
-          </a:effectRef>
-          <a:fontRef idx="minor">
-            <a:schemeClr val="tx1"/>
-          </a:fontRef>
-        </p:style>
-      </p:cxnSp>
-      <p:sp>
-        <p:nvSpPr>
-          <p:cNvPr id="10" name="TextBox 9">
-            <a:extLst>
-              <a:ext uri="{FF2B5EF4-FFF2-40B4-BE49-F238E27FC236}">
-                <a16:creationId xmlns:a16="http://schemas.microsoft.com/office/drawing/2014/main" id="{AFE8A3AE-E1B6-A94E-7C86-528849D7B52B}"/>
-              </a:ext>
-            </a:extLst>
-          </p:cNvPr>
-          <p:cNvSpPr txBox="1"/>
-          <p:nvPr/>
-        </p:nvSpPr>
-        <p:spPr>
-          <a:xfrm>
-            <a:off x="10477500" y="2833132"/>
-            <a:ext cx="1130299" cy="369332"/>
-          </a:xfrm>
-          <a:prstGeom prst="rect">
-            <a:avLst/>
-          </a:prstGeom>
-          <a:noFill/>
-        </p:spPr>
-        <p:txBody>
-          <a:bodyPr wrap="square" rtlCol="0">
-            <a:spAutoFit/>
-          </a:bodyPr>
-          <a:lstStyle/>
-          <a:p>
-            <a:r>
-              <a:rPr lang="de-CH" dirty="0"/>
-              <a:t>Budburst</a:t>
-            </a:r>
-            <a:endParaRPr lang="en-GB" dirty="0"/>
-          </a:p>
-        </p:txBody>
-      </p:sp>
-      <p:cxnSp>
-        <p:nvCxnSpPr>
-          <p:cNvPr id="11" name="Straight Arrow Connector 10">
-            <a:extLst>
-              <a:ext uri="{FF2B5EF4-FFF2-40B4-BE49-F238E27FC236}">
-                <a16:creationId xmlns:a16="http://schemas.microsoft.com/office/drawing/2014/main" id="{F9E2F8F7-A542-4D12-3444-9EE948B6280A}"/>
-              </a:ext>
-            </a:extLst>
-          </p:cNvPr>
-          <p:cNvCxnSpPr>
-            <a:cxnSpLocks/>
-            <a:stCxn id="12" idx="1"/>
-          </p:cNvCxnSpPr>
-          <p:nvPr/>
-        </p:nvCxnSpPr>
-        <p:spPr>
-          <a:xfrm flipH="1">
-            <a:off x="7124700" y="4980116"/>
-            <a:ext cx="3352800" cy="620584"/>
-          </a:xfrm>
-          <a:prstGeom prst="straightConnector1">
-            <a:avLst/>
-          </a:prstGeom>
-          <a:ln>
-            <a:tailEnd type="triangle"/>
-          </a:ln>
-        </p:spPr>
-        <p:style>
-          <a:lnRef idx="1">
-            <a:schemeClr val="accent1"/>
-          </a:lnRef>
-          <a:fillRef idx="0">
-            <a:schemeClr val="accent1"/>
-          </a:fillRef>
-          <a:effectRef idx="0">
-            <a:schemeClr val="accent1"/>
-          </a:effectRef>
-          <a:fontRef idx="minor">
-            <a:schemeClr val="tx1"/>
-          </a:fontRef>
-        </p:style>
-      </p:cxnSp>
-      <p:sp>
-        <p:nvSpPr>
-          <p:cNvPr id="12" name="TextBox 11">
-            <a:extLst>
-              <a:ext uri="{FF2B5EF4-FFF2-40B4-BE49-F238E27FC236}">
-                <a16:creationId xmlns:a16="http://schemas.microsoft.com/office/drawing/2014/main" id="{A9FC8493-0AD6-BDCD-FA4F-8FDE947FB7F5}"/>
-              </a:ext>
-            </a:extLst>
-          </p:cNvPr>
-          <p:cNvSpPr txBox="1"/>
-          <p:nvPr/>
-        </p:nvSpPr>
-        <p:spPr>
-          <a:xfrm>
-            <a:off x="10477500" y="4795450"/>
-            <a:ext cx="1130299" cy="369332"/>
-          </a:xfrm>
-          <a:prstGeom prst="rect">
-            <a:avLst/>
-          </a:prstGeom>
-          <a:noFill/>
-        </p:spPr>
-        <p:txBody>
-          <a:bodyPr wrap="square" rtlCol="0">
-            <a:spAutoFit/>
-          </a:bodyPr>
-          <a:lstStyle/>
-          <a:p>
-            <a:r>
-              <a:rPr lang="de-CH" dirty="0"/>
-              <a:t>Budset</a:t>
-            </a:r>
-            <a:endParaRPr lang="en-GB" dirty="0"/>
-          </a:p>
-        </p:txBody>
-      </p:sp>
-      <p:sp>
-        <p:nvSpPr>
-          <p:cNvPr id="17" name="TextBox 16">
-            <a:extLst>
-              <a:ext uri="{FF2B5EF4-FFF2-40B4-BE49-F238E27FC236}">
-                <a16:creationId xmlns:a16="http://schemas.microsoft.com/office/drawing/2014/main" id="{CEF2B93A-CB40-DAF3-E74D-8368928952C9}"/>
-              </a:ext>
-            </a:extLst>
-          </p:cNvPr>
-          <p:cNvSpPr txBox="1"/>
-          <p:nvPr/>
-        </p:nvSpPr>
-        <p:spPr>
-          <a:xfrm>
-            <a:off x="9626600" y="432018"/>
-            <a:ext cx="2247900" cy="646331"/>
-          </a:xfrm>
-          <a:prstGeom prst="rect">
-            <a:avLst/>
-          </a:prstGeom>
-          <a:noFill/>
-        </p:spPr>
-        <p:txBody>
-          <a:bodyPr wrap="square" rtlCol="0">
-            <a:spAutoFit/>
-          </a:bodyPr>
-          <a:lstStyle/>
-          <a:p>
-            <a:r>
-              <a:rPr lang="de-CH" dirty="0"/>
-              <a:t>Origin date (planting date) = 20/06/2023</a:t>
-            </a:r>
-            <a:endParaRPr lang="en-GB" dirty="0"/>
+        </p:nvSpPr>
+        <p:spPr/>
+        <p:txBody>
+          <a:bodyPr/>
+          <a:lstStyle/>
+          <a:p>
+            <a:endParaRPr lang="en-GB"/>
           </a:p>
         </p:txBody>
       </p:sp>
     </p:spTree>
     <p:extLst>
       <p:ext uri="{BB962C8B-B14F-4D97-AF65-F5344CB8AC3E}">
-        <p14:creationId xmlns:p14="http://schemas.microsoft.com/office/powerpoint/2010/main" val="232684958"/>
+        <p14:creationId xmlns:p14="http://schemas.microsoft.com/office/powerpoint/2010/main" val="4162262758"/>
       </p:ext>
     </p:extLst>
   </p:cSld>
@@ -9080,6 +9137,296 @@
           <a:chExt cx="0" cy="0"/>
         </a:xfrm>
       </p:grpSpPr>
+      <p:sp>
+        <p:nvSpPr>
+          <p:cNvPr id="2" name="Title 1">
+            <a:extLst>
+              <a:ext uri="{FF2B5EF4-FFF2-40B4-BE49-F238E27FC236}">
+                <a16:creationId xmlns:a16="http://schemas.microsoft.com/office/drawing/2014/main" id="{EF986BC2-00B2-FE0A-3FD2-8B3983EDDD41}"/>
+              </a:ext>
+            </a:extLst>
+          </p:cNvPr>
+          <p:cNvSpPr>
+            <a:spLocks noGrp="1"/>
+          </p:cNvSpPr>
+          <p:nvPr>
+            <p:ph type="title"/>
+          </p:nvPr>
+        </p:nvSpPr>
+        <p:spPr>
+          <a:xfrm>
+            <a:off x="215900" y="215900"/>
+            <a:ext cx="9875520" cy="1356360"/>
+          </a:xfrm>
+        </p:spPr>
+        <p:txBody>
+          <a:bodyPr/>
+          <a:lstStyle/>
+          <a:p>
+            <a:r>
+              <a:rPr lang="de-CH" dirty="0"/>
+              <a:t>Budset &amp; Budburst - Provenance</a:t>
+            </a:r>
+            <a:endParaRPr lang="en-GB" dirty="0"/>
+          </a:p>
+        </p:txBody>
+      </p:sp>
+      <p:pic>
+        <p:nvPicPr>
+          <p:cNvPr id="5" name="Content Placeholder 4" descr="A graph of a graph&#10;&#10;AI-generated content may be incorrect.">
+            <a:extLst>
+              <a:ext uri="{FF2B5EF4-FFF2-40B4-BE49-F238E27FC236}">
+                <a16:creationId xmlns:a16="http://schemas.microsoft.com/office/drawing/2014/main" id="{9E7923FB-1127-0B4E-8720-F56777E2285D}"/>
+              </a:ext>
+            </a:extLst>
+          </p:cNvPr>
+          <p:cNvPicPr>
+            <a:picLocks noGrp="1" noChangeAspect="1"/>
+          </p:cNvPicPr>
+          <p:nvPr>
+            <p:ph idx="1"/>
+          </p:nvPr>
+        </p:nvPicPr>
+        <p:blipFill>
+          <a:blip r:embed="rId3">
+            <a:extLst>
+              <a:ext uri="{28A0092B-C50C-407E-A947-70E740481C1C}">
+                <a14:useLocalDpi xmlns:a14="http://schemas.microsoft.com/office/drawing/2010/main" val="0"/>
+              </a:ext>
+            </a:extLst>
+          </a:blip>
+          <a:stretch>
+            <a:fillRect/>
+          </a:stretch>
+        </p:blipFill>
+        <p:spPr>
+          <a:xfrm>
+            <a:off x="1818655" y="1294466"/>
+            <a:ext cx="8554689" cy="5309534"/>
+          </a:xfrm>
+        </p:spPr>
+      </p:pic>
+      <p:cxnSp>
+        <p:nvCxnSpPr>
+          <p:cNvPr id="7" name="Straight Arrow Connector 6">
+            <a:extLst>
+              <a:ext uri="{FF2B5EF4-FFF2-40B4-BE49-F238E27FC236}">
+                <a16:creationId xmlns:a16="http://schemas.microsoft.com/office/drawing/2014/main" id="{25D74AA0-35DD-764B-F3C0-5ECE2236E1C8}"/>
+              </a:ext>
+            </a:extLst>
+          </p:cNvPr>
+          <p:cNvCxnSpPr>
+            <a:cxnSpLocks/>
+          </p:cNvCxnSpPr>
+          <p:nvPr/>
+        </p:nvCxnSpPr>
+        <p:spPr>
+          <a:xfrm flipH="1">
+            <a:off x="8775700" y="3111500"/>
+            <a:ext cx="1701800" cy="244733"/>
+          </a:xfrm>
+          <a:prstGeom prst="straightConnector1">
+            <a:avLst/>
+          </a:prstGeom>
+          <a:ln>
+            <a:tailEnd type="triangle"/>
+          </a:ln>
+        </p:spPr>
+        <p:style>
+          <a:lnRef idx="1">
+            <a:schemeClr val="accent1"/>
+          </a:lnRef>
+          <a:fillRef idx="0">
+            <a:schemeClr val="accent1"/>
+          </a:fillRef>
+          <a:effectRef idx="0">
+            <a:schemeClr val="accent1"/>
+          </a:effectRef>
+          <a:fontRef idx="minor">
+            <a:schemeClr val="tx1"/>
+          </a:fontRef>
+        </p:style>
+      </p:cxnSp>
+      <p:sp>
+        <p:nvSpPr>
+          <p:cNvPr id="10" name="TextBox 9">
+            <a:extLst>
+              <a:ext uri="{FF2B5EF4-FFF2-40B4-BE49-F238E27FC236}">
+                <a16:creationId xmlns:a16="http://schemas.microsoft.com/office/drawing/2014/main" id="{AFE8A3AE-E1B6-A94E-7C86-528849D7B52B}"/>
+              </a:ext>
+            </a:extLst>
+          </p:cNvPr>
+          <p:cNvSpPr txBox="1"/>
+          <p:nvPr/>
+        </p:nvSpPr>
+        <p:spPr>
+          <a:xfrm>
+            <a:off x="10477500" y="2833132"/>
+            <a:ext cx="1130299" cy="369332"/>
+          </a:xfrm>
+          <a:prstGeom prst="rect">
+            <a:avLst/>
+          </a:prstGeom>
+          <a:noFill/>
+        </p:spPr>
+        <p:txBody>
+          <a:bodyPr wrap="square" rtlCol="0">
+            <a:spAutoFit/>
+          </a:bodyPr>
+          <a:lstStyle/>
+          <a:p>
+            <a:r>
+              <a:rPr lang="de-CH" dirty="0"/>
+              <a:t>Budburst</a:t>
+            </a:r>
+            <a:endParaRPr lang="en-GB" dirty="0"/>
+          </a:p>
+        </p:txBody>
+      </p:sp>
+      <p:cxnSp>
+        <p:nvCxnSpPr>
+          <p:cNvPr id="11" name="Straight Arrow Connector 10">
+            <a:extLst>
+              <a:ext uri="{FF2B5EF4-FFF2-40B4-BE49-F238E27FC236}">
+                <a16:creationId xmlns:a16="http://schemas.microsoft.com/office/drawing/2014/main" id="{F9E2F8F7-A542-4D12-3444-9EE948B6280A}"/>
+              </a:ext>
+            </a:extLst>
+          </p:cNvPr>
+          <p:cNvCxnSpPr>
+            <a:cxnSpLocks/>
+            <a:stCxn id="12" idx="1"/>
+          </p:cNvCxnSpPr>
+          <p:nvPr/>
+        </p:nvCxnSpPr>
+        <p:spPr>
+          <a:xfrm flipH="1">
+            <a:off x="7124700" y="4980116"/>
+            <a:ext cx="3352800" cy="620584"/>
+          </a:xfrm>
+          <a:prstGeom prst="straightConnector1">
+            <a:avLst/>
+          </a:prstGeom>
+          <a:ln>
+            <a:tailEnd type="triangle"/>
+          </a:ln>
+        </p:spPr>
+        <p:style>
+          <a:lnRef idx="1">
+            <a:schemeClr val="accent1"/>
+          </a:lnRef>
+          <a:fillRef idx="0">
+            <a:schemeClr val="accent1"/>
+          </a:fillRef>
+          <a:effectRef idx="0">
+            <a:schemeClr val="accent1"/>
+          </a:effectRef>
+          <a:fontRef idx="minor">
+            <a:schemeClr val="tx1"/>
+          </a:fontRef>
+        </p:style>
+      </p:cxnSp>
+      <p:sp>
+        <p:nvSpPr>
+          <p:cNvPr id="12" name="TextBox 11">
+            <a:extLst>
+              <a:ext uri="{FF2B5EF4-FFF2-40B4-BE49-F238E27FC236}">
+                <a16:creationId xmlns:a16="http://schemas.microsoft.com/office/drawing/2014/main" id="{A9FC8493-0AD6-BDCD-FA4F-8FDE947FB7F5}"/>
+              </a:ext>
+            </a:extLst>
+          </p:cNvPr>
+          <p:cNvSpPr txBox="1"/>
+          <p:nvPr/>
+        </p:nvSpPr>
+        <p:spPr>
+          <a:xfrm>
+            <a:off x="10477500" y="4795450"/>
+            <a:ext cx="1130299" cy="369332"/>
+          </a:xfrm>
+          <a:prstGeom prst="rect">
+            <a:avLst/>
+          </a:prstGeom>
+          <a:noFill/>
+        </p:spPr>
+        <p:txBody>
+          <a:bodyPr wrap="square" rtlCol="0">
+            <a:spAutoFit/>
+          </a:bodyPr>
+          <a:lstStyle/>
+          <a:p>
+            <a:r>
+              <a:rPr lang="de-CH" dirty="0"/>
+              <a:t>Budset</a:t>
+            </a:r>
+            <a:endParaRPr lang="en-GB" dirty="0"/>
+          </a:p>
+        </p:txBody>
+      </p:sp>
+      <p:sp>
+        <p:nvSpPr>
+          <p:cNvPr id="17" name="TextBox 16">
+            <a:extLst>
+              <a:ext uri="{FF2B5EF4-FFF2-40B4-BE49-F238E27FC236}">
+                <a16:creationId xmlns:a16="http://schemas.microsoft.com/office/drawing/2014/main" id="{CEF2B93A-CB40-DAF3-E74D-8368928952C9}"/>
+              </a:ext>
+            </a:extLst>
+          </p:cNvPr>
+          <p:cNvSpPr txBox="1"/>
+          <p:nvPr/>
+        </p:nvSpPr>
+        <p:spPr>
+          <a:xfrm>
+            <a:off x="9626600" y="432018"/>
+            <a:ext cx="2247900" cy="646331"/>
+          </a:xfrm>
+          <a:prstGeom prst="rect">
+            <a:avLst/>
+          </a:prstGeom>
+          <a:noFill/>
+        </p:spPr>
+        <p:txBody>
+          <a:bodyPr wrap="square" rtlCol="0">
+            <a:spAutoFit/>
+          </a:bodyPr>
+          <a:lstStyle/>
+          <a:p>
+            <a:r>
+              <a:rPr lang="de-CH" dirty="0"/>
+              <a:t>Origin date (planting date) = 20/06/2023</a:t>
+            </a:r>
+            <a:endParaRPr lang="en-GB" dirty="0"/>
+          </a:p>
+        </p:txBody>
+      </p:sp>
+    </p:spTree>
+    <p:extLst>
+      <p:ext uri="{BB962C8B-B14F-4D97-AF65-F5344CB8AC3E}">
+        <p14:creationId xmlns:p14="http://schemas.microsoft.com/office/powerpoint/2010/main" val="232684958"/>
+      </p:ext>
+    </p:extLst>
+  </p:cSld>
+  <p:clrMapOvr>
+    <a:masterClrMapping/>
+  </p:clrMapOvr>
+</p:sld>
+</file>
+
+<file path=ppt/slides/slide29.xml><?xml version="1.0" encoding="utf-8"?>
+<p:sld xmlns:a="http://schemas.openxmlformats.org/drawingml/2006/main" xmlns:r="http://schemas.openxmlformats.org/officeDocument/2006/relationships" xmlns:p="http://schemas.openxmlformats.org/presentationml/2006/main">
+  <p:cSld>
+    <p:spTree>
+      <p:nvGrpSpPr>
+        <p:cNvPr id="1" name=""/>
+        <p:cNvGrpSpPr/>
+        <p:nvPr/>
+      </p:nvGrpSpPr>
+      <p:grpSpPr>
+        <a:xfrm>
+          <a:off x="0" y="0"/>
+          <a:ext cx="0" cy="0"/>
+          <a:chOff x="0" y="0"/>
+          <a:chExt cx="0" cy="0"/>
+        </a:xfrm>
+      </p:grpSpPr>
       <p:pic>
         <p:nvPicPr>
           <p:cNvPr id="6" name="Content Placeholder 5" descr="A graph with lines and numbers&#10;&#10;AI-generated content may be incorrect.">
@@ -9162,7 +9509,91 @@
 </p:sld>
 </file>
 
-<file path=ppt/slides/slide29.xml><?xml version="1.0" encoding="utf-8"?>
+<file path=ppt/slides/slide3.xml><?xml version="1.0" encoding="utf-8"?>
+<p:sld xmlns:a="http://schemas.openxmlformats.org/drawingml/2006/main" xmlns:r="http://schemas.openxmlformats.org/officeDocument/2006/relationships" xmlns:p="http://schemas.openxmlformats.org/presentationml/2006/main">
+  <p:cSld>
+    <p:spTree>
+      <p:nvGrpSpPr>
+        <p:cNvPr id="1" name=""/>
+        <p:cNvGrpSpPr/>
+        <p:nvPr/>
+      </p:nvGrpSpPr>
+      <p:grpSpPr>
+        <a:xfrm>
+          <a:off x="0" y="0"/>
+          <a:ext cx="0" cy="0"/>
+          <a:chOff x="0" y="0"/>
+          <a:chExt cx="0" cy="0"/>
+        </a:xfrm>
+      </p:grpSpPr>
+      <p:sp>
+        <p:nvSpPr>
+          <p:cNvPr id="2" name="Title 1">
+            <a:extLst>
+              <a:ext uri="{FF2B5EF4-FFF2-40B4-BE49-F238E27FC236}">
+                <a16:creationId xmlns:a16="http://schemas.microsoft.com/office/drawing/2014/main" id="{00CF54C3-63C1-3F02-8A60-6328BB58EECF}"/>
+              </a:ext>
+            </a:extLst>
+          </p:cNvPr>
+          <p:cNvSpPr>
+            <a:spLocks noGrp="1"/>
+          </p:cNvSpPr>
+          <p:nvPr>
+            <p:ph type="title"/>
+          </p:nvPr>
+        </p:nvSpPr>
+        <p:spPr/>
+        <p:txBody>
+          <a:bodyPr/>
+          <a:lstStyle/>
+          <a:p>
+            <a:r>
+              <a:rPr lang="de-CH" dirty="0"/>
+              <a:t>How many families in each type &amp; provenance?</a:t>
+            </a:r>
+            <a:endParaRPr lang="en-GB" dirty="0"/>
+          </a:p>
+        </p:txBody>
+      </p:sp>
+      <p:sp>
+        <p:nvSpPr>
+          <p:cNvPr id="3" name="Content Placeholder 2">
+            <a:extLst>
+              <a:ext uri="{FF2B5EF4-FFF2-40B4-BE49-F238E27FC236}">
+                <a16:creationId xmlns:a16="http://schemas.microsoft.com/office/drawing/2014/main" id="{8F0518EC-B1B3-C3A8-B6A5-FCDA5A152EB4}"/>
+              </a:ext>
+            </a:extLst>
+          </p:cNvPr>
+          <p:cNvSpPr>
+            <a:spLocks noGrp="1"/>
+          </p:cNvSpPr>
+          <p:nvPr>
+            <p:ph idx="1"/>
+          </p:nvPr>
+        </p:nvSpPr>
+        <p:spPr/>
+        <p:txBody>
+          <a:bodyPr/>
+          <a:lstStyle/>
+          <a:p>
+            <a:endParaRPr lang="en-GB"/>
+          </a:p>
+        </p:txBody>
+      </p:sp>
+    </p:spTree>
+    <p:extLst>
+      <p:ext uri="{BB962C8B-B14F-4D97-AF65-F5344CB8AC3E}">
+        <p14:creationId xmlns:p14="http://schemas.microsoft.com/office/powerpoint/2010/main" val="1156399153"/>
+      </p:ext>
+    </p:extLst>
+  </p:cSld>
+  <p:clrMapOvr>
+    <a:masterClrMapping/>
+  </p:clrMapOvr>
+</p:sld>
+</file>
+
+<file path=ppt/slides/slide30.xml><?xml version="1.0" encoding="utf-8"?>
 <p:sld xmlns:a="http://schemas.openxmlformats.org/drawingml/2006/main" xmlns:r="http://schemas.openxmlformats.org/officeDocument/2006/relationships" xmlns:p="http://schemas.openxmlformats.org/presentationml/2006/main">
   <p:cSld>
     <p:spTree>
@@ -9720,7 +10151,7 @@
 </p:sld>
 </file>
 
-<file path=ppt/slides/slide3.xml><?xml version="1.0" encoding="utf-8"?>
+<file path=ppt/slides/slide31.xml><?xml version="1.0" encoding="utf-8"?>
 <p:sld xmlns:a="http://schemas.openxmlformats.org/drawingml/2006/main" xmlns:r="http://schemas.openxmlformats.org/officeDocument/2006/relationships" xmlns:p="http://schemas.openxmlformats.org/presentationml/2006/main">
   <p:cSld>
     <p:spTree>
@@ -9742,90 +10173,6 @@
           <p:cNvPr id="2" name="Title 1">
             <a:extLst>
               <a:ext uri="{FF2B5EF4-FFF2-40B4-BE49-F238E27FC236}">
-                <a16:creationId xmlns:a16="http://schemas.microsoft.com/office/drawing/2014/main" id="{00CF54C3-63C1-3F02-8A60-6328BB58EECF}"/>
-              </a:ext>
-            </a:extLst>
-          </p:cNvPr>
-          <p:cNvSpPr>
-            <a:spLocks noGrp="1"/>
-          </p:cNvSpPr>
-          <p:nvPr>
-            <p:ph type="title"/>
-          </p:nvPr>
-        </p:nvSpPr>
-        <p:spPr/>
-        <p:txBody>
-          <a:bodyPr/>
-          <a:lstStyle/>
-          <a:p>
-            <a:r>
-              <a:rPr lang="de-CH" dirty="0"/>
-              <a:t>How many families in each type &amp; provenance?</a:t>
-            </a:r>
-            <a:endParaRPr lang="en-GB" dirty="0"/>
-          </a:p>
-        </p:txBody>
-      </p:sp>
-      <p:sp>
-        <p:nvSpPr>
-          <p:cNvPr id="3" name="Content Placeholder 2">
-            <a:extLst>
-              <a:ext uri="{FF2B5EF4-FFF2-40B4-BE49-F238E27FC236}">
-                <a16:creationId xmlns:a16="http://schemas.microsoft.com/office/drawing/2014/main" id="{8F0518EC-B1B3-C3A8-B6A5-FCDA5A152EB4}"/>
-              </a:ext>
-            </a:extLst>
-          </p:cNvPr>
-          <p:cNvSpPr>
-            <a:spLocks noGrp="1"/>
-          </p:cNvSpPr>
-          <p:nvPr>
-            <p:ph idx="1"/>
-          </p:nvPr>
-        </p:nvSpPr>
-        <p:spPr/>
-        <p:txBody>
-          <a:bodyPr/>
-          <a:lstStyle/>
-          <a:p>
-            <a:endParaRPr lang="en-GB"/>
-          </a:p>
-        </p:txBody>
-      </p:sp>
-    </p:spTree>
-    <p:extLst>
-      <p:ext uri="{BB962C8B-B14F-4D97-AF65-F5344CB8AC3E}">
-        <p14:creationId xmlns:p14="http://schemas.microsoft.com/office/powerpoint/2010/main" val="1156399153"/>
-      </p:ext>
-    </p:extLst>
-  </p:cSld>
-  <p:clrMapOvr>
-    <a:masterClrMapping/>
-  </p:clrMapOvr>
-</p:sld>
-</file>
-
-<file path=ppt/slides/slide30.xml><?xml version="1.0" encoding="utf-8"?>
-<p:sld xmlns:a="http://schemas.openxmlformats.org/drawingml/2006/main" xmlns:r="http://schemas.openxmlformats.org/officeDocument/2006/relationships" xmlns:p="http://schemas.openxmlformats.org/presentationml/2006/main">
-  <p:cSld>
-    <p:spTree>
-      <p:nvGrpSpPr>
-        <p:cNvPr id="1" name=""/>
-        <p:cNvGrpSpPr/>
-        <p:nvPr/>
-      </p:nvGrpSpPr>
-      <p:grpSpPr>
-        <a:xfrm>
-          <a:off x="0" y="0"/>
-          <a:ext cx="0" cy="0"/>
-          <a:chOff x="0" y="0"/>
-          <a:chExt cx="0" cy="0"/>
-        </a:xfrm>
-      </p:grpSpPr>
-      <p:sp>
-        <p:nvSpPr>
-          <p:cNvPr id="2" name="Title 1">
-            <a:extLst>
-              <a:ext uri="{FF2B5EF4-FFF2-40B4-BE49-F238E27FC236}">
                 <a16:creationId xmlns:a16="http://schemas.microsoft.com/office/drawing/2014/main" id="{7B8526B4-C28B-9F40-11FC-0C82F8F92148}"/>
               </a:ext>
             </a:extLst>
@@ -9926,7 +10273,7 @@
 </p:sld>
 </file>
 
-<file path=ppt/slides/slide31.xml><?xml version="1.0" encoding="utf-8"?>
+<file path=ppt/slides/slide32.xml><?xml version="1.0" encoding="utf-8"?>
 <p:sld xmlns:a="http://schemas.openxmlformats.org/drawingml/2006/main" xmlns:r="http://schemas.openxmlformats.org/officeDocument/2006/relationships" xmlns:p="http://schemas.openxmlformats.org/presentationml/2006/main">
   <p:cSld>
     <p:spTree>

</xml_diff>

<commit_message>
dabbled in degree days
</commit_message>
<xml_diff>
--- a/RapidAdaptation_DataExploration.pptx
+++ b/RapidAdaptation_DataExploration.pptx
@@ -149,7 +149,7 @@
 <file path=ppt/revisionInfo.xml><?xml version="1.0" encoding="utf-8"?>
 <p1510:revInfo xmlns:a="http://schemas.openxmlformats.org/drawingml/2006/main" xmlns:r="http://schemas.openxmlformats.org/officeDocument/2006/relationships" xmlns:p1510="http://schemas.microsoft.com/office/powerpoint/2015/10/main">
   <p1510:revLst>
-    <p1510:client id="{14F8172B-23CC-43AF-8874-FD0289D90325}" v="11" dt="2026-01-20T10:03:07.877"/>
+    <p1510:client id="{14F8172B-23CC-43AF-8874-FD0289D90325}" v="12" dt="2026-01-20T14:49:49.974"/>
   </p1510:revLst>
 </p1510:revInfo>
 </file>
@@ -1231,7 +1231,7 @@
   <pc:docChgLst>
     <pc:chgData name="Luisa Dickenmann" userId="0c0840b0-1ae7-42c8-98b5-b02d8f71a603" providerId="ADAL" clId="{14F8172B-23CC-43AF-8874-FD0289D90325}"/>
     <pc:docChg chg="undo custSel addSld modSld">
-      <pc:chgData name="Luisa Dickenmann" userId="0c0840b0-1ae7-42c8-98b5-b02d8f71a603" providerId="ADAL" clId="{14F8172B-23CC-43AF-8874-FD0289D90325}" dt="2026-01-20T10:03:38.989" v="497" actId="14100"/>
+      <pc:chgData name="Luisa Dickenmann" userId="0c0840b0-1ae7-42c8-98b5-b02d8f71a603" providerId="ADAL" clId="{14F8172B-23CC-43AF-8874-FD0289D90325}" dt="2026-01-20T14:50:23.208" v="512" actId="14100"/>
       <pc:docMkLst>
         <pc:docMk/>
       </pc:docMkLst>
@@ -1328,6 +1328,69 @@
             <ac:picMk id="14" creationId="{E7EA355A-0AE0-3FC7-425D-CC8AF30BA613}"/>
           </ac:picMkLst>
         </pc:picChg>
+      </pc:sldChg>
+      <pc:sldChg chg="addSp delSp modSp mod setBg">
+        <pc:chgData name="Luisa Dickenmann" userId="0c0840b0-1ae7-42c8-98b5-b02d8f71a603" providerId="ADAL" clId="{14F8172B-23CC-43AF-8874-FD0289D90325}" dt="2026-01-20T14:50:23.208" v="512" actId="14100"/>
+        <pc:sldMkLst>
+          <pc:docMk/>
+          <pc:sldMk cId="3635244816" sldId="286"/>
+        </pc:sldMkLst>
+        <pc:spChg chg="mod">
+          <ac:chgData name="Luisa Dickenmann" userId="0c0840b0-1ae7-42c8-98b5-b02d8f71a603" providerId="ADAL" clId="{14F8172B-23CC-43AF-8874-FD0289D90325}" dt="2026-01-20T14:50:05.658" v="506" actId="1076"/>
+          <ac:spMkLst>
+            <pc:docMk/>
+            <pc:sldMk cId="3635244816" sldId="286"/>
+            <ac:spMk id="2" creationId="{7C06FE14-95D7-2C34-3B1C-7E62C27D5BD5}"/>
+          </ac:spMkLst>
+        </pc:spChg>
+        <pc:spChg chg="del">
+          <ac:chgData name="Luisa Dickenmann" userId="0c0840b0-1ae7-42c8-98b5-b02d8f71a603" providerId="ADAL" clId="{14F8172B-23CC-43AF-8874-FD0289D90325}" dt="2026-01-20T14:49:49.972" v="498" actId="931"/>
+          <ac:spMkLst>
+            <pc:docMk/>
+            <pc:sldMk cId="3635244816" sldId="286"/>
+            <ac:spMk id="3" creationId="{F6DB63F4-FC30-DECB-6678-B7E5BBA0AA7F}"/>
+          </ac:spMkLst>
+        </pc:spChg>
+        <pc:spChg chg="add del">
+          <ac:chgData name="Luisa Dickenmann" userId="0c0840b0-1ae7-42c8-98b5-b02d8f71a603" providerId="ADAL" clId="{14F8172B-23CC-43AF-8874-FD0289D90325}" dt="2026-01-20T14:49:56.067" v="502" actId="26606"/>
+          <ac:spMkLst>
+            <pc:docMk/>
+            <pc:sldMk cId="3635244816" sldId="286"/>
+            <ac:spMk id="10" creationId="{809C0BCD-BEE9-423F-A51C-BCCD8E5EAADA}"/>
+          </ac:spMkLst>
+        </pc:spChg>
+        <pc:spChg chg="add del">
+          <ac:chgData name="Luisa Dickenmann" userId="0c0840b0-1ae7-42c8-98b5-b02d8f71a603" providerId="ADAL" clId="{14F8172B-23CC-43AF-8874-FD0289D90325}" dt="2026-01-20T14:49:56.067" v="502" actId="26606"/>
+          <ac:spMkLst>
+            <pc:docMk/>
+            <pc:sldMk cId="3635244816" sldId="286"/>
+            <ac:spMk id="12" creationId="{9998D094-42B2-42BA-AA14-E8FBE073A5D8}"/>
+          </ac:spMkLst>
+        </pc:spChg>
+        <pc:picChg chg="add mod">
+          <ac:chgData name="Luisa Dickenmann" userId="0c0840b0-1ae7-42c8-98b5-b02d8f71a603" providerId="ADAL" clId="{14F8172B-23CC-43AF-8874-FD0289D90325}" dt="2026-01-20T14:50:23.208" v="512" actId="14100"/>
+          <ac:picMkLst>
+            <pc:docMk/>
+            <pc:sldMk cId="3635244816" sldId="286"/>
+            <ac:picMk id="5" creationId="{3F139967-5735-58E9-4965-3181F2DABA56}"/>
+          </ac:picMkLst>
+        </pc:picChg>
+        <pc:cxnChg chg="add del">
+          <ac:chgData name="Luisa Dickenmann" userId="0c0840b0-1ae7-42c8-98b5-b02d8f71a603" providerId="ADAL" clId="{14F8172B-23CC-43AF-8874-FD0289D90325}" dt="2026-01-20T14:49:56.067" v="502" actId="26606"/>
+          <ac:cxnSpMkLst>
+            <pc:docMk/>
+            <pc:sldMk cId="3635244816" sldId="286"/>
+            <ac:cxnSpMk id="14" creationId="{8465D64B-59F4-4BDC-B833-A17EF1E04697}"/>
+          </ac:cxnSpMkLst>
+        </pc:cxnChg>
+        <pc:cxnChg chg="add del">
+          <ac:chgData name="Luisa Dickenmann" userId="0c0840b0-1ae7-42c8-98b5-b02d8f71a603" providerId="ADAL" clId="{14F8172B-23CC-43AF-8874-FD0289D90325}" dt="2026-01-20T14:49:56.067" v="502" actId="26606"/>
+          <ac:cxnSpMkLst>
+            <pc:docMk/>
+            <pc:sldMk cId="3635244816" sldId="286"/>
+            <ac:cxnSpMk id="16" creationId="{63FED537-3AF1-4C36-9904-77B6A54D27B5}"/>
+          </ac:cxnSpMkLst>
+        </pc:cxnChg>
       </pc:sldChg>
       <pc:sldChg chg="addSp delSp modSp mod">
         <pc:chgData name="Luisa Dickenmann" userId="0c0840b0-1ae7-42c8-98b5-b02d8f71a603" providerId="ADAL" clId="{14F8172B-23CC-43AF-8874-FD0289D90325}" dt="2026-01-20T09:59:00.407" v="394" actId="20577"/>
@@ -8985,44 +9048,59 @@
             <p:ph type="title"/>
           </p:nvPr>
         </p:nvSpPr>
-        <p:spPr/>
+        <p:spPr>
+          <a:xfrm>
+            <a:off x="206829" y="83820"/>
+            <a:ext cx="9875520" cy="1356360"/>
+          </a:xfrm>
+        </p:spPr>
         <p:txBody>
           <a:bodyPr/>
           <a:lstStyle/>
           <a:p>
             <a:r>
               <a:rPr lang="de-CH" dirty="0"/>
-              <a:t>Overlay BS &amp; BB data with temperature</a:t>
+              <a:t>BS &amp; BB data with temperature</a:t>
             </a:r>
             <a:endParaRPr lang="en-GB" dirty="0"/>
           </a:p>
         </p:txBody>
       </p:sp>
-      <p:sp>
-        <p:nvSpPr>
-          <p:cNvPr id="3" name="Content Placeholder 2">
+      <p:pic>
+        <p:nvPicPr>
+          <p:cNvPr id="5" name="Content Placeholder 4">
             <a:extLst>
               <a:ext uri="{FF2B5EF4-FFF2-40B4-BE49-F238E27FC236}">
-                <a16:creationId xmlns:a16="http://schemas.microsoft.com/office/drawing/2014/main" id="{F6DB63F4-FC30-DECB-6678-B7E5BBA0AA7F}"/>
+                <a16:creationId xmlns:a16="http://schemas.microsoft.com/office/drawing/2014/main" id="{3F139967-5735-58E9-4965-3181F2DABA56}"/>
               </a:ext>
             </a:extLst>
           </p:cNvPr>
-          <p:cNvSpPr>
-            <a:spLocks noGrp="1"/>
-          </p:cNvSpPr>
+          <p:cNvPicPr>
+            <a:picLocks noGrp="1" noChangeAspect="1"/>
+          </p:cNvPicPr>
           <p:nvPr>
             <p:ph idx="1"/>
           </p:nvPr>
-        </p:nvSpPr>
-        <p:spPr/>
-        <p:txBody>
-          <a:bodyPr/>
-          <a:lstStyle/>
-          <a:p>
-            <a:endParaRPr lang="en-GB"/>
-          </a:p>
-        </p:txBody>
-      </p:sp>
+        </p:nvPicPr>
+        <p:blipFill>
+          <a:blip r:embed="rId2">
+            <a:extLst>
+              <a:ext uri="{28A0092B-C50C-407E-A947-70E740481C1C}">
+                <a14:useLocalDpi xmlns:a14="http://schemas.microsoft.com/office/drawing/2010/main" val="0"/>
+              </a:ext>
+            </a:extLst>
+          </a:blip>
+          <a:stretch>
+            <a:fillRect/>
+          </a:stretch>
+        </p:blipFill>
+        <p:spPr>
+          <a:xfrm>
+            <a:off x="326573" y="1165851"/>
+            <a:ext cx="11549741" cy="5267608"/>
+          </a:xfrm>
+        </p:spPr>
+      </p:pic>
     </p:spTree>
     <p:extLst>
       <p:ext uri="{BB962C8B-B14F-4D97-AF65-F5344CB8AC3E}">

</xml_diff>